<commit_message>
Update the background knowledge introduction part.
</commit_message>
<xml_diff>
--- a/doc/designDoc.pptx
+++ b/doc/designDoc.pptx
@@ -4,8 +4,14 @@
   <p:sldMasterIdLst>
     <p:sldMasterId id="2147483648" r:id="rId1"/>
   </p:sldMasterIdLst>
+  <p:notesMasterIdLst>
+    <p:notesMasterId r:id="rId6"/>
+  </p:notesMasterIdLst>
   <p:sldIdLst>
     <p:sldId id="256" r:id="rId2"/>
+    <p:sldId id="257" r:id="rId3"/>
+    <p:sldId id="258" r:id="rId4"/>
+    <p:sldId id="259" r:id="rId5"/>
   </p:sldIdLst>
   <p:sldSz cx="12192000" cy="6858000"/>
   <p:notesSz cx="6858000" cy="9144000"/>
@@ -104,7 +110,446 @@
       </a:defRPr>
     </a:lvl9pPr>
   </p:defaultTextStyle>
+  <p:extLst>
+    <p:ext uri="{EFAFB233-063F-42B5-8137-9DF3F51BA10A}">
+      <p15:sldGuideLst xmlns:p15="http://schemas.microsoft.com/office/powerpoint/2012/main"/>
+    </p:ext>
+  </p:extLst>
 </p:presentation>
+</file>
+
+<file path=ppt/notesMasters/notesMaster1.xml><?xml version="1.0" encoding="utf-8"?>
+<p:notesMaster xmlns:a="http://schemas.openxmlformats.org/drawingml/2006/main" xmlns:r="http://schemas.openxmlformats.org/officeDocument/2006/relationships" xmlns:p="http://schemas.openxmlformats.org/presentationml/2006/main">
+  <p:cSld>
+    <p:bg>
+      <p:bgRef idx="1001">
+        <a:schemeClr val="bg1"/>
+      </p:bgRef>
+    </p:bg>
+    <p:spTree>
+      <p:nvGrpSpPr>
+        <p:cNvPr id="1" name=""/>
+        <p:cNvGrpSpPr/>
+        <p:nvPr/>
+      </p:nvGrpSpPr>
+      <p:grpSpPr>
+        <a:xfrm>
+          <a:off x="0" y="0"/>
+          <a:ext cx="0" cy="0"/>
+          <a:chOff x="0" y="0"/>
+          <a:chExt cx="0" cy="0"/>
+        </a:xfrm>
+      </p:grpSpPr>
+      <p:sp>
+        <p:nvSpPr>
+          <p:cNvPr id="2" name="Header Placeholder 1"/>
+          <p:cNvSpPr>
+            <a:spLocks noGrp="1"/>
+          </p:cNvSpPr>
+          <p:nvPr>
+            <p:ph type="hdr" sz="quarter"/>
+          </p:nvPr>
+        </p:nvSpPr>
+        <p:spPr>
+          <a:xfrm>
+            <a:off x="0" y="0"/>
+            <a:ext cx="2971800" cy="458788"/>
+          </a:xfrm>
+          <a:prstGeom prst="rect">
+            <a:avLst/>
+          </a:prstGeom>
+        </p:spPr>
+        <p:txBody>
+          <a:bodyPr vert="horz" lIns="91440" tIns="45720" rIns="91440" bIns="45720" rtlCol="0"/>
+          <a:lstStyle>
+            <a:lvl1pPr algn="l">
+              <a:defRPr sz="1200"/>
+            </a:lvl1pPr>
+          </a:lstStyle>
+          <a:p>
+            <a:endParaRPr lang="en-SG"/>
+          </a:p>
+        </p:txBody>
+      </p:sp>
+      <p:sp>
+        <p:nvSpPr>
+          <p:cNvPr id="3" name="Date Placeholder 2"/>
+          <p:cNvSpPr>
+            <a:spLocks noGrp="1"/>
+          </p:cNvSpPr>
+          <p:nvPr>
+            <p:ph type="dt" idx="1"/>
+          </p:nvPr>
+        </p:nvSpPr>
+        <p:spPr>
+          <a:xfrm>
+            <a:off x="3884613" y="0"/>
+            <a:ext cx="2971800" cy="458788"/>
+          </a:xfrm>
+          <a:prstGeom prst="rect">
+            <a:avLst/>
+          </a:prstGeom>
+        </p:spPr>
+        <p:txBody>
+          <a:bodyPr vert="horz" lIns="91440" tIns="45720" rIns="91440" bIns="45720" rtlCol="0"/>
+          <a:lstStyle>
+            <a:lvl1pPr algn="r">
+              <a:defRPr sz="1200"/>
+            </a:lvl1pPr>
+          </a:lstStyle>
+          <a:p>
+            <a:fld id="{9E1B34BE-8C20-40BD-B37D-1D72CA947284}" type="datetimeFigureOut">
+              <a:rPr lang="en-SG" smtClean="0"/>
+              <a:t>1/2/2024</a:t>
+            </a:fld>
+            <a:endParaRPr lang="en-SG"/>
+          </a:p>
+        </p:txBody>
+      </p:sp>
+      <p:sp>
+        <p:nvSpPr>
+          <p:cNvPr id="4" name="Slide Image Placeholder 3"/>
+          <p:cNvSpPr>
+            <a:spLocks noGrp="1" noRot="1" noChangeAspect="1"/>
+          </p:cNvSpPr>
+          <p:nvPr>
+            <p:ph type="sldImg" idx="2"/>
+          </p:nvPr>
+        </p:nvSpPr>
+        <p:spPr>
+          <a:xfrm>
+            <a:off x="685800" y="1143000"/>
+            <a:ext cx="5486400" cy="3086100"/>
+          </a:xfrm>
+          <a:prstGeom prst="rect">
+            <a:avLst/>
+          </a:prstGeom>
+          <a:noFill/>
+          <a:ln w="12700">
+            <a:solidFill>
+              <a:prstClr val="black"/>
+            </a:solidFill>
+          </a:ln>
+        </p:spPr>
+        <p:txBody>
+          <a:bodyPr vert="horz" lIns="91440" tIns="45720" rIns="91440" bIns="45720" rtlCol="0" anchor="ctr"/>
+          <a:lstStyle/>
+          <a:p>
+            <a:endParaRPr lang="en-SG"/>
+          </a:p>
+        </p:txBody>
+      </p:sp>
+      <p:sp>
+        <p:nvSpPr>
+          <p:cNvPr id="5" name="Notes Placeholder 4"/>
+          <p:cNvSpPr>
+            <a:spLocks noGrp="1"/>
+          </p:cNvSpPr>
+          <p:nvPr>
+            <p:ph type="body" sz="quarter" idx="3"/>
+          </p:nvPr>
+        </p:nvSpPr>
+        <p:spPr>
+          <a:xfrm>
+            <a:off x="685800" y="4400550"/>
+            <a:ext cx="5486400" cy="3600450"/>
+          </a:xfrm>
+          <a:prstGeom prst="rect">
+            <a:avLst/>
+          </a:prstGeom>
+        </p:spPr>
+        <p:txBody>
+          <a:bodyPr vert="horz" lIns="91440" tIns="45720" rIns="91440" bIns="45720" rtlCol="0"/>
+          <a:lstStyle/>
+          <a:p>
+            <a:pPr lvl="0"/>
+            <a:r>
+              <a:rPr lang="en-US"/>
+              <a:t>Click to edit Master text styles</a:t>
+            </a:r>
+          </a:p>
+          <a:p>
+            <a:pPr lvl="1"/>
+            <a:r>
+              <a:rPr lang="en-US"/>
+              <a:t>Second level</a:t>
+            </a:r>
+          </a:p>
+          <a:p>
+            <a:pPr lvl="2"/>
+            <a:r>
+              <a:rPr lang="en-US"/>
+              <a:t>Third level</a:t>
+            </a:r>
+          </a:p>
+          <a:p>
+            <a:pPr lvl="3"/>
+            <a:r>
+              <a:rPr lang="en-US"/>
+              <a:t>Fourth level</a:t>
+            </a:r>
+          </a:p>
+          <a:p>
+            <a:pPr lvl="4"/>
+            <a:r>
+              <a:rPr lang="en-US"/>
+              <a:t>Fifth level</a:t>
+            </a:r>
+            <a:endParaRPr lang="en-SG"/>
+          </a:p>
+        </p:txBody>
+      </p:sp>
+      <p:sp>
+        <p:nvSpPr>
+          <p:cNvPr id="6" name="Footer Placeholder 5"/>
+          <p:cNvSpPr>
+            <a:spLocks noGrp="1"/>
+          </p:cNvSpPr>
+          <p:nvPr>
+            <p:ph type="ftr" sz="quarter" idx="4"/>
+          </p:nvPr>
+        </p:nvSpPr>
+        <p:spPr>
+          <a:xfrm>
+            <a:off x="0" y="8685213"/>
+            <a:ext cx="2971800" cy="458787"/>
+          </a:xfrm>
+          <a:prstGeom prst="rect">
+            <a:avLst/>
+          </a:prstGeom>
+        </p:spPr>
+        <p:txBody>
+          <a:bodyPr vert="horz" lIns="91440" tIns="45720" rIns="91440" bIns="45720" rtlCol="0" anchor="b"/>
+          <a:lstStyle>
+            <a:lvl1pPr algn="l">
+              <a:defRPr sz="1200"/>
+            </a:lvl1pPr>
+          </a:lstStyle>
+          <a:p>
+            <a:endParaRPr lang="en-SG"/>
+          </a:p>
+        </p:txBody>
+      </p:sp>
+      <p:sp>
+        <p:nvSpPr>
+          <p:cNvPr id="7" name="Slide Number Placeholder 6"/>
+          <p:cNvSpPr>
+            <a:spLocks noGrp="1"/>
+          </p:cNvSpPr>
+          <p:nvPr>
+            <p:ph type="sldNum" sz="quarter" idx="5"/>
+          </p:nvPr>
+        </p:nvSpPr>
+        <p:spPr>
+          <a:xfrm>
+            <a:off x="3884613" y="8685213"/>
+            <a:ext cx="2971800" cy="458787"/>
+          </a:xfrm>
+          <a:prstGeom prst="rect">
+            <a:avLst/>
+          </a:prstGeom>
+        </p:spPr>
+        <p:txBody>
+          <a:bodyPr vert="horz" lIns="91440" tIns="45720" rIns="91440" bIns="45720" rtlCol="0" anchor="b"/>
+          <a:lstStyle>
+            <a:lvl1pPr algn="r">
+              <a:defRPr sz="1200"/>
+            </a:lvl1pPr>
+          </a:lstStyle>
+          <a:p>
+            <a:fld id="{3ECC8E96-92C7-4A6B-80D2-BF9BC2B92894}" type="slidenum">
+              <a:rPr lang="en-SG" smtClean="0"/>
+              <a:t>‹#›</a:t>
+            </a:fld>
+            <a:endParaRPr lang="en-SG"/>
+          </a:p>
+        </p:txBody>
+      </p:sp>
+    </p:spTree>
+    <p:extLst>
+      <p:ext uri="{BB962C8B-B14F-4D97-AF65-F5344CB8AC3E}">
+        <p14:creationId xmlns:p14="http://schemas.microsoft.com/office/powerpoint/2010/main" val="4107562158"/>
+      </p:ext>
+    </p:extLst>
+  </p:cSld>
+  <p:clrMap bg1="lt1" tx1="dk1" bg2="lt2" tx2="dk2" accent1="accent1" accent2="accent2" accent3="accent3" accent4="accent4" accent5="accent5" accent6="accent6" hlink="hlink" folHlink="folHlink"/>
+  <p:notesStyle>
+    <a:lvl1pPr marL="0" algn="l" defTabSz="914400" rtl="0" eaLnBrk="1" latinLnBrk="0" hangingPunct="1">
+      <a:defRPr sz="1200" kern="1200">
+        <a:solidFill>
+          <a:schemeClr val="tx1"/>
+        </a:solidFill>
+        <a:latin typeface="+mn-lt"/>
+        <a:ea typeface="+mn-ea"/>
+        <a:cs typeface="+mn-cs"/>
+      </a:defRPr>
+    </a:lvl1pPr>
+    <a:lvl2pPr marL="457200" algn="l" defTabSz="914400" rtl="0" eaLnBrk="1" latinLnBrk="0" hangingPunct="1">
+      <a:defRPr sz="1200" kern="1200">
+        <a:solidFill>
+          <a:schemeClr val="tx1"/>
+        </a:solidFill>
+        <a:latin typeface="+mn-lt"/>
+        <a:ea typeface="+mn-ea"/>
+        <a:cs typeface="+mn-cs"/>
+      </a:defRPr>
+    </a:lvl2pPr>
+    <a:lvl3pPr marL="914400" algn="l" defTabSz="914400" rtl="0" eaLnBrk="1" latinLnBrk="0" hangingPunct="1">
+      <a:defRPr sz="1200" kern="1200">
+        <a:solidFill>
+          <a:schemeClr val="tx1"/>
+        </a:solidFill>
+        <a:latin typeface="+mn-lt"/>
+        <a:ea typeface="+mn-ea"/>
+        <a:cs typeface="+mn-cs"/>
+      </a:defRPr>
+    </a:lvl3pPr>
+    <a:lvl4pPr marL="1371600" algn="l" defTabSz="914400" rtl="0" eaLnBrk="1" latinLnBrk="0" hangingPunct="1">
+      <a:defRPr sz="1200" kern="1200">
+        <a:solidFill>
+          <a:schemeClr val="tx1"/>
+        </a:solidFill>
+        <a:latin typeface="+mn-lt"/>
+        <a:ea typeface="+mn-ea"/>
+        <a:cs typeface="+mn-cs"/>
+      </a:defRPr>
+    </a:lvl4pPr>
+    <a:lvl5pPr marL="1828800" algn="l" defTabSz="914400" rtl="0" eaLnBrk="1" latinLnBrk="0" hangingPunct="1">
+      <a:defRPr sz="1200" kern="1200">
+        <a:solidFill>
+          <a:schemeClr val="tx1"/>
+        </a:solidFill>
+        <a:latin typeface="+mn-lt"/>
+        <a:ea typeface="+mn-ea"/>
+        <a:cs typeface="+mn-cs"/>
+      </a:defRPr>
+    </a:lvl5pPr>
+    <a:lvl6pPr marL="2286000" algn="l" defTabSz="914400" rtl="0" eaLnBrk="1" latinLnBrk="0" hangingPunct="1">
+      <a:defRPr sz="1200" kern="1200">
+        <a:solidFill>
+          <a:schemeClr val="tx1"/>
+        </a:solidFill>
+        <a:latin typeface="+mn-lt"/>
+        <a:ea typeface="+mn-ea"/>
+        <a:cs typeface="+mn-cs"/>
+      </a:defRPr>
+    </a:lvl6pPr>
+    <a:lvl7pPr marL="2743200" algn="l" defTabSz="914400" rtl="0" eaLnBrk="1" latinLnBrk="0" hangingPunct="1">
+      <a:defRPr sz="1200" kern="1200">
+        <a:solidFill>
+          <a:schemeClr val="tx1"/>
+        </a:solidFill>
+        <a:latin typeface="+mn-lt"/>
+        <a:ea typeface="+mn-ea"/>
+        <a:cs typeface="+mn-cs"/>
+      </a:defRPr>
+    </a:lvl7pPr>
+    <a:lvl8pPr marL="3200400" algn="l" defTabSz="914400" rtl="0" eaLnBrk="1" latinLnBrk="0" hangingPunct="1">
+      <a:defRPr sz="1200" kern="1200">
+        <a:solidFill>
+          <a:schemeClr val="tx1"/>
+        </a:solidFill>
+        <a:latin typeface="+mn-lt"/>
+        <a:ea typeface="+mn-ea"/>
+        <a:cs typeface="+mn-cs"/>
+      </a:defRPr>
+    </a:lvl8pPr>
+    <a:lvl9pPr marL="3657600" algn="l" defTabSz="914400" rtl="0" eaLnBrk="1" latinLnBrk="0" hangingPunct="1">
+      <a:defRPr sz="1200" kern="1200">
+        <a:solidFill>
+          <a:schemeClr val="tx1"/>
+        </a:solidFill>
+        <a:latin typeface="+mn-lt"/>
+        <a:ea typeface="+mn-ea"/>
+        <a:cs typeface="+mn-cs"/>
+      </a:defRPr>
+    </a:lvl9pPr>
+  </p:notesStyle>
+</p:notesMaster>
+</file>
+
+<file path=ppt/notesSlides/notesSlide1.xml><?xml version="1.0" encoding="utf-8"?>
+<p:notes xmlns:a="http://schemas.openxmlformats.org/drawingml/2006/main" xmlns:r="http://schemas.openxmlformats.org/officeDocument/2006/relationships" xmlns:p="http://schemas.openxmlformats.org/presentationml/2006/main">
+  <p:cSld>
+    <p:spTree>
+      <p:nvGrpSpPr>
+        <p:cNvPr id="1" name=""/>
+        <p:cNvGrpSpPr/>
+        <p:nvPr/>
+      </p:nvGrpSpPr>
+      <p:grpSpPr>
+        <a:xfrm>
+          <a:off x="0" y="0"/>
+          <a:ext cx="0" cy="0"/>
+          <a:chOff x="0" y="0"/>
+          <a:chExt cx="0" cy="0"/>
+        </a:xfrm>
+      </p:grpSpPr>
+      <p:sp>
+        <p:nvSpPr>
+          <p:cNvPr id="2" name="Slide Image Placeholder 1"/>
+          <p:cNvSpPr>
+            <a:spLocks noGrp="1" noRot="1" noChangeAspect="1"/>
+          </p:cNvSpPr>
+          <p:nvPr>
+            <p:ph type="sldImg"/>
+          </p:nvPr>
+        </p:nvSpPr>
+        <p:spPr/>
+      </p:sp>
+      <p:sp>
+        <p:nvSpPr>
+          <p:cNvPr id="3" name="Notes Placeholder 2"/>
+          <p:cNvSpPr>
+            <a:spLocks noGrp="1"/>
+          </p:cNvSpPr>
+          <p:nvPr>
+            <p:ph type="body" idx="1"/>
+          </p:nvPr>
+        </p:nvSpPr>
+        <p:spPr/>
+        <p:txBody>
+          <a:bodyPr/>
+          <a:lstStyle/>
+          <a:p>
+            <a:endParaRPr lang="en-SG" dirty="0"/>
+          </a:p>
+        </p:txBody>
+      </p:sp>
+      <p:sp>
+        <p:nvSpPr>
+          <p:cNvPr id="4" name="Slide Number Placeholder 3"/>
+          <p:cNvSpPr>
+            <a:spLocks noGrp="1"/>
+          </p:cNvSpPr>
+          <p:nvPr>
+            <p:ph type="sldNum" sz="quarter" idx="5"/>
+          </p:nvPr>
+        </p:nvSpPr>
+        <p:spPr/>
+        <p:txBody>
+          <a:bodyPr/>
+          <a:lstStyle/>
+          <a:p>
+            <a:fld id="{3ECC8E96-92C7-4A6B-80D2-BF9BC2B92894}" type="slidenum">
+              <a:rPr lang="en-SG" smtClean="0"/>
+              <a:t>4</a:t>
+            </a:fld>
+            <a:endParaRPr lang="en-SG"/>
+          </a:p>
+        </p:txBody>
+      </p:sp>
+    </p:spTree>
+    <p:extLst>
+      <p:ext uri="{BB962C8B-B14F-4D97-AF65-F5344CB8AC3E}">
+        <p14:creationId xmlns:p14="http://schemas.microsoft.com/office/powerpoint/2010/main" val="3588668645"/>
+      </p:ext>
+    </p:extLst>
+  </p:cSld>
+  <p:clrMapOvr>
+    <a:masterClrMapping/>
+  </p:clrMapOvr>
+</p:notes>
 </file>
 
 <file path=ppt/slideLayouts/slideLayout1.xml><?xml version="1.0" encoding="utf-8"?>
@@ -256,7 +701,7 @@
           <a:p>
             <a:fld id="{DBE21509-CCC6-462B-BAD1-586C6842538A}" type="datetimeFigureOut">
               <a:rPr lang="en-SG" smtClean="0"/>
-              <a:t>31/1/2024</a:t>
+              <a:t>1/2/2024</a:t>
             </a:fld>
             <a:endParaRPr lang="en-SG"/>
           </a:p>
@@ -456,7 +901,7 @@
           <a:p>
             <a:fld id="{DBE21509-CCC6-462B-BAD1-586C6842538A}" type="datetimeFigureOut">
               <a:rPr lang="en-SG" smtClean="0"/>
-              <a:t>31/1/2024</a:t>
+              <a:t>1/2/2024</a:t>
             </a:fld>
             <a:endParaRPr lang="en-SG"/>
           </a:p>
@@ -666,7 +1111,7 @@
           <a:p>
             <a:fld id="{DBE21509-CCC6-462B-BAD1-586C6842538A}" type="datetimeFigureOut">
               <a:rPr lang="en-SG" smtClean="0"/>
-              <a:t>31/1/2024</a:t>
+              <a:t>1/2/2024</a:t>
             </a:fld>
             <a:endParaRPr lang="en-SG"/>
           </a:p>
@@ -866,7 +1311,7 @@
           <a:p>
             <a:fld id="{DBE21509-CCC6-462B-BAD1-586C6842538A}" type="datetimeFigureOut">
               <a:rPr lang="en-SG" smtClean="0"/>
-              <a:t>31/1/2024</a:t>
+              <a:t>1/2/2024</a:t>
             </a:fld>
             <a:endParaRPr lang="en-SG"/>
           </a:p>
@@ -1142,7 +1587,7 @@
           <a:p>
             <a:fld id="{DBE21509-CCC6-462B-BAD1-586C6842538A}" type="datetimeFigureOut">
               <a:rPr lang="en-SG" smtClean="0"/>
-              <a:t>31/1/2024</a:t>
+              <a:t>1/2/2024</a:t>
             </a:fld>
             <a:endParaRPr lang="en-SG"/>
           </a:p>
@@ -1410,7 +1855,7 @@
           <a:p>
             <a:fld id="{DBE21509-CCC6-462B-BAD1-586C6842538A}" type="datetimeFigureOut">
               <a:rPr lang="en-SG" smtClean="0"/>
-              <a:t>31/1/2024</a:t>
+              <a:t>1/2/2024</a:t>
             </a:fld>
             <a:endParaRPr lang="en-SG"/>
           </a:p>
@@ -1825,7 +2270,7 @@
           <a:p>
             <a:fld id="{DBE21509-CCC6-462B-BAD1-586C6842538A}" type="datetimeFigureOut">
               <a:rPr lang="en-SG" smtClean="0"/>
-              <a:t>31/1/2024</a:t>
+              <a:t>1/2/2024</a:t>
             </a:fld>
             <a:endParaRPr lang="en-SG"/>
           </a:p>
@@ -1967,7 +2412,7 @@
           <a:p>
             <a:fld id="{DBE21509-CCC6-462B-BAD1-586C6842538A}" type="datetimeFigureOut">
               <a:rPr lang="en-SG" smtClean="0"/>
-              <a:t>31/1/2024</a:t>
+              <a:t>1/2/2024</a:t>
             </a:fld>
             <a:endParaRPr lang="en-SG"/>
           </a:p>
@@ -2080,7 +2525,7 @@
           <a:p>
             <a:fld id="{DBE21509-CCC6-462B-BAD1-586C6842538A}" type="datetimeFigureOut">
               <a:rPr lang="en-SG" smtClean="0"/>
-              <a:t>31/1/2024</a:t>
+              <a:t>1/2/2024</a:t>
             </a:fld>
             <a:endParaRPr lang="en-SG"/>
           </a:p>
@@ -2393,7 +2838,7 @@
           <a:p>
             <a:fld id="{DBE21509-CCC6-462B-BAD1-586C6842538A}" type="datetimeFigureOut">
               <a:rPr lang="en-SG" smtClean="0"/>
-              <a:t>31/1/2024</a:t>
+              <a:t>1/2/2024</a:t>
             </a:fld>
             <a:endParaRPr lang="en-SG"/>
           </a:p>
@@ -2682,7 +3127,7 @@
           <a:p>
             <a:fld id="{DBE21509-CCC6-462B-BAD1-586C6842538A}" type="datetimeFigureOut">
               <a:rPr lang="en-SG" smtClean="0"/>
-              <a:t>31/1/2024</a:t>
+              <a:t>1/2/2024</a:t>
             </a:fld>
             <a:endParaRPr lang="en-SG"/>
           </a:p>
@@ -2925,7 +3370,7 @@
           <a:p>
             <a:fld id="{DBE21509-CCC6-462B-BAD1-586C6842538A}" type="datetimeFigureOut">
               <a:rPr lang="en-SG" smtClean="0"/>
-              <a:t>31/1/2024</a:t>
+              <a:t>1/2/2024</a:t>
             </a:fld>
             <a:endParaRPr lang="en-SG"/>
           </a:p>
@@ -5257,6 +5702,3581 @@
 </p:sld>
 </file>
 
+<file path=ppt/slides/slide2.xml><?xml version="1.0" encoding="utf-8"?>
+<p:sld xmlns:a="http://schemas.openxmlformats.org/drawingml/2006/main" xmlns:r="http://schemas.openxmlformats.org/officeDocument/2006/relationships" xmlns:p="http://schemas.openxmlformats.org/presentationml/2006/main">
+  <p:cSld>
+    <p:spTree>
+      <p:nvGrpSpPr>
+        <p:cNvPr id="1" name=""/>
+        <p:cNvGrpSpPr/>
+        <p:nvPr/>
+      </p:nvGrpSpPr>
+      <p:grpSpPr>
+        <a:xfrm>
+          <a:off x="0" y="0"/>
+          <a:ext cx="0" cy="0"/>
+          <a:chOff x="0" y="0"/>
+          <a:chExt cx="0" cy="0"/>
+        </a:xfrm>
+      </p:grpSpPr>
+      <p:pic>
+        <p:nvPicPr>
+          <p:cNvPr id="5" name="Picture 4">
+            <a:extLst>
+              <a:ext uri="{FF2B5EF4-FFF2-40B4-BE49-F238E27FC236}">
+                <a16:creationId xmlns:a16="http://schemas.microsoft.com/office/drawing/2014/main" id="{C7251676-47D8-F84E-BBCE-0B39B82BDE1B}"/>
+              </a:ext>
+            </a:extLst>
+          </p:cNvPr>
+          <p:cNvPicPr>
+            <a:picLocks noChangeAspect="1"/>
+          </p:cNvPicPr>
+          <p:nvPr/>
+        </p:nvPicPr>
+        <p:blipFill>
+          <a:blip r:embed="rId2"/>
+          <a:stretch>
+            <a:fillRect/>
+          </a:stretch>
+        </p:blipFill>
+        <p:spPr>
+          <a:xfrm>
+            <a:off x="2554685" y="905582"/>
+            <a:ext cx="3723809" cy="2295238"/>
+          </a:xfrm>
+          <a:prstGeom prst="rect">
+            <a:avLst/>
+          </a:prstGeom>
+          <a:ln w="6350">
+            <a:solidFill>
+              <a:schemeClr val="tx1"/>
+            </a:solidFill>
+          </a:ln>
+        </p:spPr>
+      </p:pic>
+      <p:pic>
+        <p:nvPicPr>
+          <p:cNvPr id="7" name="Picture 6">
+            <a:extLst>
+              <a:ext uri="{FF2B5EF4-FFF2-40B4-BE49-F238E27FC236}">
+                <a16:creationId xmlns:a16="http://schemas.microsoft.com/office/drawing/2014/main" id="{DD308DCD-4917-7D9A-2590-4612EB6A1318}"/>
+              </a:ext>
+            </a:extLst>
+          </p:cNvPr>
+          <p:cNvPicPr>
+            <a:picLocks noChangeAspect="1"/>
+          </p:cNvPicPr>
+          <p:nvPr/>
+        </p:nvPicPr>
+        <p:blipFill>
+          <a:blip r:embed="rId3"/>
+          <a:stretch>
+            <a:fillRect/>
+          </a:stretch>
+        </p:blipFill>
+        <p:spPr>
+          <a:xfrm>
+            <a:off x="2554685" y="3720388"/>
+            <a:ext cx="3726861" cy="2582471"/>
+          </a:xfrm>
+          <a:prstGeom prst="rect">
+            <a:avLst/>
+          </a:prstGeom>
+          <a:ln w="6350">
+            <a:solidFill>
+              <a:schemeClr val="tx1"/>
+            </a:solidFill>
+          </a:ln>
+        </p:spPr>
+      </p:pic>
+      <p:pic>
+        <p:nvPicPr>
+          <p:cNvPr id="9" name="Picture 8">
+            <a:extLst>
+              <a:ext uri="{FF2B5EF4-FFF2-40B4-BE49-F238E27FC236}">
+                <a16:creationId xmlns:a16="http://schemas.microsoft.com/office/drawing/2014/main" id="{9A3D4CF1-6F4E-21E9-7E0B-D461CDE40F3E}"/>
+              </a:ext>
+            </a:extLst>
+          </p:cNvPr>
+          <p:cNvPicPr>
+            <a:picLocks noChangeAspect="1"/>
+          </p:cNvPicPr>
+          <p:nvPr/>
+        </p:nvPicPr>
+        <p:blipFill>
+          <a:blip r:embed="rId4"/>
+          <a:stretch>
+            <a:fillRect/>
+          </a:stretch>
+        </p:blipFill>
+        <p:spPr>
+          <a:xfrm>
+            <a:off x="6593786" y="886356"/>
+            <a:ext cx="4186990" cy="5416503"/>
+          </a:xfrm>
+          <a:prstGeom prst="rect">
+            <a:avLst/>
+          </a:prstGeom>
+          <a:ln w="6350">
+            <a:solidFill>
+              <a:schemeClr val="tx1"/>
+            </a:solidFill>
+          </a:ln>
+        </p:spPr>
+      </p:pic>
+      <p:sp>
+        <p:nvSpPr>
+          <p:cNvPr id="10" name="TextBox 9">
+            <a:extLst>
+              <a:ext uri="{FF2B5EF4-FFF2-40B4-BE49-F238E27FC236}">
+                <a16:creationId xmlns:a16="http://schemas.microsoft.com/office/drawing/2014/main" id="{752D6C1F-C458-B30A-D0BE-2E14845F16D2}"/>
+              </a:ext>
+            </a:extLst>
+          </p:cNvPr>
+          <p:cNvSpPr txBox="1"/>
+          <p:nvPr/>
+        </p:nvSpPr>
+        <p:spPr>
+          <a:xfrm>
+            <a:off x="2457792" y="628583"/>
+            <a:ext cx="1858213" cy="276999"/>
+          </a:xfrm>
+          <a:prstGeom prst="rect">
+            <a:avLst/>
+          </a:prstGeom>
+          <a:noFill/>
+        </p:spPr>
+        <p:txBody>
+          <a:bodyPr wrap="square">
+            <a:spAutoFit/>
+          </a:bodyPr>
+          <a:lstStyle/>
+          <a:p>
+            <a:r>
+              <a:rPr lang="en-US" sz="1200" b="1" dirty="0"/>
+              <a:t>Page 4, section 3.2 - 2:</a:t>
+            </a:r>
+            <a:endParaRPr lang="en-SG" sz="1200" b="1" dirty="0"/>
+          </a:p>
+        </p:txBody>
+      </p:sp>
+      <p:sp>
+        <p:nvSpPr>
+          <p:cNvPr id="11" name="TextBox 10">
+            <a:extLst>
+              <a:ext uri="{FF2B5EF4-FFF2-40B4-BE49-F238E27FC236}">
+                <a16:creationId xmlns:a16="http://schemas.microsoft.com/office/drawing/2014/main" id="{7190771F-562F-864C-9816-11D1A4D2187A}"/>
+              </a:ext>
+            </a:extLst>
+          </p:cNvPr>
+          <p:cNvSpPr txBox="1"/>
+          <p:nvPr/>
+        </p:nvSpPr>
+        <p:spPr>
+          <a:xfrm>
+            <a:off x="2457792" y="3360880"/>
+            <a:ext cx="1858213" cy="276999"/>
+          </a:xfrm>
+          <a:prstGeom prst="rect">
+            <a:avLst/>
+          </a:prstGeom>
+          <a:noFill/>
+        </p:spPr>
+        <p:txBody>
+          <a:bodyPr wrap="square">
+            <a:spAutoFit/>
+          </a:bodyPr>
+          <a:lstStyle/>
+          <a:p>
+            <a:r>
+              <a:rPr lang="en-US" sz="1200" b="1" dirty="0"/>
+              <a:t>Page 3, section 3.3:</a:t>
+            </a:r>
+            <a:endParaRPr lang="en-SG" sz="1200" b="1" dirty="0"/>
+          </a:p>
+        </p:txBody>
+      </p:sp>
+      <p:sp>
+        <p:nvSpPr>
+          <p:cNvPr id="12" name="TextBox 11">
+            <a:extLst>
+              <a:ext uri="{FF2B5EF4-FFF2-40B4-BE49-F238E27FC236}">
+                <a16:creationId xmlns:a16="http://schemas.microsoft.com/office/drawing/2014/main" id="{8E7FF469-B741-7916-F29F-6027642CE8BC}"/>
+              </a:ext>
+            </a:extLst>
+          </p:cNvPr>
+          <p:cNvSpPr txBox="1"/>
+          <p:nvPr/>
+        </p:nvSpPr>
+        <p:spPr>
+          <a:xfrm>
+            <a:off x="6459816" y="605071"/>
+            <a:ext cx="1858213" cy="276999"/>
+          </a:xfrm>
+          <a:prstGeom prst="rect">
+            <a:avLst/>
+          </a:prstGeom>
+          <a:noFill/>
+        </p:spPr>
+        <p:txBody>
+          <a:bodyPr wrap="square">
+            <a:spAutoFit/>
+          </a:bodyPr>
+          <a:lstStyle/>
+          <a:p>
+            <a:r>
+              <a:rPr lang="en-US" sz="1200" b="1" dirty="0"/>
+              <a:t>Page 4, section 4.1 - 3:</a:t>
+            </a:r>
+            <a:endParaRPr lang="en-SG" sz="1200" b="1" dirty="0"/>
+          </a:p>
+        </p:txBody>
+      </p:sp>
+    </p:spTree>
+    <p:extLst>
+      <p:ext uri="{BB962C8B-B14F-4D97-AF65-F5344CB8AC3E}">
+        <p14:creationId xmlns:p14="http://schemas.microsoft.com/office/powerpoint/2010/main" val="803952060"/>
+      </p:ext>
+    </p:extLst>
+  </p:cSld>
+  <p:clrMapOvr>
+    <a:masterClrMapping/>
+  </p:clrMapOvr>
+</p:sld>
+</file>
+
+<file path=ppt/slides/slide3.xml><?xml version="1.0" encoding="utf-8"?>
+<p:sld xmlns:a="http://schemas.openxmlformats.org/drawingml/2006/main" xmlns:r="http://schemas.openxmlformats.org/officeDocument/2006/relationships" xmlns:p="http://schemas.openxmlformats.org/presentationml/2006/main">
+  <p:cSld>
+    <p:spTree>
+      <p:nvGrpSpPr>
+        <p:cNvPr id="1" name=""/>
+        <p:cNvGrpSpPr/>
+        <p:nvPr/>
+      </p:nvGrpSpPr>
+      <p:grpSpPr>
+        <a:xfrm>
+          <a:off x="0" y="0"/>
+          <a:ext cx="0" cy="0"/>
+          <a:chOff x="0" y="0"/>
+          <a:chExt cx="0" cy="0"/>
+        </a:xfrm>
+      </p:grpSpPr>
+      <p:pic>
+        <p:nvPicPr>
+          <p:cNvPr id="5" name="Picture 4" descr="A screenshot of a computer&#10;&#10;Description automatically generated">
+            <a:extLst>
+              <a:ext uri="{FF2B5EF4-FFF2-40B4-BE49-F238E27FC236}">
+                <a16:creationId xmlns:a16="http://schemas.microsoft.com/office/drawing/2014/main" id="{5265BFC3-92E2-8CB5-177F-552F85FDAB3C}"/>
+              </a:ext>
+            </a:extLst>
+          </p:cNvPr>
+          <p:cNvPicPr>
+            <a:picLocks noChangeAspect="1"/>
+          </p:cNvPicPr>
+          <p:nvPr/>
+        </p:nvPicPr>
+        <p:blipFill>
+          <a:blip r:embed="rId2">
+            <a:extLst>
+              <a:ext uri="{28A0092B-C50C-407E-A947-70E740481C1C}">
+                <a14:useLocalDpi xmlns:a14="http://schemas.microsoft.com/office/drawing/2010/main" val="0"/>
+              </a:ext>
+            </a:extLst>
+          </a:blip>
+          <a:stretch>
+            <a:fillRect/>
+          </a:stretch>
+        </p:blipFill>
+        <p:spPr>
+          <a:xfrm>
+            <a:off x="1372894" y="578002"/>
+            <a:ext cx="3432081" cy="4205932"/>
+          </a:xfrm>
+          <a:prstGeom prst="rect">
+            <a:avLst/>
+          </a:prstGeom>
+          <a:ln w="9525">
+            <a:solidFill>
+              <a:schemeClr val="tx1"/>
+            </a:solidFill>
+          </a:ln>
+        </p:spPr>
+      </p:pic>
+      <p:pic>
+        <p:nvPicPr>
+          <p:cNvPr id="6" name="Picture 5">
+            <a:extLst>
+              <a:ext uri="{FF2B5EF4-FFF2-40B4-BE49-F238E27FC236}">
+                <a16:creationId xmlns:a16="http://schemas.microsoft.com/office/drawing/2014/main" id="{62C9C215-B2D1-32D9-4668-29D77DF3CC68}"/>
+              </a:ext>
+            </a:extLst>
+          </p:cNvPr>
+          <p:cNvPicPr>
+            <a:picLocks noChangeAspect="1"/>
+          </p:cNvPicPr>
+          <p:nvPr/>
+        </p:nvPicPr>
+        <p:blipFill>
+          <a:blip r:embed="rId3"/>
+          <a:stretch>
+            <a:fillRect/>
+          </a:stretch>
+        </p:blipFill>
+        <p:spPr>
+          <a:xfrm>
+            <a:off x="8089466" y="878650"/>
+            <a:ext cx="1216522" cy="835346"/>
+          </a:xfrm>
+          <a:prstGeom prst="rect">
+            <a:avLst/>
+          </a:prstGeom>
+          <a:ln w="12700">
+            <a:solidFill>
+              <a:schemeClr val="tx1"/>
+            </a:solidFill>
+          </a:ln>
+        </p:spPr>
+      </p:pic>
+      <p:pic>
+        <p:nvPicPr>
+          <p:cNvPr id="8" name="Picture 7">
+            <a:extLst>
+              <a:ext uri="{FF2B5EF4-FFF2-40B4-BE49-F238E27FC236}">
+                <a16:creationId xmlns:a16="http://schemas.microsoft.com/office/drawing/2014/main" id="{09FEBAA0-3392-864F-1072-ABB9A9042555}"/>
+              </a:ext>
+            </a:extLst>
+          </p:cNvPr>
+          <p:cNvPicPr>
+            <a:picLocks noChangeAspect="1"/>
+          </p:cNvPicPr>
+          <p:nvPr/>
+        </p:nvPicPr>
+        <p:blipFill>
+          <a:blip r:embed="rId4"/>
+          <a:stretch>
+            <a:fillRect/>
+          </a:stretch>
+        </p:blipFill>
+        <p:spPr>
+          <a:xfrm flipV="1">
+            <a:off x="9061704" y="1524619"/>
+            <a:ext cx="488568" cy="378753"/>
+          </a:xfrm>
+          <a:prstGeom prst="rect">
+            <a:avLst/>
+          </a:prstGeom>
+          <a:ln w="12700">
+            <a:solidFill>
+              <a:schemeClr val="tx1"/>
+            </a:solidFill>
+          </a:ln>
+        </p:spPr>
+      </p:pic>
+      <p:pic>
+        <p:nvPicPr>
+          <p:cNvPr id="9" name="Picture 8">
+            <a:extLst>
+              <a:ext uri="{FF2B5EF4-FFF2-40B4-BE49-F238E27FC236}">
+                <a16:creationId xmlns:a16="http://schemas.microsoft.com/office/drawing/2014/main" id="{E99F109A-BBB8-5BB1-D2AE-8771AB4CA1DE}"/>
+              </a:ext>
+            </a:extLst>
+          </p:cNvPr>
+          <p:cNvPicPr>
+            <a:picLocks noChangeAspect="1"/>
+          </p:cNvPicPr>
+          <p:nvPr/>
+        </p:nvPicPr>
+        <p:blipFill>
+          <a:blip r:embed="rId4"/>
+          <a:stretch>
+            <a:fillRect/>
+          </a:stretch>
+        </p:blipFill>
+        <p:spPr>
+          <a:xfrm flipH="1" flipV="1">
+            <a:off x="7911794" y="1531701"/>
+            <a:ext cx="488568" cy="378753"/>
+          </a:xfrm>
+          <a:prstGeom prst="rect">
+            <a:avLst/>
+          </a:prstGeom>
+          <a:ln w="12700">
+            <a:solidFill>
+              <a:schemeClr val="tx1"/>
+            </a:solidFill>
+          </a:ln>
+        </p:spPr>
+      </p:pic>
+      <p:pic>
+        <p:nvPicPr>
+          <p:cNvPr id="11" name="Picture 10">
+            <a:extLst>
+              <a:ext uri="{FF2B5EF4-FFF2-40B4-BE49-F238E27FC236}">
+                <a16:creationId xmlns:a16="http://schemas.microsoft.com/office/drawing/2014/main" id="{F1B9E57D-F3C4-6557-58D0-34A8414D428B}"/>
+              </a:ext>
+            </a:extLst>
+          </p:cNvPr>
+          <p:cNvPicPr>
+            <a:picLocks noChangeAspect="1"/>
+          </p:cNvPicPr>
+          <p:nvPr/>
+        </p:nvPicPr>
+        <p:blipFill>
+          <a:blip r:embed="rId5"/>
+          <a:stretch>
+            <a:fillRect/>
+          </a:stretch>
+        </p:blipFill>
+        <p:spPr>
+          <a:xfrm>
+            <a:off x="8449562" y="566928"/>
+            <a:ext cx="496330" cy="475432"/>
+          </a:xfrm>
+          <a:prstGeom prst="rect">
+            <a:avLst/>
+          </a:prstGeom>
+          <a:ln w="12700">
+            <a:solidFill>
+              <a:schemeClr val="tx1"/>
+            </a:solidFill>
+          </a:ln>
+        </p:spPr>
+      </p:pic>
+      <p:cxnSp>
+        <p:nvCxnSpPr>
+          <p:cNvPr id="13" name="Connector: Elbow 12">
+            <a:extLst>
+              <a:ext uri="{FF2B5EF4-FFF2-40B4-BE49-F238E27FC236}">
+                <a16:creationId xmlns:a16="http://schemas.microsoft.com/office/drawing/2014/main" id="{A5E1E5B1-224C-7AC8-F4D4-09242E19289E}"/>
+              </a:ext>
+            </a:extLst>
+          </p:cNvPr>
+          <p:cNvCxnSpPr>
+            <a:stCxn id="11" idx="3"/>
+            <a:endCxn id="8" idx="3"/>
+          </p:cNvCxnSpPr>
+          <p:nvPr/>
+        </p:nvCxnSpPr>
+        <p:spPr>
+          <a:xfrm>
+            <a:off x="8945892" y="804644"/>
+            <a:ext cx="604380" cy="909351"/>
+          </a:xfrm>
+          <a:prstGeom prst="bentConnector3">
+            <a:avLst>
+              <a:gd name="adj1" fmla="val 137824"/>
+            </a:avLst>
+          </a:prstGeom>
+        </p:spPr>
+        <p:style>
+          <a:lnRef idx="1">
+            <a:schemeClr val="accent1"/>
+          </a:lnRef>
+          <a:fillRef idx="0">
+            <a:schemeClr val="accent1"/>
+          </a:fillRef>
+          <a:effectRef idx="0">
+            <a:schemeClr val="accent1"/>
+          </a:effectRef>
+          <a:fontRef idx="minor">
+            <a:schemeClr val="tx1"/>
+          </a:fontRef>
+        </p:style>
+      </p:cxnSp>
+      <p:cxnSp>
+        <p:nvCxnSpPr>
+          <p:cNvPr id="15" name="Connector: Elbow 14">
+            <a:extLst>
+              <a:ext uri="{FF2B5EF4-FFF2-40B4-BE49-F238E27FC236}">
+                <a16:creationId xmlns:a16="http://schemas.microsoft.com/office/drawing/2014/main" id="{8A51F19A-DAF7-E698-EA81-730EB9D22F48}"/>
+              </a:ext>
+            </a:extLst>
+          </p:cNvPr>
+          <p:cNvCxnSpPr>
+            <a:stCxn id="11" idx="1"/>
+            <a:endCxn id="9" idx="3"/>
+          </p:cNvCxnSpPr>
+          <p:nvPr/>
+        </p:nvCxnSpPr>
+        <p:spPr>
+          <a:xfrm rot="10800000" flipV="1">
+            <a:off x="7911794" y="804643"/>
+            <a:ext cx="537768" cy="916433"/>
+          </a:xfrm>
+          <a:prstGeom prst="bentConnector3">
+            <a:avLst>
+              <a:gd name="adj1" fmla="val 142509"/>
+            </a:avLst>
+          </a:prstGeom>
+        </p:spPr>
+        <p:style>
+          <a:lnRef idx="1">
+            <a:schemeClr val="accent1"/>
+          </a:lnRef>
+          <a:fillRef idx="0">
+            <a:schemeClr val="accent1"/>
+          </a:fillRef>
+          <a:effectRef idx="0">
+            <a:schemeClr val="accent1"/>
+          </a:effectRef>
+          <a:fontRef idx="minor">
+            <a:schemeClr val="tx1"/>
+          </a:fontRef>
+        </p:style>
+      </p:cxnSp>
+      <p:sp>
+        <p:nvSpPr>
+          <p:cNvPr id="16" name="Cube 15">
+            <a:extLst>
+              <a:ext uri="{FF2B5EF4-FFF2-40B4-BE49-F238E27FC236}">
+                <a16:creationId xmlns:a16="http://schemas.microsoft.com/office/drawing/2014/main" id="{F3C92E69-583C-0918-8967-11B61B8E6A49}"/>
+              </a:ext>
+            </a:extLst>
+          </p:cNvPr>
+          <p:cNvSpPr/>
+          <p:nvPr/>
+        </p:nvSpPr>
+        <p:spPr>
+          <a:xfrm>
+            <a:off x="7583646" y="3890198"/>
+            <a:ext cx="2404872" cy="909351"/>
+          </a:xfrm>
+          <a:prstGeom prst="cube">
+            <a:avLst/>
+          </a:prstGeom>
+        </p:spPr>
+        <p:style>
+          <a:lnRef idx="2">
+            <a:schemeClr val="accent1">
+              <a:shade val="15000"/>
+            </a:schemeClr>
+          </a:lnRef>
+          <a:fillRef idx="1">
+            <a:schemeClr val="accent1"/>
+          </a:fillRef>
+          <a:effectRef idx="0">
+            <a:schemeClr val="accent1"/>
+          </a:effectRef>
+          <a:fontRef idx="minor">
+            <a:schemeClr val="lt1"/>
+          </a:fontRef>
+        </p:style>
+        <p:txBody>
+          <a:bodyPr rtlCol="0" anchor="ctr"/>
+          <a:lstStyle/>
+          <a:p>
+            <a:pPr algn="ctr"/>
+            <a:endParaRPr lang="en-SG"/>
+          </a:p>
+        </p:txBody>
+      </p:sp>
+      <p:sp>
+        <p:nvSpPr>
+          <p:cNvPr id="21" name="Isosceles Triangle 20">
+            <a:extLst>
+              <a:ext uri="{FF2B5EF4-FFF2-40B4-BE49-F238E27FC236}">
+                <a16:creationId xmlns:a16="http://schemas.microsoft.com/office/drawing/2014/main" id="{745FCBAC-4520-F41A-6F9A-957C9446E1E3}"/>
+              </a:ext>
+            </a:extLst>
+          </p:cNvPr>
+          <p:cNvSpPr/>
+          <p:nvPr/>
+        </p:nvSpPr>
+        <p:spPr>
+          <a:xfrm>
+            <a:off x="7424650" y="1910454"/>
+            <a:ext cx="1512055" cy="2041503"/>
+          </a:xfrm>
+          <a:prstGeom prst="triangle">
+            <a:avLst/>
+          </a:prstGeom>
+          <a:solidFill>
+            <a:schemeClr val="accent2">
+              <a:alpha val="50000"/>
+            </a:schemeClr>
+          </a:solidFill>
+          <a:ln>
+            <a:noFill/>
+          </a:ln>
+        </p:spPr>
+        <p:style>
+          <a:lnRef idx="0">
+            <a:scrgbClr r="0" g="0" b="0"/>
+          </a:lnRef>
+          <a:fillRef idx="0">
+            <a:scrgbClr r="0" g="0" b="0"/>
+          </a:fillRef>
+          <a:effectRef idx="0">
+            <a:scrgbClr r="0" g="0" b="0"/>
+          </a:effectRef>
+          <a:fontRef idx="minor">
+            <a:schemeClr val="lt1"/>
+          </a:fontRef>
+        </p:style>
+        <p:txBody>
+          <a:bodyPr rtlCol="0" anchor="ctr"/>
+          <a:lstStyle/>
+          <a:p>
+            <a:pPr algn="ctr"/>
+            <a:endParaRPr lang="en-SG" dirty="0"/>
+          </a:p>
+        </p:txBody>
+      </p:sp>
+      <p:sp>
+        <p:nvSpPr>
+          <p:cNvPr id="22" name="Isosceles Triangle 21">
+            <a:extLst>
+              <a:ext uri="{FF2B5EF4-FFF2-40B4-BE49-F238E27FC236}">
+                <a16:creationId xmlns:a16="http://schemas.microsoft.com/office/drawing/2014/main" id="{B03CE68F-4774-DF34-9AAA-056691720C8B}"/>
+              </a:ext>
+            </a:extLst>
+          </p:cNvPr>
+          <p:cNvSpPr/>
+          <p:nvPr/>
+        </p:nvSpPr>
+        <p:spPr>
+          <a:xfrm>
+            <a:off x="8697727" y="1910453"/>
+            <a:ext cx="1512055" cy="2041503"/>
+          </a:xfrm>
+          <a:prstGeom prst="triangle">
+            <a:avLst/>
+          </a:prstGeom>
+          <a:solidFill>
+            <a:schemeClr val="accent2">
+              <a:alpha val="50000"/>
+            </a:schemeClr>
+          </a:solidFill>
+          <a:ln>
+            <a:noFill/>
+          </a:ln>
+        </p:spPr>
+        <p:style>
+          <a:lnRef idx="0">
+            <a:scrgbClr r="0" g="0" b="0"/>
+          </a:lnRef>
+          <a:fillRef idx="0">
+            <a:scrgbClr r="0" g="0" b="0"/>
+          </a:fillRef>
+          <a:effectRef idx="0">
+            <a:scrgbClr r="0" g="0" b="0"/>
+          </a:effectRef>
+          <a:fontRef idx="minor">
+            <a:schemeClr val="lt1"/>
+          </a:fontRef>
+        </p:style>
+        <p:txBody>
+          <a:bodyPr rtlCol="0" anchor="ctr"/>
+          <a:lstStyle/>
+          <a:p>
+            <a:pPr algn="ctr"/>
+            <a:endParaRPr lang="en-SG" dirty="0"/>
+          </a:p>
+        </p:txBody>
+      </p:sp>
+      <p:sp>
+        <p:nvSpPr>
+          <p:cNvPr id="23" name="TextBox 22">
+            <a:extLst>
+              <a:ext uri="{FF2B5EF4-FFF2-40B4-BE49-F238E27FC236}">
+                <a16:creationId xmlns:a16="http://schemas.microsoft.com/office/drawing/2014/main" id="{EF050604-63BD-F50F-7209-04B6C1E6724B}"/>
+              </a:ext>
+            </a:extLst>
+          </p:cNvPr>
+          <p:cNvSpPr txBox="1"/>
+          <p:nvPr/>
+        </p:nvSpPr>
+        <p:spPr>
+          <a:xfrm>
+            <a:off x="4858122" y="1267804"/>
+            <a:ext cx="1628509" cy="461665"/>
+          </a:xfrm>
+          <a:prstGeom prst="rect">
+            <a:avLst/>
+          </a:prstGeom>
+          <a:noFill/>
+        </p:spPr>
+        <p:txBody>
+          <a:bodyPr wrap="square">
+            <a:spAutoFit/>
+          </a:bodyPr>
+          <a:lstStyle/>
+          <a:p>
+            <a:r>
+              <a:rPr lang="en-US" sz="1200" b="1" dirty="0"/>
+              <a:t>Ground contour data channel </a:t>
+            </a:r>
+            <a:endParaRPr lang="en-SG" sz="1200" b="1" dirty="0"/>
+          </a:p>
+        </p:txBody>
+      </p:sp>
+      <p:sp>
+        <p:nvSpPr>
+          <p:cNvPr id="25" name="TextBox 24">
+            <a:extLst>
+              <a:ext uri="{FF2B5EF4-FFF2-40B4-BE49-F238E27FC236}">
+                <a16:creationId xmlns:a16="http://schemas.microsoft.com/office/drawing/2014/main" id="{257FC5CE-B137-71F7-E47C-DAFC8A6BC11B}"/>
+              </a:ext>
+            </a:extLst>
+          </p:cNvPr>
+          <p:cNvSpPr txBox="1"/>
+          <p:nvPr/>
+        </p:nvSpPr>
+        <p:spPr>
+          <a:xfrm>
+            <a:off x="7988311" y="220527"/>
+            <a:ext cx="1418832" cy="461665"/>
+          </a:xfrm>
+          <a:prstGeom prst="rect">
+            <a:avLst/>
+          </a:prstGeom>
+          <a:noFill/>
+        </p:spPr>
+        <p:txBody>
+          <a:bodyPr wrap="square">
+            <a:spAutoFit/>
+          </a:bodyPr>
+          <a:lstStyle/>
+          <a:p>
+            <a:r>
+              <a:rPr lang="en-SG" sz="1200" b="1" dirty="0"/>
+              <a:t>Terrain matching unit </a:t>
+            </a:r>
+          </a:p>
+        </p:txBody>
+      </p:sp>
+      <p:sp>
+        <p:nvSpPr>
+          <p:cNvPr id="26" name="TextBox 25">
+            <a:extLst>
+              <a:ext uri="{FF2B5EF4-FFF2-40B4-BE49-F238E27FC236}">
+                <a16:creationId xmlns:a16="http://schemas.microsoft.com/office/drawing/2014/main" id="{370B1D82-9A76-9AC4-E97E-AAC7C9128481}"/>
+              </a:ext>
+            </a:extLst>
+          </p:cNvPr>
+          <p:cNvSpPr txBox="1"/>
+          <p:nvPr/>
+        </p:nvSpPr>
+        <p:spPr>
+          <a:xfrm>
+            <a:off x="9824211" y="1721076"/>
+            <a:ext cx="1607704" cy="461665"/>
+          </a:xfrm>
+          <a:prstGeom prst="rect">
+            <a:avLst/>
+          </a:prstGeom>
+          <a:noFill/>
+        </p:spPr>
+        <p:txBody>
+          <a:bodyPr wrap="square">
+            <a:spAutoFit/>
+          </a:bodyPr>
+          <a:lstStyle/>
+          <a:p>
+            <a:r>
+              <a:rPr lang="en-US" sz="1200" b="1" dirty="0"/>
+              <a:t>HC-SR04 Ultrasonic Sensor</a:t>
+            </a:r>
+            <a:endParaRPr lang="en-SG" sz="1200" b="1" dirty="0"/>
+          </a:p>
+        </p:txBody>
+      </p:sp>
+      <p:cxnSp>
+        <p:nvCxnSpPr>
+          <p:cNvPr id="28" name="Straight Arrow Connector 27">
+            <a:extLst>
+              <a:ext uri="{FF2B5EF4-FFF2-40B4-BE49-F238E27FC236}">
+                <a16:creationId xmlns:a16="http://schemas.microsoft.com/office/drawing/2014/main" id="{698CBC4D-EEBB-3420-7344-3D05F2C2FE64}"/>
+              </a:ext>
+            </a:extLst>
+          </p:cNvPr>
+          <p:cNvCxnSpPr>
+            <a:stCxn id="26" idx="1"/>
+          </p:cNvCxnSpPr>
+          <p:nvPr/>
+        </p:nvCxnSpPr>
+        <p:spPr>
+          <a:xfrm flipH="1" flipV="1">
+            <a:off x="9628632" y="1837944"/>
+            <a:ext cx="195579" cy="113965"/>
+          </a:xfrm>
+          <a:prstGeom prst="straightConnector1">
+            <a:avLst/>
+          </a:prstGeom>
+          <a:ln>
+            <a:tailEnd type="triangle"/>
+          </a:ln>
+        </p:spPr>
+        <p:style>
+          <a:lnRef idx="1">
+            <a:schemeClr val="accent1"/>
+          </a:lnRef>
+          <a:fillRef idx="0">
+            <a:schemeClr val="accent1"/>
+          </a:fillRef>
+          <a:effectRef idx="0">
+            <a:schemeClr val="accent1"/>
+          </a:effectRef>
+          <a:fontRef idx="minor">
+            <a:schemeClr val="tx1"/>
+          </a:fontRef>
+        </p:style>
+      </p:cxnSp>
+      <p:cxnSp>
+        <p:nvCxnSpPr>
+          <p:cNvPr id="35" name="Connector: Elbow 34">
+            <a:extLst>
+              <a:ext uri="{FF2B5EF4-FFF2-40B4-BE49-F238E27FC236}">
+                <a16:creationId xmlns:a16="http://schemas.microsoft.com/office/drawing/2014/main" id="{DF20C31D-936D-656C-EB6B-81AAA3D9C559}"/>
+              </a:ext>
+            </a:extLst>
+          </p:cNvPr>
+          <p:cNvCxnSpPr>
+            <a:cxnSpLocks/>
+          </p:cNvCxnSpPr>
+          <p:nvPr/>
+        </p:nvCxnSpPr>
+        <p:spPr>
+          <a:xfrm rot="10800000" flipV="1">
+            <a:off x="4553714" y="682190"/>
+            <a:ext cx="3895851" cy="835346"/>
+          </a:xfrm>
+          <a:prstGeom prst="bentConnector3">
+            <a:avLst/>
+          </a:prstGeom>
+          <a:ln w="19050">
+            <a:prstDash val="sysDash"/>
+          </a:ln>
+        </p:spPr>
+        <p:style>
+          <a:lnRef idx="1">
+            <a:schemeClr val="accent1"/>
+          </a:lnRef>
+          <a:fillRef idx="0">
+            <a:schemeClr val="accent1"/>
+          </a:fillRef>
+          <a:effectRef idx="0">
+            <a:schemeClr val="accent1"/>
+          </a:effectRef>
+          <a:fontRef idx="minor">
+            <a:schemeClr val="tx1"/>
+          </a:fontRef>
+        </p:style>
+      </p:cxnSp>
+      <p:sp>
+        <p:nvSpPr>
+          <p:cNvPr id="36" name="Rectangle 35">
+            <a:extLst>
+              <a:ext uri="{FF2B5EF4-FFF2-40B4-BE49-F238E27FC236}">
+                <a16:creationId xmlns:a16="http://schemas.microsoft.com/office/drawing/2014/main" id="{15A4FE36-9767-61A7-2D7E-6DD92F99F81B}"/>
+              </a:ext>
+            </a:extLst>
+          </p:cNvPr>
+          <p:cNvSpPr/>
+          <p:nvPr/>
+        </p:nvSpPr>
+        <p:spPr>
+          <a:xfrm>
+            <a:off x="4068533" y="977993"/>
+            <a:ext cx="485180" cy="2012095"/>
+          </a:xfrm>
+          <a:prstGeom prst="rect">
+            <a:avLst/>
+          </a:prstGeom>
+          <a:noFill/>
+          <a:ln w="19050" cap="flat" cmpd="sng" algn="ctr">
+            <a:solidFill>
+              <a:srgbClr val="FF0000"/>
+            </a:solidFill>
+            <a:prstDash val="sysDash"/>
+            <a:round/>
+            <a:headEnd type="none" w="med" len="med"/>
+            <a:tailEnd type="none" w="med" len="med"/>
+          </a:ln>
+        </p:spPr>
+        <p:style>
+          <a:lnRef idx="0">
+            <a:scrgbClr r="0" g="0" b="0"/>
+          </a:lnRef>
+          <a:fillRef idx="0">
+            <a:scrgbClr r="0" g="0" b="0"/>
+          </a:fillRef>
+          <a:effectRef idx="0">
+            <a:scrgbClr r="0" g="0" b="0"/>
+          </a:effectRef>
+          <a:fontRef idx="minor">
+            <a:schemeClr val="accent2"/>
+          </a:fontRef>
+        </p:style>
+        <p:txBody>
+          <a:bodyPr rtlCol="0" anchor="ctr"/>
+          <a:lstStyle/>
+          <a:p>
+            <a:pPr algn="ctr"/>
+            <a:endParaRPr lang="en-SG"/>
+          </a:p>
+        </p:txBody>
+      </p:sp>
+      <p:sp>
+        <p:nvSpPr>
+          <p:cNvPr id="38" name="Rectangle 37">
+            <a:extLst>
+              <a:ext uri="{FF2B5EF4-FFF2-40B4-BE49-F238E27FC236}">
+                <a16:creationId xmlns:a16="http://schemas.microsoft.com/office/drawing/2014/main" id="{3C121E79-ED0A-DA73-FA10-90BCF62D501C}"/>
+              </a:ext>
+            </a:extLst>
+          </p:cNvPr>
+          <p:cNvSpPr/>
+          <p:nvPr/>
+        </p:nvSpPr>
+        <p:spPr>
+          <a:xfrm>
+            <a:off x="1546539" y="1042360"/>
+            <a:ext cx="2443634" cy="1773992"/>
+          </a:xfrm>
+          <a:prstGeom prst="rect">
+            <a:avLst/>
+          </a:prstGeom>
+          <a:noFill/>
+          <a:ln w="19050" cap="flat" cmpd="sng" algn="ctr">
+            <a:solidFill>
+              <a:srgbClr val="FF0000"/>
+            </a:solidFill>
+            <a:prstDash val="sysDash"/>
+            <a:round/>
+            <a:headEnd type="none" w="med" len="med"/>
+            <a:tailEnd type="none" w="med" len="med"/>
+          </a:ln>
+        </p:spPr>
+        <p:style>
+          <a:lnRef idx="0">
+            <a:scrgbClr r="0" g="0" b="0"/>
+          </a:lnRef>
+          <a:fillRef idx="0">
+            <a:scrgbClr r="0" g="0" b="0"/>
+          </a:fillRef>
+          <a:effectRef idx="0">
+            <a:scrgbClr r="0" g="0" b="0"/>
+          </a:effectRef>
+          <a:fontRef idx="minor">
+            <a:schemeClr val="accent2"/>
+          </a:fontRef>
+        </p:style>
+        <p:txBody>
+          <a:bodyPr rtlCol="0" anchor="ctr"/>
+          <a:lstStyle/>
+          <a:p>
+            <a:pPr algn="ctr"/>
+            <a:endParaRPr lang="en-SG"/>
+          </a:p>
+        </p:txBody>
+      </p:sp>
+      <p:cxnSp>
+        <p:nvCxnSpPr>
+          <p:cNvPr id="39" name="Connector: Elbow 38">
+            <a:extLst>
+              <a:ext uri="{FF2B5EF4-FFF2-40B4-BE49-F238E27FC236}">
+                <a16:creationId xmlns:a16="http://schemas.microsoft.com/office/drawing/2014/main" id="{DD1384D0-6475-180D-DE09-197DEC982331}"/>
+              </a:ext>
+            </a:extLst>
+          </p:cNvPr>
+          <p:cNvCxnSpPr>
+            <a:cxnSpLocks/>
+            <a:endCxn id="38" idx="0"/>
+          </p:cNvCxnSpPr>
+          <p:nvPr/>
+        </p:nvCxnSpPr>
+        <p:spPr>
+          <a:xfrm rot="10800000">
+            <a:off x="2768356" y="1042360"/>
+            <a:ext cx="6076956" cy="406138"/>
+          </a:xfrm>
+          <a:prstGeom prst="bentConnector4">
+            <a:avLst>
+              <a:gd name="adj1" fmla="val 22944"/>
+              <a:gd name="adj2" fmla="val 156286"/>
+            </a:avLst>
+          </a:prstGeom>
+          <a:ln w="19050">
+            <a:solidFill>
+              <a:srgbClr val="FF0000"/>
+            </a:solidFill>
+            <a:prstDash val="sysDash"/>
+          </a:ln>
+        </p:spPr>
+        <p:style>
+          <a:lnRef idx="1">
+            <a:schemeClr val="accent1"/>
+          </a:lnRef>
+          <a:fillRef idx="0">
+            <a:schemeClr val="accent1"/>
+          </a:fillRef>
+          <a:effectRef idx="0">
+            <a:schemeClr val="accent1"/>
+          </a:effectRef>
+          <a:fontRef idx="minor">
+            <a:schemeClr val="tx1"/>
+          </a:fontRef>
+        </p:style>
+      </p:cxnSp>
+      <p:sp>
+        <p:nvSpPr>
+          <p:cNvPr id="43" name="TextBox 42">
+            <a:extLst>
+              <a:ext uri="{FF2B5EF4-FFF2-40B4-BE49-F238E27FC236}">
+                <a16:creationId xmlns:a16="http://schemas.microsoft.com/office/drawing/2014/main" id="{125AB3EA-3173-6FF5-FBB1-6645CB37E91D}"/>
+              </a:ext>
+            </a:extLst>
+          </p:cNvPr>
+          <p:cNvSpPr txBox="1"/>
+          <p:nvPr/>
+        </p:nvSpPr>
+        <p:spPr>
+          <a:xfrm>
+            <a:off x="4874274" y="580326"/>
+            <a:ext cx="1964590" cy="461665"/>
+          </a:xfrm>
+          <a:prstGeom prst="rect">
+            <a:avLst/>
+          </a:prstGeom>
+          <a:noFill/>
+        </p:spPr>
+        <p:txBody>
+          <a:bodyPr wrap="square">
+            <a:spAutoFit/>
+          </a:bodyPr>
+          <a:lstStyle/>
+          <a:p>
+            <a:r>
+              <a:rPr lang="en-US" sz="1200" b="1" dirty="0"/>
+              <a:t>Drone Camera Video channel</a:t>
+            </a:r>
+            <a:endParaRPr lang="en-SG" sz="1200" b="1" dirty="0"/>
+          </a:p>
+        </p:txBody>
+      </p:sp>
+      <p:sp>
+        <p:nvSpPr>
+          <p:cNvPr id="44" name="Rectangle 43">
+            <a:extLst>
+              <a:ext uri="{FF2B5EF4-FFF2-40B4-BE49-F238E27FC236}">
+                <a16:creationId xmlns:a16="http://schemas.microsoft.com/office/drawing/2014/main" id="{474E8779-D4D3-397D-BC2C-69C6C0866F9B}"/>
+              </a:ext>
+            </a:extLst>
+          </p:cNvPr>
+          <p:cNvSpPr/>
+          <p:nvPr/>
+        </p:nvSpPr>
+        <p:spPr>
+          <a:xfrm>
+            <a:off x="1499329" y="2929991"/>
+            <a:ext cx="2443634" cy="928778"/>
+          </a:xfrm>
+          <a:prstGeom prst="rect">
+            <a:avLst/>
+          </a:prstGeom>
+          <a:noFill/>
+          <a:ln w="19050" cap="flat" cmpd="sng" algn="ctr">
+            <a:solidFill>
+              <a:srgbClr val="00FF00"/>
+            </a:solidFill>
+            <a:prstDash val="sysDash"/>
+            <a:round/>
+            <a:headEnd type="none" w="med" len="med"/>
+            <a:tailEnd type="none" w="med" len="med"/>
+          </a:ln>
+        </p:spPr>
+        <p:style>
+          <a:lnRef idx="0">
+            <a:scrgbClr r="0" g="0" b="0"/>
+          </a:lnRef>
+          <a:fillRef idx="0">
+            <a:scrgbClr r="0" g="0" b="0"/>
+          </a:fillRef>
+          <a:effectRef idx="0">
+            <a:scrgbClr r="0" g="0" b="0"/>
+          </a:effectRef>
+          <a:fontRef idx="minor">
+            <a:schemeClr val="accent2"/>
+          </a:fontRef>
+        </p:style>
+        <p:txBody>
+          <a:bodyPr rtlCol="0" anchor="ctr"/>
+          <a:lstStyle/>
+          <a:p>
+            <a:pPr algn="ctr"/>
+            <a:endParaRPr lang="en-SG"/>
+          </a:p>
+        </p:txBody>
+      </p:sp>
+      <p:cxnSp>
+        <p:nvCxnSpPr>
+          <p:cNvPr id="46" name="Connector: Elbow 45">
+            <a:extLst>
+              <a:ext uri="{FF2B5EF4-FFF2-40B4-BE49-F238E27FC236}">
+                <a16:creationId xmlns:a16="http://schemas.microsoft.com/office/drawing/2014/main" id="{B9B99FDD-C062-239F-FA27-1AED88B9F21D}"/>
+              </a:ext>
+            </a:extLst>
+          </p:cNvPr>
+          <p:cNvCxnSpPr>
+            <a:cxnSpLocks/>
+            <a:stCxn id="6" idx="1"/>
+          </p:cNvCxnSpPr>
+          <p:nvPr/>
+        </p:nvCxnSpPr>
+        <p:spPr>
+          <a:xfrm rot="10800000" flipV="1">
+            <a:off x="3942968" y="1296323"/>
+            <a:ext cx="4146499" cy="2012094"/>
+          </a:xfrm>
+          <a:prstGeom prst="bentConnector3">
+            <a:avLst>
+              <a:gd name="adj1" fmla="val 25522"/>
+            </a:avLst>
+          </a:prstGeom>
+          <a:ln w="19050">
+            <a:solidFill>
+              <a:srgbClr val="00FF00"/>
+            </a:solidFill>
+            <a:prstDash val="sysDash"/>
+          </a:ln>
+        </p:spPr>
+        <p:style>
+          <a:lnRef idx="1">
+            <a:schemeClr val="accent1"/>
+          </a:lnRef>
+          <a:fillRef idx="0">
+            <a:schemeClr val="accent1"/>
+          </a:fillRef>
+          <a:effectRef idx="0">
+            <a:schemeClr val="accent1"/>
+          </a:effectRef>
+          <a:fontRef idx="minor">
+            <a:schemeClr val="tx1"/>
+          </a:fontRef>
+        </p:style>
+      </p:cxnSp>
+      <p:sp>
+        <p:nvSpPr>
+          <p:cNvPr id="52" name="TextBox 51">
+            <a:extLst>
+              <a:ext uri="{FF2B5EF4-FFF2-40B4-BE49-F238E27FC236}">
+                <a16:creationId xmlns:a16="http://schemas.microsoft.com/office/drawing/2014/main" id="{57F864F2-BF7C-C1FD-DED8-2729C8C8E839}"/>
+              </a:ext>
+            </a:extLst>
+          </p:cNvPr>
+          <p:cNvSpPr txBox="1"/>
+          <p:nvPr/>
+        </p:nvSpPr>
+        <p:spPr>
+          <a:xfrm>
+            <a:off x="4852180" y="3064982"/>
+            <a:ext cx="1964590" cy="461665"/>
+          </a:xfrm>
+          <a:prstGeom prst="rect">
+            <a:avLst/>
+          </a:prstGeom>
+          <a:noFill/>
+        </p:spPr>
+        <p:txBody>
+          <a:bodyPr wrap="square">
+            <a:spAutoFit/>
+          </a:bodyPr>
+          <a:lstStyle/>
+          <a:p>
+            <a:r>
+              <a:rPr lang="en-US" sz="1200" b="1" dirty="0"/>
+              <a:t>Drone flight and route control channel</a:t>
+            </a:r>
+            <a:endParaRPr lang="en-SG" sz="1200" b="1" dirty="0"/>
+          </a:p>
+        </p:txBody>
+      </p:sp>
+      <p:cxnSp>
+        <p:nvCxnSpPr>
+          <p:cNvPr id="53" name="Connector: Elbow 52">
+            <a:extLst>
+              <a:ext uri="{FF2B5EF4-FFF2-40B4-BE49-F238E27FC236}">
+                <a16:creationId xmlns:a16="http://schemas.microsoft.com/office/drawing/2014/main" id="{93EF7D2E-A22A-5353-D503-7E96610ED2B0}"/>
+              </a:ext>
+            </a:extLst>
+          </p:cNvPr>
+          <p:cNvCxnSpPr>
+            <a:cxnSpLocks/>
+            <a:endCxn id="54" idx="3"/>
+          </p:cNvCxnSpPr>
+          <p:nvPr/>
+        </p:nvCxnSpPr>
+        <p:spPr>
+          <a:xfrm rot="10800000" flipV="1">
+            <a:off x="3990173" y="973320"/>
+            <a:ext cx="4459388" cy="3373965"/>
+          </a:xfrm>
+          <a:prstGeom prst="bentConnector3">
+            <a:avLst>
+              <a:gd name="adj1" fmla="val 40158"/>
+            </a:avLst>
+          </a:prstGeom>
+          <a:ln w="19050">
+            <a:solidFill>
+              <a:srgbClr val="7030A0"/>
+            </a:solidFill>
+            <a:prstDash val="sysDash"/>
+          </a:ln>
+        </p:spPr>
+        <p:style>
+          <a:lnRef idx="1">
+            <a:schemeClr val="accent1"/>
+          </a:lnRef>
+          <a:fillRef idx="0">
+            <a:schemeClr val="accent1"/>
+          </a:fillRef>
+          <a:effectRef idx="0">
+            <a:schemeClr val="accent1"/>
+          </a:effectRef>
+          <a:fontRef idx="minor">
+            <a:schemeClr val="tx1"/>
+          </a:fontRef>
+        </p:style>
+      </p:cxnSp>
+      <p:sp>
+        <p:nvSpPr>
+          <p:cNvPr id="54" name="Rectangle 53">
+            <a:extLst>
+              <a:ext uri="{FF2B5EF4-FFF2-40B4-BE49-F238E27FC236}">
+                <a16:creationId xmlns:a16="http://schemas.microsoft.com/office/drawing/2014/main" id="{C98E8B20-82F3-755F-B49A-258FD8C302E8}"/>
+              </a:ext>
+            </a:extLst>
+          </p:cNvPr>
+          <p:cNvSpPr/>
+          <p:nvPr/>
+        </p:nvSpPr>
+        <p:spPr>
+          <a:xfrm>
+            <a:off x="1481040" y="3910637"/>
+            <a:ext cx="2509133" cy="873298"/>
+          </a:xfrm>
+          <a:prstGeom prst="rect">
+            <a:avLst/>
+          </a:prstGeom>
+          <a:noFill/>
+          <a:ln w="19050" cap="flat" cmpd="sng" algn="ctr">
+            <a:solidFill>
+              <a:srgbClr val="7030A0"/>
+            </a:solidFill>
+            <a:prstDash val="sysDash"/>
+            <a:round/>
+            <a:headEnd type="none" w="med" len="med"/>
+            <a:tailEnd type="none" w="med" len="med"/>
+          </a:ln>
+        </p:spPr>
+        <p:style>
+          <a:lnRef idx="0">
+            <a:scrgbClr r="0" g="0" b="0"/>
+          </a:lnRef>
+          <a:fillRef idx="0">
+            <a:scrgbClr r="0" g="0" b="0"/>
+          </a:fillRef>
+          <a:effectRef idx="0">
+            <a:scrgbClr r="0" g="0" b="0"/>
+          </a:effectRef>
+          <a:fontRef idx="minor">
+            <a:schemeClr val="accent2"/>
+          </a:fontRef>
+        </p:style>
+        <p:txBody>
+          <a:bodyPr rtlCol="0" anchor="ctr"/>
+          <a:lstStyle/>
+          <a:p>
+            <a:pPr algn="ctr"/>
+            <a:endParaRPr lang="en-SG"/>
+          </a:p>
+        </p:txBody>
+      </p:sp>
+      <p:sp>
+        <p:nvSpPr>
+          <p:cNvPr id="60" name="TextBox 59">
+            <a:extLst>
+              <a:ext uri="{FF2B5EF4-FFF2-40B4-BE49-F238E27FC236}">
+                <a16:creationId xmlns:a16="http://schemas.microsoft.com/office/drawing/2014/main" id="{BFE83E24-0AD5-E2D9-592F-698A0700F44A}"/>
+              </a:ext>
+            </a:extLst>
+          </p:cNvPr>
+          <p:cNvSpPr txBox="1"/>
+          <p:nvPr/>
+        </p:nvSpPr>
+        <p:spPr>
+          <a:xfrm>
+            <a:off x="4729875" y="4083032"/>
+            <a:ext cx="1964590" cy="461665"/>
+          </a:xfrm>
+          <a:prstGeom prst="rect">
+            <a:avLst/>
+          </a:prstGeom>
+          <a:noFill/>
+        </p:spPr>
+        <p:txBody>
+          <a:bodyPr wrap="square">
+            <a:spAutoFit/>
+          </a:bodyPr>
+          <a:lstStyle/>
+          <a:p>
+            <a:r>
+              <a:rPr lang="en-US" sz="1200" b="1" dirty="0"/>
+              <a:t>PATT firmware attestation communication channel</a:t>
+            </a:r>
+            <a:endParaRPr lang="en-SG" sz="1200" b="1" dirty="0"/>
+          </a:p>
+        </p:txBody>
+      </p:sp>
+      <p:cxnSp>
+        <p:nvCxnSpPr>
+          <p:cNvPr id="61" name="Straight Arrow Connector 60">
+            <a:extLst>
+              <a:ext uri="{FF2B5EF4-FFF2-40B4-BE49-F238E27FC236}">
+                <a16:creationId xmlns:a16="http://schemas.microsoft.com/office/drawing/2014/main" id="{21FC0BE3-D2EB-A516-082F-D51236E32B2B}"/>
+              </a:ext>
+            </a:extLst>
+          </p:cNvPr>
+          <p:cNvCxnSpPr>
+            <a:cxnSpLocks/>
+          </p:cNvCxnSpPr>
+          <p:nvPr/>
+        </p:nvCxnSpPr>
+        <p:spPr>
+          <a:xfrm flipH="1">
+            <a:off x="9824211" y="3113123"/>
+            <a:ext cx="223533" cy="166636"/>
+          </a:xfrm>
+          <a:prstGeom prst="straightConnector1">
+            <a:avLst/>
+          </a:prstGeom>
+          <a:ln>
+            <a:tailEnd type="triangle"/>
+          </a:ln>
+        </p:spPr>
+        <p:style>
+          <a:lnRef idx="1">
+            <a:schemeClr val="accent1"/>
+          </a:lnRef>
+          <a:fillRef idx="0">
+            <a:schemeClr val="accent1"/>
+          </a:fillRef>
+          <a:effectRef idx="0">
+            <a:schemeClr val="accent1"/>
+          </a:effectRef>
+          <a:fontRef idx="minor">
+            <a:schemeClr val="tx1"/>
+          </a:fontRef>
+        </p:style>
+      </p:cxnSp>
+      <p:pic>
+        <p:nvPicPr>
+          <p:cNvPr id="65" name="Picture 64">
+            <a:extLst>
+              <a:ext uri="{FF2B5EF4-FFF2-40B4-BE49-F238E27FC236}">
+                <a16:creationId xmlns:a16="http://schemas.microsoft.com/office/drawing/2014/main" id="{82B823DA-5EC8-AF14-9994-E6307A3CDBE2}"/>
+              </a:ext>
+            </a:extLst>
+          </p:cNvPr>
+          <p:cNvPicPr>
+            <a:picLocks noChangeAspect="1"/>
+          </p:cNvPicPr>
+          <p:nvPr/>
+        </p:nvPicPr>
+        <p:blipFill>
+          <a:blip r:embed="rId6"/>
+          <a:stretch>
+            <a:fillRect/>
+          </a:stretch>
+        </p:blipFill>
+        <p:spPr>
+          <a:xfrm>
+            <a:off x="6787567" y="5688223"/>
+            <a:ext cx="839247" cy="556001"/>
+          </a:xfrm>
+          <a:prstGeom prst="rect">
+            <a:avLst/>
+          </a:prstGeom>
+          <a:ln w="9525">
+            <a:solidFill>
+              <a:schemeClr val="tx1"/>
+            </a:solidFill>
+          </a:ln>
+        </p:spPr>
+      </p:pic>
+      <p:sp>
+        <p:nvSpPr>
+          <p:cNvPr id="66" name="TextBox 65">
+            <a:extLst>
+              <a:ext uri="{FF2B5EF4-FFF2-40B4-BE49-F238E27FC236}">
+                <a16:creationId xmlns:a16="http://schemas.microsoft.com/office/drawing/2014/main" id="{AAAE728E-1E66-2A65-80F2-39745654FFE9}"/>
+              </a:ext>
+            </a:extLst>
+          </p:cNvPr>
+          <p:cNvSpPr txBox="1"/>
+          <p:nvPr/>
+        </p:nvSpPr>
+        <p:spPr>
+          <a:xfrm>
+            <a:off x="8068574" y="4354183"/>
+            <a:ext cx="1607704" cy="276999"/>
+          </a:xfrm>
+          <a:prstGeom prst="rect">
+            <a:avLst/>
+          </a:prstGeom>
+          <a:noFill/>
+        </p:spPr>
+        <p:txBody>
+          <a:bodyPr wrap="square">
+            <a:spAutoFit/>
+          </a:bodyPr>
+          <a:lstStyle/>
+          <a:p>
+            <a:r>
+              <a:rPr lang="en-US" sz="1200" b="1" dirty="0"/>
+              <a:t>Item detected </a:t>
+            </a:r>
+            <a:endParaRPr lang="en-SG" sz="1200" b="1" dirty="0"/>
+          </a:p>
+        </p:txBody>
+      </p:sp>
+      <p:sp>
+        <p:nvSpPr>
+          <p:cNvPr id="67" name="TextBox 66">
+            <a:extLst>
+              <a:ext uri="{FF2B5EF4-FFF2-40B4-BE49-F238E27FC236}">
+                <a16:creationId xmlns:a16="http://schemas.microsoft.com/office/drawing/2014/main" id="{9E7D703B-EEC1-B639-1ACC-1D71551C49BD}"/>
+              </a:ext>
+            </a:extLst>
+          </p:cNvPr>
+          <p:cNvSpPr txBox="1"/>
+          <p:nvPr/>
+        </p:nvSpPr>
+        <p:spPr>
+          <a:xfrm>
+            <a:off x="10016997" y="2941469"/>
+            <a:ext cx="1321563" cy="461665"/>
+          </a:xfrm>
+          <a:prstGeom prst="rect">
+            <a:avLst/>
+          </a:prstGeom>
+          <a:noFill/>
+        </p:spPr>
+        <p:txBody>
+          <a:bodyPr wrap="square">
+            <a:spAutoFit/>
+          </a:bodyPr>
+          <a:lstStyle/>
+          <a:p>
+            <a:r>
+              <a:rPr lang="en-US" sz="1200" b="1" dirty="0"/>
+              <a:t>Sensor detection area</a:t>
+            </a:r>
+            <a:endParaRPr lang="en-SG" sz="1200" b="1" dirty="0"/>
+          </a:p>
+        </p:txBody>
+      </p:sp>
+      <p:sp>
+        <p:nvSpPr>
+          <p:cNvPr id="68" name="Cube 67">
+            <a:extLst>
+              <a:ext uri="{FF2B5EF4-FFF2-40B4-BE49-F238E27FC236}">
+                <a16:creationId xmlns:a16="http://schemas.microsoft.com/office/drawing/2014/main" id="{77D5B88A-D547-E3F9-D97F-D66E73AEEE14}"/>
+              </a:ext>
+            </a:extLst>
+          </p:cNvPr>
+          <p:cNvSpPr/>
+          <p:nvPr/>
+        </p:nvSpPr>
+        <p:spPr>
+          <a:xfrm>
+            <a:off x="1664250" y="5783305"/>
+            <a:ext cx="1247898" cy="522575"/>
+          </a:xfrm>
+          <a:prstGeom prst="cube">
+            <a:avLst/>
+          </a:prstGeom>
+        </p:spPr>
+        <p:style>
+          <a:lnRef idx="2">
+            <a:schemeClr val="accent1">
+              <a:shade val="15000"/>
+            </a:schemeClr>
+          </a:lnRef>
+          <a:fillRef idx="1">
+            <a:schemeClr val="accent1"/>
+          </a:fillRef>
+          <a:effectRef idx="0">
+            <a:schemeClr val="accent1"/>
+          </a:effectRef>
+          <a:fontRef idx="minor">
+            <a:schemeClr val="lt1"/>
+          </a:fontRef>
+        </p:style>
+        <p:txBody>
+          <a:bodyPr rtlCol="0" anchor="ctr"/>
+          <a:lstStyle/>
+          <a:p>
+            <a:pPr algn="ctr"/>
+            <a:endParaRPr lang="en-SG" dirty="0"/>
+          </a:p>
+        </p:txBody>
+      </p:sp>
+      <p:sp>
+        <p:nvSpPr>
+          <p:cNvPr id="69" name="Oval 68">
+            <a:extLst>
+              <a:ext uri="{FF2B5EF4-FFF2-40B4-BE49-F238E27FC236}">
+                <a16:creationId xmlns:a16="http://schemas.microsoft.com/office/drawing/2014/main" id="{5874302C-2C5E-3DA3-9795-5464E469C358}"/>
+              </a:ext>
+            </a:extLst>
+          </p:cNvPr>
+          <p:cNvSpPr/>
+          <p:nvPr/>
+        </p:nvSpPr>
+        <p:spPr>
+          <a:xfrm>
+            <a:off x="1424091" y="5615107"/>
+            <a:ext cx="1728216" cy="429486"/>
+          </a:xfrm>
+          <a:prstGeom prst="ellipse">
+            <a:avLst/>
+          </a:prstGeom>
+          <a:noFill/>
+          <a:ln w="19050" cap="flat" cmpd="sng" algn="ctr">
+            <a:solidFill>
+              <a:srgbClr val="FF0000"/>
+            </a:solidFill>
+            <a:prstDash val="sysDash"/>
+            <a:round/>
+            <a:headEnd type="none" w="med" len="med"/>
+            <a:tailEnd type="none" w="med" len="med"/>
+          </a:ln>
+        </p:spPr>
+        <p:style>
+          <a:lnRef idx="0">
+            <a:scrgbClr r="0" g="0" b="0"/>
+          </a:lnRef>
+          <a:fillRef idx="0">
+            <a:scrgbClr r="0" g="0" b="0"/>
+          </a:fillRef>
+          <a:effectRef idx="0">
+            <a:scrgbClr r="0" g="0" b="0"/>
+          </a:effectRef>
+          <a:fontRef idx="minor">
+            <a:schemeClr val="dk1"/>
+          </a:fontRef>
+        </p:style>
+        <p:txBody>
+          <a:bodyPr rtlCol="0" anchor="ctr"/>
+          <a:lstStyle/>
+          <a:p>
+            <a:pPr algn="ctr"/>
+            <a:endParaRPr lang="en-SG"/>
+          </a:p>
+        </p:txBody>
+      </p:sp>
+      <p:sp>
+        <p:nvSpPr>
+          <p:cNvPr id="70" name="Arrow: Right 69">
+            <a:extLst>
+              <a:ext uri="{FF2B5EF4-FFF2-40B4-BE49-F238E27FC236}">
+                <a16:creationId xmlns:a16="http://schemas.microsoft.com/office/drawing/2014/main" id="{0C77E269-D688-642F-1284-867E381164B5}"/>
+              </a:ext>
+            </a:extLst>
+          </p:cNvPr>
+          <p:cNvSpPr/>
+          <p:nvPr/>
+        </p:nvSpPr>
+        <p:spPr>
+          <a:xfrm>
+            <a:off x="4805346" y="5847189"/>
+            <a:ext cx="481219" cy="162252"/>
+          </a:xfrm>
+          <a:prstGeom prst="rightArrow">
+            <a:avLst/>
+          </a:prstGeom>
+        </p:spPr>
+        <p:style>
+          <a:lnRef idx="2">
+            <a:schemeClr val="accent1">
+              <a:shade val="15000"/>
+            </a:schemeClr>
+          </a:lnRef>
+          <a:fillRef idx="1">
+            <a:schemeClr val="accent1"/>
+          </a:fillRef>
+          <a:effectRef idx="0">
+            <a:schemeClr val="accent1"/>
+          </a:effectRef>
+          <a:fontRef idx="minor">
+            <a:schemeClr val="lt1"/>
+          </a:fontRef>
+        </p:style>
+        <p:txBody>
+          <a:bodyPr rtlCol="0" anchor="ctr"/>
+          <a:lstStyle/>
+          <a:p>
+            <a:pPr algn="ctr"/>
+            <a:endParaRPr lang="en-SG"/>
+          </a:p>
+        </p:txBody>
+      </p:sp>
+      <p:pic>
+        <p:nvPicPr>
+          <p:cNvPr id="71" name="Picture 70">
+            <a:extLst>
+              <a:ext uri="{FF2B5EF4-FFF2-40B4-BE49-F238E27FC236}">
+                <a16:creationId xmlns:a16="http://schemas.microsoft.com/office/drawing/2014/main" id="{4B79CEB5-E058-53D2-4B31-5D000E03ADA2}"/>
+              </a:ext>
+            </a:extLst>
+          </p:cNvPr>
+          <p:cNvPicPr>
+            <a:picLocks noChangeAspect="1"/>
+          </p:cNvPicPr>
+          <p:nvPr/>
+        </p:nvPicPr>
+        <p:blipFill>
+          <a:blip r:embed="rId5"/>
+          <a:stretch>
+            <a:fillRect/>
+          </a:stretch>
+        </p:blipFill>
+        <p:spPr>
+          <a:xfrm>
+            <a:off x="5430714" y="5701632"/>
+            <a:ext cx="566442" cy="542592"/>
+          </a:xfrm>
+          <a:prstGeom prst="rect">
+            <a:avLst/>
+          </a:prstGeom>
+          <a:ln w="12700">
+            <a:solidFill>
+              <a:schemeClr val="tx1"/>
+            </a:solidFill>
+          </a:ln>
+        </p:spPr>
+      </p:pic>
+      <p:sp>
+        <p:nvSpPr>
+          <p:cNvPr id="72" name="TextBox 71">
+            <a:extLst>
+              <a:ext uri="{FF2B5EF4-FFF2-40B4-BE49-F238E27FC236}">
+                <a16:creationId xmlns:a16="http://schemas.microsoft.com/office/drawing/2014/main" id="{4DF94C9F-D044-3C96-221F-EEAE66487F2D}"/>
+              </a:ext>
+            </a:extLst>
+          </p:cNvPr>
+          <p:cNvSpPr txBox="1"/>
+          <p:nvPr/>
+        </p:nvSpPr>
+        <p:spPr>
+          <a:xfrm>
+            <a:off x="1298210" y="5162687"/>
+            <a:ext cx="2260705" cy="461665"/>
+          </a:xfrm>
+          <a:prstGeom prst="rect">
+            <a:avLst/>
+          </a:prstGeom>
+          <a:noFill/>
+        </p:spPr>
+        <p:txBody>
+          <a:bodyPr wrap="square">
+            <a:spAutoFit/>
+          </a:bodyPr>
+          <a:lstStyle/>
+          <a:p>
+            <a:r>
+              <a:rPr lang="en-US" sz="1200" b="1" dirty="0"/>
+              <a:t>Item top area reflection distance data generated by sensor </a:t>
+            </a:r>
+            <a:endParaRPr lang="en-SG" sz="1200" b="1" dirty="0"/>
+          </a:p>
+        </p:txBody>
+      </p:sp>
+      <p:sp>
+        <p:nvSpPr>
+          <p:cNvPr id="73" name="TextBox 72">
+            <a:extLst>
+              <a:ext uri="{FF2B5EF4-FFF2-40B4-BE49-F238E27FC236}">
+                <a16:creationId xmlns:a16="http://schemas.microsoft.com/office/drawing/2014/main" id="{20B4B059-6095-8537-D164-B623468CA36C}"/>
+              </a:ext>
+            </a:extLst>
+          </p:cNvPr>
+          <p:cNvSpPr txBox="1"/>
+          <p:nvPr/>
+        </p:nvSpPr>
+        <p:spPr>
+          <a:xfrm>
+            <a:off x="5313591" y="5231329"/>
+            <a:ext cx="1418832" cy="461665"/>
+          </a:xfrm>
+          <a:prstGeom prst="rect">
+            <a:avLst/>
+          </a:prstGeom>
+          <a:noFill/>
+        </p:spPr>
+        <p:txBody>
+          <a:bodyPr wrap="square">
+            <a:spAutoFit/>
+          </a:bodyPr>
+          <a:lstStyle/>
+          <a:p>
+            <a:r>
+              <a:rPr lang="en-US" sz="1200" b="1" dirty="0"/>
+              <a:t>Ground</a:t>
+            </a:r>
+            <a:r>
+              <a:rPr lang="en-SG" sz="1200" b="1" dirty="0"/>
+              <a:t> </a:t>
+            </a:r>
+            <a:r>
+              <a:rPr lang="en-US" sz="1200" b="1" dirty="0"/>
+              <a:t>contour </a:t>
+            </a:r>
+            <a:r>
+              <a:rPr lang="en-SG" sz="1200" b="1" dirty="0"/>
+              <a:t>generate unit </a:t>
+            </a:r>
+          </a:p>
+        </p:txBody>
+      </p:sp>
+      <p:sp>
+        <p:nvSpPr>
+          <p:cNvPr id="74" name="Arrow: Right 73">
+            <a:extLst>
+              <a:ext uri="{FF2B5EF4-FFF2-40B4-BE49-F238E27FC236}">
+                <a16:creationId xmlns:a16="http://schemas.microsoft.com/office/drawing/2014/main" id="{616435C6-99EF-DB5A-0E84-B18F2DEEEC6A}"/>
+              </a:ext>
+            </a:extLst>
+          </p:cNvPr>
+          <p:cNvSpPr/>
+          <p:nvPr/>
+        </p:nvSpPr>
+        <p:spPr>
+          <a:xfrm>
+            <a:off x="6151752" y="5882341"/>
+            <a:ext cx="481219" cy="162252"/>
+          </a:xfrm>
+          <a:prstGeom prst="rightArrow">
+            <a:avLst/>
+          </a:prstGeom>
+        </p:spPr>
+        <p:style>
+          <a:lnRef idx="2">
+            <a:schemeClr val="accent1">
+              <a:shade val="15000"/>
+            </a:schemeClr>
+          </a:lnRef>
+          <a:fillRef idx="1">
+            <a:schemeClr val="accent1"/>
+          </a:fillRef>
+          <a:effectRef idx="0">
+            <a:schemeClr val="accent1"/>
+          </a:effectRef>
+          <a:fontRef idx="minor">
+            <a:schemeClr val="lt1"/>
+          </a:fontRef>
+        </p:style>
+        <p:txBody>
+          <a:bodyPr rtlCol="0" anchor="ctr"/>
+          <a:lstStyle/>
+          <a:p>
+            <a:pPr algn="ctr"/>
+            <a:endParaRPr lang="en-SG"/>
+          </a:p>
+        </p:txBody>
+      </p:sp>
+      <p:sp>
+        <p:nvSpPr>
+          <p:cNvPr id="75" name="TextBox 74">
+            <a:extLst>
+              <a:ext uri="{FF2B5EF4-FFF2-40B4-BE49-F238E27FC236}">
+                <a16:creationId xmlns:a16="http://schemas.microsoft.com/office/drawing/2014/main" id="{9949B7C8-9C37-131E-7A16-8BD0C38A758C}"/>
+              </a:ext>
+            </a:extLst>
+          </p:cNvPr>
+          <p:cNvSpPr txBox="1"/>
+          <p:nvPr/>
+        </p:nvSpPr>
+        <p:spPr>
+          <a:xfrm>
+            <a:off x="6696295" y="5248084"/>
+            <a:ext cx="1418832" cy="461665"/>
+          </a:xfrm>
+          <a:prstGeom prst="rect">
+            <a:avLst/>
+          </a:prstGeom>
+          <a:noFill/>
+        </p:spPr>
+        <p:txBody>
+          <a:bodyPr wrap="square">
+            <a:spAutoFit/>
+          </a:bodyPr>
+          <a:lstStyle/>
+          <a:p>
+            <a:r>
+              <a:rPr lang="en-US" sz="1200" b="1" dirty="0"/>
+              <a:t>Simple ground contour matrix  </a:t>
+            </a:r>
+            <a:endParaRPr lang="en-SG" sz="1200" b="1" dirty="0"/>
+          </a:p>
+        </p:txBody>
+      </p:sp>
+      <p:sp>
+        <p:nvSpPr>
+          <p:cNvPr id="76" name="Arrow: Right 75">
+            <a:extLst>
+              <a:ext uri="{FF2B5EF4-FFF2-40B4-BE49-F238E27FC236}">
+                <a16:creationId xmlns:a16="http://schemas.microsoft.com/office/drawing/2014/main" id="{08443FEF-CAEC-0664-D92B-14050A657DDF}"/>
+              </a:ext>
+            </a:extLst>
+          </p:cNvPr>
+          <p:cNvSpPr/>
+          <p:nvPr/>
+        </p:nvSpPr>
+        <p:spPr>
+          <a:xfrm>
+            <a:off x="7794192" y="5862781"/>
+            <a:ext cx="481219" cy="162252"/>
+          </a:xfrm>
+          <a:prstGeom prst="rightArrow">
+            <a:avLst/>
+          </a:prstGeom>
+        </p:spPr>
+        <p:style>
+          <a:lnRef idx="2">
+            <a:schemeClr val="accent1">
+              <a:shade val="15000"/>
+            </a:schemeClr>
+          </a:lnRef>
+          <a:fillRef idx="1">
+            <a:schemeClr val="accent1"/>
+          </a:fillRef>
+          <a:effectRef idx="0">
+            <a:schemeClr val="accent1"/>
+          </a:effectRef>
+          <a:fontRef idx="minor">
+            <a:schemeClr val="lt1"/>
+          </a:fontRef>
+        </p:style>
+        <p:txBody>
+          <a:bodyPr rtlCol="0" anchor="ctr"/>
+          <a:lstStyle/>
+          <a:p>
+            <a:pPr algn="ctr"/>
+            <a:endParaRPr lang="en-SG"/>
+          </a:p>
+        </p:txBody>
+      </p:sp>
+      <p:pic>
+        <p:nvPicPr>
+          <p:cNvPr id="78" name="Picture 77">
+            <a:extLst>
+              <a:ext uri="{FF2B5EF4-FFF2-40B4-BE49-F238E27FC236}">
+                <a16:creationId xmlns:a16="http://schemas.microsoft.com/office/drawing/2014/main" id="{A9CCE663-AC56-B9B7-DE8B-B968BBBEC788}"/>
+              </a:ext>
+            </a:extLst>
+          </p:cNvPr>
+          <p:cNvPicPr>
+            <a:picLocks noChangeAspect="1"/>
+          </p:cNvPicPr>
+          <p:nvPr/>
+        </p:nvPicPr>
+        <p:blipFill>
+          <a:blip r:embed="rId7"/>
+          <a:stretch>
+            <a:fillRect/>
+          </a:stretch>
+        </p:blipFill>
+        <p:spPr>
+          <a:xfrm>
+            <a:off x="8417225" y="5650840"/>
+            <a:ext cx="668342" cy="865418"/>
+          </a:xfrm>
+          <a:prstGeom prst="rect">
+            <a:avLst/>
+          </a:prstGeom>
+          <a:ln w="9525">
+            <a:solidFill>
+              <a:schemeClr val="tx1"/>
+            </a:solidFill>
+          </a:ln>
+        </p:spPr>
+      </p:pic>
+      <p:sp>
+        <p:nvSpPr>
+          <p:cNvPr id="79" name="TextBox 78">
+            <a:extLst>
+              <a:ext uri="{FF2B5EF4-FFF2-40B4-BE49-F238E27FC236}">
+                <a16:creationId xmlns:a16="http://schemas.microsoft.com/office/drawing/2014/main" id="{ED6B7383-AD86-8A06-6A5C-893EF6F91964}"/>
+              </a:ext>
+            </a:extLst>
+          </p:cNvPr>
+          <p:cNvSpPr txBox="1"/>
+          <p:nvPr/>
+        </p:nvSpPr>
+        <p:spPr>
+          <a:xfrm>
+            <a:off x="8129208" y="5248083"/>
+            <a:ext cx="1418832" cy="461665"/>
+          </a:xfrm>
+          <a:prstGeom prst="rect">
+            <a:avLst/>
+          </a:prstGeom>
+          <a:noFill/>
+        </p:spPr>
+        <p:txBody>
+          <a:bodyPr wrap="square">
+            <a:spAutoFit/>
+          </a:bodyPr>
+          <a:lstStyle/>
+          <a:p>
+            <a:r>
+              <a:rPr lang="en-SG" sz="1200" b="1" dirty="0"/>
+              <a:t>Terrain matching function</a:t>
+            </a:r>
+          </a:p>
+        </p:txBody>
+      </p:sp>
+      <p:sp>
+        <p:nvSpPr>
+          <p:cNvPr id="80" name="Arrow: Right 79">
+            <a:extLst>
+              <a:ext uri="{FF2B5EF4-FFF2-40B4-BE49-F238E27FC236}">
+                <a16:creationId xmlns:a16="http://schemas.microsoft.com/office/drawing/2014/main" id="{1DCBB217-4ECA-AA55-6364-5B0F60F367A3}"/>
+              </a:ext>
+            </a:extLst>
+          </p:cNvPr>
+          <p:cNvSpPr/>
+          <p:nvPr/>
+        </p:nvSpPr>
+        <p:spPr>
+          <a:xfrm>
+            <a:off x="9239220" y="5847244"/>
+            <a:ext cx="481219" cy="162252"/>
+          </a:xfrm>
+          <a:prstGeom prst="rightArrow">
+            <a:avLst/>
+          </a:prstGeom>
+        </p:spPr>
+        <p:style>
+          <a:lnRef idx="2">
+            <a:schemeClr val="accent1">
+              <a:shade val="15000"/>
+            </a:schemeClr>
+          </a:lnRef>
+          <a:fillRef idx="1">
+            <a:schemeClr val="accent1"/>
+          </a:fillRef>
+          <a:effectRef idx="0">
+            <a:schemeClr val="accent1"/>
+          </a:effectRef>
+          <a:fontRef idx="minor">
+            <a:schemeClr val="lt1"/>
+          </a:fontRef>
+        </p:style>
+        <p:txBody>
+          <a:bodyPr rtlCol="0" anchor="ctr"/>
+          <a:lstStyle/>
+          <a:p>
+            <a:pPr algn="ctr"/>
+            <a:endParaRPr lang="en-SG"/>
+          </a:p>
+        </p:txBody>
+      </p:sp>
+      <p:pic>
+        <p:nvPicPr>
+          <p:cNvPr id="81" name="Picture 80">
+            <a:extLst>
+              <a:ext uri="{FF2B5EF4-FFF2-40B4-BE49-F238E27FC236}">
+                <a16:creationId xmlns:a16="http://schemas.microsoft.com/office/drawing/2014/main" id="{7CD99E47-3D2F-786A-5477-651A514005C9}"/>
+              </a:ext>
+            </a:extLst>
+          </p:cNvPr>
+          <p:cNvPicPr>
+            <a:picLocks noChangeAspect="1"/>
+          </p:cNvPicPr>
+          <p:nvPr/>
+        </p:nvPicPr>
+        <p:blipFill>
+          <a:blip r:embed="rId3"/>
+          <a:stretch>
+            <a:fillRect/>
+          </a:stretch>
+        </p:blipFill>
+        <p:spPr>
+          <a:xfrm>
+            <a:off x="9797709" y="5709748"/>
+            <a:ext cx="897771" cy="616470"/>
+          </a:xfrm>
+          <a:prstGeom prst="rect">
+            <a:avLst/>
+          </a:prstGeom>
+          <a:ln w="12700">
+            <a:solidFill>
+              <a:schemeClr val="tx1"/>
+            </a:solidFill>
+          </a:ln>
+        </p:spPr>
+      </p:pic>
+      <p:sp>
+        <p:nvSpPr>
+          <p:cNvPr id="82" name="TextBox 81">
+            <a:extLst>
+              <a:ext uri="{FF2B5EF4-FFF2-40B4-BE49-F238E27FC236}">
+                <a16:creationId xmlns:a16="http://schemas.microsoft.com/office/drawing/2014/main" id="{A4223DDA-BAFB-A549-DB57-4FD54E7D0283}"/>
+              </a:ext>
+            </a:extLst>
+          </p:cNvPr>
+          <p:cNvSpPr txBox="1"/>
+          <p:nvPr/>
+        </p:nvSpPr>
+        <p:spPr>
+          <a:xfrm>
+            <a:off x="9629035" y="5255125"/>
+            <a:ext cx="1418832" cy="461665"/>
+          </a:xfrm>
+          <a:prstGeom prst="rect">
+            <a:avLst/>
+          </a:prstGeom>
+          <a:noFill/>
+        </p:spPr>
+        <p:txBody>
+          <a:bodyPr wrap="square">
+            <a:spAutoFit/>
+          </a:bodyPr>
+          <a:lstStyle/>
+          <a:p>
+            <a:r>
+              <a:rPr lang="en-US" sz="1200" b="1" dirty="0"/>
+              <a:t>Control command to the drone</a:t>
+            </a:r>
+            <a:endParaRPr lang="en-SG" sz="1200" b="1" dirty="0"/>
+          </a:p>
+        </p:txBody>
+      </p:sp>
+      <p:pic>
+        <p:nvPicPr>
+          <p:cNvPr id="83" name="Picture 82">
+            <a:extLst>
+              <a:ext uri="{FF2B5EF4-FFF2-40B4-BE49-F238E27FC236}">
+                <a16:creationId xmlns:a16="http://schemas.microsoft.com/office/drawing/2014/main" id="{0D0430E6-8C4D-B1E2-BB54-664B37C60525}"/>
+              </a:ext>
+            </a:extLst>
+          </p:cNvPr>
+          <p:cNvPicPr>
+            <a:picLocks noChangeAspect="1"/>
+          </p:cNvPicPr>
+          <p:nvPr/>
+        </p:nvPicPr>
+        <p:blipFill>
+          <a:blip r:embed="rId4"/>
+          <a:stretch>
+            <a:fillRect/>
+          </a:stretch>
+        </p:blipFill>
+        <p:spPr>
+          <a:xfrm flipH="1" flipV="1">
+            <a:off x="3899532" y="5728838"/>
+            <a:ext cx="712684" cy="552495"/>
+          </a:xfrm>
+          <a:prstGeom prst="rect">
+            <a:avLst/>
+          </a:prstGeom>
+          <a:ln w="12700">
+            <a:solidFill>
+              <a:schemeClr val="tx1"/>
+            </a:solidFill>
+          </a:ln>
+        </p:spPr>
+      </p:pic>
+      <p:sp>
+        <p:nvSpPr>
+          <p:cNvPr id="84" name="Arrow: Right 83">
+            <a:extLst>
+              <a:ext uri="{FF2B5EF4-FFF2-40B4-BE49-F238E27FC236}">
+                <a16:creationId xmlns:a16="http://schemas.microsoft.com/office/drawing/2014/main" id="{20C09E53-8BCF-5143-518E-C16BA2CC92A2}"/>
+              </a:ext>
+            </a:extLst>
+          </p:cNvPr>
+          <p:cNvSpPr/>
+          <p:nvPr/>
+        </p:nvSpPr>
+        <p:spPr>
+          <a:xfrm>
+            <a:off x="3220560" y="5836971"/>
+            <a:ext cx="481219" cy="162252"/>
+          </a:xfrm>
+          <a:prstGeom prst="rightArrow">
+            <a:avLst/>
+          </a:prstGeom>
+        </p:spPr>
+        <p:style>
+          <a:lnRef idx="2">
+            <a:schemeClr val="accent1">
+              <a:shade val="15000"/>
+            </a:schemeClr>
+          </a:lnRef>
+          <a:fillRef idx="1">
+            <a:schemeClr val="accent1"/>
+          </a:fillRef>
+          <a:effectRef idx="0">
+            <a:schemeClr val="accent1"/>
+          </a:effectRef>
+          <a:fontRef idx="minor">
+            <a:schemeClr val="lt1"/>
+          </a:fontRef>
+        </p:style>
+        <p:txBody>
+          <a:bodyPr rtlCol="0" anchor="ctr"/>
+          <a:lstStyle/>
+          <a:p>
+            <a:pPr algn="ctr"/>
+            <a:endParaRPr lang="en-SG"/>
+          </a:p>
+        </p:txBody>
+      </p:sp>
+      <p:sp>
+        <p:nvSpPr>
+          <p:cNvPr id="85" name="TextBox 84">
+            <a:extLst>
+              <a:ext uri="{FF2B5EF4-FFF2-40B4-BE49-F238E27FC236}">
+                <a16:creationId xmlns:a16="http://schemas.microsoft.com/office/drawing/2014/main" id="{45ED53DB-9731-2C2A-3226-1B28799A2E29}"/>
+              </a:ext>
+            </a:extLst>
+          </p:cNvPr>
+          <p:cNvSpPr txBox="1"/>
+          <p:nvPr/>
+        </p:nvSpPr>
+        <p:spPr>
+          <a:xfrm>
+            <a:off x="3768966" y="5292189"/>
+            <a:ext cx="1607704" cy="461665"/>
+          </a:xfrm>
+          <a:prstGeom prst="rect">
+            <a:avLst/>
+          </a:prstGeom>
+          <a:noFill/>
+        </p:spPr>
+        <p:txBody>
+          <a:bodyPr wrap="square">
+            <a:spAutoFit/>
+          </a:bodyPr>
+          <a:lstStyle/>
+          <a:p>
+            <a:r>
+              <a:rPr lang="en-US" sz="1200" b="1" dirty="0"/>
+              <a:t>HC-SR04 Ultrasonic Sensor</a:t>
+            </a:r>
+            <a:endParaRPr lang="en-SG" sz="1200" b="1" dirty="0"/>
+          </a:p>
+        </p:txBody>
+      </p:sp>
+    </p:spTree>
+    <p:extLst>
+      <p:ext uri="{BB962C8B-B14F-4D97-AF65-F5344CB8AC3E}">
+        <p14:creationId xmlns:p14="http://schemas.microsoft.com/office/powerpoint/2010/main" val="2164037287"/>
+      </p:ext>
+    </p:extLst>
+  </p:cSld>
+  <p:clrMapOvr>
+    <a:masterClrMapping/>
+  </p:clrMapOvr>
+</p:sld>
+</file>
+
+<file path=ppt/slides/slide4.xml><?xml version="1.0" encoding="utf-8"?>
+<p:sld xmlns:a="http://schemas.openxmlformats.org/drawingml/2006/main" xmlns:r="http://schemas.openxmlformats.org/officeDocument/2006/relationships" xmlns:p="http://schemas.openxmlformats.org/presentationml/2006/main">
+  <p:cSld>
+    <p:spTree>
+      <p:nvGrpSpPr>
+        <p:cNvPr id="1" name=""/>
+        <p:cNvGrpSpPr/>
+        <p:nvPr/>
+      </p:nvGrpSpPr>
+      <p:grpSpPr>
+        <a:xfrm>
+          <a:off x="0" y="0"/>
+          <a:ext cx="0" cy="0"/>
+          <a:chOff x="0" y="0"/>
+          <a:chExt cx="0" cy="0"/>
+        </a:xfrm>
+      </p:grpSpPr>
+      <p:pic>
+        <p:nvPicPr>
+          <p:cNvPr id="5" name="Picture 4" descr="A drone on a table&#10;&#10;Description automatically generated">
+            <a:extLst>
+              <a:ext uri="{FF2B5EF4-FFF2-40B4-BE49-F238E27FC236}">
+                <a16:creationId xmlns:a16="http://schemas.microsoft.com/office/drawing/2014/main" id="{D0F45704-DD5C-3BAE-8476-82692F3C5B32}"/>
+              </a:ext>
+            </a:extLst>
+          </p:cNvPr>
+          <p:cNvPicPr>
+            <a:picLocks noChangeAspect="1"/>
+          </p:cNvPicPr>
+          <p:nvPr/>
+        </p:nvPicPr>
+        <p:blipFill>
+          <a:blip r:embed="rId3">
+            <a:extLst>
+              <a:ext uri="{28A0092B-C50C-407E-A947-70E740481C1C}">
+                <a14:useLocalDpi xmlns:a14="http://schemas.microsoft.com/office/drawing/2010/main" val="0"/>
+              </a:ext>
+            </a:extLst>
+          </a:blip>
+          <a:stretch>
+            <a:fillRect/>
+          </a:stretch>
+        </p:blipFill>
+        <p:spPr>
+          <a:xfrm>
+            <a:off x="1937512" y="1828546"/>
+            <a:ext cx="5080000" cy="2908300"/>
+          </a:xfrm>
+          <a:prstGeom prst="rect">
+            <a:avLst/>
+          </a:prstGeom>
+        </p:spPr>
+      </p:pic>
+      <p:sp>
+        <p:nvSpPr>
+          <p:cNvPr id="6" name="Rectangle 5">
+            <a:extLst>
+              <a:ext uri="{FF2B5EF4-FFF2-40B4-BE49-F238E27FC236}">
+                <a16:creationId xmlns:a16="http://schemas.microsoft.com/office/drawing/2014/main" id="{7ABA5E08-8531-9622-9716-2BB1F4B7C757}"/>
+              </a:ext>
+            </a:extLst>
+          </p:cNvPr>
+          <p:cNvSpPr/>
+          <p:nvPr/>
+        </p:nvSpPr>
+        <p:spPr>
+          <a:xfrm>
+            <a:off x="2620264" y="3282696"/>
+            <a:ext cx="286004" cy="429768"/>
+          </a:xfrm>
+          <a:prstGeom prst="rect">
+            <a:avLst/>
+          </a:prstGeom>
+          <a:noFill/>
+          <a:ln w="19050" cap="flat" cmpd="sng" algn="ctr">
+            <a:solidFill>
+              <a:srgbClr val="FF0000"/>
+            </a:solidFill>
+            <a:prstDash val="solid"/>
+            <a:round/>
+            <a:headEnd type="none" w="med" len="med"/>
+            <a:tailEnd type="none" w="med" len="med"/>
+          </a:ln>
+        </p:spPr>
+        <p:style>
+          <a:lnRef idx="0">
+            <a:scrgbClr r="0" g="0" b="0"/>
+          </a:lnRef>
+          <a:fillRef idx="0">
+            <a:scrgbClr r="0" g="0" b="0"/>
+          </a:fillRef>
+          <a:effectRef idx="0">
+            <a:scrgbClr r="0" g="0" b="0"/>
+          </a:effectRef>
+          <a:fontRef idx="minor">
+            <a:schemeClr val="dk1"/>
+          </a:fontRef>
+        </p:style>
+        <p:txBody>
+          <a:bodyPr rtlCol="0" anchor="ctr"/>
+          <a:lstStyle/>
+          <a:p>
+            <a:pPr algn="ctr"/>
+            <a:endParaRPr lang="en-SG"/>
+          </a:p>
+        </p:txBody>
+      </p:sp>
+      <p:sp>
+        <p:nvSpPr>
+          <p:cNvPr id="7" name="Rectangle 6">
+            <a:extLst>
+              <a:ext uri="{FF2B5EF4-FFF2-40B4-BE49-F238E27FC236}">
+                <a16:creationId xmlns:a16="http://schemas.microsoft.com/office/drawing/2014/main" id="{AA711BD5-1CDD-A460-A9D0-7E01A50277D8}"/>
+              </a:ext>
+            </a:extLst>
+          </p:cNvPr>
+          <p:cNvSpPr/>
+          <p:nvPr/>
+        </p:nvSpPr>
+        <p:spPr>
+          <a:xfrm>
+            <a:off x="3192272" y="3127248"/>
+            <a:ext cx="384048" cy="512061"/>
+          </a:xfrm>
+          <a:prstGeom prst="rect">
+            <a:avLst/>
+          </a:prstGeom>
+          <a:noFill/>
+          <a:ln w="19050" cap="flat" cmpd="sng" algn="ctr">
+            <a:solidFill>
+              <a:srgbClr val="FF0000"/>
+            </a:solidFill>
+            <a:prstDash val="solid"/>
+            <a:round/>
+            <a:headEnd type="none" w="med" len="med"/>
+            <a:tailEnd type="none" w="med" len="med"/>
+          </a:ln>
+        </p:spPr>
+        <p:style>
+          <a:lnRef idx="0">
+            <a:scrgbClr r="0" g="0" b="0"/>
+          </a:lnRef>
+          <a:fillRef idx="0">
+            <a:scrgbClr r="0" g="0" b="0"/>
+          </a:fillRef>
+          <a:effectRef idx="0">
+            <a:scrgbClr r="0" g="0" b="0"/>
+          </a:effectRef>
+          <a:fontRef idx="minor">
+            <a:schemeClr val="dk1"/>
+          </a:fontRef>
+        </p:style>
+        <p:txBody>
+          <a:bodyPr rtlCol="0" anchor="ctr"/>
+          <a:lstStyle/>
+          <a:p>
+            <a:pPr algn="ctr"/>
+            <a:endParaRPr lang="en-SG"/>
+          </a:p>
+        </p:txBody>
+      </p:sp>
+      <p:cxnSp>
+        <p:nvCxnSpPr>
+          <p:cNvPr id="9" name="Straight Arrow Connector 8">
+            <a:extLst>
+              <a:ext uri="{FF2B5EF4-FFF2-40B4-BE49-F238E27FC236}">
+                <a16:creationId xmlns:a16="http://schemas.microsoft.com/office/drawing/2014/main" id="{A56983E4-BF40-F989-4048-CED276D24B9E}"/>
+              </a:ext>
+            </a:extLst>
+          </p:cNvPr>
+          <p:cNvCxnSpPr>
+            <a:cxnSpLocks/>
+          </p:cNvCxnSpPr>
+          <p:nvPr/>
+        </p:nvCxnSpPr>
+        <p:spPr>
+          <a:xfrm>
+            <a:off x="1609344" y="3200400"/>
+            <a:ext cx="1582928" cy="0"/>
+          </a:xfrm>
+          <a:prstGeom prst="straightConnector1">
+            <a:avLst/>
+          </a:prstGeom>
+          <a:ln>
+            <a:solidFill>
+              <a:srgbClr val="FF0000"/>
+            </a:solidFill>
+            <a:tailEnd type="triangle"/>
+          </a:ln>
+        </p:spPr>
+        <p:style>
+          <a:lnRef idx="1">
+            <a:schemeClr val="accent1"/>
+          </a:lnRef>
+          <a:fillRef idx="0">
+            <a:schemeClr val="accent1"/>
+          </a:fillRef>
+          <a:effectRef idx="0">
+            <a:schemeClr val="accent1"/>
+          </a:effectRef>
+          <a:fontRef idx="minor">
+            <a:schemeClr val="tx1"/>
+          </a:fontRef>
+        </p:style>
+      </p:cxnSp>
+      <p:cxnSp>
+        <p:nvCxnSpPr>
+          <p:cNvPr id="12" name="Straight Arrow Connector 11">
+            <a:extLst>
+              <a:ext uri="{FF2B5EF4-FFF2-40B4-BE49-F238E27FC236}">
+                <a16:creationId xmlns:a16="http://schemas.microsoft.com/office/drawing/2014/main" id="{71292624-8FEE-2577-7CD0-DCD61B345E82}"/>
+              </a:ext>
+            </a:extLst>
+          </p:cNvPr>
+          <p:cNvCxnSpPr>
+            <a:cxnSpLocks/>
+          </p:cNvCxnSpPr>
+          <p:nvPr/>
+        </p:nvCxnSpPr>
+        <p:spPr>
+          <a:xfrm>
+            <a:off x="1609344" y="3282696"/>
+            <a:ext cx="1010920" cy="225552"/>
+          </a:xfrm>
+          <a:prstGeom prst="straightConnector1">
+            <a:avLst/>
+          </a:prstGeom>
+          <a:ln>
+            <a:solidFill>
+              <a:srgbClr val="FF0000"/>
+            </a:solidFill>
+            <a:tailEnd type="triangle"/>
+          </a:ln>
+        </p:spPr>
+        <p:style>
+          <a:lnRef idx="1">
+            <a:schemeClr val="accent1"/>
+          </a:lnRef>
+          <a:fillRef idx="0">
+            <a:schemeClr val="accent1"/>
+          </a:fillRef>
+          <a:effectRef idx="0">
+            <a:schemeClr val="accent1"/>
+          </a:effectRef>
+          <a:fontRef idx="minor">
+            <a:schemeClr val="tx1"/>
+          </a:fontRef>
+        </p:style>
+      </p:cxnSp>
+      <p:sp>
+        <p:nvSpPr>
+          <p:cNvPr id="14" name="TextBox 13">
+            <a:extLst>
+              <a:ext uri="{FF2B5EF4-FFF2-40B4-BE49-F238E27FC236}">
+                <a16:creationId xmlns:a16="http://schemas.microsoft.com/office/drawing/2014/main" id="{EC432E6A-099B-374E-0183-E13E8E68A0C2}"/>
+              </a:ext>
+            </a:extLst>
+          </p:cNvPr>
+          <p:cNvSpPr txBox="1"/>
+          <p:nvPr/>
+        </p:nvSpPr>
+        <p:spPr>
+          <a:xfrm>
+            <a:off x="579134" y="2930759"/>
+            <a:ext cx="1755126" cy="461665"/>
+          </a:xfrm>
+          <a:prstGeom prst="rect">
+            <a:avLst/>
+          </a:prstGeom>
+          <a:noFill/>
+        </p:spPr>
+        <p:txBody>
+          <a:bodyPr wrap="square">
+            <a:spAutoFit/>
+          </a:bodyPr>
+          <a:lstStyle/>
+          <a:p>
+            <a:r>
+              <a:rPr lang="en-US" sz="1200" b="1" dirty="0"/>
+              <a:t>HC-SR04 Ultrasonic Sensors</a:t>
+            </a:r>
+            <a:endParaRPr lang="en-SG" sz="1200" b="1" dirty="0"/>
+          </a:p>
+        </p:txBody>
+      </p:sp>
+      <p:sp>
+        <p:nvSpPr>
+          <p:cNvPr id="16" name="Rectangle 15">
+            <a:extLst>
+              <a:ext uri="{FF2B5EF4-FFF2-40B4-BE49-F238E27FC236}">
+                <a16:creationId xmlns:a16="http://schemas.microsoft.com/office/drawing/2014/main" id="{6889299F-CFB6-BEF2-7234-9F41E6901973}"/>
+              </a:ext>
+            </a:extLst>
+          </p:cNvPr>
+          <p:cNvSpPr/>
+          <p:nvPr/>
+        </p:nvSpPr>
+        <p:spPr>
+          <a:xfrm>
+            <a:off x="5717032" y="2930758"/>
+            <a:ext cx="384048" cy="577489"/>
+          </a:xfrm>
+          <a:prstGeom prst="rect">
+            <a:avLst/>
+          </a:prstGeom>
+          <a:noFill/>
+          <a:ln w="19050" cap="flat" cmpd="sng" algn="ctr">
+            <a:solidFill>
+              <a:srgbClr val="FF0000"/>
+            </a:solidFill>
+            <a:prstDash val="solid"/>
+            <a:round/>
+            <a:headEnd type="none" w="med" len="med"/>
+            <a:tailEnd type="none" w="med" len="med"/>
+          </a:ln>
+        </p:spPr>
+        <p:style>
+          <a:lnRef idx="0">
+            <a:scrgbClr r="0" g="0" b="0"/>
+          </a:lnRef>
+          <a:fillRef idx="0">
+            <a:scrgbClr r="0" g="0" b="0"/>
+          </a:fillRef>
+          <a:effectRef idx="0">
+            <a:scrgbClr r="0" g="0" b="0"/>
+          </a:effectRef>
+          <a:fontRef idx="minor">
+            <a:schemeClr val="dk1"/>
+          </a:fontRef>
+        </p:style>
+        <p:txBody>
+          <a:bodyPr rtlCol="0" anchor="ctr"/>
+          <a:lstStyle/>
+          <a:p>
+            <a:pPr algn="ctr"/>
+            <a:endParaRPr lang="en-SG"/>
+          </a:p>
+        </p:txBody>
+      </p:sp>
+      <p:cxnSp>
+        <p:nvCxnSpPr>
+          <p:cNvPr id="17" name="Straight Arrow Connector 16">
+            <a:extLst>
+              <a:ext uri="{FF2B5EF4-FFF2-40B4-BE49-F238E27FC236}">
+                <a16:creationId xmlns:a16="http://schemas.microsoft.com/office/drawing/2014/main" id="{D3D93E62-C5F9-7BA8-8CAD-40A76DE0E1DC}"/>
+              </a:ext>
+            </a:extLst>
+          </p:cNvPr>
+          <p:cNvCxnSpPr>
+            <a:cxnSpLocks/>
+          </p:cNvCxnSpPr>
+          <p:nvPr/>
+        </p:nvCxnSpPr>
+        <p:spPr>
+          <a:xfrm flipH="1">
+            <a:off x="6101080" y="3222550"/>
+            <a:ext cx="1122680" cy="0"/>
+          </a:xfrm>
+          <a:prstGeom prst="straightConnector1">
+            <a:avLst/>
+          </a:prstGeom>
+          <a:ln>
+            <a:solidFill>
+              <a:srgbClr val="FF0000"/>
+            </a:solidFill>
+            <a:tailEnd type="triangle"/>
+          </a:ln>
+        </p:spPr>
+        <p:style>
+          <a:lnRef idx="1">
+            <a:schemeClr val="accent1"/>
+          </a:lnRef>
+          <a:fillRef idx="0">
+            <a:schemeClr val="accent1"/>
+          </a:fillRef>
+          <a:effectRef idx="0">
+            <a:schemeClr val="accent1"/>
+          </a:effectRef>
+          <a:fontRef idx="minor">
+            <a:schemeClr val="tx1"/>
+          </a:fontRef>
+        </p:style>
+      </p:cxnSp>
+      <p:sp>
+        <p:nvSpPr>
+          <p:cNvPr id="20" name="TextBox 19">
+            <a:extLst>
+              <a:ext uri="{FF2B5EF4-FFF2-40B4-BE49-F238E27FC236}">
+                <a16:creationId xmlns:a16="http://schemas.microsoft.com/office/drawing/2014/main" id="{4887CEBF-ECD5-6D75-F271-DD365CE2284F}"/>
+              </a:ext>
+            </a:extLst>
+          </p:cNvPr>
+          <p:cNvSpPr txBox="1"/>
+          <p:nvPr/>
+        </p:nvSpPr>
+        <p:spPr>
+          <a:xfrm>
+            <a:off x="7178040" y="1846472"/>
+            <a:ext cx="1262613" cy="461665"/>
+          </a:xfrm>
+          <a:prstGeom prst="rect">
+            <a:avLst/>
+          </a:prstGeom>
+          <a:noFill/>
+        </p:spPr>
+        <p:txBody>
+          <a:bodyPr wrap="square">
+            <a:spAutoFit/>
+          </a:bodyPr>
+          <a:lstStyle/>
+          <a:p>
+            <a:r>
+              <a:rPr lang="en-US" sz="1200" b="1" dirty="0"/>
+              <a:t>Ground</a:t>
+            </a:r>
+            <a:r>
+              <a:rPr lang="en-SG" sz="1200" b="1" dirty="0"/>
+              <a:t> </a:t>
+            </a:r>
+            <a:r>
+              <a:rPr lang="en-US" sz="1200" b="1" dirty="0"/>
+              <a:t>contour </a:t>
+            </a:r>
+            <a:r>
+              <a:rPr lang="en-SG" sz="1200" b="1" dirty="0"/>
+              <a:t>generate unit </a:t>
+            </a:r>
+          </a:p>
+        </p:txBody>
+      </p:sp>
+      <p:cxnSp>
+        <p:nvCxnSpPr>
+          <p:cNvPr id="22" name="Straight Arrow Connector 21">
+            <a:extLst>
+              <a:ext uri="{FF2B5EF4-FFF2-40B4-BE49-F238E27FC236}">
+                <a16:creationId xmlns:a16="http://schemas.microsoft.com/office/drawing/2014/main" id="{B7BE397E-A861-6E1C-6AC9-3EF46DCA16FD}"/>
+              </a:ext>
+            </a:extLst>
+          </p:cNvPr>
+          <p:cNvCxnSpPr>
+            <a:cxnSpLocks/>
+          </p:cNvCxnSpPr>
+          <p:nvPr/>
+        </p:nvCxnSpPr>
+        <p:spPr>
+          <a:xfrm flipV="1">
+            <a:off x="1749552" y="3639309"/>
+            <a:ext cx="1348232" cy="721690"/>
+          </a:xfrm>
+          <a:prstGeom prst="straightConnector1">
+            <a:avLst/>
+          </a:prstGeom>
+          <a:ln>
+            <a:solidFill>
+              <a:srgbClr val="FF0000"/>
+            </a:solidFill>
+            <a:tailEnd type="triangle"/>
+          </a:ln>
+        </p:spPr>
+        <p:style>
+          <a:lnRef idx="1">
+            <a:schemeClr val="accent1"/>
+          </a:lnRef>
+          <a:fillRef idx="0">
+            <a:schemeClr val="accent1"/>
+          </a:fillRef>
+          <a:effectRef idx="0">
+            <a:schemeClr val="accent1"/>
+          </a:effectRef>
+          <a:fontRef idx="minor">
+            <a:schemeClr val="tx1"/>
+          </a:fontRef>
+        </p:style>
+      </p:cxnSp>
+      <p:sp>
+        <p:nvSpPr>
+          <p:cNvPr id="25" name="TextBox 24">
+            <a:extLst>
+              <a:ext uri="{FF2B5EF4-FFF2-40B4-BE49-F238E27FC236}">
+                <a16:creationId xmlns:a16="http://schemas.microsoft.com/office/drawing/2014/main" id="{204B1C87-E8A6-C27F-7CCD-B4B69B098AA7}"/>
+              </a:ext>
+            </a:extLst>
+          </p:cNvPr>
+          <p:cNvSpPr txBox="1"/>
+          <p:nvPr/>
+        </p:nvSpPr>
+        <p:spPr>
+          <a:xfrm>
+            <a:off x="687846" y="4037833"/>
+            <a:ext cx="1426958" cy="646331"/>
+          </a:xfrm>
+          <a:prstGeom prst="rect">
+            <a:avLst/>
+          </a:prstGeom>
+          <a:noFill/>
+        </p:spPr>
+        <p:txBody>
+          <a:bodyPr wrap="square">
+            <a:spAutoFit/>
+          </a:bodyPr>
+          <a:lstStyle/>
+          <a:p>
+            <a:r>
+              <a:rPr lang="en-US" sz="1200" b="1" dirty="0"/>
+              <a:t>Drone build in center height detection sensor</a:t>
+            </a:r>
+            <a:endParaRPr lang="en-SG" sz="1200" b="1" dirty="0"/>
+          </a:p>
+        </p:txBody>
+      </p:sp>
+      <p:pic>
+        <p:nvPicPr>
+          <p:cNvPr id="28" name="Picture 27">
+            <a:extLst>
+              <a:ext uri="{FF2B5EF4-FFF2-40B4-BE49-F238E27FC236}">
+                <a16:creationId xmlns:a16="http://schemas.microsoft.com/office/drawing/2014/main" id="{6B111F21-8D1A-2CB7-4A6F-15688FDAE121}"/>
+              </a:ext>
+            </a:extLst>
+          </p:cNvPr>
+          <p:cNvPicPr>
+            <a:picLocks noChangeAspect="1"/>
+          </p:cNvPicPr>
+          <p:nvPr/>
+        </p:nvPicPr>
+        <p:blipFill rotWithShape="1">
+          <a:blip r:embed="rId4"/>
+          <a:srcRect r="10655"/>
+          <a:stretch/>
+        </p:blipFill>
+        <p:spPr>
+          <a:xfrm>
+            <a:off x="7205472" y="2418039"/>
+            <a:ext cx="1792224" cy="2275269"/>
+          </a:xfrm>
+          <a:prstGeom prst="rect">
+            <a:avLst/>
+          </a:prstGeom>
+          <a:ln>
+            <a:solidFill>
+              <a:srgbClr val="FF0000"/>
+            </a:solidFill>
+          </a:ln>
+        </p:spPr>
+      </p:pic>
+      <p:pic>
+        <p:nvPicPr>
+          <p:cNvPr id="29" name="Picture 28">
+            <a:extLst>
+              <a:ext uri="{FF2B5EF4-FFF2-40B4-BE49-F238E27FC236}">
+                <a16:creationId xmlns:a16="http://schemas.microsoft.com/office/drawing/2014/main" id="{224BDD95-61A2-DCA1-9EC0-E710C93B38B0}"/>
+              </a:ext>
+            </a:extLst>
+          </p:cNvPr>
+          <p:cNvPicPr>
+            <a:picLocks noChangeAspect="1"/>
+          </p:cNvPicPr>
+          <p:nvPr/>
+        </p:nvPicPr>
+        <p:blipFill>
+          <a:blip r:embed="rId5"/>
+          <a:stretch>
+            <a:fillRect/>
+          </a:stretch>
+        </p:blipFill>
+        <p:spPr>
+          <a:xfrm flipH="1" flipV="1">
+            <a:off x="10254488" y="2304324"/>
+            <a:ext cx="712684" cy="552495"/>
+          </a:xfrm>
+          <a:prstGeom prst="rect">
+            <a:avLst/>
+          </a:prstGeom>
+          <a:ln w="12700">
+            <a:solidFill>
+              <a:schemeClr val="tx1"/>
+            </a:solidFill>
+          </a:ln>
+        </p:spPr>
+      </p:pic>
+      <p:pic>
+        <p:nvPicPr>
+          <p:cNvPr id="30" name="Picture 29">
+            <a:extLst>
+              <a:ext uri="{FF2B5EF4-FFF2-40B4-BE49-F238E27FC236}">
+                <a16:creationId xmlns:a16="http://schemas.microsoft.com/office/drawing/2014/main" id="{BD2E139F-F5ED-D5A6-5EAD-4F8E93513083}"/>
+              </a:ext>
+            </a:extLst>
+          </p:cNvPr>
+          <p:cNvPicPr>
+            <a:picLocks noChangeAspect="1"/>
+          </p:cNvPicPr>
+          <p:nvPr/>
+        </p:nvPicPr>
+        <p:blipFill>
+          <a:blip r:embed="rId5"/>
+          <a:stretch>
+            <a:fillRect/>
+          </a:stretch>
+        </p:blipFill>
+        <p:spPr>
+          <a:xfrm flipH="1" flipV="1">
+            <a:off x="10254488" y="3808503"/>
+            <a:ext cx="712684" cy="552495"/>
+          </a:xfrm>
+          <a:prstGeom prst="rect">
+            <a:avLst/>
+          </a:prstGeom>
+          <a:ln w="12700">
+            <a:solidFill>
+              <a:schemeClr val="tx1"/>
+            </a:solidFill>
+          </a:ln>
+        </p:spPr>
+      </p:pic>
+      <p:cxnSp>
+        <p:nvCxnSpPr>
+          <p:cNvPr id="32" name="Connector: Elbow 31">
+            <a:extLst>
+              <a:ext uri="{FF2B5EF4-FFF2-40B4-BE49-F238E27FC236}">
+                <a16:creationId xmlns:a16="http://schemas.microsoft.com/office/drawing/2014/main" id="{EE5FC9F4-C296-F75A-AF4A-9F201DC9E855}"/>
+              </a:ext>
+            </a:extLst>
+          </p:cNvPr>
+          <p:cNvCxnSpPr>
+            <a:cxnSpLocks/>
+            <a:stCxn id="29" idx="3"/>
+          </p:cNvCxnSpPr>
+          <p:nvPr/>
+        </p:nvCxnSpPr>
+        <p:spPr>
+          <a:xfrm rot="10800000" flipV="1">
+            <a:off x="9080678" y="2580570"/>
+            <a:ext cx="1173811" cy="463889"/>
+          </a:xfrm>
+          <a:prstGeom prst="bentConnector3">
+            <a:avLst/>
+          </a:prstGeom>
+        </p:spPr>
+        <p:style>
+          <a:lnRef idx="1">
+            <a:schemeClr val="accent1"/>
+          </a:lnRef>
+          <a:fillRef idx="0">
+            <a:schemeClr val="accent1"/>
+          </a:fillRef>
+          <a:effectRef idx="0">
+            <a:schemeClr val="accent1"/>
+          </a:effectRef>
+          <a:fontRef idx="minor">
+            <a:schemeClr val="tx1"/>
+          </a:fontRef>
+        </p:style>
+      </p:cxnSp>
+      <p:sp>
+        <p:nvSpPr>
+          <p:cNvPr id="33" name="TextBox 32">
+            <a:extLst>
+              <a:ext uri="{FF2B5EF4-FFF2-40B4-BE49-F238E27FC236}">
+                <a16:creationId xmlns:a16="http://schemas.microsoft.com/office/drawing/2014/main" id="{854D543B-6998-220B-DB4C-F46CC76A0202}"/>
+              </a:ext>
+            </a:extLst>
+          </p:cNvPr>
+          <p:cNvSpPr txBox="1"/>
+          <p:nvPr/>
+        </p:nvSpPr>
+        <p:spPr>
+          <a:xfrm>
+            <a:off x="8788480" y="2905562"/>
+            <a:ext cx="524256" cy="276999"/>
+          </a:xfrm>
+          <a:prstGeom prst="rect">
+            <a:avLst/>
+          </a:prstGeom>
+          <a:noFill/>
+        </p:spPr>
+        <p:txBody>
+          <a:bodyPr wrap="square">
+            <a:spAutoFit/>
+          </a:bodyPr>
+          <a:lstStyle/>
+          <a:p>
+            <a:r>
+              <a:rPr lang="en-US" sz="1200" b="1" dirty="0"/>
+              <a:t>D1</a:t>
+            </a:r>
+            <a:endParaRPr lang="en-SG" sz="1200" b="1" dirty="0"/>
+          </a:p>
+        </p:txBody>
+      </p:sp>
+      <p:sp>
+        <p:nvSpPr>
+          <p:cNvPr id="34" name="TextBox 33">
+            <a:extLst>
+              <a:ext uri="{FF2B5EF4-FFF2-40B4-BE49-F238E27FC236}">
+                <a16:creationId xmlns:a16="http://schemas.microsoft.com/office/drawing/2014/main" id="{1488481C-BE4F-95EF-6E1B-781CE734ED97}"/>
+              </a:ext>
+            </a:extLst>
+          </p:cNvPr>
+          <p:cNvSpPr txBox="1"/>
+          <p:nvPr/>
+        </p:nvSpPr>
+        <p:spPr>
+          <a:xfrm>
+            <a:off x="9080678" y="2129059"/>
+            <a:ext cx="1463781" cy="415498"/>
+          </a:xfrm>
+          <a:prstGeom prst="rect">
+            <a:avLst/>
+          </a:prstGeom>
+          <a:noFill/>
+        </p:spPr>
+        <p:txBody>
+          <a:bodyPr wrap="square">
+            <a:spAutoFit/>
+          </a:bodyPr>
+          <a:lstStyle/>
+          <a:p>
+            <a:r>
+              <a:rPr lang="en-US" sz="1050" b="1" dirty="0"/>
+              <a:t>Sensor 1 reading connect to pin </a:t>
+            </a:r>
+            <a:r>
+              <a:rPr lang="en-US" sz="1050" b="1" dirty="0">
+                <a:highlight>
+                  <a:srgbClr val="FFFF00"/>
+                </a:highlight>
+              </a:rPr>
+              <a:t>D1</a:t>
+            </a:r>
+            <a:endParaRPr lang="en-SG" sz="1050" b="1" dirty="0">
+              <a:highlight>
+                <a:srgbClr val="FFFF00"/>
+              </a:highlight>
+            </a:endParaRPr>
+          </a:p>
+        </p:txBody>
+      </p:sp>
+      <p:sp>
+        <p:nvSpPr>
+          <p:cNvPr id="36" name="TextBox 35">
+            <a:extLst>
+              <a:ext uri="{FF2B5EF4-FFF2-40B4-BE49-F238E27FC236}">
+                <a16:creationId xmlns:a16="http://schemas.microsoft.com/office/drawing/2014/main" id="{D573C5AB-2949-F75B-7BDB-D6156681AAFC}"/>
+              </a:ext>
+            </a:extLst>
+          </p:cNvPr>
+          <p:cNvSpPr txBox="1"/>
+          <p:nvPr/>
+        </p:nvSpPr>
+        <p:spPr>
+          <a:xfrm>
+            <a:off x="8788480" y="3079414"/>
+            <a:ext cx="524256" cy="276999"/>
+          </a:xfrm>
+          <a:prstGeom prst="rect">
+            <a:avLst/>
+          </a:prstGeom>
+          <a:noFill/>
+        </p:spPr>
+        <p:txBody>
+          <a:bodyPr wrap="square">
+            <a:spAutoFit/>
+          </a:bodyPr>
+          <a:lstStyle/>
+          <a:p>
+            <a:r>
+              <a:rPr lang="en-US" sz="1200" b="1" dirty="0"/>
+              <a:t>D2</a:t>
+            </a:r>
+            <a:endParaRPr lang="en-SG" sz="1200" b="1" dirty="0"/>
+          </a:p>
+        </p:txBody>
+      </p:sp>
+      <p:cxnSp>
+        <p:nvCxnSpPr>
+          <p:cNvPr id="37" name="Connector: Elbow 36">
+            <a:extLst>
+              <a:ext uri="{FF2B5EF4-FFF2-40B4-BE49-F238E27FC236}">
+                <a16:creationId xmlns:a16="http://schemas.microsoft.com/office/drawing/2014/main" id="{0E69DF63-6575-FCE6-4D3D-22144EACAE28}"/>
+              </a:ext>
+            </a:extLst>
+          </p:cNvPr>
+          <p:cNvCxnSpPr>
+            <a:cxnSpLocks/>
+            <a:stCxn id="29" idx="0"/>
+          </p:cNvCxnSpPr>
+          <p:nvPr/>
+        </p:nvCxnSpPr>
+        <p:spPr>
+          <a:xfrm rot="5400000">
+            <a:off x="9682884" y="2254615"/>
+            <a:ext cx="325743" cy="1530150"/>
+          </a:xfrm>
+          <a:prstGeom prst="bentConnector2">
+            <a:avLst/>
+          </a:prstGeom>
+        </p:spPr>
+        <p:style>
+          <a:lnRef idx="1">
+            <a:schemeClr val="accent1"/>
+          </a:lnRef>
+          <a:fillRef idx="0">
+            <a:schemeClr val="accent1"/>
+          </a:fillRef>
+          <a:effectRef idx="0">
+            <a:schemeClr val="accent1"/>
+          </a:effectRef>
+          <a:fontRef idx="minor">
+            <a:schemeClr val="tx1"/>
+          </a:fontRef>
+        </p:style>
+      </p:cxnSp>
+      <p:sp>
+        <p:nvSpPr>
+          <p:cNvPr id="40" name="TextBox 39">
+            <a:extLst>
+              <a:ext uri="{FF2B5EF4-FFF2-40B4-BE49-F238E27FC236}">
+                <a16:creationId xmlns:a16="http://schemas.microsoft.com/office/drawing/2014/main" id="{40EA3C62-83DC-341A-9783-52F2D83F383B}"/>
+              </a:ext>
+            </a:extLst>
+          </p:cNvPr>
+          <p:cNvSpPr txBox="1"/>
+          <p:nvPr/>
+        </p:nvSpPr>
+        <p:spPr>
+          <a:xfrm>
+            <a:off x="9571736" y="2974812"/>
+            <a:ext cx="1463781" cy="415498"/>
+          </a:xfrm>
+          <a:prstGeom prst="rect">
+            <a:avLst/>
+          </a:prstGeom>
+          <a:noFill/>
+        </p:spPr>
+        <p:txBody>
+          <a:bodyPr wrap="square">
+            <a:spAutoFit/>
+          </a:bodyPr>
+          <a:lstStyle/>
+          <a:p>
+            <a:r>
+              <a:rPr lang="en-US" sz="1050" b="1" dirty="0"/>
+              <a:t>Sensor 2 reading connect to pin </a:t>
+            </a:r>
+            <a:r>
+              <a:rPr lang="en-US" sz="1050" b="1" dirty="0">
+                <a:highlight>
+                  <a:srgbClr val="FFFF00"/>
+                </a:highlight>
+              </a:rPr>
+              <a:t>D2</a:t>
+            </a:r>
+            <a:endParaRPr lang="en-SG" sz="1050" b="1" dirty="0">
+              <a:highlight>
+                <a:srgbClr val="FFFF00"/>
+              </a:highlight>
+            </a:endParaRPr>
+          </a:p>
+        </p:txBody>
+      </p:sp>
+      <p:cxnSp>
+        <p:nvCxnSpPr>
+          <p:cNvPr id="41" name="Connector: Elbow 40">
+            <a:extLst>
+              <a:ext uri="{FF2B5EF4-FFF2-40B4-BE49-F238E27FC236}">
+                <a16:creationId xmlns:a16="http://schemas.microsoft.com/office/drawing/2014/main" id="{6CDA8A6E-57AF-4511-5E07-3802F9E0D952}"/>
+              </a:ext>
+            </a:extLst>
+          </p:cNvPr>
+          <p:cNvCxnSpPr>
+            <a:cxnSpLocks/>
+            <a:stCxn id="30" idx="3"/>
+          </p:cNvCxnSpPr>
+          <p:nvPr/>
+        </p:nvCxnSpPr>
+        <p:spPr>
+          <a:xfrm rot="10800000">
+            <a:off x="9091676" y="3497580"/>
+            <a:ext cx="1162812" cy="587170"/>
+          </a:xfrm>
+          <a:prstGeom prst="bentConnector3">
+            <a:avLst/>
+          </a:prstGeom>
+        </p:spPr>
+        <p:style>
+          <a:lnRef idx="1">
+            <a:schemeClr val="accent1"/>
+          </a:lnRef>
+          <a:fillRef idx="0">
+            <a:schemeClr val="accent1"/>
+          </a:fillRef>
+          <a:effectRef idx="0">
+            <a:schemeClr val="accent1"/>
+          </a:effectRef>
+          <a:fontRef idx="minor">
+            <a:schemeClr val="tx1"/>
+          </a:fontRef>
+        </p:style>
+      </p:cxnSp>
+      <p:sp>
+        <p:nvSpPr>
+          <p:cNvPr id="45" name="TextBox 44">
+            <a:extLst>
+              <a:ext uri="{FF2B5EF4-FFF2-40B4-BE49-F238E27FC236}">
+                <a16:creationId xmlns:a16="http://schemas.microsoft.com/office/drawing/2014/main" id="{148704A2-D3AF-FC24-5B0C-AB56F69AF908}"/>
+              </a:ext>
+            </a:extLst>
+          </p:cNvPr>
+          <p:cNvSpPr txBox="1"/>
+          <p:nvPr/>
+        </p:nvSpPr>
+        <p:spPr>
+          <a:xfrm>
+            <a:off x="8795164" y="3377607"/>
+            <a:ext cx="524256" cy="276999"/>
+          </a:xfrm>
+          <a:prstGeom prst="rect">
+            <a:avLst/>
+          </a:prstGeom>
+          <a:noFill/>
+        </p:spPr>
+        <p:txBody>
+          <a:bodyPr wrap="square">
+            <a:spAutoFit/>
+          </a:bodyPr>
+          <a:lstStyle/>
+          <a:p>
+            <a:r>
+              <a:rPr lang="en-US" sz="1200" b="1" dirty="0"/>
+              <a:t>D3</a:t>
+            </a:r>
+            <a:endParaRPr lang="en-SG" sz="1200" b="1" dirty="0"/>
+          </a:p>
+        </p:txBody>
+      </p:sp>
+      <p:sp>
+        <p:nvSpPr>
+          <p:cNvPr id="46" name="TextBox 45">
+            <a:extLst>
+              <a:ext uri="{FF2B5EF4-FFF2-40B4-BE49-F238E27FC236}">
+                <a16:creationId xmlns:a16="http://schemas.microsoft.com/office/drawing/2014/main" id="{DCC4759F-7FF8-BA88-4DCA-A71356DBB36F}"/>
+              </a:ext>
+            </a:extLst>
+          </p:cNvPr>
+          <p:cNvSpPr txBox="1"/>
+          <p:nvPr/>
+        </p:nvSpPr>
+        <p:spPr>
+          <a:xfrm>
+            <a:off x="9091676" y="3599627"/>
+            <a:ext cx="1463781" cy="415498"/>
+          </a:xfrm>
+          <a:prstGeom prst="rect">
+            <a:avLst/>
+          </a:prstGeom>
+          <a:noFill/>
+        </p:spPr>
+        <p:txBody>
+          <a:bodyPr wrap="square">
+            <a:spAutoFit/>
+          </a:bodyPr>
+          <a:lstStyle/>
+          <a:p>
+            <a:r>
+              <a:rPr lang="en-US" sz="1050" b="1" dirty="0"/>
+              <a:t>Sensor 3 reading connect to pin </a:t>
+            </a:r>
+            <a:r>
+              <a:rPr lang="en-US" sz="1050" b="1" dirty="0">
+                <a:highlight>
+                  <a:srgbClr val="FFFF00"/>
+                </a:highlight>
+              </a:rPr>
+              <a:t>D3</a:t>
+            </a:r>
+            <a:endParaRPr lang="en-SG" sz="1050" b="1" dirty="0">
+              <a:highlight>
+                <a:srgbClr val="FFFF00"/>
+              </a:highlight>
+            </a:endParaRPr>
+          </a:p>
+        </p:txBody>
+      </p:sp>
+      <p:cxnSp>
+        <p:nvCxnSpPr>
+          <p:cNvPr id="47" name="Connector: Elbow 46">
+            <a:extLst>
+              <a:ext uri="{FF2B5EF4-FFF2-40B4-BE49-F238E27FC236}">
+                <a16:creationId xmlns:a16="http://schemas.microsoft.com/office/drawing/2014/main" id="{C951CA22-2541-20EB-C849-22FB0843A08F}"/>
+              </a:ext>
+            </a:extLst>
+          </p:cNvPr>
+          <p:cNvCxnSpPr>
+            <a:cxnSpLocks/>
+            <a:endCxn id="50" idx="2"/>
+          </p:cNvCxnSpPr>
+          <p:nvPr/>
+        </p:nvCxnSpPr>
+        <p:spPr>
+          <a:xfrm rot="10800000">
+            <a:off x="9050609" y="3870087"/>
+            <a:ext cx="1601291" cy="533872"/>
+          </a:xfrm>
+          <a:prstGeom prst="bentConnector2">
+            <a:avLst/>
+          </a:prstGeom>
+        </p:spPr>
+        <p:style>
+          <a:lnRef idx="1">
+            <a:schemeClr val="accent1"/>
+          </a:lnRef>
+          <a:fillRef idx="0">
+            <a:schemeClr val="accent1"/>
+          </a:fillRef>
+          <a:effectRef idx="0">
+            <a:schemeClr val="accent1"/>
+          </a:effectRef>
+          <a:fontRef idx="minor">
+            <a:schemeClr val="tx1"/>
+          </a:fontRef>
+        </p:style>
+      </p:cxnSp>
+      <p:sp>
+        <p:nvSpPr>
+          <p:cNvPr id="50" name="TextBox 49">
+            <a:extLst>
+              <a:ext uri="{FF2B5EF4-FFF2-40B4-BE49-F238E27FC236}">
+                <a16:creationId xmlns:a16="http://schemas.microsoft.com/office/drawing/2014/main" id="{1CB09063-D946-D895-4F78-03D3F989CCE6}"/>
+              </a:ext>
+            </a:extLst>
+          </p:cNvPr>
+          <p:cNvSpPr txBox="1"/>
+          <p:nvPr/>
+        </p:nvSpPr>
+        <p:spPr>
+          <a:xfrm>
+            <a:off x="8793386" y="3593088"/>
+            <a:ext cx="514444" cy="276999"/>
+          </a:xfrm>
+          <a:prstGeom prst="rect">
+            <a:avLst/>
+          </a:prstGeom>
+          <a:noFill/>
+        </p:spPr>
+        <p:txBody>
+          <a:bodyPr wrap="square">
+            <a:spAutoFit/>
+          </a:bodyPr>
+          <a:lstStyle/>
+          <a:p>
+            <a:r>
+              <a:rPr lang="en-US" sz="1200" b="1" dirty="0"/>
+              <a:t>D4</a:t>
+            </a:r>
+            <a:endParaRPr lang="en-SG" sz="1200" b="1" dirty="0"/>
+          </a:p>
+        </p:txBody>
+      </p:sp>
+      <p:sp>
+        <p:nvSpPr>
+          <p:cNvPr id="53" name="TextBox 52">
+            <a:extLst>
+              <a:ext uri="{FF2B5EF4-FFF2-40B4-BE49-F238E27FC236}">
+                <a16:creationId xmlns:a16="http://schemas.microsoft.com/office/drawing/2014/main" id="{1BAA243F-A159-6202-7A43-2AE9D812A824}"/>
+              </a:ext>
+            </a:extLst>
+          </p:cNvPr>
+          <p:cNvSpPr txBox="1"/>
+          <p:nvPr/>
+        </p:nvSpPr>
+        <p:spPr>
+          <a:xfrm>
+            <a:off x="9147049" y="4199198"/>
+            <a:ext cx="1463781" cy="415498"/>
+          </a:xfrm>
+          <a:prstGeom prst="rect">
+            <a:avLst/>
+          </a:prstGeom>
+          <a:noFill/>
+        </p:spPr>
+        <p:txBody>
+          <a:bodyPr wrap="square">
+            <a:spAutoFit/>
+          </a:bodyPr>
+          <a:lstStyle/>
+          <a:p>
+            <a:r>
+              <a:rPr lang="en-US" sz="1050" b="1" dirty="0"/>
+              <a:t>Sensor 4 reading connect to pin </a:t>
+            </a:r>
+            <a:r>
+              <a:rPr lang="en-US" sz="1050" b="1" dirty="0">
+                <a:highlight>
+                  <a:srgbClr val="FFFF00"/>
+                </a:highlight>
+              </a:rPr>
+              <a:t>D4</a:t>
+            </a:r>
+            <a:endParaRPr lang="en-SG" sz="1050" b="1" dirty="0">
+              <a:highlight>
+                <a:srgbClr val="FFFF00"/>
+              </a:highlight>
+            </a:endParaRPr>
+          </a:p>
+        </p:txBody>
+      </p:sp>
+      <p:sp>
+        <p:nvSpPr>
+          <p:cNvPr id="54" name="TextBox 53">
+            <a:extLst>
+              <a:ext uri="{FF2B5EF4-FFF2-40B4-BE49-F238E27FC236}">
+                <a16:creationId xmlns:a16="http://schemas.microsoft.com/office/drawing/2014/main" id="{C6C1CD7D-B4D7-9761-1CAA-86687CBED100}"/>
+              </a:ext>
+            </a:extLst>
+          </p:cNvPr>
+          <p:cNvSpPr txBox="1"/>
+          <p:nvPr/>
+        </p:nvSpPr>
+        <p:spPr>
+          <a:xfrm>
+            <a:off x="10134777" y="1867509"/>
+            <a:ext cx="1463781" cy="461665"/>
+          </a:xfrm>
+          <a:prstGeom prst="rect">
+            <a:avLst/>
+          </a:prstGeom>
+          <a:noFill/>
+        </p:spPr>
+        <p:txBody>
+          <a:bodyPr wrap="square">
+            <a:spAutoFit/>
+          </a:bodyPr>
+          <a:lstStyle/>
+          <a:p>
+            <a:r>
+              <a:rPr lang="en-US" sz="1200" b="1" dirty="0"/>
+              <a:t>HC-SR04 Ultrasonic Sensors 1 &amp; 2 </a:t>
+            </a:r>
+            <a:endParaRPr lang="en-SG" sz="1200" b="1" dirty="0"/>
+          </a:p>
+        </p:txBody>
+      </p:sp>
+      <p:sp>
+        <p:nvSpPr>
+          <p:cNvPr id="55" name="TextBox 54">
+            <a:extLst>
+              <a:ext uri="{FF2B5EF4-FFF2-40B4-BE49-F238E27FC236}">
+                <a16:creationId xmlns:a16="http://schemas.microsoft.com/office/drawing/2014/main" id="{2408A4B5-F84E-0A4F-9786-B0AE62A31CD4}"/>
+              </a:ext>
+            </a:extLst>
+          </p:cNvPr>
+          <p:cNvSpPr txBox="1"/>
+          <p:nvPr/>
+        </p:nvSpPr>
+        <p:spPr>
+          <a:xfrm>
+            <a:off x="10177221" y="3365460"/>
+            <a:ext cx="1463781" cy="461665"/>
+          </a:xfrm>
+          <a:prstGeom prst="rect">
+            <a:avLst/>
+          </a:prstGeom>
+          <a:noFill/>
+        </p:spPr>
+        <p:txBody>
+          <a:bodyPr wrap="square">
+            <a:spAutoFit/>
+          </a:bodyPr>
+          <a:lstStyle/>
+          <a:p>
+            <a:r>
+              <a:rPr lang="en-US" sz="1200" b="1" dirty="0"/>
+              <a:t>HC-SR04 Ultrasonic Sensors 3 &amp; 4 </a:t>
+            </a:r>
+            <a:endParaRPr lang="en-SG" sz="1200" b="1" dirty="0"/>
+          </a:p>
+        </p:txBody>
+      </p:sp>
+      <p:cxnSp>
+        <p:nvCxnSpPr>
+          <p:cNvPr id="57" name="Connector: Elbow 56">
+            <a:extLst>
+              <a:ext uri="{FF2B5EF4-FFF2-40B4-BE49-F238E27FC236}">
+                <a16:creationId xmlns:a16="http://schemas.microsoft.com/office/drawing/2014/main" id="{2BE9B09F-8E3D-8AF4-5FA6-88E8C0ACA343}"/>
+              </a:ext>
+            </a:extLst>
+          </p:cNvPr>
+          <p:cNvCxnSpPr>
+            <a:cxnSpLocks/>
+            <a:stCxn id="29" idx="1"/>
+            <a:endCxn id="28" idx="2"/>
+          </p:cNvCxnSpPr>
+          <p:nvPr/>
+        </p:nvCxnSpPr>
+        <p:spPr>
+          <a:xfrm flipH="1">
+            <a:off x="8101584" y="2580571"/>
+            <a:ext cx="2865588" cy="2112737"/>
+          </a:xfrm>
+          <a:prstGeom prst="bentConnector4">
+            <a:avLst>
+              <a:gd name="adj1" fmla="val -7977"/>
+              <a:gd name="adj2" fmla="val 104761"/>
+            </a:avLst>
+          </a:prstGeom>
+          <a:ln>
+            <a:solidFill>
+              <a:schemeClr val="tx1"/>
+            </a:solidFill>
+          </a:ln>
+        </p:spPr>
+        <p:style>
+          <a:lnRef idx="1">
+            <a:schemeClr val="accent1"/>
+          </a:lnRef>
+          <a:fillRef idx="0">
+            <a:schemeClr val="accent1"/>
+          </a:fillRef>
+          <a:effectRef idx="0">
+            <a:schemeClr val="accent1"/>
+          </a:effectRef>
+          <a:fontRef idx="minor">
+            <a:schemeClr val="tx1"/>
+          </a:fontRef>
+        </p:style>
+      </p:cxnSp>
+      <p:sp>
+        <p:nvSpPr>
+          <p:cNvPr id="62" name="TextBox 61">
+            <a:extLst>
+              <a:ext uri="{FF2B5EF4-FFF2-40B4-BE49-F238E27FC236}">
+                <a16:creationId xmlns:a16="http://schemas.microsoft.com/office/drawing/2014/main" id="{F36051C7-7F72-B3F6-660D-46FB02FCFCBD}"/>
+              </a:ext>
+            </a:extLst>
+          </p:cNvPr>
+          <p:cNvSpPr txBox="1"/>
+          <p:nvPr/>
+        </p:nvSpPr>
+        <p:spPr>
+          <a:xfrm>
+            <a:off x="7651496" y="4684864"/>
+            <a:ext cx="524256" cy="276999"/>
+          </a:xfrm>
+          <a:prstGeom prst="rect">
+            <a:avLst/>
+          </a:prstGeom>
+          <a:noFill/>
+        </p:spPr>
+        <p:txBody>
+          <a:bodyPr wrap="square">
+            <a:spAutoFit/>
+          </a:bodyPr>
+          <a:lstStyle/>
+          <a:p>
+            <a:r>
+              <a:rPr lang="en-US" sz="1200" b="1" dirty="0"/>
+              <a:t>GND</a:t>
+            </a:r>
+            <a:endParaRPr lang="en-SG" sz="1200" b="1" dirty="0"/>
+          </a:p>
+        </p:txBody>
+      </p:sp>
+      <p:cxnSp>
+        <p:nvCxnSpPr>
+          <p:cNvPr id="64" name="Straight Connector 63">
+            <a:extLst>
+              <a:ext uri="{FF2B5EF4-FFF2-40B4-BE49-F238E27FC236}">
+                <a16:creationId xmlns:a16="http://schemas.microsoft.com/office/drawing/2014/main" id="{6757B3D7-FCEF-7BE4-796B-3C1A37777CC7}"/>
+              </a:ext>
+            </a:extLst>
+          </p:cNvPr>
+          <p:cNvCxnSpPr>
+            <a:stCxn id="30" idx="1"/>
+          </p:cNvCxnSpPr>
+          <p:nvPr/>
+        </p:nvCxnSpPr>
+        <p:spPr>
+          <a:xfrm>
+            <a:off x="10967172" y="4084750"/>
+            <a:ext cx="234228" cy="0"/>
+          </a:xfrm>
+          <a:prstGeom prst="line">
+            <a:avLst/>
+          </a:prstGeom>
+          <a:ln>
+            <a:solidFill>
+              <a:schemeClr val="tx1"/>
+            </a:solidFill>
+          </a:ln>
+        </p:spPr>
+        <p:style>
+          <a:lnRef idx="1">
+            <a:schemeClr val="accent1"/>
+          </a:lnRef>
+          <a:fillRef idx="0">
+            <a:schemeClr val="accent1"/>
+          </a:fillRef>
+          <a:effectRef idx="0">
+            <a:schemeClr val="accent1"/>
+          </a:effectRef>
+          <a:fontRef idx="minor">
+            <a:schemeClr val="tx1"/>
+          </a:fontRef>
+        </p:style>
+      </p:cxnSp>
+      <p:sp>
+        <p:nvSpPr>
+          <p:cNvPr id="65" name="TextBox 64">
+            <a:extLst>
+              <a:ext uri="{FF2B5EF4-FFF2-40B4-BE49-F238E27FC236}">
+                <a16:creationId xmlns:a16="http://schemas.microsoft.com/office/drawing/2014/main" id="{9E9666A6-E835-4E2F-4E92-16EF00E41257}"/>
+              </a:ext>
+            </a:extLst>
+          </p:cNvPr>
+          <p:cNvSpPr txBox="1"/>
+          <p:nvPr/>
+        </p:nvSpPr>
+        <p:spPr>
+          <a:xfrm>
+            <a:off x="10908518" y="4033610"/>
+            <a:ext cx="690040" cy="400110"/>
+          </a:xfrm>
+          <a:prstGeom prst="rect">
+            <a:avLst/>
+          </a:prstGeom>
+          <a:noFill/>
+        </p:spPr>
+        <p:txBody>
+          <a:bodyPr wrap="square">
+            <a:spAutoFit/>
+          </a:bodyPr>
+          <a:lstStyle/>
+          <a:p>
+            <a:r>
+              <a:rPr lang="en-US" sz="1000" b="1" dirty="0"/>
+              <a:t>Sensor GND</a:t>
+            </a:r>
+            <a:endParaRPr lang="en-SG" sz="1000" b="1" dirty="0"/>
+          </a:p>
+        </p:txBody>
+      </p:sp>
+      <p:sp>
+        <p:nvSpPr>
+          <p:cNvPr id="66" name="TextBox 65">
+            <a:extLst>
+              <a:ext uri="{FF2B5EF4-FFF2-40B4-BE49-F238E27FC236}">
+                <a16:creationId xmlns:a16="http://schemas.microsoft.com/office/drawing/2014/main" id="{06DDCA1F-1860-10D0-E0C7-2F82C6403A7C}"/>
+              </a:ext>
+            </a:extLst>
+          </p:cNvPr>
+          <p:cNvSpPr txBox="1"/>
+          <p:nvPr/>
+        </p:nvSpPr>
+        <p:spPr>
+          <a:xfrm>
+            <a:off x="10944745" y="2567763"/>
+            <a:ext cx="690040" cy="400110"/>
+          </a:xfrm>
+          <a:prstGeom prst="rect">
+            <a:avLst/>
+          </a:prstGeom>
+          <a:noFill/>
+        </p:spPr>
+        <p:txBody>
+          <a:bodyPr wrap="square">
+            <a:spAutoFit/>
+          </a:bodyPr>
+          <a:lstStyle/>
+          <a:p>
+            <a:r>
+              <a:rPr lang="en-US" sz="1000" b="1" dirty="0"/>
+              <a:t>Sensor GND</a:t>
+            </a:r>
+            <a:endParaRPr lang="en-SG" sz="1000" b="1" dirty="0"/>
+          </a:p>
+        </p:txBody>
+      </p:sp>
+    </p:spTree>
+    <p:extLst>
+      <p:ext uri="{BB962C8B-B14F-4D97-AF65-F5344CB8AC3E}">
+        <p14:creationId xmlns:p14="http://schemas.microsoft.com/office/powerpoint/2010/main" val="1188943797"/>
+      </p:ext>
+    </p:extLst>
+  </p:cSld>
+  <p:clrMapOvr>
+    <a:masterClrMapping/>
+  </p:clrMapOvr>
+</p:sld>
+</file>
+
 <file path=ppt/theme/theme1.xml><?xml version="1.0" encoding="utf-8"?>
 <a:theme xmlns:a="http://schemas.openxmlformats.org/drawingml/2006/main" name="Office Theme">
   <a:themeElements>
@@ -5550,4 +9570,299 @@
     </a:ext>
   </a:extLst>
 </a:theme>
+</file>
+
+<file path=ppt/theme/theme2.xml><?xml version="1.0" encoding="utf-8"?>
+<a:theme xmlns:a="http://schemas.openxmlformats.org/drawingml/2006/main" name="Office Theme">
+  <a:themeElements>
+    <a:clrScheme name="Office">
+      <a:dk1>
+        <a:sysClr val="windowText" lastClr="000000"/>
+      </a:dk1>
+      <a:lt1>
+        <a:sysClr val="window" lastClr="FFFFFF"/>
+      </a:lt1>
+      <a:dk2>
+        <a:srgbClr val="44546A"/>
+      </a:dk2>
+      <a:lt2>
+        <a:srgbClr val="E7E6E6"/>
+      </a:lt2>
+      <a:accent1>
+        <a:srgbClr val="4472C4"/>
+      </a:accent1>
+      <a:accent2>
+        <a:srgbClr val="ED7D31"/>
+      </a:accent2>
+      <a:accent3>
+        <a:srgbClr val="A5A5A5"/>
+      </a:accent3>
+      <a:accent4>
+        <a:srgbClr val="FFC000"/>
+      </a:accent4>
+      <a:accent5>
+        <a:srgbClr val="5B9BD5"/>
+      </a:accent5>
+      <a:accent6>
+        <a:srgbClr val="70AD47"/>
+      </a:accent6>
+      <a:hlink>
+        <a:srgbClr val="0563C1"/>
+      </a:hlink>
+      <a:folHlink>
+        <a:srgbClr val="954F72"/>
+      </a:folHlink>
+    </a:clrScheme>
+    <a:fontScheme name="Office">
+      <a:majorFont>
+        <a:latin typeface="Calibri Light" panose="020F0302020204030204"/>
+        <a:ea typeface=""/>
+        <a:cs typeface=""/>
+        <a:font script="Jpan" typeface="游ゴシック Light"/>
+        <a:font script="Hang" typeface="맑은 고딕"/>
+        <a:font script="Hans" typeface="等线 Light"/>
+        <a:font script="Hant" typeface="新細明體"/>
+        <a:font script="Arab" typeface="Times New Roman"/>
+        <a:font script="Hebr" typeface="Times New Roman"/>
+        <a:font script="Thai" typeface="Angsana New"/>
+        <a:font script="Ethi" typeface="Nyala"/>
+        <a:font script="Beng" typeface="Vrinda"/>
+        <a:font script="Gujr" typeface="Shruti"/>
+        <a:font script="Khmr" typeface="MoolBoran"/>
+        <a:font script="Knda" typeface="Tunga"/>
+        <a:font script="Guru" typeface="Raavi"/>
+        <a:font script="Cans" typeface="Euphemia"/>
+        <a:font script="Cher" typeface="Plantagenet Cherokee"/>
+        <a:font script="Yiii" typeface="Microsoft Yi Baiti"/>
+        <a:font script="Tibt" typeface="Microsoft Himalaya"/>
+        <a:font script="Thaa" typeface="MV Boli"/>
+        <a:font script="Deva" typeface="Mangal"/>
+        <a:font script="Telu" typeface="Gautami"/>
+        <a:font script="Taml" typeface="Latha"/>
+        <a:font script="Syrc" typeface="Estrangelo Edessa"/>
+        <a:font script="Orya" typeface="Kalinga"/>
+        <a:font script="Mlym" typeface="Kartika"/>
+        <a:font script="Laoo" typeface="DokChampa"/>
+        <a:font script="Sinh" typeface="Iskoola Pota"/>
+        <a:font script="Mong" typeface="Mongolian Baiti"/>
+        <a:font script="Viet" typeface="Times New Roman"/>
+        <a:font script="Uigh" typeface="Microsoft Uighur"/>
+        <a:font script="Geor" typeface="Sylfaen"/>
+        <a:font script="Armn" typeface="Arial"/>
+        <a:font script="Bugi" typeface="Leelawadee UI"/>
+        <a:font script="Bopo" typeface="Microsoft JhengHei"/>
+        <a:font script="Java" typeface="Javanese Text"/>
+        <a:font script="Lisu" typeface="Segoe UI"/>
+        <a:font script="Mymr" typeface="Myanmar Text"/>
+        <a:font script="Nkoo" typeface="Ebrima"/>
+        <a:font script="Olck" typeface="Nirmala UI"/>
+        <a:font script="Osma" typeface="Ebrima"/>
+        <a:font script="Phag" typeface="Phagspa"/>
+        <a:font script="Syrn" typeface="Estrangelo Edessa"/>
+        <a:font script="Syrj" typeface="Estrangelo Edessa"/>
+        <a:font script="Syre" typeface="Estrangelo Edessa"/>
+        <a:font script="Sora" typeface="Nirmala UI"/>
+        <a:font script="Tale" typeface="Microsoft Tai Le"/>
+        <a:font script="Talu" typeface="Microsoft New Tai Lue"/>
+        <a:font script="Tfng" typeface="Ebrima"/>
+      </a:majorFont>
+      <a:minorFont>
+        <a:latin typeface="Calibri" panose="020F0502020204030204"/>
+        <a:ea typeface=""/>
+        <a:cs typeface=""/>
+        <a:font script="Jpan" typeface="游ゴシック"/>
+        <a:font script="Hang" typeface="맑은 고딕"/>
+        <a:font script="Hans" typeface="等线"/>
+        <a:font script="Hant" typeface="新細明體"/>
+        <a:font script="Arab" typeface="Arial"/>
+        <a:font script="Hebr" typeface="Arial"/>
+        <a:font script="Thai" typeface="Cordia New"/>
+        <a:font script="Ethi" typeface="Nyala"/>
+        <a:font script="Beng" typeface="Vrinda"/>
+        <a:font script="Gujr" typeface="Shruti"/>
+        <a:font script="Khmr" typeface="DaunPenh"/>
+        <a:font script="Knda" typeface="Tunga"/>
+        <a:font script="Guru" typeface="Raavi"/>
+        <a:font script="Cans" typeface="Euphemia"/>
+        <a:font script="Cher" typeface="Plantagenet Cherokee"/>
+        <a:font script="Yiii" typeface="Microsoft Yi Baiti"/>
+        <a:font script="Tibt" typeface="Microsoft Himalaya"/>
+        <a:font script="Thaa" typeface="MV Boli"/>
+        <a:font script="Deva" typeface="Mangal"/>
+        <a:font script="Telu" typeface="Gautami"/>
+        <a:font script="Taml" typeface="Latha"/>
+        <a:font script="Syrc" typeface="Estrangelo Edessa"/>
+        <a:font script="Orya" typeface="Kalinga"/>
+        <a:font script="Mlym" typeface="Kartika"/>
+        <a:font script="Laoo" typeface="DokChampa"/>
+        <a:font script="Sinh" typeface="Iskoola Pota"/>
+        <a:font script="Mong" typeface="Mongolian Baiti"/>
+        <a:font script="Viet" typeface="Arial"/>
+        <a:font script="Uigh" typeface="Microsoft Uighur"/>
+        <a:font script="Geor" typeface="Sylfaen"/>
+        <a:font script="Armn" typeface="Arial"/>
+        <a:font script="Bugi" typeface="Leelawadee UI"/>
+        <a:font script="Bopo" typeface="Microsoft JhengHei"/>
+        <a:font script="Java" typeface="Javanese Text"/>
+        <a:font script="Lisu" typeface="Segoe UI"/>
+        <a:font script="Mymr" typeface="Myanmar Text"/>
+        <a:font script="Nkoo" typeface="Ebrima"/>
+        <a:font script="Olck" typeface="Nirmala UI"/>
+        <a:font script="Osma" typeface="Ebrima"/>
+        <a:font script="Phag" typeface="Phagspa"/>
+        <a:font script="Syrn" typeface="Estrangelo Edessa"/>
+        <a:font script="Syrj" typeface="Estrangelo Edessa"/>
+        <a:font script="Syre" typeface="Estrangelo Edessa"/>
+        <a:font script="Sora" typeface="Nirmala UI"/>
+        <a:font script="Tale" typeface="Microsoft Tai Le"/>
+        <a:font script="Talu" typeface="Microsoft New Tai Lue"/>
+        <a:font script="Tfng" typeface="Ebrima"/>
+      </a:minorFont>
+    </a:fontScheme>
+    <a:fmtScheme name="Office">
+      <a:fillStyleLst>
+        <a:solidFill>
+          <a:schemeClr val="phClr"/>
+        </a:solidFill>
+        <a:gradFill rotWithShape="1">
+          <a:gsLst>
+            <a:gs pos="0">
+              <a:schemeClr val="phClr">
+                <a:lumMod val="110000"/>
+                <a:satMod val="105000"/>
+                <a:tint val="67000"/>
+              </a:schemeClr>
+            </a:gs>
+            <a:gs pos="50000">
+              <a:schemeClr val="phClr">
+                <a:lumMod val="105000"/>
+                <a:satMod val="103000"/>
+                <a:tint val="73000"/>
+              </a:schemeClr>
+            </a:gs>
+            <a:gs pos="100000">
+              <a:schemeClr val="phClr">
+                <a:lumMod val="105000"/>
+                <a:satMod val="109000"/>
+                <a:tint val="81000"/>
+              </a:schemeClr>
+            </a:gs>
+          </a:gsLst>
+          <a:lin ang="5400000" scaled="0"/>
+        </a:gradFill>
+        <a:gradFill rotWithShape="1">
+          <a:gsLst>
+            <a:gs pos="0">
+              <a:schemeClr val="phClr">
+                <a:satMod val="103000"/>
+                <a:lumMod val="102000"/>
+                <a:tint val="94000"/>
+              </a:schemeClr>
+            </a:gs>
+            <a:gs pos="50000">
+              <a:schemeClr val="phClr">
+                <a:satMod val="110000"/>
+                <a:lumMod val="100000"/>
+                <a:shade val="100000"/>
+              </a:schemeClr>
+            </a:gs>
+            <a:gs pos="100000">
+              <a:schemeClr val="phClr">
+                <a:lumMod val="99000"/>
+                <a:satMod val="120000"/>
+                <a:shade val="78000"/>
+              </a:schemeClr>
+            </a:gs>
+          </a:gsLst>
+          <a:lin ang="5400000" scaled="0"/>
+        </a:gradFill>
+      </a:fillStyleLst>
+      <a:lnStyleLst>
+        <a:ln w="6350" cap="flat" cmpd="sng" algn="ctr">
+          <a:solidFill>
+            <a:schemeClr val="phClr"/>
+          </a:solidFill>
+          <a:prstDash val="solid"/>
+          <a:miter lim="800000"/>
+        </a:ln>
+        <a:ln w="12700" cap="flat" cmpd="sng" algn="ctr">
+          <a:solidFill>
+            <a:schemeClr val="phClr"/>
+          </a:solidFill>
+          <a:prstDash val="solid"/>
+          <a:miter lim="800000"/>
+        </a:ln>
+        <a:ln w="19050" cap="flat" cmpd="sng" algn="ctr">
+          <a:solidFill>
+            <a:schemeClr val="phClr"/>
+          </a:solidFill>
+          <a:prstDash val="solid"/>
+          <a:miter lim="800000"/>
+        </a:ln>
+      </a:lnStyleLst>
+      <a:effectStyleLst>
+        <a:effectStyle>
+          <a:effectLst/>
+        </a:effectStyle>
+        <a:effectStyle>
+          <a:effectLst/>
+        </a:effectStyle>
+        <a:effectStyle>
+          <a:effectLst>
+            <a:outerShdw blurRad="57150" dist="19050" dir="5400000" algn="ctr" rotWithShape="0">
+              <a:srgbClr val="000000">
+                <a:alpha val="63000"/>
+              </a:srgbClr>
+            </a:outerShdw>
+          </a:effectLst>
+        </a:effectStyle>
+      </a:effectStyleLst>
+      <a:bgFillStyleLst>
+        <a:solidFill>
+          <a:schemeClr val="phClr"/>
+        </a:solidFill>
+        <a:solidFill>
+          <a:schemeClr val="phClr">
+            <a:tint val="95000"/>
+            <a:satMod val="170000"/>
+          </a:schemeClr>
+        </a:solidFill>
+        <a:gradFill rotWithShape="1">
+          <a:gsLst>
+            <a:gs pos="0">
+              <a:schemeClr val="phClr">
+                <a:tint val="93000"/>
+                <a:satMod val="150000"/>
+                <a:shade val="98000"/>
+                <a:lumMod val="102000"/>
+              </a:schemeClr>
+            </a:gs>
+            <a:gs pos="50000">
+              <a:schemeClr val="phClr">
+                <a:tint val="98000"/>
+                <a:satMod val="130000"/>
+                <a:shade val="90000"/>
+                <a:lumMod val="103000"/>
+              </a:schemeClr>
+            </a:gs>
+            <a:gs pos="100000">
+              <a:schemeClr val="phClr">
+                <a:shade val="63000"/>
+                <a:satMod val="120000"/>
+              </a:schemeClr>
+            </a:gs>
+          </a:gsLst>
+          <a:lin ang="5400000" scaled="0"/>
+        </a:gradFill>
+      </a:bgFillStyleLst>
+    </a:fmtScheme>
+  </a:themeElements>
+  <a:objectDefaults/>
+  <a:extraClrSchemeLst/>
+  <a:extLst>
+    <a:ext uri="{05A4C25C-085E-4340-85A3-A5531E510DB2}">
+      <thm15:themeFamily xmlns:thm15="http://schemas.microsoft.com/office/thememl/2012/main" name="Office Theme" id="{62F939B6-93AF-4DB8-9C6B-D6C7DFDC589F}" vid="{4A3C46E8-61CC-4603-A589-7422A47A8E4A}"/>
+    </a:ext>
+  </a:extLst>
+</a:theme>
 </file>
</xml_diff>

<commit_message>
update the attack scenario section of the read me file.
</commit_message>
<xml_diff>
--- a/doc/designDoc.pptx
+++ b/doc/designDoc.pptx
@@ -5,13 +5,14 @@
     <p:sldMasterId id="2147483648" r:id="rId1"/>
   </p:sldMasterIdLst>
   <p:notesMasterIdLst>
-    <p:notesMasterId r:id="rId6"/>
+    <p:notesMasterId r:id="rId7"/>
   </p:notesMasterIdLst>
   <p:sldIdLst>
     <p:sldId id="256" r:id="rId2"/>
     <p:sldId id="257" r:id="rId3"/>
     <p:sldId id="258" r:id="rId4"/>
     <p:sldId id="259" r:id="rId5"/>
+    <p:sldId id="260" r:id="rId6"/>
   </p:sldIdLst>
   <p:sldSz cx="12192000" cy="6858000"/>
   <p:notesSz cx="6858000" cy="9144000"/>
@@ -9268,6 +9269,504 @@
     <p:extLst>
       <p:ext uri="{BB962C8B-B14F-4D97-AF65-F5344CB8AC3E}">
         <p14:creationId xmlns:p14="http://schemas.microsoft.com/office/powerpoint/2010/main" val="1188943797"/>
+      </p:ext>
+    </p:extLst>
+  </p:cSld>
+  <p:clrMapOvr>
+    <a:masterClrMapping/>
+  </p:clrMapOvr>
+</p:sld>
+</file>
+
+<file path=ppt/slides/slide5.xml><?xml version="1.0" encoding="utf-8"?>
+<p:sld xmlns:a="http://schemas.openxmlformats.org/drawingml/2006/main" xmlns:r="http://schemas.openxmlformats.org/officeDocument/2006/relationships" xmlns:p="http://schemas.openxmlformats.org/presentationml/2006/main">
+  <p:cSld>
+    <p:spTree>
+      <p:nvGrpSpPr>
+        <p:cNvPr id="1" name=""/>
+        <p:cNvGrpSpPr/>
+        <p:nvPr/>
+      </p:nvGrpSpPr>
+      <p:grpSpPr>
+        <a:xfrm>
+          <a:off x="0" y="0"/>
+          <a:ext cx="0" cy="0"/>
+          <a:chOff x="0" y="0"/>
+          <a:chExt cx="0" cy="0"/>
+        </a:xfrm>
+      </p:grpSpPr>
+      <p:pic>
+        <p:nvPicPr>
+          <p:cNvPr id="22" name="Picture 21">
+            <a:extLst>
+              <a:ext uri="{FF2B5EF4-FFF2-40B4-BE49-F238E27FC236}">
+                <a16:creationId xmlns:a16="http://schemas.microsoft.com/office/drawing/2014/main" id="{1602B04D-EE1E-A91E-38EC-F64BE0DAE0C8}"/>
+              </a:ext>
+            </a:extLst>
+          </p:cNvPr>
+          <p:cNvPicPr>
+            <a:picLocks noChangeAspect="1"/>
+          </p:cNvPicPr>
+          <p:nvPr/>
+        </p:nvPicPr>
+        <p:blipFill>
+          <a:blip r:embed="rId2"/>
+          <a:stretch>
+            <a:fillRect/>
+          </a:stretch>
+        </p:blipFill>
+        <p:spPr>
+          <a:xfrm>
+            <a:off x="5751716" y="1409981"/>
+            <a:ext cx="5285714" cy="2247619"/>
+          </a:xfrm>
+          <a:prstGeom prst="rect">
+            <a:avLst/>
+          </a:prstGeom>
+        </p:spPr>
+      </p:pic>
+      <p:pic>
+        <p:nvPicPr>
+          <p:cNvPr id="6" name="Picture 5">
+            <a:extLst>
+              <a:ext uri="{FF2B5EF4-FFF2-40B4-BE49-F238E27FC236}">
+                <a16:creationId xmlns:a16="http://schemas.microsoft.com/office/drawing/2014/main" id="{25D14558-9748-2EF5-EABB-7C7032EB84E1}"/>
+              </a:ext>
+            </a:extLst>
+          </p:cNvPr>
+          <p:cNvPicPr>
+            <a:picLocks noChangeAspect="1"/>
+          </p:cNvPicPr>
+          <p:nvPr/>
+        </p:nvPicPr>
+        <p:blipFill>
+          <a:blip r:embed="rId3"/>
+          <a:stretch>
+            <a:fillRect/>
+          </a:stretch>
+        </p:blipFill>
+        <p:spPr>
+          <a:xfrm>
+            <a:off x="497180" y="1127834"/>
+            <a:ext cx="4778447" cy="2529766"/>
+          </a:xfrm>
+          <a:prstGeom prst="rect">
+            <a:avLst/>
+          </a:prstGeom>
+        </p:spPr>
+      </p:pic>
+      <p:sp>
+        <p:nvSpPr>
+          <p:cNvPr id="11" name="TextBox 10">
+            <a:extLst>
+              <a:ext uri="{FF2B5EF4-FFF2-40B4-BE49-F238E27FC236}">
+                <a16:creationId xmlns:a16="http://schemas.microsoft.com/office/drawing/2014/main" id="{78CA941B-7E22-8B34-9EDC-35064ACDDCCF}"/>
+              </a:ext>
+            </a:extLst>
+          </p:cNvPr>
+          <p:cNvSpPr txBox="1"/>
+          <p:nvPr/>
+        </p:nvSpPr>
+        <p:spPr>
+          <a:xfrm>
+            <a:off x="579134" y="2930759"/>
+            <a:ext cx="1755126" cy="461665"/>
+          </a:xfrm>
+          <a:prstGeom prst="rect">
+            <a:avLst/>
+          </a:prstGeom>
+          <a:noFill/>
+        </p:spPr>
+        <p:txBody>
+          <a:bodyPr wrap="square">
+            <a:spAutoFit/>
+          </a:bodyPr>
+          <a:lstStyle/>
+          <a:p>
+            <a:r>
+              <a:rPr lang="en-US" sz="1200" b="1" dirty="0"/>
+              <a:t>HC-SR04 Ultrasonic Sensors</a:t>
+            </a:r>
+            <a:endParaRPr lang="en-SG" sz="1200" b="1" dirty="0"/>
+          </a:p>
+        </p:txBody>
+      </p:sp>
+      <p:sp>
+        <p:nvSpPr>
+          <p:cNvPr id="12" name="TextBox 11">
+            <a:extLst>
+              <a:ext uri="{FF2B5EF4-FFF2-40B4-BE49-F238E27FC236}">
+                <a16:creationId xmlns:a16="http://schemas.microsoft.com/office/drawing/2014/main" id="{774A8890-0639-C4CF-BD3B-3DAE230743E2}"/>
+              </a:ext>
+            </a:extLst>
+          </p:cNvPr>
+          <p:cNvSpPr txBox="1"/>
+          <p:nvPr/>
+        </p:nvSpPr>
+        <p:spPr>
+          <a:xfrm>
+            <a:off x="433172" y="724158"/>
+            <a:ext cx="4559452" cy="338554"/>
+          </a:xfrm>
+          <a:prstGeom prst="rect">
+            <a:avLst/>
+          </a:prstGeom>
+          <a:noFill/>
+        </p:spPr>
+        <p:txBody>
+          <a:bodyPr wrap="square">
+            <a:spAutoFit/>
+          </a:bodyPr>
+          <a:lstStyle/>
+          <a:p>
+            <a:r>
+              <a:rPr lang="en-US" sz="1600" b="1" dirty="0"/>
+              <a:t>Normal firmware’s distance data calculate code </a:t>
+            </a:r>
+            <a:endParaRPr lang="en-SG" sz="1600" b="1" dirty="0"/>
+          </a:p>
+        </p:txBody>
+      </p:sp>
+      <p:sp>
+        <p:nvSpPr>
+          <p:cNvPr id="13" name="TextBox 12">
+            <a:extLst>
+              <a:ext uri="{FF2B5EF4-FFF2-40B4-BE49-F238E27FC236}">
+                <a16:creationId xmlns:a16="http://schemas.microsoft.com/office/drawing/2014/main" id="{197E498C-8963-3178-6838-AD568B8FE8C3}"/>
+              </a:ext>
+            </a:extLst>
+          </p:cNvPr>
+          <p:cNvSpPr txBox="1"/>
+          <p:nvPr/>
+        </p:nvSpPr>
+        <p:spPr>
+          <a:xfrm>
+            <a:off x="5523116" y="785168"/>
+            <a:ext cx="5940412" cy="584775"/>
+          </a:xfrm>
+          <a:prstGeom prst="rect">
+            <a:avLst/>
+          </a:prstGeom>
+          <a:noFill/>
+        </p:spPr>
+        <p:txBody>
+          <a:bodyPr wrap="square">
+            <a:spAutoFit/>
+          </a:bodyPr>
+          <a:lstStyle/>
+          <a:p>
+            <a:r>
+              <a:rPr lang="en-US" sz="1600" b="1" dirty="0">
+                <a:solidFill>
+                  <a:srgbClr val="C00000"/>
+                </a:solidFill>
+              </a:rPr>
+              <a:t>Malicious firmware’s distance calculate code which added the random latency of the time and random offset of the distance: </a:t>
+            </a:r>
+            <a:endParaRPr lang="en-SG" sz="1600" b="1" dirty="0">
+              <a:solidFill>
+                <a:srgbClr val="C00000"/>
+              </a:solidFill>
+            </a:endParaRPr>
+          </a:p>
+        </p:txBody>
+      </p:sp>
+      <p:sp>
+        <p:nvSpPr>
+          <p:cNvPr id="14" name="Rectangle 13">
+            <a:extLst>
+              <a:ext uri="{FF2B5EF4-FFF2-40B4-BE49-F238E27FC236}">
+                <a16:creationId xmlns:a16="http://schemas.microsoft.com/office/drawing/2014/main" id="{B0A5464B-84A6-9C60-1AF9-927D03040FC6}"/>
+              </a:ext>
+            </a:extLst>
+          </p:cNvPr>
+          <p:cNvSpPr/>
+          <p:nvPr/>
+        </p:nvSpPr>
+        <p:spPr>
+          <a:xfrm>
+            <a:off x="7324344" y="2191752"/>
+            <a:ext cx="1325880" cy="228388"/>
+          </a:xfrm>
+          <a:prstGeom prst="rect">
+            <a:avLst/>
+          </a:prstGeom>
+          <a:noFill/>
+          <a:ln w="38100" cap="flat" cmpd="sng" algn="ctr">
+            <a:solidFill>
+              <a:srgbClr val="FF0000"/>
+            </a:solidFill>
+            <a:prstDash val="solid"/>
+            <a:round/>
+            <a:headEnd type="none" w="med" len="med"/>
+            <a:tailEnd type="none" w="med" len="med"/>
+          </a:ln>
+        </p:spPr>
+        <p:style>
+          <a:lnRef idx="0">
+            <a:scrgbClr r="0" g="0" b="0"/>
+          </a:lnRef>
+          <a:fillRef idx="0">
+            <a:scrgbClr r="0" g="0" b="0"/>
+          </a:fillRef>
+          <a:effectRef idx="0">
+            <a:scrgbClr r="0" g="0" b="0"/>
+          </a:effectRef>
+          <a:fontRef idx="minor">
+            <a:schemeClr val="dk1"/>
+          </a:fontRef>
+        </p:style>
+        <p:txBody>
+          <a:bodyPr rtlCol="0" anchor="ctr"/>
+          <a:lstStyle/>
+          <a:p>
+            <a:pPr algn="ctr"/>
+            <a:endParaRPr lang="en-SG" dirty="0"/>
+          </a:p>
+        </p:txBody>
+      </p:sp>
+      <p:sp>
+        <p:nvSpPr>
+          <p:cNvPr id="15" name="Rectangle 14">
+            <a:extLst>
+              <a:ext uri="{FF2B5EF4-FFF2-40B4-BE49-F238E27FC236}">
+                <a16:creationId xmlns:a16="http://schemas.microsoft.com/office/drawing/2014/main" id="{B4523807-8781-7C59-C302-643F9FF9D732}"/>
+              </a:ext>
+            </a:extLst>
+          </p:cNvPr>
+          <p:cNvSpPr/>
+          <p:nvPr/>
+        </p:nvSpPr>
+        <p:spPr>
+          <a:xfrm>
+            <a:off x="7324344" y="2539021"/>
+            <a:ext cx="1426464" cy="228388"/>
+          </a:xfrm>
+          <a:prstGeom prst="rect">
+            <a:avLst/>
+          </a:prstGeom>
+          <a:noFill/>
+          <a:ln w="38100" cap="flat" cmpd="sng" algn="ctr">
+            <a:solidFill>
+              <a:srgbClr val="FF0000"/>
+            </a:solidFill>
+            <a:prstDash val="solid"/>
+            <a:round/>
+            <a:headEnd type="none" w="med" len="med"/>
+            <a:tailEnd type="none" w="med" len="med"/>
+          </a:ln>
+        </p:spPr>
+        <p:style>
+          <a:lnRef idx="0">
+            <a:scrgbClr r="0" g="0" b="0"/>
+          </a:lnRef>
+          <a:fillRef idx="0">
+            <a:scrgbClr r="0" g="0" b="0"/>
+          </a:fillRef>
+          <a:effectRef idx="0">
+            <a:scrgbClr r="0" g="0" b="0"/>
+          </a:effectRef>
+          <a:fontRef idx="minor">
+            <a:schemeClr val="dk1"/>
+          </a:fontRef>
+        </p:style>
+        <p:txBody>
+          <a:bodyPr rtlCol="0" anchor="ctr"/>
+          <a:lstStyle/>
+          <a:p>
+            <a:pPr algn="ctr"/>
+            <a:endParaRPr lang="en-SG" dirty="0"/>
+          </a:p>
+        </p:txBody>
+      </p:sp>
+      <p:sp>
+        <p:nvSpPr>
+          <p:cNvPr id="16" name="Rectangle 15">
+            <a:extLst>
+              <a:ext uri="{FF2B5EF4-FFF2-40B4-BE49-F238E27FC236}">
+                <a16:creationId xmlns:a16="http://schemas.microsoft.com/office/drawing/2014/main" id="{F5B59A32-1968-34DD-6238-385834F4D607}"/>
+              </a:ext>
+            </a:extLst>
+          </p:cNvPr>
+          <p:cNvSpPr/>
+          <p:nvPr/>
+        </p:nvSpPr>
+        <p:spPr>
+          <a:xfrm>
+            <a:off x="9098280" y="3015287"/>
+            <a:ext cx="1286256" cy="292608"/>
+          </a:xfrm>
+          <a:prstGeom prst="rect">
+            <a:avLst/>
+          </a:prstGeom>
+          <a:noFill/>
+          <a:ln w="38100" cap="flat" cmpd="sng" algn="ctr">
+            <a:solidFill>
+              <a:srgbClr val="FF0000"/>
+            </a:solidFill>
+            <a:prstDash val="solid"/>
+            <a:round/>
+            <a:headEnd type="none" w="med" len="med"/>
+            <a:tailEnd type="none" w="med" len="med"/>
+          </a:ln>
+        </p:spPr>
+        <p:style>
+          <a:lnRef idx="0">
+            <a:scrgbClr r="0" g="0" b="0"/>
+          </a:lnRef>
+          <a:fillRef idx="0">
+            <a:scrgbClr r="0" g="0" b="0"/>
+          </a:fillRef>
+          <a:effectRef idx="0">
+            <a:scrgbClr r="0" g="0" b="0"/>
+          </a:effectRef>
+          <a:fontRef idx="minor">
+            <a:schemeClr val="dk1"/>
+          </a:fontRef>
+        </p:style>
+        <p:txBody>
+          <a:bodyPr rtlCol="0" anchor="ctr"/>
+          <a:lstStyle/>
+          <a:p>
+            <a:pPr algn="ctr"/>
+            <a:endParaRPr lang="en-SG" dirty="0"/>
+          </a:p>
+        </p:txBody>
+      </p:sp>
+      <p:cxnSp>
+        <p:nvCxnSpPr>
+          <p:cNvPr id="18" name="Straight Arrow Connector 17">
+            <a:extLst>
+              <a:ext uri="{FF2B5EF4-FFF2-40B4-BE49-F238E27FC236}">
+                <a16:creationId xmlns:a16="http://schemas.microsoft.com/office/drawing/2014/main" id="{619CBBC4-2A43-082F-8E6F-581155744A13}"/>
+              </a:ext>
+            </a:extLst>
+          </p:cNvPr>
+          <p:cNvCxnSpPr/>
+          <p:nvPr/>
+        </p:nvCxnSpPr>
+        <p:spPr>
+          <a:xfrm>
+            <a:off x="3979164" y="3161591"/>
+            <a:ext cx="2026920" cy="0"/>
+          </a:xfrm>
+          <a:prstGeom prst="straightConnector1">
+            <a:avLst/>
+          </a:prstGeom>
+          <a:ln w="19050">
+            <a:solidFill>
+              <a:srgbClr val="FF0000"/>
+            </a:solidFill>
+            <a:tailEnd type="triangle"/>
+          </a:ln>
+        </p:spPr>
+        <p:style>
+          <a:lnRef idx="1">
+            <a:schemeClr val="accent1"/>
+          </a:lnRef>
+          <a:fillRef idx="0">
+            <a:schemeClr val="accent1"/>
+          </a:fillRef>
+          <a:effectRef idx="0">
+            <a:schemeClr val="accent1"/>
+          </a:effectRef>
+          <a:fontRef idx="minor">
+            <a:schemeClr val="tx1"/>
+          </a:fontRef>
+        </p:style>
+      </p:cxnSp>
+      <p:cxnSp>
+        <p:nvCxnSpPr>
+          <p:cNvPr id="19" name="Straight Arrow Connector 18">
+            <a:extLst>
+              <a:ext uri="{FF2B5EF4-FFF2-40B4-BE49-F238E27FC236}">
+                <a16:creationId xmlns:a16="http://schemas.microsoft.com/office/drawing/2014/main" id="{8EBF2C8E-8939-4917-268B-BC661D968CF3}"/>
+              </a:ext>
+            </a:extLst>
+          </p:cNvPr>
+          <p:cNvCxnSpPr>
+            <a:cxnSpLocks/>
+          </p:cNvCxnSpPr>
+          <p:nvPr/>
+        </p:nvCxnSpPr>
+        <p:spPr>
+          <a:xfrm>
+            <a:off x="2458212" y="2661756"/>
+            <a:ext cx="3547872" cy="0"/>
+          </a:xfrm>
+          <a:prstGeom prst="straightConnector1">
+            <a:avLst/>
+          </a:prstGeom>
+          <a:ln w="19050">
+            <a:solidFill>
+              <a:srgbClr val="FF0000"/>
+            </a:solidFill>
+            <a:tailEnd type="triangle"/>
+          </a:ln>
+        </p:spPr>
+        <p:style>
+          <a:lnRef idx="1">
+            <a:schemeClr val="accent1"/>
+          </a:lnRef>
+          <a:fillRef idx="0">
+            <a:schemeClr val="accent1"/>
+          </a:fillRef>
+          <a:effectRef idx="0">
+            <a:schemeClr val="accent1"/>
+          </a:effectRef>
+          <a:fontRef idx="minor">
+            <a:schemeClr val="tx1"/>
+          </a:fontRef>
+        </p:style>
+      </p:cxnSp>
+      <p:cxnSp>
+        <p:nvCxnSpPr>
+          <p:cNvPr id="24" name="Straight Arrow Connector 23">
+            <a:extLst>
+              <a:ext uri="{FF2B5EF4-FFF2-40B4-BE49-F238E27FC236}">
+                <a16:creationId xmlns:a16="http://schemas.microsoft.com/office/drawing/2014/main" id="{1A21FC7D-8EAA-0176-AB6B-38E83CFFA9DD}"/>
+              </a:ext>
+            </a:extLst>
+          </p:cNvPr>
+          <p:cNvCxnSpPr>
+            <a:cxnSpLocks/>
+          </p:cNvCxnSpPr>
+          <p:nvPr/>
+        </p:nvCxnSpPr>
+        <p:spPr>
+          <a:xfrm>
+            <a:off x="2334260" y="2264089"/>
+            <a:ext cx="3671824" cy="0"/>
+          </a:xfrm>
+          <a:prstGeom prst="straightConnector1">
+            <a:avLst/>
+          </a:prstGeom>
+          <a:ln w="19050">
+            <a:solidFill>
+              <a:srgbClr val="FF0000"/>
+            </a:solidFill>
+            <a:tailEnd type="triangle"/>
+          </a:ln>
+        </p:spPr>
+        <p:style>
+          <a:lnRef idx="1">
+            <a:schemeClr val="accent1"/>
+          </a:lnRef>
+          <a:fillRef idx="0">
+            <a:schemeClr val="accent1"/>
+          </a:fillRef>
+          <a:effectRef idx="0">
+            <a:schemeClr val="accent1"/>
+          </a:effectRef>
+          <a:fontRef idx="minor">
+            <a:schemeClr val="tx1"/>
+          </a:fontRef>
+        </p:style>
+      </p:cxnSp>
+    </p:spTree>
+    <p:extLst>
+      <p:ext uri="{BB962C8B-B14F-4D97-AF65-F5344CB8AC3E}">
+        <p14:creationId xmlns:p14="http://schemas.microsoft.com/office/powerpoint/2010/main" val="2579077205"/>
       </p:ext>
     </p:extLst>
   </p:cSld>

</xml_diff>

<commit_message>
update the introduction section of the read me file.
</commit_message>
<xml_diff>
--- a/doc/designDoc.pptx
+++ b/doc/designDoc.pptx
@@ -5,7 +5,7 @@
     <p:sldMasterId id="2147483648" r:id="rId1"/>
   </p:sldMasterIdLst>
   <p:notesMasterIdLst>
-    <p:notesMasterId r:id="rId7"/>
+    <p:notesMasterId r:id="rId8"/>
   </p:notesMasterIdLst>
   <p:sldIdLst>
     <p:sldId id="256" r:id="rId2"/>
@@ -13,6 +13,7 @@
     <p:sldId id="258" r:id="rId4"/>
     <p:sldId id="259" r:id="rId5"/>
     <p:sldId id="260" r:id="rId6"/>
+    <p:sldId id="261" r:id="rId7"/>
   </p:sldIdLst>
   <p:sldSz cx="12192000" cy="6858000"/>
   <p:notesSz cx="6858000" cy="9144000"/>
@@ -201,7 +202,7 @@
           <a:p>
             <a:fld id="{9E1B34BE-8C20-40BD-B37D-1D72CA947284}" type="datetimeFigureOut">
               <a:rPr lang="en-SG" smtClean="0"/>
-              <a:t>1/2/2024</a:t>
+              <a:t>2/2/2024</a:t>
             </a:fld>
             <a:endParaRPr lang="en-SG"/>
           </a:p>
@@ -702,7 +703,7 @@
           <a:p>
             <a:fld id="{DBE21509-CCC6-462B-BAD1-586C6842538A}" type="datetimeFigureOut">
               <a:rPr lang="en-SG" smtClean="0"/>
-              <a:t>1/2/2024</a:t>
+              <a:t>2/2/2024</a:t>
             </a:fld>
             <a:endParaRPr lang="en-SG"/>
           </a:p>
@@ -902,7 +903,7 @@
           <a:p>
             <a:fld id="{DBE21509-CCC6-462B-BAD1-586C6842538A}" type="datetimeFigureOut">
               <a:rPr lang="en-SG" smtClean="0"/>
-              <a:t>1/2/2024</a:t>
+              <a:t>2/2/2024</a:t>
             </a:fld>
             <a:endParaRPr lang="en-SG"/>
           </a:p>
@@ -1112,7 +1113,7 @@
           <a:p>
             <a:fld id="{DBE21509-CCC6-462B-BAD1-586C6842538A}" type="datetimeFigureOut">
               <a:rPr lang="en-SG" smtClean="0"/>
-              <a:t>1/2/2024</a:t>
+              <a:t>2/2/2024</a:t>
             </a:fld>
             <a:endParaRPr lang="en-SG"/>
           </a:p>
@@ -1312,7 +1313,7 @@
           <a:p>
             <a:fld id="{DBE21509-CCC6-462B-BAD1-586C6842538A}" type="datetimeFigureOut">
               <a:rPr lang="en-SG" smtClean="0"/>
-              <a:t>1/2/2024</a:t>
+              <a:t>2/2/2024</a:t>
             </a:fld>
             <a:endParaRPr lang="en-SG"/>
           </a:p>
@@ -1588,7 +1589,7 @@
           <a:p>
             <a:fld id="{DBE21509-CCC6-462B-BAD1-586C6842538A}" type="datetimeFigureOut">
               <a:rPr lang="en-SG" smtClean="0"/>
-              <a:t>1/2/2024</a:t>
+              <a:t>2/2/2024</a:t>
             </a:fld>
             <a:endParaRPr lang="en-SG"/>
           </a:p>
@@ -1856,7 +1857,7 @@
           <a:p>
             <a:fld id="{DBE21509-CCC6-462B-BAD1-586C6842538A}" type="datetimeFigureOut">
               <a:rPr lang="en-SG" smtClean="0"/>
-              <a:t>1/2/2024</a:t>
+              <a:t>2/2/2024</a:t>
             </a:fld>
             <a:endParaRPr lang="en-SG"/>
           </a:p>
@@ -2271,7 +2272,7 @@
           <a:p>
             <a:fld id="{DBE21509-CCC6-462B-BAD1-586C6842538A}" type="datetimeFigureOut">
               <a:rPr lang="en-SG" smtClean="0"/>
-              <a:t>1/2/2024</a:t>
+              <a:t>2/2/2024</a:t>
             </a:fld>
             <a:endParaRPr lang="en-SG"/>
           </a:p>
@@ -2413,7 +2414,7 @@
           <a:p>
             <a:fld id="{DBE21509-CCC6-462B-BAD1-586C6842538A}" type="datetimeFigureOut">
               <a:rPr lang="en-SG" smtClean="0"/>
-              <a:t>1/2/2024</a:t>
+              <a:t>2/2/2024</a:t>
             </a:fld>
             <a:endParaRPr lang="en-SG"/>
           </a:p>
@@ -2526,7 +2527,7 @@
           <a:p>
             <a:fld id="{DBE21509-CCC6-462B-BAD1-586C6842538A}" type="datetimeFigureOut">
               <a:rPr lang="en-SG" smtClean="0"/>
-              <a:t>1/2/2024</a:t>
+              <a:t>2/2/2024</a:t>
             </a:fld>
             <a:endParaRPr lang="en-SG"/>
           </a:p>
@@ -2839,7 +2840,7 @@
           <a:p>
             <a:fld id="{DBE21509-CCC6-462B-BAD1-586C6842538A}" type="datetimeFigureOut">
               <a:rPr lang="en-SG" smtClean="0"/>
-              <a:t>1/2/2024</a:t>
+              <a:t>2/2/2024</a:t>
             </a:fld>
             <a:endParaRPr lang="en-SG"/>
           </a:p>
@@ -3128,7 +3129,7 @@
           <a:p>
             <a:fld id="{DBE21509-CCC6-462B-BAD1-586C6842538A}" type="datetimeFigureOut">
               <a:rPr lang="en-SG" smtClean="0"/>
-              <a:t>1/2/2024</a:t>
+              <a:t>2/2/2024</a:t>
             </a:fld>
             <a:endParaRPr lang="en-SG"/>
           </a:p>
@@ -3371,7 +3372,7 @@
           <a:p>
             <a:fld id="{DBE21509-CCC6-462B-BAD1-586C6842538A}" type="datetimeFigureOut">
               <a:rPr lang="en-SG" smtClean="0"/>
-              <a:t>1/2/2024</a:t>
+              <a:t>2/2/2024</a:t>
             </a:fld>
             <a:endParaRPr lang="en-SG"/>
           </a:p>
@@ -9767,6 +9768,1468 @@
     <p:extLst>
       <p:ext uri="{BB962C8B-B14F-4D97-AF65-F5344CB8AC3E}">
         <p14:creationId xmlns:p14="http://schemas.microsoft.com/office/powerpoint/2010/main" val="2579077205"/>
+      </p:ext>
+    </p:extLst>
+  </p:cSld>
+  <p:clrMapOvr>
+    <a:masterClrMapping/>
+  </p:clrMapOvr>
+</p:sld>
+</file>
+
+<file path=ppt/slides/slide6.xml><?xml version="1.0" encoding="utf-8"?>
+<p:sld xmlns:a="http://schemas.openxmlformats.org/drawingml/2006/main" xmlns:r="http://schemas.openxmlformats.org/officeDocument/2006/relationships" xmlns:p="http://schemas.openxmlformats.org/presentationml/2006/main">
+  <p:cSld>
+    <p:spTree>
+      <p:nvGrpSpPr>
+        <p:cNvPr id="1" name=""/>
+        <p:cNvGrpSpPr/>
+        <p:nvPr/>
+      </p:nvGrpSpPr>
+      <p:grpSpPr>
+        <a:xfrm>
+          <a:off x="0" y="0"/>
+          <a:ext cx="0" cy="0"/>
+          <a:chOff x="0" y="0"/>
+          <a:chExt cx="0" cy="0"/>
+        </a:xfrm>
+      </p:grpSpPr>
+      <p:pic>
+        <p:nvPicPr>
+          <p:cNvPr id="4" name="Picture 3">
+            <a:extLst>
+              <a:ext uri="{FF2B5EF4-FFF2-40B4-BE49-F238E27FC236}">
+                <a16:creationId xmlns:a16="http://schemas.microsoft.com/office/drawing/2014/main" id="{24690124-792A-9396-E3F1-5EA57B87828B}"/>
+              </a:ext>
+            </a:extLst>
+          </p:cNvPr>
+          <p:cNvPicPr>
+            <a:picLocks noChangeAspect="1"/>
+          </p:cNvPicPr>
+          <p:nvPr/>
+        </p:nvPicPr>
+        <p:blipFill>
+          <a:blip r:embed="rId2"/>
+          <a:stretch>
+            <a:fillRect/>
+          </a:stretch>
+        </p:blipFill>
+        <p:spPr>
+          <a:xfrm>
+            <a:off x="5783327" y="1845767"/>
+            <a:ext cx="1306292" cy="865418"/>
+          </a:xfrm>
+          <a:prstGeom prst="rect">
+            <a:avLst/>
+          </a:prstGeom>
+          <a:ln w="9525">
+            <a:solidFill>
+              <a:schemeClr val="tx1"/>
+            </a:solidFill>
+          </a:ln>
+        </p:spPr>
+      </p:pic>
+      <p:sp>
+        <p:nvSpPr>
+          <p:cNvPr id="5" name="Cube 4">
+            <a:extLst>
+              <a:ext uri="{FF2B5EF4-FFF2-40B4-BE49-F238E27FC236}">
+                <a16:creationId xmlns:a16="http://schemas.microsoft.com/office/drawing/2014/main" id="{8654C0E8-471F-DF36-2240-C760B7B79B3E}"/>
+              </a:ext>
+            </a:extLst>
+          </p:cNvPr>
+          <p:cNvSpPr/>
+          <p:nvPr/>
+        </p:nvSpPr>
+        <p:spPr>
+          <a:xfrm>
+            <a:off x="1042458" y="3308485"/>
+            <a:ext cx="1247898" cy="522575"/>
+          </a:xfrm>
+          <a:prstGeom prst="cube">
+            <a:avLst/>
+          </a:prstGeom>
+        </p:spPr>
+        <p:style>
+          <a:lnRef idx="2">
+            <a:schemeClr val="accent1">
+              <a:shade val="15000"/>
+            </a:schemeClr>
+          </a:lnRef>
+          <a:fillRef idx="1">
+            <a:schemeClr val="accent1"/>
+          </a:fillRef>
+          <a:effectRef idx="0">
+            <a:schemeClr val="accent1"/>
+          </a:effectRef>
+          <a:fontRef idx="minor">
+            <a:schemeClr val="lt1"/>
+          </a:fontRef>
+        </p:style>
+        <p:txBody>
+          <a:bodyPr rtlCol="0" anchor="ctr"/>
+          <a:lstStyle/>
+          <a:p>
+            <a:pPr algn="ctr"/>
+            <a:endParaRPr lang="en-SG" dirty="0"/>
+          </a:p>
+        </p:txBody>
+      </p:sp>
+      <p:sp>
+        <p:nvSpPr>
+          <p:cNvPr id="6" name="Oval 5">
+            <a:extLst>
+              <a:ext uri="{FF2B5EF4-FFF2-40B4-BE49-F238E27FC236}">
+                <a16:creationId xmlns:a16="http://schemas.microsoft.com/office/drawing/2014/main" id="{2F53C18A-67C3-EA81-9BC6-E44E6FB32630}"/>
+              </a:ext>
+            </a:extLst>
+          </p:cNvPr>
+          <p:cNvSpPr/>
+          <p:nvPr/>
+        </p:nvSpPr>
+        <p:spPr>
+          <a:xfrm>
+            <a:off x="802299" y="3140287"/>
+            <a:ext cx="1728216" cy="429486"/>
+          </a:xfrm>
+          <a:prstGeom prst="ellipse">
+            <a:avLst/>
+          </a:prstGeom>
+          <a:noFill/>
+          <a:ln w="19050" cap="flat" cmpd="sng" algn="ctr">
+            <a:solidFill>
+              <a:srgbClr val="FF0000"/>
+            </a:solidFill>
+            <a:prstDash val="sysDash"/>
+            <a:round/>
+            <a:headEnd type="none" w="med" len="med"/>
+            <a:tailEnd type="none" w="med" len="med"/>
+          </a:ln>
+        </p:spPr>
+        <p:style>
+          <a:lnRef idx="0">
+            <a:scrgbClr r="0" g="0" b="0"/>
+          </a:lnRef>
+          <a:fillRef idx="0">
+            <a:scrgbClr r="0" g="0" b="0"/>
+          </a:fillRef>
+          <a:effectRef idx="0">
+            <a:scrgbClr r="0" g="0" b="0"/>
+          </a:effectRef>
+          <a:fontRef idx="minor">
+            <a:schemeClr val="dk1"/>
+          </a:fontRef>
+        </p:style>
+        <p:txBody>
+          <a:bodyPr rtlCol="0" anchor="ctr"/>
+          <a:lstStyle/>
+          <a:p>
+            <a:pPr algn="ctr"/>
+            <a:endParaRPr lang="en-SG"/>
+          </a:p>
+        </p:txBody>
+      </p:sp>
+      <p:sp>
+        <p:nvSpPr>
+          <p:cNvPr id="7" name="Arrow: Right 6">
+            <a:extLst>
+              <a:ext uri="{FF2B5EF4-FFF2-40B4-BE49-F238E27FC236}">
+                <a16:creationId xmlns:a16="http://schemas.microsoft.com/office/drawing/2014/main" id="{C8D62141-9984-D3D7-4356-8D9873A4075F}"/>
+              </a:ext>
+            </a:extLst>
+          </p:cNvPr>
+          <p:cNvSpPr/>
+          <p:nvPr/>
+        </p:nvSpPr>
+        <p:spPr>
+          <a:xfrm>
+            <a:off x="3599449" y="2006353"/>
+            <a:ext cx="481219" cy="162252"/>
+          </a:xfrm>
+          <a:prstGeom prst="rightArrow">
+            <a:avLst/>
+          </a:prstGeom>
+        </p:spPr>
+        <p:style>
+          <a:lnRef idx="2">
+            <a:schemeClr val="accent1">
+              <a:shade val="15000"/>
+            </a:schemeClr>
+          </a:lnRef>
+          <a:fillRef idx="1">
+            <a:schemeClr val="accent1"/>
+          </a:fillRef>
+          <a:effectRef idx="0">
+            <a:schemeClr val="accent1"/>
+          </a:effectRef>
+          <a:fontRef idx="minor">
+            <a:schemeClr val="lt1"/>
+          </a:fontRef>
+        </p:style>
+        <p:txBody>
+          <a:bodyPr rtlCol="0" anchor="ctr"/>
+          <a:lstStyle/>
+          <a:p>
+            <a:pPr algn="ctr"/>
+            <a:endParaRPr lang="en-SG"/>
+          </a:p>
+        </p:txBody>
+      </p:sp>
+      <p:pic>
+        <p:nvPicPr>
+          <p:cNvPr id="8" name="Picture 7">
+            <a:extLst>
+              <a:ext uri="{FF2B5EF4-FFF2-40B4-BE49-F238E27FC236}">
+                <a16:creationId xmlns:a16="http://schemas.microsoft.com/office/drawing/2014/main" id="{1EAC0FA7-0DFE-5857-59A0-6AFBB5DB5640}"/>
+              </a:ext>
+            </a:extLst>
+          </p:cNvPr>
+          <p:cNvPicPr>
+            <a:picLocks noChangeAspect="1"/>
+          </p:cNvPicPr>
+          <p:nvPr/>
+        </p:nvPicPr>
+        <p:blipFill>
+          <a:blip r:embed="rId3"/>
+          <a:stretch>
+            <a:fillRect/>
+          </a:stretch>
+        </p:blipFill>
+        <p:spPr>
+          <a:xfrm>
+            <a:off x="4274981" y="1819621"/>
+            <a:ext cx="566442" cy="542592"/>
+          </a:xfrm>
+          <a:prstGeom prst="rect">
+            <a:avLst/>
+          </a:prstGeom>
+          <a:ln w="12700">
+            <a:solidFill>
+              <a:schemeClr val="tx1"/>
+            </a:solidFill>
+          </a:ln>
+        </p:spPr>
+      </p:pic>
+      <p:sp>
+        <p:nvSpPr>
+          <p:cNvPr id="9" name="TextBox 8">
+            <a:extLst>
+              <a:ext uri="{FF2B5EF4-FFF2-40B4-BE49-F238E27FC236}">
+                <a16:creationId xmlns:a16="http://schemas.microsoft.com/office/drawing/2014/main" id="{7AB03320-F982-28F4-B3FF-9E8761F51DE4}"/>
+              </a:ext>
+            </a:extLst>
+          </p:cNvPr>
+          <p:cNvSpPr txBox="1"/>
+          <p:nvPr/>
+        </p:nvSpPr>
+        <p:spPr>
+          <a:xfrm>
+            <a:off x="676418" y="2687867"/>
+            <a:ext cx="2260705" cy="461665"/>
+          </a:xfrm>
+          <a:prstGeom prst="rect">
+            <a:avLst/>
+          </a:prstGeom>
+          <a:noFill/>
+        </p:spPr>
+        <p:txBody>
+          <a:bodyPr wrap="square">
+            <a:spAutoFit/>
+          </a:bodyPr>
+          <a:lstStyle/>
+          <a:p>
+            <a:r>
+              <a:rPr lang="en-US" sz="1200" b="1" dirty="0"/>
+              <a:t>Item top area reflection distance data generated by sensor </a:t>
+            </a:r>
+            <a:endParaRPr lang="en-SG" sz="1200" b="1" dirty="0"/>
+          </a:p>
+        </p:txBody>
+      </p:sp>
+      <p:sp>
+        <p:nvSpPr>
+          <p:cNvPr id="10" name="TextBox 9">
+            <a:extLst>
+              <a:ext uri="{FF2B5EF4-FFF2-40B4-BE49-F238E27FC236}">
+                <a16:creationId xmlns:a16="http://schemas.microsoft.com/office/drawing/2014/main" id="{7BE5E3A1-AA52-7AEB-FBEA-C88039549815}"/>
+              </a:ext>
+            </a:extLst>
+          </p:cNvPr>
+          <p:cNvSpPr txBox="1"/>
+          <p:nvPr/>
+        </p:nvSpPr>
+        <p:spPr>
+          <a:xfrm>
+            <a:off x="4080668" y="1357321"/>
+            <a:ext cx="1418832" cy="461665"/>
+          </a:xfrm>
+          <a:prstGeom prst="rect">
+            <a:avLst/>
+          </a:prstGeom>
+          <a:noFill/>
+        </p:spPr>
+        <p:txBody>
+          <a:bodyPr wrap="square">
+            <a:spAutoFit/>
+          </a:bodyPr>
+          <a:lstStyle/>
+          <a:p>
+            <a:r>
+              <a:rPr lang="en-US" sz="1200" b="1" dirty="0"/>
+              <a:t>Ground</a:t>
+            </a:r>
+            <a:r>
+              <a:rPr lang="en-SG" sz="1200" b="1" dirty="0"/>
+              <a:t> </a:t>
+            </a:r>
+            <a:r>
+              <a:rPr lang="en-US" sz="1200" b="1" dirty="0"/>
+              <a:t>contour </a:t>
+            </a:r>
+            <a:r>
+              <a:rPr lang="en-SG" sz="1200" b="1" dirty="0"/>
+              <a:t>generate unit </a:t>
+            </a:r>
+          </a:p>
+        </p:txBody>
+      </p:sp>
+      <p:sp>
+        <p:nvSpPr>
+          <p:cNvPr id="11" name="Arrow: Right 10">
+            <a:extLst>
+              <a:ext uri="{FF2B5EF4-FFF2-40B4-BE49-F238E27FC236}">
+                <a16:creationId xmlns:a16="http://schemas.microsoft.com/office/drawing/2014/main" id="{D93FA45E-E779-3B13-1097-0712560E8B6F}"/>
+              </a:ext>
+            </a:extLst>
+          </p:cNvPr>
+          <p:cNvSpPr/>
+          <p:nvPr/>
+        </p:nvSpPr>
+        <p:spPr>
+          <a:xfrm>
+            <a:off x="5189829" y="2022614"/>
+            <a:ext cx="481219" cy="162252"/>
+          </a:xfrm>
+          <a:prstGeom prst="rightArrow">
+            <a:avLst/>
+          </a:prstGeom>
+        </p:spPr>
+        <p:style>
+          <a:lnRef idx="2">
+            <a:schemeClr val="accent1">
+              <a:shade val="15000"/>
+            </a:schemeClr>
+          </a:lnRef>
+          <a:fillRef idx="1">
+            <a:schemeClr val="accent1"/>
+          </a:fillRef>
+          <a:effectRef idx="0">
+            <a:schemeClr val="accent1"/>
+          </a:effectRef>
+          <a:fontRef idx="minor">
+            <a:schemeClr val="lt1"/>
+          </a:fontRef>
+        </p:style>
+        <p:txBody>
+          <a:bodyPr rtlCol="0" anchor="ctr"/>
+          <a:lstStyle/>
+          <a:p>
+            <a:pPr algn="ctr"/>
+            <a:endParaRPr lang="en-SG"/>
+          </a:p>
+        </p:txBody>
+      </p:sp>
+      <p:sp>
+        <p:nvSpPr>
+          <p:cNvPr id="12" name="TextBox 11">
+            <a:extLst>
+              <a:ext uri="{FF2B5EF4-FFF2-40B4-BE49-F238E27FC236}">
+                <a16:creationId xmlns:a16="http://schemas.microsoft.com/office/drawing/2014/main" id="{D9014E4A-E59D-76B0-B445-A743B0C7BFC7}"/>
+              </a:ext>
+            </a:extLst>
+          </p:cNvPr>
+          <p:cNvSpPr txBox="1"/>
+          <p:nvPr/>
+        </p:nvSpPr>
+        <p:spPr>
+          <a:xfrm>
+            <a:off x="5780295" y="1357321"/>
+            <a:ext cx="1418832" cy="461665"/>
+          </a:xfrm>
+          <a:prstGeom prst="rect">
+            <a:avLst/>
+          </a:prstGeom>
+          <a:noFill/>
+        </p:spPr>
+        <p:txBody>
+          <a:bodyPr wrap="square">
+            <a:spAutoFit/>
+          </a:bodyPr>
+          <a:lstStyle/>
+          <a:p>
+            <a:r>
+              <a:rPr lang="en-US" sz="1200" b="1" dirty="0"/>
+              <a:t>Simple ground contour matrix  </a:t>
+            </a:r>
+            <a:endParaRPr lang="en-SG" sz="1200" b="1" dirty="0"/>
+          </a:p>
+        </p:txBody>
+      </p:sp>
+      <p:sp>
+        <p:nvSpPr>
+          <p:cNvPr id="13" name="Arrow: Right 12">
+            <a:extLst>
+              <a:ext uri="{FF2B5EF4-FFF2-40B4-BE49-F238E27FC236}">
+                <a16:creationId xmlns:a16="http://schemas.microsoft.com/office/drawing/2014/main" id="{D895587D-BC4C-86C6-3D45-603618F818FF}"/>
+              </a:ext>
+            </a:extLst>
+          </p:cNvPr>
+          <p:cNvSpPr/>
+          <p:nvPr/>
+        </p:nvSpPr>
+        <p:spPr>
+          <a:xfrm>
+            <a:off x="7272365" y="2116224"/>
+            <a:ext cx="481219" cy="162252"/>
+          </a:xfrm>
+          <a:prstGeom prst="rightArrow">
+            <a:avLst/>
+          </a:prstGeom>
+        </p:spPr>
+        <p:style>
+          <a:lnRef idx="2">
+            <a:schemeClr val="accent1">
+              <a:shade val="15000"/>
+            </a:schemeClr>
+          </a:lnRef>
+          <a:fillRef idx="1">
+            <a:schemeClr val="accent1"/>
+          </a:fillRef>
+          <a:effectRef idx="0">
+            <a:schemeClr val="accent1"/>
+          </a:effectRef>
+          <a:fontRef idx="minor">
+            <a:schemeClr val="lt1"/>
+          </a:fontRef>
+        </p:style>
+        <p:txBody>
+          <a:bodyPr rtlCol="0" anchor="ctr"/>
+          <a:lstStyle/>
+          <a:p>
+            <a:pPr algn="ctr"/>
+            <a:endParaRPr lang="en-SG"/>
+          </a:p>
+        </p:txBody>
+      </p:sp>
+      <p:pic>
+        <p:nvPicPr>
+          <p:cNvPr id="14" name="Picture 13">
+            <a:extLst>
+              <a:ext uri="{FF2B5EF4-FFF2-40B4-BE49-F238E27FC236}">
+                <a16:creationId xmlns:a16="http://schemas.microsoft.com/office/drawing/2014/main" id="{E170C7A8-BFCA-0D2E-97CD-72E807C34FCD}"/>
+              </a:ext>
+            </a:extLst>
+          </p:cNvPr>
+          <p:cNvPicPr>
+            <a:picLocks noChangeAspect="1"/>
+          </p:cNvPicPr>
+          <p:nvPr/>
+        </p:nvPicPr>
+        <p:blipFill>
+          <a:blip r:embed="rId4"/>
+          <a:stretch>
+            <a:fillRect/>
+          </a:stretch>
+        </p:blipFill>
+        <p:spPr>
+          <a:xfrm>
+            <a:off x="7890853" y="1882610"/>
+            <a:ext cx="897771" cy="1162499"/>
+          </a:xfrm>
+          <a:prstGeom prst="rect">
+            <a:avLst/>
+          </a:prstGeom>
+          <a:ln w="9525">
+            <a:solidFill>
+              <a:schemeClr val="tx1"/>
+            </a:solidFill>
+          </a:ln>
+        </p:spPr>
+      </p:pic>
+      <p:sp>
+        <p:nvSpPr>
+          <p:cNvPr id="15" name="TextBox 14">
+            <a:extLst>
+              <a:ext uri="{FF2B5EF4-FFF2-40B4-BE49-F238E27FC236}">
+                <a16:creationId xmlns:a16="http://schemas.microsoft.com/office/drawing/2014/main" id="{8AE89910-A1D8-E1A9-8A6E-AB09AF901F6B}"/>
+              </a:ext>
+            </a:extLst>
+          </p:cNvPr>
+          <p:cNvSpPr txBox="1"/>
+          <p:nvPr/>
+        </p:nvSpPr>
+        <p:spPr>
+          <a:xfrm>
+            <a:off x="7479923" y="1384102"/>
+            <a:ext cx="1820560" cy="461665"/>
+          </a:xfrm>
+          <a:prstGeom prst="rect">
+            <a:avLst/>
+          </a:prstGeom>
+          <a:noFill/>
+        </p:spPr>
+        <p:txBody>
+          <a:bodyPr wrap="square">
+            <a:spAutoFit/>
+          </a:bodyPr>
+          <a:lstStyle/>
+          <a:p>
+            <a:r>
+              <a:rPr lang="en-SG" sz="1200" b="1" dirty="0"/>
+              <a:t>Drone controller’s Terrain matching function</a:t>
+            </a:r>
+          </a:p>
+        </p:txBody>
+      </p:sp>
+      <p:sp>
+        <p:nvSpPr>
+          <p:cNvPr id="16" name="Arrow: Right 15">
+            <a:extLst>
+              <a:ext uri="{FF2B5EF4-FFF2-40B4-BE49-F238E27FC236}">
+                <a16:creationId xmlns:a16="http://schemas.microsoft.com/office/drawing/2014/main" id="{25F73203-C1CC-1069-8B85-28769D0E0717}"/>
+              </a:ext>
+            </a:extLst>
+          </p:cNvPr>
+          <p:cNvSpPr/>
+          <p:nvPr/>
+        </p:nvSpPr>
+        <p:spPr>
+          <a:xfrm>
+            <a:off x="8925893" y="2144121"/>
+            <a:ext cx="481219" cy="162252"/>
+          </a:xfrm>
+          <a:prstGeom prst="rightArrow">
+            <a:avLst/>
+          </a:prstGeom>
+        </p:spPr>
+        <p:style>
+          <a:lnRef idx="2">
+            <a:schemeClr val="accent1">
+              <a:shade val="15000"/>
+            </a:schemeClr>
+          </a:lnRef>
+          <a:fillRef idx="1">
+            <a:schemeClr val="accent1"/>
+          </a:fillRef>
+          <a:effectRef idx="0">
+            <a:schemeClr val="accent1"/>
+          </a:effectRef>
+          <a:fontRef idx="minor">
+            <a:schemeClr val="lt1"/>
+          </a:fontRef>
+        </p:style>
+        <p:txBody>
+          <a:bodyPr rtlCol="0" anchor="ctr"/>
+          <a:lstStyle/>
+          <a:p>
+            <a:pPr algn="ctr"/>
+            <a:endParaRPr lang="en-SG"/>
+          </a:p>
+        </p:txBody>
+      </p:sp>
+      <p:pic>
+        <p:nvPicPr>
+          <p:cNvPr id="17" name="Picture 16">
+            <a:extLst>
+              <a:ext uri="{FF2B5EF4-FFF2-40B4-BE49-F238E27FC236}">
+                <a16:creationId xmlns:a16="http://schemas.microsoft.com/office/drawing/2014/main" id="{DA8F4DD1-59BF-6C53-3BE5-68C900F677F0}"/>
+              </a:ext>
+            </a:extLst>
+          </p:cNvPr>
+          <p:cNvPicPr>
+            <a:picLocks noChangeAspect="1"/>
+          </p:cNvPicPr>
+          <p:nvPr/>
+        </p:nvPicPr>
+        <p:blipFill>
+          <a:blip r:embed="rId5"/>
+          <a:stretch>
+            <a:fillRect/>
+          </a:stretch>
+        </p:blipFill>
+        <p:spPr>
+          <a:xfrm>
+            <a:off x="9544381" y="2006353"/>
+            <a:ext cx="897771" cy="616470"/>
+          </a:xfrm>
+          <a:prstGeom prst="rect">
+            <a:avLst/>
+          </a:prstGeom>
+          <a:ln w="12700">
+            <a:solidFill>
+              <a:schemeClr val="tx1"/>
+            </a:solidFill>
+          </a:ln>
+        </p:spPr>
+      </p:pic>
+      <p:sp>
+        <p:nvSpPr>
+          <p:cNvPr id="18" name="TextBox 17">
+            <a:extLst>
+              <a:ext uri="{FF2B5EF4-FFF2-40B4-BE49-F238E27FC236}">
+                <a16:creationId xmlns:a16="http://schemas.microsoft.com/office/drawing/2014/main" id="{662C3DC7-3B7E-C19D-C78E-A01D985E7F9D}"/>
+              </a:ext>
+            </a:extLst>
+          </p:cNvPr>
+          <p:cNvSpPr txBox="1"/>
+          <p:nvPr/>
+        </p:nvSpPr>
+        <p:spPr>
+          <a:xfrm>
+            <a:off x="9503352" y="1406015"/>
+            <a:ext cx="1777554" cy="461665"/>
+          </a:xfrm>
+          <a:prstGeom prst="rect">
+            <a:avLst/>
+          </a:prstGeom>
+          <a:noFill/>
+        </p:spPr>
+        <p:txBody>
+          <a:bodyPr wrap="square">
+            <a:spAutoFit/>
+          </a:bodyPr>
+          <a:lstStyle/>
+          <a:p>
+            <a:r>
+              <a:rPr lang="en-US" sz="1200" b="1" dirty="0"/>
+              <a:t>Control command to guide the drone landing</a:t>
+            </a:r>
+            <a:endParaRPr lang="en-SG" sz="1200" b="1" dirty="0"/>
+          </a:p>
+        </p:txBody>
+      </p:sp>
+      <p:pic>
+        <p:nvPicPr>
+          <p:cNvPr id="19" name="Picture 18">
+            <a:extLst>
+              <a:ext uri="{FF2B5EF4-FFF2-40B4-BE49-F238E27FC236}">
+                <a16:creationId xmlns:a16="http://schemas.microsoft.com/office/drawing/2014/main" id="{6D538108-1FB8-602A-6ECD-32A3FCEAB630}"/>
+              </a:ext>
+            </a:extLst>
+          </p:cNvPr>
+          <p:cNvPicPr>
+            <a:picLocks noChangeAspect="1"/>
+          </p:cNvPicPr>
+          <p:nvPr/>
+        </p:nvPicPr>
+        <p:blipFill>
+          <a:blip r:embed="rId6"/>
+          <a:stretch>
+            <a:fillRect/>
+          </a:stretch>
+        </p:blipFill>
+        <p:spPr>
+          <a:xfrm flipH="1" flipV="1">
+            <a:off x="2453136" y="1849442"/>
+            <a:ext cx="712684" cy="552495"/>
+          </a:xfrm>
+          <a:prstGeom prst="rect">
+            <a:avLst/>
+          </a:prstGeom>
+          <a:ln w="12700">
+            <a:solidFill>
+              <a:schemeClr val="tx1"/>
+            </a:solidFill>
+          </a:ln>
+        </p:spPr>
+      </p:pic>
+      <p:sp>
+        <p:nvSpPr>
+          <p:cNvPr id="20" name="Arrow: Right 19">
+            <a:extLst>
+              <a:ext uri="{FF2B5EF4-FFF2-40B4-BE49-F238E27FC236}">
+                <a16:creationId xmlns:a16="http://schemas.microsoft.com/office/drawing/2014/main" id="{3FD354AB-9253-FE1C-404B-5DA78BE2DB15}"/>
+              </a:ext>
+            </a:extLst>
+          </p:cNvPr>
+          <p:cNvSpPr/>
+          <p:nvPr/>
+        </p:nvSpPr>
+        <p:spPr>
+          <a:xfrm rot="18900542">
+            <a:off x="1724101" y="2414535"/>
+            <a:ext cx="481219" cy="162252"/>
+          </a:xfrm>
+          <a:prstGeom prst="rightArrow">
+            <a:avLst/>
+          </a:prstGeom>
+        </p:spPr>
+        <p:style>
+          <a:lnRef idx="2">
+            <a:schemeClr val="accent1">
+              <a:shade val="15000"/>
+            </a:schemeClr>
+          </a:lnRef>
+          <a:fillRef idx="1">
+            <a:schemeClr val="accent1"/>
+          </a:fillRef>
+          <a:effectRef idx="0">
+            <a:schemeClr val="accent1"/>
+          </a:effectRef>
+          <a:fontRef idx="minor">
+            <a:schemeClr val="lt1"/>
+          </a:fontRef>
+        </p:style>
+        <p:txBody>
+          <a:bodyPr rtlCol="0" anchor="ctr"/>
+          <a:lstStyle/>
+          <a:p>
+            <a:pPr algn="ctr"/>
+            <a:endParaRPr lang="en-SG"/>
+          </a:p>
+        </p:txBody>
+      </p:sp>
+      <p:sp>
+        <p:nvSpPr>
+          <p:cNvPr id="21" name="TextBox 20">
+            <a:extLst>
+              <a:ext uri="{FF2B5EF4-FFF2-40B4-BE49-F238E27FC236}">
+                <a16:creationId xmlns:a16="http://schemas.microsoft.com/office/drawing/2014/main" id="{5EC760DC-C7DE-D652-687C-DCB972DCCDB9}"/>
+              </a:ext>
+            </a:extLst>
+          </p:cNvPr>
+          <p:cNvSpPr txBox="1"/>
+          <p:nvPr/>
+        </p:nvSpPr>
+        <p:spPr>
+          <a:xfrm>
+            <a:off x="2343761" y="1357322"/>
+            <a:ext cx="1607704" cy="461665"/>
+          </a:xfrm>
+          <a:prstGeom prst="rect">
+            <a:avLst/>
+          </a:prstGeom>
+          <a:noFill/>
+        </p:spPr>
+        <p:txBody>
+          <a:bodyPr wrap="square">
+            <a:spAutoFit/>
+          </a:bodyPr>
+          <a:lstStyle/>
+          <a:p>
+            <a:r>
+              <a:rPr lang="en-US" sz="1200" b="1" dirty="0"/>
+              <a:t>HC-SR04 Ultrasonic Sensors </a:t>
+            </a:r>
+            <a:endParaRPr lang="en-SG" sz="1200" b="1" dirty="0"/>
+          </a:p>
+        </p:txBody>
+      </p:sp>
+      <p:pic>
+        <p:nvPicPr>
+          <p:cNvPr id="22" name="Picture 21">
+            <a:extLst>
+              <a:ext uri="{FF2B5EF4-FFF2-40B4-BE49-F238E27FC236}">
+                <a16:creationId xmlns:a16="http://schemas.microsoft.com/office/drawing/2014/main" id="{64020772-9537-3DD7-E538-23449F7AD14F}"/>
+              </a:ext>
+            </a:extLst>
+          </p:cNvPr>
+          <p:cNvPicPr>
+            <a:picLocks noChangeAspect="1"/>
+          </p:cNvPicPr>
+          <p:nvPr/>
+        </p:nvPicPr>
+        <p:blipFill>
+          <a:blip r:embed="rId7"/>
+          <a:stretch>
+            <a:fillRect/>
+          </a:stretch>
+        </p:blipFill>
+        <p:spPr>
+          <a:xfrm>
+            <a:off x="3461958" y="3631188"/>
+            <a:ext cx="489507" cy="542715"/>
+          </a:xfrm>
+          <a:prstGeom prst="rect">
+            <a:avLst/>
+          </a:prstGeom>
+          <a:ln w="9525">
+            <a:solidFill>
+              <a:schemeClr val="tx1"/>
+            </a:solidFill>
+          </a:ln>
+        </p:spPr>
+      </p:pic>
+      <p:sp>
+        <p:nvSpPr>
+          <p:cNvPr id="23" name="Arrow: Right 22">
+            <a:extLst>
+              <a:ext uri="{FF2B5EF4-FFF2-40B4-BE49-F238E27FC236}">
+                <a16:creationId xmlns:a16="http://schemas.microsoft.com/office/drawing/2014/main" id="{5C0BA40A-1FCA-8DAC-4809-1731B561D9AC}"/>
+              </a:ext>
+            </a:extLst>
+          </p:cNvPr>
+          <p:cNvSpPr/>
+          <p:nvPr/>
+        </p:nvSpPr>
+        <p:spPr>
+          <a:xfrm rot="2968346">
+            <a:off x="4787974" y="2752956"/>
+            <a:ext cx="987995" cy="139723"/>
+          </a:xfrm>
+          <a:prstGeom prst="rightArrow">
+            <a:avLst/>
+          </a:prstGeom>
+          <a:solidFill>
+            <a:srgbClr val="FF0000"/>
+          </a:solidFill>
+        </p:spPr>
+        <p:style>
+          <a:lnRef idx="2">
+            <a:schemeClr val="accent1">
+              <a:shade val="15000"/>
+            </a:schemeClr>
+          </a:lnRef>
+          <a:fillRef idx="1">
+            <a:schemeClr val="accent1"/>
+          </a:fillRef>
+          <a:effectRef idx="0">
+            <a:schemeClr val="accent1"/>
+          </a:effectRef>
+          <a:fontRef idx="minor">
+            <a:schemeClr val="lt1"/>
+          </a:fontRef>
+        </p:style>
+        <p:txBody>
+          <a:bodyPr rtlCol="0" anchor="ctr"/>
+          <a:lstStyle/>
+          <a:p>
+            <a:pPr algn="ctr"/>
+            <a:endParaRPr lang="en-SG" dirty="0"/>
+          </a:p>
+        </p:txBody>
+      </p:sp>
+      <p:pic>
+        <p:nvPicPr>
+          <p:cNvPr id="24" name="Picture 23">
+            <a:extLst>
+              <a:ext uri="{FF2B5EF4-FFF2-40B4-BE49-F238E27FC236}">
+                <a16:creationId xmlns:a16="http://schemas.microsoft.com/office/drawing/2014/main" id="{B417D21C-8C25-CEB8-6BA1-E6EFB5756641}"/>
+              </a:ext>
+            </a:extLst>
+          </p:cNvPr>
+          <p:cNvPicPr>
+            <a:picLocks noChangeAspect="1"/>
+          </p:cNvPicPr>
+          <p:nvPr/>
+        </p:nvPicPr>
+        <p:blipFill>
+          <a:blip r:embed="rId2">
+            <a:duotone>
+              <a:prstClr val="black"/>
+              <a:srgbClr val="FF0000">
+                <a:tint val="45000"/>
+                <a:satMod val="400000"/>
+              </a:srgbClr>
+            </a:duotone>
+          </a:blip>
+          <a:stretch>
+            <a:fillRect/>
+          </a:stretch>
+        </p:blipFill>
+        <p:spPr>
+          <a:xfrm>
+            <a:off x="5735283" y="3308485"/>
+            <a:ext cx="1306292" cy="865418"/>
+          </a:xfrm>
+          <a:prstGeom prst="rect">
+            <a:avLst/>
+          </a:prstGeom>
+          <a:ln w="9525">
+            <a:solidFill>
+              <a:schemeClr val="tx1"/>
+            </a:solidFill>
+          </a:ln>
+        </p:spPr>
+      </p:pic>
+      <p:sp>
+        <p:nvSpPr>
+          <p:cNvPr id="25" name="TextBox 24">
+            <a:extLst>
+              <a:ext uri="{FF2B5EF4-FFF2-40B4-BE49-F238E27FC236}">
+                <a16:creationId xmlns:a16="http://schemas.microsoft.com/office/drawing/2014/main" id="{62E06569-2A27-A0E8-1285-888910E8E743}"/>
+              </a:ext>
+            </a:extLst>
+          </p:cNvPr>
+          <p:cNvSpPr txBox="1"/>
+          <p:nvPr/>
+        </p:nvSpPr>
+        <p:spPr>
+          <a:xfrm>
+            <a:off x="5724927" y="2884994"/>
+            <a:ext cx="1418832" cy="461665"/>
+          </a:xfrm>
+          <a:prstGeom prst="rect">
+            <a:avLst/>
+          </a:prstGeom>
+          <a:noFill/>
+        </p:spPr>
+        <p:txBody>
+          <a:bodyPr wrap="square">
+            <a:spAutoFit/>
+          </a:bodyPr>
+          <a:lstStyle/>
+          <a:p>
+            <a:r>
+              <a:rPr lang="en-US" sz="1200" b="1" dirty="0">
+                <a:solidFill>
+                  <a:srgbClr val="FF0000"/>
+                </a:solidFill>
+              </a:rPr>
+              <a:t>Fake ground contour matrix  </a:t>
+            </a:r>
+            <a:endParaRPr lang="en-SG" sz="1200" b="1" dirty="0">
+              <a:solidFill>
+                <a:srgbClr val="FF0000"/>
+              </a:solidFill>
+            </a:endParaRPr>
+          </a:p>
+        </p:txBody>
+      </p:sp>
+      <p:sp>
+        <p:nvSpPr>
+          <p:cNvPr id="26" name="Arrow: Right 25">
+            <a:extLst>
+              <a:ext uri="{FF2B5EF4-FFF2-40B4-BE49-F238E27FC236}">
+                <a16:creationId xmlns:a16="http://schemas.microsoft.com/office/drawing/2014/main" id="{6D962475-6A08-D756-F7FB-095F9EB09984}"/>
+              </a:ext>
+            </a:extLst>
+          </p:cNvPr>
+          <p:cNvSpPr/>
+          <p:nvPr/>
+        </p:nvSpPr>
+        <p:spPr>
+          <a:xfrm rot="18893227">
+            <a:off x="6985926" y="2785843"/>
+            <a:ext cx="987995" cy="139723"/>
+          </a:xfrm>
+          <a:prstGeom prst="rightArrow">
+            <a:avLst/>
+          </a:prstGeom>
+          <a:solidFill>
+            <a:srgbClr val="FF0000"/>
+          </a:solidFill>
+        </p:spPr>
+        <p:style>
+          <a:lnRef idx="2">
+            <a:schemeClr val="accent1">
+              <a:shade val="15000"/>
+            </a:schemeClr>
+          </a:lnRef>
+          <a:fillRef idx="1">
+            <a:schemeClr val="accent1"/>
+          </a:fillRef>
+          <a:effectRef idx="0">
+            <a:schemeClr val="accent1"/>
+          </a:effectRef>
+          <a:fontRef idx="minor">
+            <a:schemeClr val="lt1"/>
+          </a:fontRef>
+        </p:style>
+        <p:txBody>
+          <a:bodyPr rtlCol="0" anchor="ctr"/>
+          <a:lstStyle/>
+          <a:p>
+            <a:pPr algn="ctr"/>
+            <a:endParaRPr lang="en-SG" dirty="0"/>
+          </a:p>
+        </p:txBody>
+      </p:sp>
+      <p:sp>
+        <p:nvSpPr>
+          <p:cNvPr id="27" name="Arrow: Right 26">
+            <a:extLst>
+              <a:ext uri="{FF2B5EF4-FFF2-40B4-BE49-F238E27FC236}">
+                <a16:creationId xmlns:a16="http://schemas.microsoft.com/office/drawing/2014/main" id="{2961121B-FDE0-72B7-F371-32396AF586BA}"/>
+              </a:ext>
+            </a:extLst>
+          </p:cNvPr>
+          <p:cNvSpPr/>
+          <p:nvPr/>
+        </p:nvSpPr>
+        <p:spPr>
+          <a:xfrm rot="3074843">
+            <a:off x="8738793" y="2785842"/>
+            <a:ext cx="987995" cy="139723"/>
+          </a:xfrm>
+          <a:prstGeom prst="rightArrow">
+            <a:avLst/>
+          </a:prstGeom>
+          <a:solidFill>
+            <a:srgbClr val="FF0000"/>
+          </a:solidFill>
+        </p:spPr>
+        <p:style>
+          <a:lnRef idx="2">
+            <a:schemeClr val="accent1">
+              <a:shade val="15000"/>
+            </a:schemeClr>
+          </a:lnRef>
+          <a:fillRef idx="1">
+            <a:schemeClr val="accent1"/>
+          </a:fillRef>
+          <a:effectRef idx="0">
+            <a:schemeClr val="accent1"/>
+          </a:effectRef>
+          <a:fontRef idx="minor">
+            <a:schemeClr val="lt1"/>
+          </a:fontRef>
+        </p:style>
+        <p:txBody>
+          <a:bodyPr rtlCol="0" anchor="ctr"/>
+          <a:lstStyle/>
+          <a:p>
+            <a:pPr algn="ctr"/>
+            <a:endParaRPr lang="en-SG" dirty="0"/>
+          </a:p>
+        </p:txBody>
+      </p:sp>
+      <p:pic>
+        <p:nvPicPr>
+          <p:cNvPr id="29" name="Picture 28">
+            <a:extLst>
+              <a:ext uri="{FF2B5EF4-FFF2-40B4-BE49-F238E27FC236}">
+                <a16:creationId xmlns:a16="http://schemas.microsoft.com/office/drawing/2014/main" id="{D0098785-A1D7-AB68-BF57-AA27A0D81DF9}"/>
+              </a:ext>
+            </a:extLst>
+          </p:cNvPr>
+          <p:cNvPicPr>
+            <a:picLocks noChangeAspect="1"/>
+          </p:cNvPicPr>
+          <p:nvPr/>
+        </p:nvPicPr>
+        <p:blipFill>
+          <a:blip r:embed="rId8"/>
+          <a:stretch>
+            <a:fillRect/>
+          </a:stretch>
+        </p:blipFill>
+        <p:spPr>
+          <a:xfrm>
+            <a:off x="9578932" y="3191601"/>
+            <a:ext cx="1306292" cy="1157002"/>
+          </a:xfrm>
+          <a:prstGeom prst="rect">
+            <a:avLst/>
+          </a:prstGeom>
+          <a:ln w="9525">
+            <a:solidFill>
+              <a:schemeClr val="tx1"/>
+            </a:solidFill>
+          </a:ln>
+        </p:spPr>
+      </p:pic>
+      <p:sp>
+        <p:nvSpPr>
+          <p:cNvPr id="30" name="TextBox 29">
+            <a:extLst>
+              <a:ext uri="{FF2B5EF4-FFF2-40B4-BE49-F238E27FC236}">
+                <a16:creationId xmlns:a16="http://schemas.microsoft.com/office/drawing/2014/main" id="{C9695023-DBDC-143F-606B-1D9C73A8297A}"/>
+              </a:ext>
+            </a:extLst>
+          </p:cNvPr>
+          <p:cNvSpPr txBox="1"/>
+          <p:nvPr/>
+        </p:nvSpPr>
+        <p:spPr>
+          <a:xfrm>
+            <a:off x="9553375" y="2729936"/>
+            <a:ext cx="1777554" cy="461665"/>
+          </a:xfrm>
+          <a:prstGeom prst="rect">
+            <a:avLst/>
+          </a:prstGeom>
+          <a:noFill/>
+        </p:spPr>
+        <p:txBody>
+          <a:bodyPr wrap="square">
+            <a:spAutoFit/>
+          </a:bodyPr>
+          <a:lstStyle/>
+          <a:p>
+            <a:r>
+              <a:rPr lang="en-US" sz="1200" b="1" dirty="0">
+                <a:solidFill>
+                  <a:srgbClr val="FF0000"/>
+                </a:solidFill>
+              </a:rPr>
+              <a:t>Incorrect command caused drone crash</a:t>
+            </a:r>
+            <a:endParaRPr lang="en-SG" sz="1200" b="1" dirty="0">
+              <a:solidFill>
+                <a:srgbClr val="FF0000"/>
+              </a:solidFill>
+            </a:endParaRPr>
+          </a:p>
+        </p:txBody>
+      </p:sp>
+      <p:pic>
+        <p:nvPicPr>
+          <p:cNvPr id="33" name="Picture 32">
+            <a:extLst>
+              <a:ext uri="{FF2B5EF4-FFF2-40B4-BE49-F238E27FC236}">
+                <a16:creationId xmlns:a16="http://schemas.microsoft.com/office/drawing/2014/main" id="{23BC0430-64FE-54DF-0508-4C7F2473E3CE}"/>
+              </a:ext>
+            </a:extLst>
+          </p:cNvPr>
+          <p:cNvPicPr>
+            <a:picLocks noChangeAspect="1"/>
+          </p:cNvPicPr>
+          <p:nvPr/>
+        </p:nvPicPr>
+        <p:blipFill>
+          <a:blip r:embed="rId9"/>
+          <a:stretch>
+            <a:fillRect/>
+          </a:stretch>
+        </p:blipFill>
+        <p:spPr>
+          <a:xfrm>
+            <a:off x="4308240" y="3045109"/>
+            <a:ext cx="489507" cy="569523"/>
+          </a:xfrm>
+          <a:prstGeom prst="rect">
+            <a:avLst/>
+          </a:prstGeom>
+          <a:ln w="9525">
+            <a:solidFill>
+              <a:schemeClr val="tx1"/>
+            </a:solidFill>
+          </a:ln>
+        </p:spPr>
+      </p:pic>
+      <p:cxnSp>
+        <p:nvCxnSpPr>
+          <p:cNvPr id="35" name="Connector: Elbow 34">
+            <a:extLst>
+              <a:ext uri="{FF2B5EF4-FFF2-40B4-BE49-F238E27FC236}">
+                <a16:creationId xmlns:a16="http://schemas.microsoft.com/office/drawing/2014/main" id="{42E1482A-5C82-6CA3-00EC-59D933C2859E}"/>
+              </a:ext>
+            </a:extLst>
+          </p:cNvPr>
+          <p:cNvCxnSpPr>
+            <a:stCxn id="22" idx="3"/>
+            <a:endCxn id="33" idx="2"/>
+          </p:cNvCxnSpPr>
+          <p:nvPr/>
+        </p:nvCxnSpPr>
+        <p:spPr>
+          <a:xfrm flipV="1">
+            <a:off x="3951465" y="3614632"/>
+            <a:ext cx="601529" cy="287914"/>
+          </a:xfrm>
+          <a:prstGeom prst="bentConnector2">
+            <a:avLst/>
+          </a:prstGeom>
+          <a:ln w="28575">
+            <a:solidFill>
+              <a:srgbClr val="FF0000"/>
+            </a:solidFill>
+            <a:tailEnd type="triangle"/>
+          </a:ln>
+        </p:spPr>
+        <p:style>
+          <a:lnRef idx="1">
+            <a:schemeClr val="accent1"/>
+          </a:lnRef>
+          <a:fillRef idx="0">
+            <a:schemeClr val="accent1"/>
+          </a:fillRef>
+          <a:effectRef idx="0">
+            <a:schemeClr val="accent1"/>
+          </a:effectRef>
+          <a:fontRef idx="minor">
+            <a:schemeClr val="tx1"/>
+          </a:fontRef>
+        </p:style>
+      </p:cxnSp>
+      <p:pic>
+        <p:nvPicPr>
+          <p:cNvPr id="31" name="Picture 30">
+            <a:extLst>
+              <a:ext uri="{FF2B5EF4-FFF2-40B4-BE49-F238E27FC236}">
+                <a16:creationId xmlns:a16="http://schemas.microsoft.com/office/drawing/2014/main" id="{0772F1F4-9662-7853-838A-5D0ECB3C7EF4}"/>
+              </a:ext>
+            </a:extLst>
+          </p:cNvPr>
+          <p:cNvPicPr>
+            <a:picLocks noChangeAspect="1"/>
+          </p:cNvPicPr>
+          <p:nvPr/>
+        </p:nvPicPr>
+        <p:blipFill>
+          <a:blip r:embed="rId10"/>
+          <a:stretch>
+            <a:fillRect/>
+          </a:stretch>
+        </p:blipFill>
+        <p:spPr>
+          <a:xfrm>
+            <a:off x="4101437" y="3758589"/>
+            <a:ext cx="339408" cy="259794"/>
+          </a:xfrm>
+          <a:prstGeom prst="rect">
+            <a:avLst/>
+          </a:prstGeom>
+        </p:spPr>
+      </p:pic>
+      <p:sp>
+        <p:nvSpPr>
+          <p:cNvPr id="36" name="TextBox 35">
+            <a:extLst>
+              <a:ext uri="{FF2B5EF4-FFF2-40B4-BE49-F238E27FC236}">
+                <a16:creationId xmlns:a16="http://schemas.microsoft.com/office/drawing/2014/main" id="{B724CEF9-D21D-AA10-709A-0139F2CF0CB8}"/>
+              </a:ext>
+            </a:extLst>
+          </p:cNvPr>
+          <p:cNvSpPr txBox="1"/>
+          <p:nvPr/>
+        </p:nvSpPr>
+        <p:spPr>
+          <a:xfrm>
+            <a:off x="2808838" y="3338389"/>
+            <a:ext cx="1144339" cy="461665"/>
+          </a:xfrm>
+          <a:prstGeom prst="rect">
+            <a:avLst/>
+          </a:prstGeom>
+          <a:noFill/>
+        </p:spPr>
+        <p:txBody>
+          <a:bodyPr wrap="square">
+            <a:spAutoFit/>
+          </a:bodyPr>
+          <a:lstStyle/>
+          <a:p>
+            <a:r>
+              <a:rPr lang="en-US" sz="1200" b="1" dirty="0">
+                <a:solidFill>
+                  <a:srgbClr val="FF0000"/>
+                </a:solidFill>
+              </a:rPr>
+              <a:t>Red team attacker</a:t>
+            </a:r>
+            <a:endParaRPr lang="en-SG" sz="1200" b="1" dirty="0">
+              <a:solidFill>
+                <a:srgbClr val="FF0000"/>
+              </a:solidFill>
+            </a:endParaRPr>
+          </a:p>
+        </p:txBody>
+      </p:sp>
+      <p:sp>
+        <p:nvSpPr>
+          <p:cNvPr id="37" name="TextBox 36">
+            <a:extLst>
+              <a:ext uri="{FF2B5EF4-FFF2-40B4-BE49-F238E27FC236}">
+                <a16:creationId xmlns:a16="http://schemas.microsoft.com/office/drawing/2014/main" id="{5E4BFA64-5798-AC11-19D1-5CC31AC61780}"/>
+              </a:ext>
+            </a:extLst>
+          </p:cNvPr>
+          <p:cNvSpPr txBox="1"/>
+          <p:nvPr/>
+        </p:nvSpPr>
+        <p:spPr>
+          <a:xfrm>
+            <a:off x="4440972" y="3872469"/>
+            <a:ext cx="1144339" cy="461665"/>
+          </a:xfrm>
+          <a:prstGeom prst="rect">
+            <a:avLst/>
+          </a:prstGeom>
+          <a:noFill/>
+        </p:spPr>
+        <p:txBody>
+          <a:bodyPr wrap="square">
+            <a:spAutoFit/>
+          </a:bodyPr>
+          <a:lstStyle/>
+          <a:p>
+            <a:r>
+              <a:rPr lang="en-US" sz="1200" b="1" dirty="0">
+                <a:solidFill>
+                  <a:srgbClr val="FF0000"/>
+                </a:solidFill>
+              </a:rPr>
+              <a:t>Fake firmware update email</a:t>
+            </a:r>
+            <a:endParaRPr lang="en-SG" sz="1200" b="1" dirty="0">
+              <a:solidFill>
+                <a:srgbClr val="FF0000"/>
+              </a:solidFill>
+            </a:endParaRPr>
+          </a:p>
+        </p:txBody>
+      </p:sp>
+      <p:cxnSp>
+        <p:nvCxnSpPr>
+          <p:cNvPr id="39" name="Straight Arrow Connector 38">
+            <a:extLst>
+              <a:ext uri="{FF2B5EF4-FFF2-40B4-BE49-F238E27FC236}">
+                <a16:creationId xmlns:a16="http://schemas.microsoft.com/office/drawing/2014/main" id="{3D6156B9-622E-4AEE-9EC1-FA2E8B0D0000}"/>
+              </a:ext>
+            </a:extLst>
+          </p:cNvPr>
+          <p:cNvCxnSpPr>
+            <a:stCxn id="33" idx="0"/>
+            <a:endCxn id="8" idx="2"/>
+          </p:cNvCxnSpPr>
+          <p:nvPr/>
+        </p:nvCxnSpPr>
+        <p:spPr>
+          <a:xfrm flipV="1">
+            <a:off x="4552994" y="2362213"/>
+            <a:ext cx="5208" cy="682896"/>
+          </a:xfrm>
+          <a:prstGeom prst="straightConnector1">
+            <a:avLst/>
+          </a:prstGeom>
+          <a:ln w="19050">
+            <a:solidFill>
+              <a:srgbClr val="FF0000"/>
+            </a:solidFill>
+            <a:tailEnd type="triangle"/>
+          </a:ln>
+        </p:spPr>
+        <p:style>
+          <a:lnRef idx="1">
+            <a:schemeClr val="accent1"/>
+          </a:lnRef>
+          <a:fillRef idx="0">
+            <a:schemeClr val="accent1"/>
+          </a:fillRef>
+          <a:effectRef idx="0">
+            <a:schemeClr val="accent1"/>
+          </a:effectRef>
+          <a:fontRef idx="minor">
+            <a:schemeClr val="tx1"/>
+          </a:fontRef>
+        </p:style>
+      </p:cxnSp>
+      <p:pic>
+        <p:nvPicPr>
+          <p:cNvPr id="42" name="Picture 41">
+            <a:extLst>
+              <a:ext uri="{FF2B5EF4-FFF2-40B4-BE49-F238E27FC236}">
+                <a16:creationId xmlns:a16="http://schemas.microsoft.com/office/drawing/2014/main" id="{8A7A85B8-5A8B-C76D-BA22-9503FDFB4A17}"/>
+              </a:ext>
+            </a:extLst>
+          </p:cNvPr>
+          <p:cNvPicPr>
+            <a:picLocks noChangeAspect="1"/>
+          </p:cNvPicPr>
+          <p:nvPr/>
+        </p:nvPicPr>
+        <p:blipFill>
+          <a:blip r:embed="rId11"/>
+          <a:stretch>
+            <a:fillRect/>
+          </a:stretch>
+        </p:blipFill>
+        <p:spPr>
+          <a:xfrm>
+            <a:off x="4197220" y="2608555"/>
+            <a:ext cx="417996" cy="292597"/>
+          </a:xfrm>
+          <a:prstGeom prst="rect">
+            <a:avLst/>
+          </a:prstGeom>
+        </p:spPr>
+      </p:pic>
+      <p:sp>
+        <p:nvSpPr>
+          <p:cNvPr id="43" name="TextBox 42">
+            <a:extLst>
+              <a:ext uri="{FF2B5EF4-FFF2-40B4-BE49-F238E27FC236}">
+                <a16:creationId xmlns:a16="http://schemas.microsoft.com/office/drawing/2014/main" id="{AC567204-877F-0C1F-AD3E-FF305EFD8773}"/>
+              </a:ext>
+            </a:extLst>
+          </p:cNvPr>
+          <p:cNvSpPr txBox="1"/>
+          <p:nvPr/>
+        </p:nvSpPr>
+        <p:spPr>
+          <a:xfrm>
+            <a:off x="3461958" y="2495404"/>
+            <a:ext cx="1144339" cy="461665"/>
+          </a:xfrm>
+          <a:prstGeom prst="rect">
+            <a:avLst/>
+          </a:prstGeom>
+          <a:noFill/>
+        </p:spPr>
+        <p:txBody>
+          <a:bodyPr wrap="square">
+            <a:spAutoFit/>
+          </a:bodyPr>
+          <a:lstStyle/>
+          <a:p>
+            <a:r>
+              <a:rPr lang="en-US" sz="1200" b="1" dirty="0">
+                <a:solidFill>
+                  <a:srgbClr val="FF0000"/>
+                </a:solidFill>
+              </a:rPr>
+              <a:t>Malicious Firmware</a:t>
+            </a:r>
+            <a:endParaRPr lang="en-SG" sz="1200" b="1" dirty="0">
+              <a:solidFill>
+                <a:srgbClr val="FF0000"/>
+              </a:solidFill>
+            </a:endParaRPr>
+          </a:p>
+        </p:txBody>
+      </p:sp>
+      <p:sp>
+        <p:nvSpPr>
+          <p:cNvPr id="44" name="TextBox 43">
+            <a:extLst>
+              <a:ext uri="{FF2B5EF4-FFF2-40B4-BE49-F238E27FC236}">
+                <a16:creationId xmlns:a16="http://schemas.microsoft.com/office/drawing/2014/main" id="{3AF9CD06-D774-F14B-FBA4-4F0C5831DA66}"/>
+              </a:ext>
+            </a:extLst>
+          </p:cNvPr>
+          <p:cNvSpPr txBox="1"/>
+          <p:nvPr/>
+        </p:nvSpPr>
+        <p:spPr>
+          <a:xfrm>
+            <a:off x="4745112" y="3014392"/>
+            <a:ext cx="1418832" cy="646331"/>
+          </a:xfrm>
+          <a:prstGeom prst="rect">
+            <a:avLst/>
+          </a:prstGeom>
+          <a:noFill/>
+        </p:spPr>
+        <p:txBody>
+          <a:bodyPr wrap="square">
+            <a:spAutoFit/>
+          </a:bodyPr>
+          <a:lstStyle/>
+          <a:p>
+            <a:r>
+              <a:rPr lang="en-US" sz="1200" b="1" dirty="0"/>
+              <a:t>Drone maintenance engineer </a:t>
+            </a:r>
+            <a:endParaRPr lang="en-SG" sz="1200" b="1" dirty="0"/>
+          </a:p>
+        </p:txBody>
+      </p:sp>
+    </p:spTree>
+    <p:extLst>
+      <p:ext uri="{BB962C8B-B14F-4D97-AF65-F5344CB8AC3E}">
+        <p14:creationId xmlns:p14="http://schemas.microsoft.com/office/powerpoint/2010/main" val="408409170"/>
       </p:ext>
     </p:extLst>
   </p:cSld>

</xml_diff>

<commit_message>
Added the sensor manual and update the system design section of the read me file.
</commit_message>
<xml_diff>
--- a/doc/designDoc.pptx
+++ b/doc/designDoc.pptx
@@ -5,7 +5,7 @@
     <p:sldMasterId id="2147483648" r:id="rId1"/>
   </p:sldMasterIdLst>
   <p:notesMasterIdLst>
-    <p:notesMasterId r:id="rId8"/>
+    <p:notesMasterId r:id="rId10"/>
   </p:notesMasterIdLst>
   <p:sldIdLst>
     <p:sldId id="256" r:id="rId2"/>
@@ -14,6 +14,8 @@
     <p:sldId id="259" r:id="rId5"/>
     <p:sldId id="260" r:id="rId6"/>
     <p:sldId id="261" r:id="rId7"/>
+    <p:sldId id="262" r:id="rId8"/>
+    <p:sldId id="263" r:id="rId9"/>
   </p:sldIdLst>
   <p:sldSz cx="12192000" cy="6858000"/>
   <p:notesSz cx="6858000" cy="9144000"/>
@@ -202,7 +204,7 @@
           <a:p>
             <a:fld id="{9E1B34BE-8C20-40BD-B37D-1D72CA947284}" type="datetimeFigureOut">
               <a:rPr lang="en-SG" smtClean="0"/>
-              <a:t>2/2/2024</a:t>
+              <a:t>3/2/2024</a:t>
             </a:fld>
             <a:endParaRPr lang="en-SG"/>
           </a:p>
@@ -703,7 +705,7 @@
           <a:p>
             <a:fld id="{DBE21509-CCC6-462B-BAD1-586C6842538A}" type="datetimeFigureOut">
               <a:rPr lang="en-SG" smtClean="0"/>
-              <a:t>2/2/2024</a:t>
+              <a:t>3/2/2024</a:t>
             </a:fld>
             <a:endParaRPr lang="en-SG"/>
           </a:p>
@@ -903,7 +905,7 @@
           <a:p>
             <a:fld id="{DBE21509-CCC6-462B-BAD1-586C6842538A}" type="datetimeFigureOut">
               <a:rPr lang="en-SG" smtClean="0"/>
-              <a:t>2/2/2024</a:t>
+              <a:t>3/2/2024</a:t>
             </a:fld>
             <a:endParaRPr lang="en-SG"/>
           </a:p>
@@ -1113,7 +1115,7 @@
           <a:p>
             <a:fld id="{DBE21509-CCC6-462B-BAD1-586C6842538A}" type="datetimeFigureOut">
               <a:rPr lang="en-SG" smtClean="0"/>
-              <a:t>2/2/2024</a:t>
+              <a:t>3/2/2024</a:t>
             </a:fld>
             <a:endParaRPr lang="en-SG"/>
           </a:p>
@@ -1313,7 +1315,7 @@
           <a:p>
             <a:fld id="{DBE21509-CCC6-462B-BAD1-586C6842538A}" type="datetimeFigureOut">
               <a:rPr lang="en-SG" smtClean="0"/>
-              <a:t>2/2/2024</a:t>
+              <a:t>3/2/2024</a:t>
             </a:fld>
             <a:endParaRPr lang="en-SG"/>
           </a:p>
@@ -1589,7 +1591,7 @@
           <a:p>
             <a:fld id="{DBE21509-CCC6-462B-BAD1-586C6842538A}" type="datetimeFigureOut">
               <a:rPr lang="en-SG" smtClean="0"/>
-              <a:t>2/2/2024</a:t>
+              <a:t>3/2/2024</a:t>
             </a:fld>
             <a:endParaRPr lang="en-SG"/>
           </a:p>
@@ -1857,7 +1859,7 @@
           <a:p>
             <a:fld id="{DBE21509-CCC6-462B-BAD1-586C6842538A}" type="datetimeFigureOut">
               <a:rPr lang="en-SG" smtClean="0"/>
-              <a:t>2/2/2024</a:t>
+              <a:t>3/2/2024</a:t>
             </a:fld>
             <a:endParaRPr lang="en-SG"/>
           </a:p>
@@ -2272,7 +2274,7 @@
           <a:p>
             <a:fld id="{DBE21509-CCC6-462B-BAD1-586C6842538A}" type="datetimeFigureOut">
               <a:rPr lang="en-SG" smtClean="0"/>
-              <a:t>2/2/2024</a:t>
+              <a:t>3/2/2024</a:t>
             </a:fld>
             <a:endParaRPr lang="en-SG"/>
           </a:p>
@@ -2414,7 +2416,7 @@
           <a:p>
             <a:fld id="{DBE21509-CCC6-462B-BAD1-586C6842538A}" type="datetimeFigureOut">
               <a:rPr lang="en-SG" smtClean="0"/>
-              <a:t>2/2/2024</a:t>
+              <a:t>3/2/2024</a:t>
             </a:fld>
             <a:endParaRPr lang="en-SG"/>
           </a:p>
@@ -2527,7 +2529,7 @@
           <a:p>
             <a:fld id="{DBE21509-CCC6-462B-BAD1-586C6842538A}" type="datetimeFigureOut">
               <a:rPr lang="en-SG" smtClean="0"/>
-              <a:t>2/2/2024</a:t>
+              <a:t>3/2/2024</a:t>
             </a:fld>
             <a:endParaRPr lang="en-SG"/>
           </a:p>
@@ -2840,7 +2842,7 @@
           <a:p>
             <a:fld id="{DBE21509-CCC6-462B-BAD1-586C6842538A}" type="datetimeFigureOut">
               <a:rPr lang="en-SG" smtClean="0"/>
-              <a:t>2/2/2024</a:t>
+              <a:t>3/2/2024</a:t>
             </a:fld>
             <a:endParaRPr lang="en-SG"/>
           </a:p>
@@ -3129,7 +3131,7 @@
           <a:p>
             <a:fld id="{DBE21509-CCC6-462B-BAD1-586C6842538A}" type="datetimeFigureOut">
               <a:rPr lang="en-SG" smtClean="0"/>
-              <a:t>2/2/2024</a:t>
+              <a:t>3/2/2024</a:t>
             </a:fld>
             <a:endParaRPr lang="en-SG"/>
           </a:p>
@@ -3372,7 +3374,7 @@
           <a:p>
             <a:fld id="{DBE21509-CCC6-462B-BAD1-586C6842538A}" type="datetimeFigureOut">
               <a:rPr lang="en-SG" smtClean="0"/>
-              <a:t>2/2/2024</a:t>
+              <a:t>3/2/2024</a:t>
             </a:fld>
             <a:endParaRPr lang="en-SG"/>
           </a:p>
@@ -11230,6 +11232,1991 @@
     <p:extLst>
       <p:ext uri="{BB962C8B-B14F-4D97-AF65-F5344CB8AC3E}">
         <p14:creationId xmlns:p14="http://schemas.microsoft.com/office/powerpoint/2010/main" val="408409170"/>
+      </p:ext>
+    </p:extLst>
+  </p:cSld>
+  <p:clrMapOvr>
+    <a:masterClrMapping/>
+  </p:clrMapOvr>
+</p:sld>
+</file>
+
+<file path=ppt/slides/slide7.xml><?xml version="1.0" encoding="utf-8"?>
+<p:sld xmlns:a="http://schemas.openxmlformats.org/drawingml/2006/main" xmlns:r="http://schemas.openxmlformats.org/officeDocument/2006/relationships" xmlns:p="http://schemas.openxmlformats.org/presentationml/2006/main">
+  <p:cSld>
+    <p:spTree>
+      <p:nvGrpSpPr>
+        <p:cNvPr id="1" name=""/>
+        <p:cNvGrpSpPr/>
+        <p:nvPr/>
+      </p:nvGrpSpPr>
+      <p:grpSpPr>
+        <a:xfrm>
+          <a:off x="0" y="0"/>
+          <a:ext cx="0" cy="0"/>
+          <a:chOff x="0" y="0"/>
+          <a:chExt cx="0" cy="0"/>
+        </a:xfrm>
+      </p:grpSpPr>
+      <p:pic>
+        <p:nvPicPr>
+          <p:cNvPr id="5" name="Picture 4" descr="A screenshot of a computer&#10;&#10;Description automatically generated">
+            <a:extLst>
+              <a:ext uri="{FF2B5EF4-FFF2-40B4-BE49-F238E27FC236}">
+                <a16:creationId xmlns:a16="http://schemas.microsoft.com/office/drawing/2014/main" id="{0F9669F2-CB73-B201-EA17-F50BD52B732A}"/>
+              </a:ext>
+            </a:extLst>
+          </p:cNvPr>
+          <p:cNvPicPr>
+            <a:picLocks noChangeAspect="1"/>
+          </p:cNvPicPr>
+          <p:nvPr/>
+        </p:nvPicPr>
+        <p:blipFill>
+          <a:blip r:embed="rId2">
+            <a:extLst>
+              <a:ext uri="{28A0092B-C50C-407E-A947-70E740481C1C}">
+                <a14:useLocalDpi xmlns:a14="http://schemas.microsoft.com/office/drawing/2010/main" val="0"/>
+              </a:ext>
+            </a:extLst>
+          </a:blip>
+          <a:stretch>
+            <a:fillRect/>
+          </a:stretch>
+        </p:blipFill>
+        <p:spPr>
+          <a:xfrm>
+            <a:off x="3143389" y="321058"/>
+            <a:ext cx="5076051" cy="6215883"/>
+          </a:xfrm>
+          <a:prstGeom prst="rect">
+            <a:avLst/>
+          </a:prstGeom>
+        </p:spPr>
+      </p:pic>
+      <p:sp>
+        <p:nvSpPr>
+          <p:cNvPr id="9" name="TextBox 8">
+            <a:extLst>
+              <a:ext uri="{FF2B5EF4-FFF2-40B4-BE49-F238E27FC236}">
+                <a16:creationId xmlns:a16="http://schemas.microsoft.com/office/drawing/2014/main" id="{313D2C8F-D9AF-3F27-B784-F3C0DCC48C8F}"/>
+              </a:ext>
+            </a:extLst>
+          </p:cNvPr>
+          <p:cNvSpPr txBox="1"/>
+          <p:nvPr/>
+        </p:nvSpPr>
+        <p:spPr>
+          <a:xfrm>
+            <a:off x="161925" y="342805"/>
+            <a:ext cx="2591435" cy="461665"/>
+          </a:xfrm>
+          <a:prstGeom prst="rect">
+            <a:avLst/>
+          </a:prstGeom>
+          <a:noFill/>
+        </p:spPr>
+        <p:txBody>
+          <a:bodyPr wrap="square">
+            <a:spAutoFit/>
+          </a:bodyPr>
+          <a:lstStyle/>
+          <a:p>
+            <a:r>
+              <a:rPr lang="en-SG" sz="1200" b="1" dirty="0"/>
+              <a:t>Drone selection button (if multiple drones are connected to the Wi-Fi AP)</a:t>
+            </a:r>
+          </a:p>
+        </p:txBody>
+      </p:sp>
+      <p:cxnSp>
+        <p:nvCxnSpPr>
+          <p:cNvPr id="11" name="Connector: Elbow 10">
+            <a:extLst>
+              <a:ext uri="{FF2B5EF4-FFF2-40B4-BE49-F238E27FC236}">
+                <a16:creationId xmlns:a16="http://schemas.microsoft.com/office/drawing/2014/main" id="{D859A401-B75C-8BC1-8A91-2240CBF0C74B}"/>
+              </a:ext>
+            </a:extLst>
+          </p:cNvPr>
+          <p:cNvCxnSpPr>
+            <a:cxnSpLocks/>
+            <a:stCxn id="9" idx="3"/>
+          </p:cNvCxnSpPr>
+          <p:nvPr/>
+        </p:nvCxnSpPr>
+        <p:spPr>
+          <a:xfrm>
+            <a:off x="2753360" y="573638"/>
+            <a:ext cx="666115" cy="230832"/>
+          </a:xfrm>
+          <a:prstGeom prst="bentConnector3">
+            <a:avLst/>
+          </a:prstGeom>
+          <a:ln w="19050">
+            <a:solidFill>
+              <a:srgbClr val="FF0000"/>
+            </a:solidFill>
+            <a:tailEnd type="triangle"/>
+          </a:ln>
+        </p:spPr>
+        <p:style>
+          <a:lnRef idx="1">
+            <a:schemeClr val="accent1"/>
+          </a:lnRef>
+          <a:fillRef idx="0">
+            <a:schemeClr val="accent1"/>
+          </a:fillRef>
+          <a:effectRef idx="0">
+            <a:schemeClr val="accent1"/>
+          </a:effectRef>
+          <a:fontRef idx="minor">
+            <a:schemeClr val="tx1"/>
+          </a:fontRef>
+        </p:style>
+      </p:cxnSp>
+      <p:sp>
+        <p:nvSpPr>
+          <p:cNvPr id="15" name="TextBox 14">
+            <a:extLst>
+              <a:ext uri="{FF2B5EF4-FFF2-40B4-BE49-F238E27FC236}">
+                <a16:creationId xmlns:a16="http://schemas.microsoft.com/office/drawing/2014/main" id="{FD0E4B04-F112-C348-E465-BA7E792130EF}"/>
+              </a:ext>
+            </a:extLst>
+          </p:cNvPr>
+          <p:cNvSpPr txBox="1"/>
+          <p:nvPr/>
+        </p:nvSpPr>
+        <p:spPr>
+          <a:xfrm>
+            <a:off x="238125" y="896803"/>
+            <a:ext cx="2345939" cy="276999"/>
+          </a:xfrm>
+          <a:prstGeom prst="rect">
+            <a:avLst/>
+          </a:prstGeom>
+          <a:noFill/>
+        </p:spPr>
+        <p:txBody>
+          <a:bodyPr wrap="square">
+            <a:spAutoFit/>
+          </a:bodyPr>
+          <a:lstStyle/>
+          <a:p>
+            <a:r>
+              <a:rPr lang="en-SG" sz="1200" b="1" dirty="0"/>
+              <a:t>Drone connection state indicator </a:t>
+            </a:r>
+          </a:p>
+        </p:txBody>
+      </p:sp>
+      <p:cxnSp>
+        <p:nvCxnSpPr>
+          <p:cNvPr id="16" name="Connector: Elbow 15">
+            <a:extLst>
+              <a:ext uri="{FF2B5EF4-FFF2-40B4-BE49-F238E27FC236}">
+                <a16:creationId xmlns:a16="http://schemas.microsoft.com/office/drawing/2014/main" id="{C851CE04-BECC-381C-4CE4-16F6080C825F}"/>
+              </a:ext>
+            </a:extLst>
+          </p:cNvPr>
+          <p:cNvCxnSpPr>
+            <a:cxnSpLocks/>
+            <a:stCxn id="15" idx="3"/>
+          </p:cNvCxnSpPr>
+          <p:nvPr/>
+        </p:nvCxnSpPr>
+        <p:spPr>
+          <a:xfrm flipV="1">
+            <a:off x="2584064" y="896803"/>
+            <a:ext cx="1702186" cy="138500"/>
+          </a:xfrm>
+          <a:prstGeom prst="bentConnector3">
+            <a:avLst>
+              <a:gd name="adj1" fmla="val 99802"/>
+            </a:avLst>
+          </a:prstGeom>
+          <a:ln w="19050">
+            <a:solidFill>
+              <a:srgbClr val="FF0000"/>
+            </a:solidFill>
+            <a:tailEnd type="triangle"/>
+          </a:ln>
+        </p:spPr>
+        <p:style>
+          <a:lnRef idx="1">
+            <a:schemeClr val="accent1"/>
+          </a:lnRef>
+          <a:fillRef idx="0">
+            <a:schemeClr val="accent1"/>
+          </a:fillRef>
+          <a:effectRef idx="0">
+            <a:schemeClr val="accent1"/>
+          </a:effectRef>
+          <a:fontRef idx="minor">
+            <a:schemeClr val="tx1"/>
+          </a:fontRef>
+        </p:style>
+      </p:cxnSp>
+      <p:sp>
+        <p:nvSpPr>
+          <p:cNvPr id="21" name="TextBox 20">
+            <a:extLst>
+              <a:ext uri="{FF2B5EF4-FFF2-40B4-BE49-F238E27FC236}">
+                <a16:creationId xmlns:a16="http://schemas.microsoft.com/office/drawing/2014/main" id="{B253C881-5B35-E7BE-EFB2-30375A4A3326}"/>
+              </a:ext>
+            </a:extLst>
+          </p:cNvPr>
+          <p:cNvSpPr txBox="1"/>
+          <p:nvPr/>
+        </p:nvSpPr>
+        <p:spPr>
+          <a:xfrm>
+            <a:off x="238123" y="1241715"/>
+            <a:ext cx="2066927" cy="276999"/>
+          </a:xfrm>
+          <a:prstGeom prst="rect">
+            <a:avLst/>
+          </a:prstGeom>
+          <a:noFill/>
+        </p:spPr>
+        <p:txBody>
+          <a:bodyPr wrap="square">
+            <a:spAutoFit/>
+          </a:bodyPr>
+          <a:lstStyle/>
+          <a:p>
+            <a:r>
+              <a:rPr lang="en-SG" sz="1200" b="1" dirty="0"/>
+              <a:t>Drone battery state indicator </a:t>
+            </a:r>
+          </a:p>
+        </p:txBody>
+      </p:sp>
+      <p:cxnSp>
+        <p:nvCxnSpPr>
+          <p:cNvPr id="22" name="Connector: Elbow 21">
+            <a:extLst>
+              <a:ext uri="{FF2B5EF4-FFF2-40B4-BE49-F238E27FC236}">
+                <a16:creationId xmlns:a16="http://schemas.microsoft.com/office/drawing/2014/main" id="{379B56C9-B0D9-C2C5-37C8-1366F67439B2}"/>
+              </a:ext>
+            </a:extLst>
+          </p:cNvPr>
+          <p:cNvCxnSpPr>
+            <a:cxnSpLocks/>
+            <a:stCxn id="21" idx="3"/>
+          </p:cNvCxnSpPr>
+          <p:nvPr/>
+        </p:nvCxnSpPr>
+        <p:spPr>
+          <a:xfrm flipV="1">
+            <a:off x="2305050" y="896803"/>
+            <a:ext cx="2800350" cy="483412"/>
+          </a:xfrm>
+          <a:prstGeom prst="bentConnector3">
+            <a:avLst>
+              <a:gd name="adj1" fmla="val 99660"/>
+            </a:avLst>
+          </a:prstGeom>
+          <a:ln w="19050">
+            <a:solidFill>
+              <a:srgbClr val="FF0000"/>
+            </a:solidFill>
+            <a:tailEnd type="triangle"/>
+          </a:ln>
+        </p:spPr>
+        <p:style>
+          <a:lnRef idx="1">
+            <a:schemeClr val="accent1"/>
+          </a:lnRef>
+          <a:fillRef idx="0">
+            <a:schemeClr val="accent1"/>
+          </a:fillRef>
+          <a:effectRef idx="0">
+            <a:schemeClr val="accent1"/>
+          </a:effectRef>
+          <a:fontRef idx="minor">
+            <a:schemeClr val="tx1"/>
+          </a:fontRef>
+        </p:style>
+      </p:cxnSp>
+      <p:sp>
+        <p:nvSpPr>
+          <p:cNvPr id="28" name="TextBox 27">
+            <a:extLst>
+              <a:ext uri="{FF2B5EF4-FFF2-40B4-BE49-F238E27FC236}">
+                <a16:creationId xmlns:a16="http://schemas.microsoft.com/office/drawing/2014/main" id="{8E51EA9F-FA53-6BE7-F3EE-8B7EABD03D77}"/>
+              </a:ext>
+            </a:extLst>
+          </p:cNvPr>
+          <p:cNvSpPr txBox="1"/>
+          <p:nvPr/>
+        </p:nvSpPr>
+        <p:spPr>
+          <a:xfrm>
+            <a:off x="8854965" y="342805"/>
+            <a:ext cx="2946510" cy="461665"/>
+          </a:xfrm>
+          <a:prstGeom prst="rect">
+            <a:avLst/>
+          </a:prstGeom>
+          <a:noFill/>
+        </p:spPr>
+        <p:txBody>
+          <a:bodyPr wrap="square">
+            <a:spAutoFit/>
+          </a:bodyPr>
+          <a:lstStyle/>
+          <a:p>
+            <a:r>
+              <a:rPr lang="en-SG" sz="1200" b="1" dirty="0"/>
+              <a:t>Ground contour generate unit connection state indicator </a:t>
+            </a:r>
+          </a:p>
+        </p:txBody>
+      </p:sp>
+      <p:cxnSp>
+        <p:nvCxnSpPr>
+          <p:cNvPr id="29" name="Connector: Elbow 28">
+            <a:extLst>
+              <a:ext uri="{FF2B5EF4-FFF2-40B4-BE49-F238E27FC236}">
+                <a16:creationId xmlns:a16="http://schemas.microsoft.com/office/drawing/2014/main" id="{8158036E-E76A-79FB-099B-4A73FE3AD0F1}"/>
+              </a:ext>
+            </a:extLst>
+          </p:cNvPr>
+          <p:cNvCxnSpPr>
+            <a:cxnSpLocks/>
+            <a:stCxn id="28" idx="1"/>
+          </p:cNvCxnSpPr>
+          <p:nvPr/>
+        </p:nvCxnSpPr>
+        <p:spPr>
+          <a:xfrm rot="10800000" flipV="1">
+            <a:off x="5705475" y="573638"/>
+            <a:ext cx="3149490" cy="131212"/>
+          </a:xfrm>
+          <a:prstGeom prst="bentConnector3">
+            <a:avLst>
+              <a:gd name="adj1" fmla="val 99901"/>
+            </a:avLst>
+          </a:prstGeom>
+          <a:ln w="19050">
+            <a:solidFill>
+              <a:srgbClr val="FF0000"/>
+            </a:solidFill>
+            <a:tailEnd type="triangle"/>
+          </a:ln>
+        </p:spPr>
+        <p:style>
+          <a:lnRef idx="1">
+            <a:schemeClr val="accent1"/>
+          </a:lnRef>
+          <a:fillRef idx="0">
+            <a:schemeClr val="accent1"/>
+          </a:fillRef>
+          <a:effectRef idx="0">
+            <a:schemeClr val="accent1"/>
+          </a:effectRef>
+          <a:fontRef idx="minor">
+            <a:schemeClr val="tx1"/>
+          </a:fontRef>
+        </p:style>
+      </p:cxnSp>
+      <p:sp>
+        <p:nvSpPr>
+          <p:cNvPr id="36" name="TextBox 35">
+            <a:extLst>
+              <a:ext uri="{FF2B5EF4-FFF2-40B4-BE49-F238E27FC236}">
+                <a16:creationId xmlns:a16="http://schemas.microsoft.com/office/drawing/2014/main" id="{2FF0B38F-D770-4F54-DD06-7DB3521143C6}"/>
+              </a:ext>
+            </a:extLst>
+          </p:cNvPr>
+          <p:cNvSpPr txBox="1"/>
+          <p:nvPr/>
+        </p:nvSpPr>
+        <p:spPr>
+          <a:xfrm>
+            <a:off x="8854965" y="826216"/>
+            <a:ext cx="2946510" cy="461665"/>
+          </a:xfrm>
+          <a:prstGeom prst="rect">
+            <a:avLst/>
+          </a:prstGeom>
+          <a:noFill/>
+        </p:spPr>
+        <p:txBody>
+          <a:bodyPr wrap="square">
+            <a:spAutoFit/>
+          </a:bodyPr>
+          <a:lstStyle/>
+          <a:p>
+            <a:r>
+              <a:rPr lang="en-SG" sz="1200" b="1" dirty="0"/>
+              <a:t>Ground contour generate unit current firmware state indicator </a:t>
+            </a:r>
+          </a:p>
+        </p:txBody>
+      </p:sp>
+      <p:cxnSp>
+        <p:nvCxnSpPr>
+          <p:cNvPr id="37" name="Connector: Elbow 36">
+            <a:extLst>
+              <a:ext uri="{FF2B5EF4-FFF2-40B4-BE49-F238E27FC236}">
+                <a16:creationId xmlns:a16="http://schemas.microsoft.com/office/drawing/2014/main" id="{D51CFC59-494B-FC6A-6EEB-9EEEC5114371}"/>
+              </a:ext>
+            </a:extLst>
+          </p:cNvPr>
+          <p:cNvCxnSpPr>
+            <a:cxnSpLocks/>
+            <a:stCxn id="36" idx="1"/>
+          </p:cNvCxnSpPr>
+          <p:nvPr/>
+        </p:nvCxnSpPr>
+        <p:spPr>
+          <a:xfrm rot="10800000">
+            <a:off x="6296025" y="896803"/>
+            <a:ext cx="2558940" cy="160246"/>
+          </a:xfrm>
+          <a:prstGeom prst="bentConnector3">
+            <a:avLst>
+              <a:gd name="adj1" fmla="val 99506"/>
+            </a:avLst>
+          </a:prstGeom>
+          <a:ln w="19050">
+            <a:solidFill>
+              <a:srgbClr val="FF0000"/>
+            </a:solidFill>
+            <a:tailEnd type="triangle"/>
+          </a:ln>
+        </p:spPr>
+        <p:style>
+          <a:lnRef idx="1">
+            <a:schemeClr val="accent1"/>
+          </a:lnRef>
+          <a:fillRef idx="0">
+            <a:schemeClr val="accent1"/>
+          </a:fillRef>
+          <a:effectRef idx="0">
+            <a:schemeClr val="accent1"/>
+          </a:effectRef>
+          <a:fontRef idx="minor">
+            <a:schemeClr val="tx1"/>
+          </a:fontRef>
+        </p:style>
+      </p:cxnSp>
+      <p:cxnSp>
+        <p:nvCxnSpPr>
+          <p:cNvPr id="42" name="Straight Arrow Connector 41">
+            <a:extLst>
+              <a:ext uri="{FF2B5EF4-FFF2-40B4-BE49-F238E27FC236}">
+                <a16:creationId xmlns:a16="http://schemas.microsoft.com/office/drawing/2014/main" id="{33252F2A-07F3-A0CC-0F49-96C239AF7ADD}"/>
+              </a:ext>
+            </a:extLst>
+          </p:cNvPr>
+          <p:cNvCxnSpPr>
+            <a:cxnSpLocks/>
+          </p:cNvCxnSpPr>
+          <p:nvPr/>
+        </p:nvCxnSpPr>
+        <p:spPr>
+          <a:xfrm flipV="1">
+            <a:off x="2305050" y="1990724"/>
+            <a:ext cx="1628775" cy="1"/>
+          </a:xfrm>
+          <a:prstGeom prst="straightConnector1">
+            <a:avLst/>
+          </a:prstGeom>
+          <a:ln w="19050">
+            <a:solidFill>
+              <a:srgbClr val="FF0000"/>
+            </a:solidFill>
+            <a:tailEnd type="triangle"/>
+          </a:ln>
+        </p:spPr>
+        <p:style>
+          <a:lnRef idx="1">
+            <a:schemeClr val="accent1"/>
+          </a:lnRef>
+          <a:fillRef idx="0">
+            <a:schemeClr val="accent1"/>
+          </a:fillRef>
+          <a:effectRef idx="0">
+            <a:schemeClr val="accent1"/>
+          </a:effectRef>
+          <a:fontRef idx="minor">
+            <a:schemeClr val="tx1"/>
+          </a:fontRef>
+        </p:style>
+      </p:cxnSp>
+      <p:sp>
+        <p:nvSpPr>
+          <p:cNvPr id="44" name="TextBox 43">
+            <a:extLst>
+              <a:ext uri="{FF2B5EF4-FFF2-40B4-BE49-F238E27FC236}">
+                <a16:creationId xmlns:a16="http://schemas.microsoft.com/office/drawing/2014/main" id="{36DE1FA5-F378-2361-C0C4-3020174604CD}"/>
+              </a:ext>
+            </a:extLst>
+          </p:cNvPr>
+          <p:cNvSpPr txBox="1"/>
+          <p:nvPr/>
+        </p:nvSpPr>
+        <p:spPr>
+          <a:xfrm>
+            <a:off x="238123" y="1852225"/>
+            <a:ext cx="2066927" cy="276999"/>
+          </a:xfrm>
+          <a:prstGeom prst="rect">
+            <a:avLst/>
+          </a:prstGeom>
+          <a:noFill/>
+        </p:spPr>
+        <p:txBody>
+          <a:bodyPr wrap="square">
+            <a:spAutoFit/>
+          </a:bodyPr>
+          <a:lstStyle/>
+          <a:p>
+            <a:r>
+              <a:rPr lang="en-SG" sz="1200" b="1" dirty="0"/>
+              <a:t>Drone Front camera display </a:t>
+            </a:r>
+          </a:p>
+        </p:txBody>
+      </p:sp>
+      <p:sp>
+        <p:nvSpPr>
+          <p:cNvPr id="46" name="Rectangle 45">
+            <a:extLst>
+              <a:ext uri="{FF2B5EF4-FFF2-40B4-BE49-F238E27FC236}">
+                <a16:creationId xmlns:a16="http://schemas.microsoft.com/office/drawing/2014/main" id="{E50E7378-6186-BAE2-8034-16A1C3994B9A}"/>
+              </a:ext>
+            </a:extLst>
+          </p:cNvPr>
+          <p:cNvSpPr/>
+          <p:nvPr/>
+        </p:nvSpPr>
+        <p:spPr>
+          <a:xfrm>
+            <a:off x="3028198" y="3686175"/>
+            <a:ext cx="1628775" cy="1042601"/>
+          </a:xfrm>
+          <a:prstGeom prst="rect">
+            <a:avLst/>
+          </a:prstGeom>
+          <a:noFill/>
+          <a:ln w="19050" cap="flat" cmpd="sng" algn="ctr">
+            <a:solidFill>
+              <a:srgbClr val="FF0000"/>
+            </a:solidFill>
+            <a:prstDash val="sysDash"/>
+            <a:round/>
+            <a:headEnd type="none" w="med" len="med"/>
+            <a:tailEnd type="none" w="med" len="med"/>
+          </a:ln>
+        </p:spPr>
+        <p:style>
+          <a:lnRef idx="0">
+            <a:scrgbClr r="0" g="0" b="0"/>
+          </a:lnRef>
+          <a:fillRef idx="0">
+            <a:scrgbClr r="0" g="0" b="0"/>
+          </a:fillRef>
+          <a:effectRef idx="0">
+            <a:scrgbClr r="0" g="0" b="0"/>
+          </a:effectRef>
+          <a:fontRef idx="minor">
+            <a:schemeClr val="accent2"/>
+          </a:fontRef>
+        </p:style>
+        <p:txBody>
+          <a:bodyPr rtlCol="0" anchor="ctr"/>
+          <a:lstStyle/>
+          <a:p>
+            <a:pPr algn="ctr"/>
+            <a:endParaRPr lang="en-SG"/>
+          </a:p>
+        </p:txBody>
+      </p:sp>
+      <p:cxnSp>
+        <p:nvCxnSpPr>
+          <p:cNvPr id="47" name="Straight Arrow Connector 46">
+            <a:extLst>
+              <a:ext uri="{FF2B5EF4-FFF2-40B4-BE49-F238E27FC236}">
+                <a16:creationId xmlns:a16="http://schemas.microsoft.com/office/drawing/2014/main" id="{B1BDEB0C-37D5-B1DF-7000-511620B06728}"/>
+              </a:ext>
+            </a:extLst>
+          </p:cNvPr>
+          <p:cNvCxnSpPr>
+            <a:cxnSpLocks/>
+            <a:stCxn id="49" idx="3"/>
+            <a:endCxn id="46" idx="1"/>
+          </p:cNvCxnSpPr>
+          <p:nvPr/>
+        </p:nvCxnSpPr>
+        <p:spPr>
+          <a:xfrm>
+            <a:off x="2339950" y="4142258"/>
+            <a:ext cx="688248" cy="0"/>
+          </a:xfrm>
+          <a:prstGeom prst="straightConnector1">
+            <a:avLst/>
+          </a:prstGeom>
+          <a:ln w="19050">
+            <a:solidFill>
+              <a:srgbClr val="FF0000"/>
+            </a:solidFill>
+            <a:tailEnd type="triangle"/>
+          </a:ln>
+        </p:spPr>
+        <p:style>
+          <a:lnRef idx="1">
+            <a:schemeClr val="accent1"/>
+          </a:lnRef>
+          <a:fillRef idx="0">
+            <a:schemeClr val="accent1"/>
+          </a:fillRef>
+          <a:effectRef idx="0">
+            <a:schemeClr val="accent1"/>
+          </a:effectRef>
+          <a:fontRef idx="minor">
+            <a:schemeClr val="tx1"/>
+          </a:fontRef>
+        </p:style>
+      </p:cxnSp>
+      <p:sp>
+        <p:nvSpPr>
+          <p:cNvPr id="49" name="TextBox 48">
+            <a:extLst>
+              <a:ext uri="{FF2B5EF4-FFF2-40B4-BE49-F238E27FC236}">
+                <a16:creationId xmlns:a16="http://schemas.microsoft.com/office/drawing/2014/main" id="{9341FAC7-3362-1B35-289A-47EFFC27D155}"/>
+              </a:ext>
+            </a:extLst>
+          </p:cNvPr>
+          <p:cNvSpPr txBox="1"/>
+          <p:nvPr/>
+        </p:nvSpPr>
+        <p:spPr>
+          <a:xfrm>
+            <a:off x="273024" y="3911425"/>
+            <a:ext cx="2066926" cy="461665"/>
+          </a:xfrm>
+          <a:prstGeom prst="rect">
+            <a:avLst/>
+          </a:prstGeom>
+          <a:noFill/>
+        </p:spPr>
+        <p:txBody>
+          <a:bodyPr wrap="square">
+            <a:spAutoFit/>
+          </a:bodyPr>
+          <a:lstStyle/>
+          <a:p>
+            <a:r>
+              <a:rPr lang="en-SG" sz="1200" b="1" dirty="0"/>
+              <a:t>Drone vertical motion control panel </a:t>
+            </a:r>
+          </a:p>
+        </p:txBody>
+      </p:sp>
+      <p:sp>
+        <p:nvSpPr>
+          <p:cNvPr id="52" name="Rectangle 51">
+            <a:extLst>
+              <a:ext uri="{FF2B5EF4-FFF2-40B4-BE49-F238E27FC236}">
+                <a16:creationId xmlns:a16="http://schemas.microsoft.com/office/drawing/2014/main" id="{DC4745CE-8C21-A26F-72C7-E8910A6D71EF}"/>
+              </a:ext>
+            </a:extLst>
+          </p:cNvPr>
+          <p:cNvSpPr/>
+          <p:nvPr/>
+        </p:nvSpPr>
+        <p:spPr>
+          <a:xfrm>
+            <a:off x="4772164" y="3686175"/>
+            <a:ext cx="933311" cy="1042601"/>
+          </a:xfrm>
+          <a:prstGeom prst="rect">
+            <a:avLst/>
+          </a:prstGeom>
+          <a:noFill/>
+          <a:ln w="19050" cap="flat" cmpd="sng" algn="ctr">
+            <a:solidFill>
+              <a:srgbClr val="FF0000"/>
+            </a:solidFill>
+            <a:prstDash val="sysDash"/>
+            <a:round/>
+            <a:headEnd type="none" w="med" len="med"/>
+            <a:tailEnd type="none" w="med" len="med"/>
+          </a:ln>
+        </p:spPr>
+        <p:style>
+          <a:lnRef idx="0">
+            <a:scrgbClr r="0" g="0" b="0"/>
+          </a:lnRef>
+          <a:fillRef idx="0">
+            <a:scrgbClr r="0" g="0" b="0"/>
+          </a:fillRef>
+          <a:effectRef idx="0">
+            <a:scrgbClr r="0" g="0" b="0"/>
+          </a:effectRef>
+          <a:fontRef idx="minor">
+            <a:schemeClr val="accent2"/>
+          </a:fontRef>
+        </p:style>
+        <p:txBody>
+          <a:bodyPr rtlCol="0" anchor="ctr"/>
+          <a:lstStyle/>
+          <a:p>
+            <a:pPr algn="ctr"/>
+            <a:endParaRPr lang="en-SG"/>
+          </a:p>
+        </p:txBody>
+      </p:sp>
+      <p:cxnSp>
+        <p:nvCxnSpPr>
+          <p:cNvPr id="53" name="Connector: Elbow 52">
+            <a:extLst>
+              <a:ext uri="{FF2B5EF4-FFF2-40B4-BE49-F238E27FC236}">
+                <a16:creationId xmlns:a16="http://schemas.microsoft.com/office/drawing/2014/main" id="{55F3461B-702A-320C-4E53-0396E555426A}"/>
+              </a:ext>
+            </a:extLst>
+          </p:cNvPr>
+          <p:cNvCxnSpPr>
+            <a:cxnSpLocks/>
+            <a:stCxn id="56" idx="3"/>
+            <a:endCxn id="52" idx="0"/>
+          </p:cNvCxnSpPr>
+          <p:nvPr/>
+        </p:nvCxnSpPr>
+        <p:spPr>
+          <a:xfrm>
+            <a:off x="2507864" y="3515657"/>
+            <a:ext cx="2730956" cy="170518"/>
+          </a:xfrm>
+          <a:prstGeom prst="bentConnector2">
+            <a:avLst/>
+          </a:prstGeom>
+          <a:ln w="19050">
+            <a:solidFill>
+              <a:srgbClr val="FF0000"/>
+            </a:solidFill>
+            <a:tailEnd type="triangle"/>
+          </a:ln>
+        </p:spPr>
+        <p:style>
+          <a:lnRef idx="1">
+            <a:schemeClr val="accent1"/>
+          </a:lnRef>
+          <a:fillRef idx="0">
+            <a:schemeClr val="accent1"/>
+          </a:fillRef>
+          <a:effectRef idx="0">
+            <a:schemeClr val="accent1"/>
+          </a:effectRef>
+          <a:fontRef idx="minor">
+            <a:schemeClr val="tx1"/>
+          </a:fontRef>
+        </p:style>
+      </p:cxnSp>
+      <p:sp>
+        <p:nvSpPr>
+          <p:cNvPr id="56" name="TextBox 55">
+            <a:extLst>
+              <a:ext uri="{FF2B5EF4-FFF2-40B4-BE49-F238E27FC236}">
+                <a16:creationId xmlns:a16="http://schemas.microsoft.com/office/drawing/2014/main" id="{64F161AC-5B26-3F54-6988-D15D0E7E11FC}"/>
+              </a:ext>
+            </a:extLst>
+          </p:cNvPr>
+          <p:cNvSpPr txBox="1"/>
+          <p:nvPr/>
+        </p:nvSpPr>
+        <p:spPr>
+          <a:xfrm>
+            <a:off x="273024" y="3284824"/>
+            <a:ext cx="2234840" cy="461665"/>
+          </a:xfrm>
+          <a:prstGeom prst="rect">
+            <a:avLst/>
+          </a:prstGeom>
+          <a:noFill/>
+        </p:spPr>
+        <p:txBody>
+          <a:bodyPr wrap="square">
+            <a:spAutoFit/>
+          </a:bodyPr>
+          <a:lstStyle/>
+          <a:p>
+            <a:r>
+              <a:rPr lang="en-SG" sz="1200" b="1" dirty="0"/>
+              <a:t>Drone  take off / landing control and camera mode switch </a:t>
+            </a:r>
+          </a:p>
+        </p:txBody>
+      </p:sp>
+      <p:sp>
+        <p:nvSpPr>
+          <p:cNvPr id="62" name="Rectangle 61">
+            <a:extLst>
+              <a:ext uri="{FF2B5EF4-FFF2-40B4-BE49-F238E27FC236}">
+                <a16:creationId xmlns:a16="http://schemas.microsoft.com/office/drawing/2014/main" id="{75A9450A-4E02-461C-7A7B-F28EC11756A3}"/>
+              </a:ext>
+            </a:extLst>
+          </p:cNvPr>
+          <p:cNvSpPr/>
+          <p:nvPr/>
+        </p:nvSpPr>
+        <p:spPr>
+          <a:xfrm>
+            <a:off x="5820666" y="3685243"/>
+            <a:ext cx="1485009" cy="1042601"/>
+          </a:xfrm>
+          <a:prstGeom prst="rect">
+            <a:avLst/>
+          </a:prstGeom>
+          <a:noFill/>
+          <a:ln w="19050" cap="flat" cmpd="sng" algn="ctr">
+            <a:solidFill>
+              <a:srgbClr val="FF0000"/>
+            </a:solidFill>
+            <a:prstDash val="sysDash"/>
+            <a:round/>
+            <a:headEnd type="none" w="med" len="med"/>
+            <a:tailEnd type="none" w="med" len="med"/>
+          </a:ln>
+        </p:spPr>
+        <p:style>
+          <a:lnRef idx="0">
+            <a:scrgbClr r="0" g="0" b="0"/>
+          </a:lnRef>
+          <a:fillRef idx="0">
+            <a:scrgbClr r="0" g="0" b="0"/>
+          </a:fillRef>
+          <a:effectRef idx="0">
+            <a:scrgbClr r="0" g="0" b="0"/>
+          </a:effectRef>
+          <a:fontRef idx="minor">
+            <a:schemeClr val="accent2"/>
+          </a:fontRef>
+        </p:style>
+        <p:txBody>
+          <a:bodyPr rtlCol="0" anchor="ctr"/>
+          <a:lstStyle/>
+          <a:p>
+            <a:pPr algn="ctr"/>
+            <a:endParaRPr lang="en-SG"/>
+          </a:p>
+        </p:txBody>
+      </p:sp>
+      <p:sp>
+        <p:nvSpPr>
+          <p:cNvPr id="63" name="TextBox 62">
+            <a:extLst>
+              <a:ext uri="{FF2B5EF4-FFF2-40B4-BE49-F238E27FC236}">
+                <a16:creationId xmlns:a16="http://schemas.microsoft.com/office/drawing/2014/main" id="{BE07A2BD-4C56-1D5D-CE19-B5EE5812FE3F}"/>
+              </a:ext>
+            </a:extLst>
+          </p:cNvPr>
+          <p:cNvSpPr txBox="1"/>
+          <p:nvPr/>
+        </p:nvSpPr>
+        <p:spPr>
+          <a:xfrm>
+            <a:off x="273023" y="2757631"/>
+            <a:ext cx="2244999" cy="461665"/>
+          </a:xfrm>
+          <a:prstGeom prst="rect">
+            <a:avLst/>
+          </a:prstGeom>
+          <a:noFill/>
+        </p:spPr>
+        <p:txBody>
+          <a:bodyPr wrap="square">
+            <a:spAutoFit/>
+          </a:bodyPr>
+          <a:lstStyle/>
+          <a:p>
+            <a:r>
+              <a:rPr lang="en-SG" sz="1200" b="1" dirty="0"/>
+              <a:t>Drone horizontal motion control panel </a:t>
+            </a:r>
+          </a:p>
+        </p:txBody>
+      </p:sp>
+      <p:cxnSp>
+        <p:nvCxnSpPr>
+          <p:cNvPr id="64" name="Connector: Elbow 63">
+            <a:extLst>
+              <a:ext uri="{FF2B5EF4-FFF2-40B4-BE49-F238E27FC236}">
+                <a16:creationId xmlns:a16="http://schemas.microsoft.com/office/drawing/2014/main" id="{B1215327-1E00-B4B9-C4D1-B44327817F73}"/>
+              </a:ext>
+            </a:extLst>
+          </p:cNvPr>
+          <p:cNvCxnSpPr>
+            <a:cxnSpLocks/>
+            <a:stCxn id="63" idx="3"/>
+            <a:endCxn id="62" idx="0"/>
+          </p:cNvCxnSpPr>
+          <p:nvPr/>
+        </p:nvCxnSpPr>
+        <p:spPr>
+          <a:xfrm>
+            <a:off x="2518022" y="2988464"/>
+            <a:ext cx="4045149" cy="696779"/>
+          </a:xfrm>
+          <a:prstGeom prst="bentConnector2">
+            <a:avLst/>
+          </a:prstGeom>
+          <a:ln w="19050">
+            <a:solidFill>
+              <a:srgbClr val="FF0000"/>
+            </a:solidFill>
+            <a:tailEnd type="triangle"/>
+          </a:ln>
+        </p:spPr>
+        <p:style>
+          <a:lnRef idx="1">
+            <a:schemeClr val="accent1"/>
+          </a:lnRef>
+          <a:fillRef idx="0">
+            <a:schemeClr val="accent1"/>
+          </a:fillRef>
+          <a:effectRef idx="0">
+            <a:schemeClr val="accent1"/>
+          </a:effectRef>
+          <a:fontRef idx="minor">
+            <a:schemeClr val="tx1"/>
+          </a:fontRef>
+        </p:style>
+      </p:cxnSp>
+      <p:cxnSp>
+        <p:nvCxnSpPr>
+          <p:cNvPr id="67" name="Straight Arrow Connector 66">
+            <a:extLst>
+              <a:ext uri="{FF2B5EF4-FFF2-40B4-BE49-F238E27FC236}">
+                <a16:creationId xmlns:a16="http://schemas.microsoft.com/office/drawing/2014/main" id="{81C583A0-9382-7CB6-595C-86996595B7B7}"/>
+              </a:ext>
+            </a:extLst>
+          </p:cNvPr>
+          <p:cNvCxnSpPr>
+            <a:cxnSpLocks/>
+          </p:cNvCxnSpPr>
+          <p:nvPr/>
+        </p:nvCxnSpPr>
+        <p:spPr>
+          <a:xfrm>
+            <a:off x="2753360" y="4836792"/>
+            <a:ext cx="496027" cy="0"/>
+          </a:xfrm>
+          <a:prstGeom prst="straightConnector1">
+            <a:avLst/>
+          </a:prstGeom>
+          <a:ln w="19050">
+            <a:solidFill>
+              <a:srgbClr val="FF0000"/>
+            </a:solidFill>
+            <a:tailEnd type="triangle"/>
+          </a:ln>
+        </p:spPr>
+        <p:style>
+          <a:lnRef idx="1">
+            <a:schemeClr val="accent1"/>
+          </a:lnRef>
+          <a:fillRef idx="0">
+            <a:schemeClr val="accent1"/>
+          </a:fillRef>
+          <a:effectRef idx="0">
+            <a:schemeClr val="accent1"/>
+          </a:effectRef>
+          <a:fontRef idx="minor">
+            <a:schemeClr val="tx1"/>
+          </a:fontRef>
+        </p:style>
+      </p:cxnSp>
+      <p:sp>
+        <p:nvSpPr>
+          <p:cNvPr id="68" name="TextBox 67">
+            <a:extLst>
+              <a:ext uri="{FF2B5EF4-FFF2-40B4-BE49-F238E27FC236}">
+                <a16:creationId xmlns:a16="http://schemas.microsoft.com/office/drawing/2014/main" id="{B51A43FC-73F8-311C-7479-7B743DC908DC}"/>
+              </a:ext>
+            </a:extLst>
+          </p:cNvPr>
+          <p:cNvSpPr txBox="1"/>
+          <p:nvPr/>
+        </p:nvSpPr>
+        <p:spPr>
+          <a:xfrm>
+            <a:off x="238123" y="4605959"/>
+            <a:ext cx="2515237" cy="1200329"/>
+          </a:xfrm>
+          <a:prstGeom prst="rect">
+            <a:avLst/>
+          </a:prstGeom>
+          <a:noFill/>
+          <a:ln w="6350">
+            <a:solidFill>
+              <a:schemeClr val="tx1"/>
+            </a:solidFill>
+          </a:ln>
+        </p:spPr>
+        <p:txBody>
+          <a:bodyPr wrap="square">
+            <a:spAutoFit/>
+          </a:bodyPr>
+          <a:lstStyle/>
+          <a:p>
+            <a:r>
+              <a:rPr lang="en-SG" sz="1200" b="1" dirty="0"/>
+              <a:t>Drone route / track action area: </a:t>
+            </a:r>
+          </a:p>
+          <a:p>
+            <a:pPr marL="228600" indent="-228600">
+              <a:buAutoNum type="arabicPeriod"/>
+            </a:pPr>
+            <a:r>
+              <a:rPr lang="en-SG" sz="1200" b="1" dirty="0"/>
+              <a:t>Track/Route selection </a:t>
+            </a:r>
+          </a:p>
+          <a:p>
+            <a:pPr marL="228600" indent="-228600">
+              <a:buAutoNum type="arabicPeriod"/>
+            </a:pPr>
+            <a:r>
+              <a:rPr lang="en-SG" sz="1200" b="1" dirty="0"/>
+              <a:t>Track active button</a:t>
+            </a:r>
+          </a:p>
+          <a:p>
+            <a:pPr marL="228600" indent="-228600">
+              <a:buAutoNum type="arabicPeriod"/>
+            </a:pPr>
+            <a:r>
+              <a:rPr lang="en-SG" sz="1200" b="1" dirty="0"/>
+              <a:t>Track adjustment /edit pop up dialog. </a:t>
+            </a:r>
+          </a:p>
+          <a:p>
+            <a:pPr marL="228600" indent="-228600">
+              <a:buAutoNum type="arabicPeriod"/>
+            </a:pPr>
+            <a:r>
+              <a:rPr lang="en-SG" sz="1200" b="1" dirty="0"/>
+              <a:t>New track/route file load button </a:t>
+            </a:r>
+          </a:p>
+        </p:txBody>
+      </p:sp>
+      <p:sp>
+        <p:nvSpPr>
+          <p:cNvPr id="70" name="Rectangle 69">
+            <a:extLst>
+              <a:ext uri="{FF2B5EF4-FFF2-40B4-BE49-F238E27FC236}">
+                <a16:creationId xmlns:a16="http://schemas.microsoft.com/office/drawing/2014/main" id="{52E60241-9205-82BD-CC1B-02E9DDCFED58}"/>
+              </a:ext>
+            </a:extLst>
+          </p:cNvPr>
+          <p:cNvSpPr/>
+          <p:nvPr/>
+        </p:nvSpPr>
+        <p:spPr>
+          <a:xfrm>
+            <a:off x="3272312" y="4962309"/>
+            <a:ext cx="3595213" cy="331184"/>
+          </a:xfrm>
+          <a:prstGeom prst="rect">
+            <a:avLst/>
+          </a:prstGeom>
+          <a:noFill/>
+          <a:ln w="19050" cap="flat" cmpd="sng" algn="ctr">
+            <a:solidFill>
+              <a:srgbClr val="FF0000"/>
+            </a:solidFill>
+            <a:prstDash val="sysDash"/>
+            <a:round/>
+            <a:headEnd type="none" w="med" len="med"/>
+            <a:tailEnd type="none" w="med" len="med"/>
+          </a:ln>
+        </p:spPr>
+        <p:style>
+          <a:lnRef idx="0">
+            <a:scrgbClr r="0" g="0" b="0"/>
+          </a:lnRef>
+          <a:fillRef idx="0">
+            <a:scrgbClr r="0" g="0" b="0"/>
+          </a:fillRef>
+          <a:effectRef idx="0">
+            <a:scrgbClr r="0" g="0" b="0"/>
+          </a:effectRef>
+          <a:fontRef idx="minor">
+            <a:schemeClr val="accent2"/>
+          </a:fontRef>
+        </p:style>
+        <p:txBody>
+          <a:bodyPr rtlCol="0" anchor="ctr"/>
+          <a:lstStyle/>
+          <a:p>
+            <a:pPr algn="ctr"/>
+            <a:endParaRPr lang="en-SG"/>
+          </a:p>
+        </p:txBody>
+      </p:sp>
+      <p:sp>
+        <p:nvSpPr>
+          <p:cNvPr id="73" name="TextBox 72">
+            <a:extLst>
+              <a:ext uri="{FF2B5EF4-FFF2-40B4-BE49-F238E27FC236}">
+                <a16:creationId xmlns:a16="http://schemas.microsoft.com/office/drawing/2014/main" id="{858C6F3F-4855-BFC7-8C9F-62BC7BCC63A6}"/>
+              </a:ext>
+            </a:extLst>
+          </p:cNvPr>
+          <p:cNvSpPr txBox="1"/>
+          <p:nvPr/>
+        </p:nvSpPr>
+        <p:spPr>
+          <a:xfrm>
+            <a:off x="238124" y="5961197"/>
+            <a:ext cx="2066926" cy="461665"/>
+          </a:xfrm>
+          <a:prstGeom prst="rect">
+            <a:avLst/>
+          </a:prstGeom>
+          <a:noFill/>
+        </p:spPr>
+        <p:txBody>
+          <a:bodyPr wrap="square">
+            <a:spAutoFit/>
+          </a:bodyPr>
+          <a:lstStyle/>
+          <a:p>
+            <a:r>
+              <a:rPr lang="en-SG" sz="1200" b="1" dirty="0"/>
+              <a:t>Drone track action and route waypoint display panel</a:t>
+            </a:r>
+          </a:p>
+        </p:txBody>
+      </p:sp>
+      <p:cxnSp>
+        <p:nvCxnSpPr>
+          <p:cNvPr id="77" name="Connector: Elbow 76">
+            <a:extLst>
+              <a:ext uri="{FF2B5EF4-FFF2-40B4-BE49-F238E27FC236}">
+                <a16:creationId xmlns:a16="http://schemas.microsoft.com/office/drawing/2014/main" id="{E97F285B-A1C4-0C14-686A-1F0A6C84CFBF}"/>
+              </a:ext>
+            </a:extLst>
+          </p:cNvPr>
+          <p:cNvCxnSpPr>
+            <a:cxnSpLocks/>
+            <a:stCxn id="73" idx="3"/>
+            <a:endCxn id="70" idx="1"/>
+          </p:cNvCxnSpPr>
+          <p:nvPr/>
+        </p:nvCxnSpPr>
+        <p:spPr>
+          <a:xfrm flipV="1">
+            <a:off x="2305050" y="5127901"/>
+            <a:ext cx="967262" cy="1064129"/>
+          </a:xfrm>
+          <a:prstGeom prst="bentConnector3">
+            <a:avLst>
+              <a:gd name="adj1" fmla="val 70680"/>
+            </a:avLst>
+          </a:prstGeom>
+          <a:ln w="19050">
+            <a:solidFill>
+              <a:srgbClr val="FF0000"/>
+            </a:solidFill>
+            <a:tailEnd type="triangle"/>
+          </a:ln>
+        </p:spPr>
+        <p:style>
+          <a:lnRef idx="1">
+            <a:schemeClr val="accent1"/>
+          </a:lnRef>
+          <a:fillRef idx="0">
+            <a:schemeClr val="accent1"/>
+          </a:fillRef>
+          <a:effectRef idx="0">
+            <a:schemeClr val="accent1"/>
+          </a:effectRef>
+          <a:fontRef idx="minor">
+            <a:schemeClr val="tx1"/>
+          </a:fontRef>
+        </p:style>
+      </p:cxnSp>
+      <p:sp>
+        <p:nvSpPr>
+          <p:cNvPr id="81" name="Rectangle 80">
+            <a:extLst>
+              <a:ext uri="{FF2B5EF4-FFF2-40B4-BE49-F238E27FC236}">
+                <a16:creationId xmlns:a16="http://schemas.microsoft.com/office/drawing/2014/main" id="{3C8C573D-84D0-F8CA-F7E2-8BD63AF590B8}"/>
+              </a:ext>
+            </a:extLst>
+          </p:cNvPr>
+          <p:cNvSpPr/>
+          <p:nvPr/>
+        </p:nvSpPr>
+        <p:spPr>
+          <a:xfrm>
+            <a:off x="7248595" y="781044"/>
+            <a:ext cx="682447" cy="3294217"/>
+          </a:xfrm>
+          <a:prstGeom prst="rect">
+            <a:avLst/>
+          </a:prstGeom>
+          <a:noFill/>
+          <a:ln w="19050" cap="flat" cmpd="sng" algn="ctr">
+            <a:solidFill>
+              <a:srgbClr val="FF0000"/>
+            </a:solidFill>
+            <a:prstDash val="sysDash"/>
+            <a:round/>
+            <a:headEnd type="none" w="med" len="med"/>
+            <a:tailEnd type="none" w="med" len="med"/>
+          </a:ln>
+        </p:spPr>
+        <p:style>
+          <a:lnRef idx="0">
+            <a:scrgbClr r="0" g="0" b="0"/>
+          </a:lnRef>
+          <a:fillRef idx="0">
+            <a:scrgbClr r="0" g="0" b="0"/>
+          </a:fillRef>
+          <a:effectRef idx="0">
+            <a:scrgbClr r="0" g="0" b="0"/>
+          </a:effectRef>
+          <a:fontRef idx="minor">
+            <a:schemeClr val="accent2"/>
+          </a:fontRef>
+        </p:style>
+        <p:txBody>
+          <a:bodyPr rtlCol="0" anchor="ctr"/>
+          <a:lstStyle/>
+          <a:p>
+            <a:pPr algn="ctr"/>
+            <a:endParaRPr lang="en-SG"/>
+          </a:p>
+        </p:txBody>
+      </p:sp>
+      <p:cxnSp>
+        <p:nvCxnSpPr>
+          <p:cNvPr id="82" name="Straight Arrow Connector 81">
+            <a:extLst>
+              <a:ext uri="{FF2B5EF4-FFF2-40B4-BE49-F238E27FC236}">
+                <a16:creationId xmlns:a16="http://schemas.microsoft.com/office/drawing/2014/main" id="{08BAE3EF-B25B-7E08-3AEF-DE2BB3309A17}"/>
+              </a:ext>
+            </a:extLst>
+          </p:cNvPr>
+          <p:cNvCxnSpPr>
+            <a:cxnSpLocks/>
+          </p:cNvCxnSpPr>
+          <p:nvPr/>
+        </p:nvCxnSpPr>
+        <p:spPr>
+          <a:xfrm flipH="1">
+            <a:off x="7939778" y="2075456"/>
+            <a:ext cx="838987" cy="0"/>
+          </a:xfrm>
+          <a:prstGeom prst="straightConnector1">
+            <a:avLst/>
+          </a:prstGeom>
+          <a:ln w="19050">
+            <a:solidFill>
+              <a:srgbClr val="FF0000"/>
+            </a:solidFill>
+            <a:tailEnd type="triangle"/>
+          </a:ln>
+        </p:spPr>
+        <p:style>
+          <a:lnRef idx="1">
+            <a:schemeClr val="accent1"/>
+          </a:lnRef>
+          <a:fillRef idx="0">
+            <a:schemeClr val="accent1"/>
+          </a:fillRef>
+          <a:effectRef idx="0">
+            <a:schemeClr val="accent1"/>
+          </a:effectRef>
+          <a:fontRef idx="minor">
+            <a:schemeClr val="tx1"/>
+          </a:fontRef>
+        </p:style>
+      </p:cxnSp>
+      <p:sp>
+        <p:nvSpPr>
+          <p:cNvPr id="84" name="TextBox 83">
+            <a:extLst>
+              <a:ext uri="{FF2B5EF4-FFF2-40B4-BE49-F238E27FC236}">
+                <a16:creationId xmlns:a16="http://schemas.microsoft.com/office/drawing/2014/main" id="{8504939D-9C1E-1363-4F10-166A72BA8EFA}"/>
+              </a:ext>
+            </a:extLst>
+          </p:cNvPr>
+          <p:cNvSpPr txBox="1"/>
+          <p:nvPr/>
+        </p:nvSpPr>
+        <p:spPr>
+          <a:xfrm>
+            <a:off x="8787501" y="1917415"/>
+            <a:ext cx="2244999" cy="646331"/>
+          </a:xfrm>
+          <a:prstGeom prst="rect">
+            <a:avLst/>
+          </a:prstGeom>
+          <a:noFill/>
+        </p:spPr>
+        <p:txBody>
+          <a:bodyPr wrap="square">
+            <a:spAutoFit/>
+          </a:bodyPr>
+          <a:lstStyle/>
+          <a:p>
+            <a:r>
+              <a:rPr lang="en-SG" sz="1200" b="1" dirty="0"/>
+              <a:t>Drone sensor and Ground contour generate unit feedback data display panel </a:t>
+            </a:r>
+          </a:p>
+        </p:txBody>
+      </p:sp>
+      <p:sp>
+        <p:nvSpPr>
+          <p:cNvPr id="87" name="Rectangle 86">
+            <a:extLst>
+              <a:ext uri="{FF2B5EF4-FFF2-40B4-BE49-F238E27FC236}">
+                <a16:creationId xmlns:a16="http://schemas.microsoft.com/office/drawing/2014/main" id="{47ECFDF3-C2B1-9AD5-728E-125677F1EA26}"/>
+              </a:ext>
+            </a:extLst>
+          </p:cNvPr>
+          <p:cNvSpPr/>
+          <p:nvPr/>
+        </p:nvSpPr>
+        <p:spPr>
+          <a:xfrm>
+            <a:off x="3364001" y="5403842"/>
+            <a:ext cx="2798674" cy="331184"/>
+          </a:xfrm>
+          <a:prstGeom prst="rect">
+            <a:avLst/>
+          </a:prstGeom>
+          <a:noFill/>
+          <a:ln w="19050" cap="flat" cmpd="sng" algn="ctr">
+            <a:solidFill>
+              <a:srgbClr val="FF0000"/>
+            </a:solidFill>
+            <a:prstDash val="sysDash"/>
+            <a:round/>
+            <a:headEnd type="none" w="med" len="med"/>
+            <a:tailEnd type="none" w="med" len="med"/>
+          </a:ln>
+        </p:spPr>
+        <p:style>
+          <a:lnRef idx="0">
+            <a:scrgbClr r="0" g="0" b="0"/>
+          </a:lnRef>
+          <a:fillRef idx="0">
+            <a:scrgbClr r="0" g="0" b="0"/>
+          </a:fillRef>
+          <a:effectRef idx="0">
+            <a:scrgbClr r="0" g="0" b="0"/>
+          </a:effectRef>
+          <a:fontRef idx="minor">
+            <a:schemeClr val="accent2"/>
+          </a:fontRef>
+        </p:style>
+        <p:txBody>
+          <a:bodyPr rtlCol="0" anchor="ctr"/>
+          <a:lstStyle/>
+          <a:p>
+            <a:pPr algn="ctr"/>
+            <a:endParaRPr lang="en-SG"/>
+          </a:p>
+        </p:txBody>
+      </p:sp>
+      <p:sp>
+        <p:nvSpPr>
+          <p:cNvPr id="88" name="TextBox 87">
+            <a:extLst>
+              <a:ext uri="{FF2B5EF4-FFF2-40B4-BE49-F238E27FC236}">
+                <a16:creationId xmlns:a16="http://schemas.microsoft.com/office/drawing/2014/main" id="{3749717F-C000-CB6A-EFBC-08815679FF22}"/>
+              </a:ext>
+            </a:extLst>
+          </p:cNvPr>
+          <p:cNvSpPr txBox="1"/>
+          <p:nvPr/>
+        </p:nvSpPr>
+        <p:spPr>
+          <a:xfrm>
+            <a:off x="8854965" y="2872504"/>
+            <a:ext cx="2855298" cy="830997"/>
+          </a:xfrm>
+          <a:prstGeom prst="rect">
+            <a:avLst/>
+          </a:prstGeom>
+          <a:noFill/>
+        </p:spPr>
+        <p:txBody>
+          <a:bodyPr wrap="square">
+            <a:spAutoFit/>
+          </a:bodyPr>
+          <a:lstStyle/>
+          <a:p>
+            <a:r>
+              <a:rPr lang="en-SG" sz="1200" b="1" dirty="0"/>
+              <a:t>PATT attestation parameter config panel: </a:t>
+            </a:r>
+          </a:p>
+          <a:p>
+            <a:pPr marL="228600" indent="-228600">
+              <a:buAutoNum type="arabicPeriod"/>
+            </a:pPr>
+            <a:r>
+              <a:rPr lang="en-SG" sz="1200" b="1" dirty="0"/>
+              <a:t>Iteration loop execution number</a:t>
+            </a:r>
+          </a:p>
+          <a:p>
+            <a:pPr marL="228600" indent="-228600">
+              <a:buAutoNum type="arabicPeriod"/>
+            </a:pPr>
+            <a:r>
+              <a:rPr lang="en-SG" sz="1200" b="1" dirty="0"/>
+              <a:t>Block size [k] value</a:t>
+            </a:r>
+          </a:p>
+          <a:p>
+            <a:pPr marL="228600" indent="-228600">
+              <a:buAutoNum type="arabicPeriod"/>
+            </a:pPr>
+            <a:r>
+              <a:rPr lang="en-SG" sz="1200" b="1" dirty="0"/>
+              <a:t>Generated random seed </a:t>
+            </a:r>
+          </a:p>
+        </p:txBody>
+      </p:sp>
+      <p:cxnSp>
+        <p:nvCxnSpPr>
+          <p:cNvPr id="89" name="Connector: Elbow 88">
+            <a:extLst>
+              <a:ext uri="{FF2B5EF4-FFF2-40B4-BE49-F238E27FC236}">
+                <a16:creationId xmlns:a16="http://schemas.microsoft.com/office/drawing/2014/main" id="{AC8BAC35-D1D1-B832-6549-21E66B5BA489}"/>
+              </a:ext>
+            </a:extLst>
+          </p:cNvPr>
+          <p:cNvCxnSpPr>
+            <a:cxnSpLocks/>
+            <a:stCxn id="88" idx="1"/>
+            <a:endCxn id="87" idx="3"/>
+          </p:cNvCxnSpPr>
+          <p:nvPr/>
+        </p:nvCxnSpPr>
+        <p:spPr>
+          <a:xfrm rot="10800000" flipV="1">
+            <a:off x="6162675" y="3288002"/>
+            <a:ext cx="2692290" cy="2281431"/>
+          </a:xfrm>
+          <a:prstGeom prst="bentConnector3">
+            <a:avLst>
+              <a:gd name="adj1" fmla="val 17452"/>
+            </a:avLst>
+          </a:prstGeom>
+          <a:ln w="19050">
+            <a:solidFill>
+              <a:srgbClr val="FF0000"/>
+            </a:solidFill>
+            <a:tailEnd type="triangle"/>
+          </a:ln>
+        </p:spPr>
+        <p:style>
+          <a:lnRef idx="1">
+            <a:schemeClr val="accent1"/>
+          </a:lnRef>
+          <a:fillRef idx="0">
+            <a:schemeClr val="accent1"/>
+          </a:fillRef>
+          <a:effectRef idx="0">
+            <a:schemeClr val="accent1"/>
+          </a:effectRef>
+          <a:fontRef idx="minor">
+            <a:schemeClr val="tx1"/>
+          </a:fontRef>
+        </p:style>
+      </p:cxnSp>
+      <p:cxnSp>
+        <p:nvCxnSpPr>
+          <p:cNvPr id="95" name="Connector: Elbow 94">
+            <a:extLst>
+              <a:ext uri="{FF2B5EF4-FFF2-40B4-BE49-F238E27FC236}">
+                <a16:creationId xmlns:a16="http://schemas.microsoft.com/office/drawing/2014/main" id="{27481D6B-8FFC-56F4-1B97-60451262AE69}"/>
+              </a:ext>
+            </a:extLst>
+          </p:cNvPr>
+          <p:cNvCxnSpPr>
+            <a:cxnSpLocks/>
+          </p:cNvCxnSpPr>
+          <p:nvPr/>
+        </p:nvCxnSpPr>
+        <p:spPr>
+          <a:xfrm rot="10800000" flipV="1">
+            <a:off x="6838009" y="4167593"/>
+            <a:ext cx="2016956" cy="1278442"/>
+          </a:xfrm>
+          <a:prstGeom prst="bentConnector3">
+            <a:avLst>
+              <a:gd name="adj1" fmla="val 40083"/>
+            </a:avLst>
+          </a:prstGeom>
+          <a:ln w="19050">
+            <a:solidFill>
+              <a:srgbClr val="FF0000"/>
+            </a:solidFill>
+            <a:tailEnd type="triangle"/>
+          </a:ln>
+        </p:spPr>
+        <p:style>
+          <a:lnRef idx="1">
+            <a:schemeClr val="accent1"/>
+          </a:lnRef>
+          <a:fillRef idx="0">
+            <a:schemeClr val="accent1"/>
+          </a:fillRef>
+          <a:effectRef idx="0">
+            <a:schemeClr val="accent1"/>
+          </a:effectRef>
+          <a:fontRef idx="minor">
+            <a:schemeClr val="tx1"/>
+          </a:fontRef>
+        </p:style>
+      </p:cxnSp>
+      <p:sp>
+        <p:nvSpPr>
+          <p:cNvPr id="99" name="TextBox 98">
+            <a:extLst>
+              <a:ext uri="{FF2B5EF4-FFF2-40B4-BE49-F238E27FC236}">
+                <a16:creationId xmlns:a16="http://schemas.microsoft.com/office/drawing/2014/main" id="{B8CEDC87-1538-D23C-FA44-A31C9E2815A1}"/>
+              </a:ext>
+            </a:extLst>
+          </p:cNvPr>
+          <p:cNvSpPr txBox="1"/>
+          <p:nvPr/>
+        </p:nvSpPr>
+        <p:spPr>
+          <a:xfrm>
+            <a:off x="8869314" y="4029093"/>
+            <a:ext cx="2707462" cy="276999"/>
+          </a:xfrm>
+          <a:prstGeom prst="rect">
+            <a:avLst/>
+          </a:prstGeom>
+          <a:noFill/>
+        </p:spPr>
+        <p:txBody>
+          <a:bodyPr wrap="square">
+            <a:spAutoFit/>
+          </a:bodyPr>
+          <a:lstStyle/>
+          <a:p>
+            <a:r>
+              <a:rPr lang="en-SG" sz="1200" b="1" dirty="0"/>
+              <a:t>PATT attestation execution start button</a:t>
+            </a:r>
+          </a:p>
+        </p:txBody>
+      </p:sp>
+      <p:cxnSp>
+        <p:nvCxnSpPr>
+          <p:cNvPr id="100" name="Connector: Elbow 99">
+            <a:extLst>
+              <a:ext uri="{FF2B5EF4-FFF2-40B4-BE49-F238E27FC236}">
+                <a16:creationId xmlns:a16="http://schemas.microsoft.com/office/drawing/2014/main" id="{1EF91D58-225D-04BE-F198-C168916A279B}"/>
+              </a:ext>
+            </a:extLst>
+          </p:cNvPr>
+          <p:cNvCxnSpPr>
+            <a:cxnSpLocks/>
+          </p:cNvCxnSpPr>
+          <p:nvPr/>
+        </p:nvCxnSpPr>
+        <p:spPr>
+          <a:xfrm rot="10800000" flipV="1">
+            <a:off x="7010444" y="4916045"/>
+            <a:ext cx="1884331" cy="992545"/>
+          </a:xfrm>
+          <a:prstGeom prst="bentConnector3">
+            <a:avLst>
+              <a:gd name="adj1" fmla="val 14111"/>
+            </a:avLst>
+          </a:prstGeom>
+          <a:ln w="19050">
+            <a:solidFill>
+              <a:srgbClr val="FF0000"/>
+            </a:solidFill>
+            <a:tailEnd type="triangle"/>
+          </a:ln>
+        </p:spPr>
+        <p:style>
+          <a:lnRef idx="1">
+            <a:schemeClr val="accent1"/>
+          </a:lnRef>
+          <a:fillRef idx="0">
+            <a:schemeClr val="accent1"/>
+          </a:fillRef>
+          <a:effectRef idx="0">
+            <a:schemeClr val="accent1"/>
+          </a:effectRef>
+          <a:fontRef idx="minor">
+            <a:schemeClr val="tx1"/>
+          </a:fontRef>
+        </p:style>
+      </p:cxnSp>
+      <p:sp>
+        <p:nvSpPr>
+          <p:cNvPr id="107" name="TextBox 106">
+            <a:extLst>
+              <a:ext uri="{FF2B5EF4-FFF2-40B4-BE49-F238E27FC236}">
+                <a16:creationId xmlns:a16="http://schemas.microsoft.com/office/drawing/2014/main" id="{06902020-F875-10C7-E63E-0282D38EF035}"/>
+              </a:ext>
+            </a:extLst>
+          </p:cNvPr>
+          <p:cNvSpPr txBox="1"/>
+          <p:nvPr/>
+        </p:nvSpPr>
+        <p:spPr>
+          <a:xfrm>
+            <a:off x="8869314" y="4777545"/>
+            <a:ext cx="2707462" cy="276999"/>
+          </a:xfrm>
+          <a:prstGeom prst="rect">
+            <a:avLst/>
+          </a:prstGeom>
+          <a:noFill/>
+        </p:spPr>
+        <p:txBody>
+          <a:bodyPr wrap="square">
+            <a:spAutoFit/>
+          </a:bodyPr>
+          <a:lstStyle/>
+          <a:p>
+            <a:r>
+              <a:rPr lang="en-SG" sz="1200" b="1" dirty="0"/>
+              <a:t>Local hash checksum value </a:t>
+            </a:r>
+          </a:p>
+        </p:txBody>
+      </p:sp>
+      <p:cxnSp>
+        <p:nvCxnSpPr>
+          <p:cNvPr id="108" name="Connector: Elbow 107">
+            <a:extLst>
+              <a:ext uri="{FF2B5EF4-FFF2-40B4-BE49-F238E27FC236}">
+                <a16:creationId xmlns:a16="http://schemas.microsoft.com/office/drawing/2014/main" id="{78E7C62B-82DE-0A1E-1233-5336EAD90B76}"/>
+              </a:ext>
+            </a:extLst>
+          </p:cNvPr>
+          <p:cNvCxnSpPr>
+            <a:cxnSpLocks/>
+          </p:cNvCxnSpPr>
+          <p:nvPr/>
+        </p:nvCxnSpPr>
+        <p:spPr>
+          <a:xfrm rot="10800000" flipV="1">
+            <a:off x="7010445" y="5446036"/>
+            <a:ext cx="2065518" cy="702466"/>
+          </a:xfrm>
+          <a:prstGeom prst="bentConnector3">
+            <a:avLst>
+              <a:gd name="adj1" fmla="val 15875"/>
+            </a:avLst>
+          </a:prstGeom>
+          <a:ln w="19050">
+            <a:solidFill>
+              <a:srgbClr val="FF0000"/>
+            </a:solidFill>
+            <a:tailEnd type="triangle"/>
+          </a:ln>
+        </p:spPr>
+        <p:style>
+          <a:lnRef idx="1">
+            <a:schemeClr val="accent1"/>
+          </a:lnRef>
+          <a:fillRef idx="0">
+            <a:schemeClr val="accent1"/>
+          </a:fillRef>
+          <a:effectRef idx="0">
+            <a:schemeClr val="accent1"/>
+          </a:effectRef>
+          <a:fontRef idx="minor">
+            <a:schemeClr val="tx1"/>
+          </a:fontRef>
+        </p:style>
+      </p:cxnSp>
+      <p:sp>
+        <p:nvSpPr>
+          <p:cNvPr id="112" name="TextBox 111">
+            <a:extLst>
+              <a:ext uri="{FF2B5EF4-FFF2-40B4-BE49-F238E27FC236}">
+                <a16:creationId xmlns:a16="http://schemas.microsoft.com/office/drawing/2014/main" id="{49A7ACB9-1B9E-9552-5935-0DF53C6548A9}"/>
+              </a:ext>
+            </a:extLst>
+          </p:cNvPr>
+          <p:cNvSpPr txBox="1"/>
+          <p:nvPr/>
+        </p:nvSpPr>
+        <p:spPr>
+          <a:xfrm>
+            <a:off x="9067210" y="5288124"/>
+            <a:ext cx="2353265" cy="276999"/>
+          </a:xfrm>
+          <a:prstGeom prst="rect">
+            <a:avLst/>
+          </a:prstGeom>
+          <a:noFill/>
+        </p:spPr>
+        <p:txBody>
+          <a:bodyPr wrap="square">
+            <a:spAutoFit/>
+          </a:bodyPr>
+          <a:lstStyle/>
+          <a:p>
+            <a:r>
+              <a:rPr lang="en-SG" sz="1200" b="1" dirty="0"/>
+              <a:t>Attestation progress bar</a:t>
+            </a:r>
+          </a:p>
+        </p:txBody>
+      </p:sp>
+      <p:cxnSp>
+        <p:nvCxnSpPr>
+          <p:cNvPr id="113" name="Straight Arrow Connector 112">
+            <a:extLst>
+              <a:ext uri="{FF2B5EF4-FFF2-40B4-BE49-F238E27FC236}">
+                <a16:creationId xmlns:a16="http://schemas.microsoft.com/office/drawing/2014/main" id="{87428C14-4D65-E40A-627E-18BE8C069107}"/>
+              </a:ext>
+            </a:extLst>
+          </p:cNvPr>
+          <p:cNvCxnSpPr>
+            <a:cxnSpLocks/>
+          </p:cNvCxnSpPr>
+          <p:nvPr/>
+        </p:nvCxnSpPr>
+        <p:spPr>
+          <a:xfrm flipH="1">
+            <a:off x="7010444" y="6354058"/>
+            <a:ext cx="2065519" cy="0"/>
+          </a:xfrm>
+          <a:prstGeom prst="straightConnector1">
+            <a:avLst/>
+          </a:prstGeom>
+          <a:ln w="19050">
+            <a:solidFill>
+              <a:srgbClr val="FF0000"/>
+            </a:solidFill>
+            <a:tailEnd type="triangle"/>
+          </a:ln>
+        </p:spPr>
+        <p:style>
+          <a:lnRef idx="1">
+            <a:schemeClr val="accent1"/>
+          </a:lnRef>
+          <a:fillRef idx="0">
+            <a:schemeClr val="accent1"/>
+          </a:fillRef>
+          <a:effectRef idx="0">
+            <a:schemeClr val="accent1"/>
+          </a:effectRef>
+          <a:fontRef idx="minor">
+            <a:schemeClr val="tx1"/>
+          </a:fontRef>
+        </p:style>
+      </p:cxnSp>
+      <p:sp>
+        <p:nvSpPr>
+          <p:cNvPr id="116" name="TextBox 115">
+            <a:extLst>
+              <a:ext uri="{FF2B5EF4-FFF2-40B4-BE49-F238E27FC236}">
+                <a16:creationId xmlns:a16="http://schemas.microsoft.com/office/drawing/2014/main" id="{F67D7EB7-BB3C-9F74-6A99-C663FEBBAD55}"/>
+              </a:ext>
+            </a:extLst>
+          </p:cNvPr>
+          <p:cNvSpPr txBox="1"/>
+          <p:nvPr/>
+        </p:nvSpPr>
+        <p:spPr>
+          <a:xfrm>
+            <a:off x="9094013" y="6148503"/>
+            <a:ext cx="2707462" cy="276999"/>
+          </a:xfrm>
+          <a:prstGeom prst="rect">
+            <a:avLst/>
+          </a:prstGeom>
+          <a:noFill/>
+        </p:spPr>
+        <p:txBody>
+          <a:bodyPr wrap="square">
+            <a:spAutoFit/>
+          </a:bodyPr>
+          <a:lstStyle/>
+          <a:p>
+            <a:r>
+              <a:rPr lang="en-SG" sz="1200" b="1" dirty="0"/>
+              <a:t>Drone firmware hash checksum value</a:t>
+            </a:r>
+          </a:p>
+        </p:txBody>
+      </p:sp>
+    </p:spTree>
+    <p:extLst>
+      <p:ext uri="{BB962C8B-B14F-4D97-AF65-F5344CB8AC3E}">
+        <p14:creationId xmlns:p14="http://schemas.microsoft.com/office/powerpoint/2010/main" val="825996882"/>
+      </p:ext>
+    </p:extLst>
+  </p:cSld>
+  <p:clrMapOvr>
+    <a:masterClrMapping/>
+  </p:clrMapOvr>
+</p:sld>
+</file>
+
+<file path=ppt/slides/slide8.xml><?xml version="1.0" encoding="utf-8"?>
+<p:sld xmlns:a="http://schemas.openxmlformats.org/drawingml/2006/main" xmlns:r="http://schemas.openxmlformats.org/officeDocument/2006/relationships" xmlns:p="http://schemas.openxmlformats.org/presentationml/2006/main">
+  <p:cSld>
+    <p:spTree>
+      <p:nvGrpSpPr>
+        <p:cNvPr id="1" name=""/>
+        <p:cNvGrpSpPr/>
+        <p:nvPr/>
+      </p:nvGrpSpPr>
+      <p:grpSpPr>
+        <a:xfrm>
+          <a:off x="0" y="0"/>
+          <a:ext cx="0" cy="0"/>
+          <a:chOff x="0" y="0"/>
+          <a:chExt cx="0" cy="0"/>
+        </a:xfrm>
+      </p:grpSpPr>
+      <p:pic>
+        <p:nvPicPr>
+          <p:cNvPr id="5" name="Picture 4">
+            <a:extLst>
+              <a:ext uri="{FF2B5EF4-FFF2-40B4-BE49-F238E27FC236}">
+                <a16:creationId xmlns:a16="http://schemas.microsoft.com/office/drawing/2014/main" id="{5BE55707-C64D-E20F-CD6C-D31855BF7FB5}"/>
+              </a:ext>
+            </a:extLst>
+          </p:cNvPr>
+          <p:cNvPicPr>
+            <a:picLocks noChangeAspect="1"/>
+          </p:cNvPicPr>
+          <p:nvPr/>
+        </p:nvPicPr>
+        <p:blipFill rotWithShape="1">
+          <a:blip r:embed="rId2"/>
+          <a:srcRect r="14042"/>
+          <a:stretch/>
+        </p:blipFill>
+        <p:spPr>
+          <a:xfrm>
+            <a:off x="5031314" y="1634632"/>
+            <a:ext cx="5292262" cy="2823707"/>
+          </a:xfrm>
+          <a:prstGeom prst="rect">
+            <a:avLst/>
+          </a:prstGeom>
+          <a:ln w="6350">
+            <a:solidFill>
+              <a:schemeClr val="tx1"/>
+            </a:solidFill>
+          </a:ln>
+        </p:spPr>
+      </p:pic>
+      <p:pic>
+        <p:nvPicPr>
+          <p:cNvPr id="7" name="Picture 6" descr="A computer and a drone&#10;&#10;Description automatically generated">
+            <a:extLst>
+              <a:ext uri="{FF2B5EF4-FFF2-40B4-BE49-F238E27FC236}">
+                <a16:creationId xmlns:a16="http://schemas.microsoft.com/office/drawing/2014/main" id="{4A1F46A6-57D6-72A8-0E86-CA41057F8111}"/>
+              </a:ext>
+            </a:extLst>
+          </p:cNvPr>
+          <p:cNvPicPr>
+            <a:picLocks noChangeAspect="1"/>
+          </p:cNvPicPr>
+          <p:nvPr/>
+        </p:nvPicPr>
+        <p:blipFill>
+          <a:blip r:embed="rId3">
+            <a:extLst>
+              <a:ext uri="{28A0092B-C50C-407E-A947-70E740481C1C}">
+                <a14:useLocalDpi xmlns:a14="http://schemas.microsoft.com/office/drawing/2010/main" val="0"/>
+              </a:ext>
+            </a:extLst>
+          </a:blip>
+          <a:stretch>
+            <a:fillRect/>
+          </a:stretch>
+        </p:blipFill>
+        <p:spPr>
+          <a:xfrm>
+            <a:off x="1020574" y="1640508"/>
+            <a:ext cx="3509259" cy="2807407"/>
+          </a:xfrm>
+          <a:prstGeom prst="rect">
+            <a:avLst/>
+          </a:prstGeom>
+          <a:ln w="6350">
+            <a:solidFill>
+              <a:schemeClr val="tx1"/>
+            </a:solidFill>
+          </a:ln>
+        </p:spPr>
+      </p:pic>
+      <p:sp>
+        <p:nvSpPr>
+          <p:cNvPr id="8" name="Arrow: Right 7">
+            <a:extLst>
+              <a:ext uri="{FF2B5EF4-FFF2-40B4-BE49-F238E27FC236}">
+                <a16:creationId xmlns:a16="http://schemas.microsoft.com/office/drawing/2014/main" id="{18E8DE04-B673-71EB-7E71-945146FFDABC}"/>
+              </a:ext>
+            </a:extLst>
+          </p:cNvPr>
+          <p:cNvSpPr/>
+          <p:nvPr/>
+        </p:nvSpPr>
+        <p:spPr>
+          <a:xfrm>
+            <a:off x="4672584" y="2852928"/>
+            <a:ext cx="274320" cy="201168"/>
+          </a:xfrm>
+          <a:prstGeom prst="rightArrow">
+            <a:avLst/>
+          </a:prstGeom>
+        </p:spPr>
+        <p:style>
+          <a:lnRef idx="2">
+            <a:schemeClr val="accent1">
+              <a:shade val="15000"/>
+            </a:schemeClr>
+          </a:lnRef>
+          <a:fillRef idx="1">
+            <a:schemeClr val="accent1"/>
+          </a:fillRef>
+          <a:effectRef idx="0">
+            <a:schemeClr val="accent1"/>
+          </a:effectRef>
+          <a:fontRef idx="minor">
+            <a:schemeClr val="lt1"/>
+          </a:fontRef>
+        </p:style>
+        <p:txBody>
+          <a:bodyPr rtlCol="0" anchor="ctr"/>
+          <a:lstStyle/>
+          <a:p>
+            <a:pPr algn="ctr"/>
+            <a:endParaRPr lang="en-SG"/>
+          </a:p>
+        </p:txBody>
+      </p:sp>
+    </p:spTree>
+    <p:extLst>
+      <p:ext uri="{BB962C8B-B14F-4D97-AF65-F5344CB8AC3E}">
+        <p14:creationId xmlns:p14="http://schemas.microsoft.com/office/powerpoint/2010/main" val="1457027501"/>
       </p:ext>
     </p:extLst>
   </p:cSld>

</xml_diff>

<commit_message>
update the design document and finished the project design section in the readme file.
</commit_message>
<xml_diff>
--- a/doc/designDoc.pptx
+++ b/doc/designDoc.pptx
@@ -5,7 +5,7 @@
     <p:sldMasterId id="2147483648" r:id="rId1"/>
   </p:sldMasterIdLst>
   <p:notesMasterIdLst>
-    <p:notesMasterId r:id="rId10"/>
+    <p:notesMasterId r:id="rId13"/>
   </p:notesMasterIdLst>
   <p:sldIdLst>
     <p:sldId id="256" r:id="rId2"/>
@@ -16,6 +16,9 @@
     <p:sldId id="261" r:id="rId7"/>
     <p:sldId id="262" r:id="rId8"/>
     <p:sldId id="263" r:id="rId9"/>
+    <p:sldId id="264" r:id="rId10"/>
+    <p:sldId id="265" r:id="rId11"/>
+    <p:sldId id="266" r:id="rId12"/>
   </p:sldIdLst>
   <p:sldSz cx="12192000" cy="6858000"/>
   <p:notesSz cx="6858000" cy="9144000"/>
@@ -120,6 +123,1967 @@
     </p:ext>
   </p:extLst>
 </p:presentation>
+</file>
+
+<file path=ppt/charts/chart1.xml><?xml version="1.0" encoding="utf-8"?>
+<c:chartSpace xmlns:c="http://schemas.openxmlformats.org/drawingml/2006/chart" xmlns:a="http://schemas.openxmlformats.org/drawingml/2006/main" xmlns:r="http://schemas.openxmlformats.org/officeDocument/2006/relationships" xmlns:c16r2="http://schemas.microsoft.com/office/drawing/2015/06/chart">
+  <c:date1904 val="0"/>
+  <c:lang val="en-US"/>
+  <c:roundedCorners val="0"/>
+  <mc:AlternateContent xmlns:mc="http://schemas.openxmlformats.org/markup-compatibility/2006">
+    <mc:Choice xmlns:c14="http://schemas.microsoft.com/office/drawing/2007/8/2/chart" Requires="c14">
+      <c14:style val="102"/>
+    </mc:Choice>
+    <mc:Fallback>
+      <c:style val="2"/>
+    </mc:Fallback>
+  </mc:AlternateContent>
+  <c:chart>
+    <c:title>
+      <c:tx>
+        <c:rich>
+          <a:bodyPr rot="0" spcFirstLastPara="1" vertOverflow="ellipsis" vert="horz" wrap="square" anchor="ctr" anchorCtr="1"/>
+          <a:lstStyle/>
+          <a:p>
+            <a:pPr>
+              <a:defRPr sz="1862" b="0" i="0" u="none" strike="noStrike" kern="1200" spc="0" baseline="0">
+                <a:solidFill>
+                  <a:schemeClr val="tx1">
+                    <a:lumMod val="65000"/>
+                    <a:lumOff val="35000"/>
+                  </a:schemeClr>
+                </a:solidFill>
+                <a:latin typeface="+mn-lt"/>
+                <a:ea typeface="+mn-ea"/>
+                <a:cs typeface="+mn-cs"/>
+              </a:defRPr>
+            </a:pPr>
+            <a:r>
+              <a:rPr lang="en-SG" sz="1400" b="1" dirty="0"/>
+              <a:t>Normal contour </a:t>
+            </a:r>
+            <a:r>
+              <a:rPr lang="en-SG" sz="1400" b="1" i="0" u="none" strike="noStrike" kern="1200" spc="0" baseline="0" dirty="0">
+                <a:solidFill>
+                  <a:prstClr val="black">
+                    <a:lumMod val="65000"/>
+                    <a:lumOff val="35000"/>
+                  </a:prstClr>
+                </a:solidFill>
+              </a:rPr>
+              <a:t>matric</a:t>
+            </a:r>
+            <a:r>
+              <a:rPr lang="en-SG" sz="1400" b="1" dirty="0"/>
+              <a:t> generation progress before</a:t>
+            </a:r>
+            <a:r>
+              <a:rPr lang="en-SG" sz="1400" b="1" baseline="0" dirty="0"/>
+              <a:t> attack  </a:t>
+            </a:r>
+            <a:endParaRPr lang="en-SG" sz="1400" b="1" dirty="0"/>
+          </a:p>
+        </c:rich>
+      </c:tx>
+      <c:overlay val="0"/>
+      <c:spPr>
+        <a:noFill/>
+        <a:ln>
+          <a:noFill/>
+        </a:ln>
+        <a:effectLst/>
+      </c:spPr>
+    </c:title>
+    <c:autoTitleDeleted val="0"/>
+    <c:view3D>
+      <c:rotX val="15"/>
+      <c:rotY val="20"/>
+      <c:rAngAx val="0"/>
+    </c:view3D>
+    <c:floor>
+      <c:thickness val="0"/>
+      <c:spPr>
+        <a:noFill/>
+        <a:ln>
+          <a:noFill/>
+        </a:ln>
+        <a:effectLst/>
+        <a:sp3d/>
+      </c:spPr>
+    </c:floor>
+    <c:sideWall>
+      <c:thickness val="0"/>
+      <c:spPr>
+        <a:noFill/>
+        <a:ln>
+          <a:noFill/>
+        </a:ln>
+        <a:effectLst/>
+        <a:sp3d/>
+      </c:spPr>
+    </c:sideWall>
+    <c:backWall>
+      <c:thickness val="0"/>
+      <c:spPr>
+        <a:noFill/>
+        <a:ln>
+          <a:noFill/>
+        </a:ln>
+        <a:effectLst/>
+        <a:sp3d/>
+      </c:spPr>
+    </c:backWall>
+    <c:plotArea>
+      <c:layout/>
+      <c:surface3DChart>
+        <c:wireframe val="0"/>
+        <c:ser>
+          <c:idx val="0"/>
+          <c:order val="0"/>
+          <c:tx>
+            <c:strRef>
+              <c:f>Sheet1!$B$1</c:f>
+              <c:strCache>
+                <c:ptCount val="1"/>
+                <c:pt idx="0">
+                  <c:v>SensorLF</c:v>
+                </c:pt>
+              </c:strCache>
+            </c:strRef>
+          </c:tx>
+          <c:spPr>
+            <a:solidFill>
+              <a:schemeClr val="accent1"/>
+            </a:solidFill>
+            <a:ln/>
+            <a:effectLst/>
+            <a:sp3d/>
+          </c:spPr>
+          <c:cat>
+            <c:strRef>
+              <c:f>Sheet1!$A$2:$A$9</c:f>
+              <c:strCache>
+                <c:ptCount val="8"/>
+                <c:pt idx="0">
+                  <c:v>0m</c:v>
+                </c:pt>
+                <c:pt idx="1">
+                  <c:v>1m</c:v>
+                </c:pt>
+                <c:pt idx="2">
+                  <c:v>2m</c:v>
+                </c:pt>
+                <c:pt idx="3">
+                  <c:v>3m</c:v>
+                </c:pt>
+                <c:pt idx="4">
+                  <c:v>4m</c:v>
+                </c:pt>
+                <c:pt idx="5">
+                  <c:v>5m</c:v>
+                </c:pt>
+                <c:pt idx="6">
+                  <c:v>6m</c:v>
+                </c:pt>
+                <c:pt idx="7">
+                  <c:v>7m</c:v>
+                </c:pt>
+              </c:strCache>
+            </c:strRef>
+          </c:cat>
+          <c:val>
+            <c:numRef>
+              <c:f>Sheet1!$B$2:$B$9</c:f>
+              <c:numCache>
+                <c:formatCode>General</c:formatCode>
+                <c:ptCount val="8"/>
+                <c:pt idx="0">
+                  <c:v>1.5</c:v>
+                </c:pt>
+                <c:pt idx="1">
+                  <c:v>1.6</c:v>
+                </c:pt>
+                <c:pt idx="2">
+                  <c:v>0.2</c:v>
+                </c:pt>
+                <c:pt idx="3">
+                  <c:v>0.1</c:v>
+                </c:pt>
+                <c:pt idx="4">
+                  <c:v>0.3</c:v>
+                </c:pt>
+                <c:pt idx="5">
+                  <c:v>1.4</c:v>
+                </c:pt>
+                <c:pt idx="6">
+                  <c:v>1.6</c:v>
+                </c:pt>
+                <c:pt idx="7">
+                  <c:v>1.6</c:v>
+                </c:pt>
+              </c:numCache>
+            </c:numRef>
+          </c:val>
+          <c:extLst>
+            <c:ext xmlns:c16="http://schemas.microsoft.com/office/drawing/2014/chart" uri="{C3380CC4-5D6E-409C-BE32-E72D297353CC}">
+              <c16:uniqueId val="{00000000-D1A3-4868-9DED-77B3A1EF4C50}"/>
+            </c:ext>
+          </c:extLst>
+        </c:ser>
+        <c:ser>
+          <c:idx val="1"/>
+          <c:order val="1"/>
+          <c:tx>
+            <c:strRef>
+              <c:f>Sheet1!$C$1</c:f>
+              <c:strCache>
+                <c:ptCount val="1"/>
+                <c:pt idx="0">
+                  <c:v>SensorLB</c:v>
+                </c:pt>
+              </c:strCache>
+            </c:strRef>
+          </c:tx>
+          <c:spPr>
+            <a:solidFill>
+              <a:schemeClr val="accent2"/>
+            </a:solidFill>
+            <a:ln/>
+            <a:effectLst/>
+            <a:sp3d/>
+          </c:spPr>
+          <c:cat>
+            <c:strRef>
+              <c:f>Sheet1!$A$2:$A$9</c:f>
+              <c:strCache>
+                <c:ptCount val="8"/>
+                <c:pt idx="0">
+                  <c:v>0m</c:v>
+                </c:pt>
+                <c:pt idx="1">
+                  <c:v>1m</c:v>
+                </c:pt>
+                <c:pt idx="2">
+                  <c:v>2m</c:v>
+                </c:pt>
+                <c:pt idx="3">
+                  <c:v>3m</c:v>
+                </c:pt>
+                <c:pt idx="4">
+                  <c:v>4m</c:v>
+                </c:pt>
+                <c:pt idx="5">
+                  <c:v>5m</c:v>
+                </c:pt>
+                <c:pt idx="6">
+                  <c:v>6m</c:v>
+                </c:pt>
+                <c:pt idx="7">
+                  <c:v>7m</c:v>
+                </c:pt>
+              </c:strCache>
+            </c:strRef>
+          </c:cat>
+          <c:val>
+            <c:numRef>
+              <c:f>Sheet1!$C$2:$C$9</c:f>
+              <c:numCache>
+                <c:formatCode>General</c:formatCode>
+                <c:ptCount val="8"/>
+                <c:pt idx="0">
+                  <c:v>2.2999999999999998</c:v>
+                </c:pt>
+                <c:pt idx="1">
+                  <c:v>2.2999999999999998</c:v>
+                </c:pt>
+                <c:pt idx="2">
+                  <c:v>0.3</c:v>
+                </c:pt>
+                <c:pt idx="3">
+                  <c:v>0.2</c:v>
+                </c:pt>
+                <c:pt idx="4">
+                  <c:v>0.1</c:v>
+                </c:pt>
+                <c:pt idx="5">
+                  <c:v>2.2000000000000002</c:v>
+                </c:pt>
+                <c:pt idx="6">
+                  <c:v>2.2999999999999998</c:v>
+                </c:pt>
+                <c:pt idx="7">
+                  <c:v>2.2999999999999998</c:v>
+                </c:pt>
+              </c:numCache>
+            </c:numRef>
+          </c:val>
+          <c:extLst>
+            <c:ext xmlns:c16="http://schemas.microsoft.com/office/drawing/2014/chart" uri="{C3380CC4-5D6E-409C-BE32-E72D297353CC}">
+              <c16:uniqueId val="{00000001-D1A3-4868-9DED-77B3A1EF4C50}"/>
+            </c:ext>
+          </c:extLst>
+        </c:ser>
+        <c:ser>
+          <c:idx val="2"/>
+          <c:order val="2"/>
+          <c:tx>
+            <c:strRef>
+              <c:f>Sheet1!$D$1</c:f>
+              <c:strCache>
+                <c:ptCount val="1"/>
+                <c:pt idx="0">
+                  <c:v>Mid</c:v>
+                </c:pt>
+              </c:strCache>
+            </c:strRef>
+          </c:tx>
+          <c:spPr>
+            <a:solidFill>
+              <a:schemeClr val="accent3"/>
+            </a:solidFill>
+            <a:ln/>
+            <a:effectLst/>
+            <a:sp3d/>
+          </c:spPr>
+          <c:cat>
+            <c:strRef>
+              <c:f>Sheet1!$A$2:$A$9</c:f>
+              <c:strCache>
+                <c:ptCount val="8"/>
+                <c:pt idx="0">
+                  <c:v>0m</c:v>
+                </c:pt>
+                <c:pt idx="1">
+                  <c:v>1m</c:v>
+                </c:pt>
+                <c:pt idx="2">
+                  <c:v>2m</c:v>
+                </c:pt>
+                <c:pt idx="3">
+                  <c:v>3m</c:v>
+                </c:pt>
+                <c:pt idx="4">
+                  <c:v>4m</c:v>
+                </c:pt>
+                <c:pt idx="5">
+                  <c:v>5m</c:v>
+                </c:pt>
+                <c:pt idx="6">
+                  <c:v>6m</c:v>
+                </c:pt>
+                <c:pt idx="7">
+                  <c:v>7m</c:v>
+                </c:pt>
+              </c:strCache>
+            </c:strRef>
+          </c:cat>
+          <c:val>
+            <c:numRef>
+              <c:f>Sheet1!$D$2:$D$9</c:f>
+              <c:numCache>
+                <c:formatCode>General</c:formatCode>
+                <c:ptCount val="8"/>
+                <c:pt idx="0">
+                  <c:v>2.2000000000000002</c:v>
+                </c:pt>
+                <c:pt idx="1">
+                  <c:v>2.1</c:v>
+                </c:pt>
+                <c:pt idx="2">
+                  <c:v>0.2</c:v>
+                </c:pt>
+                <c:pt idx="3">
+                  <c:v>0.1</c:v>
+                </c:pt>
+                <c:pt idx="4">
+                  <c:v>0.1</c:v>
+                </c:pt>
+                <c:pt idx="5">
+                  <c:v>2.1</c:v>
+                </c:pt>
+                <c:pt idx="6">
+                  <c:v>2.2000000000000002</c:v>
+                </c:pt>
+                <c:pt idx="7">
+                  <c:v>2.2000000000000002</c:v>
+                </c:pt>
+              </c:numCache>
+            </c:numRef>
+          </c:val>
+          <c:extLst>
+            <c:ext xmlns:c16="http://schemas.microsoft.com/office/drawing/2014/chart" uri="{C3380CC4-5D6E-409C-BE32-E72D297353CC}">
+              <c16:uniqueId val="{00000002-D1A3-4868-9DED-77B3A1EF4C50}"/>
+            </c:ext>
+          </c:extLst>
+        </c:ser>
+        <c:ser>
+          <c:idx val="3"/>
+          <c:order val="3"/>
+          <c:tx>
+            <c:strRef>
+              <c:f>Sheet1!$E$1</c:f>
+              <c:strCache>
+                <c:ptCount val="1"/>
+                <c:pt idx="0">
+                  <c:v>SensorRB</c:v>
+                </c:pt>
+              </c:strCache>
+            </c:strRef>
+          </c:tx>
+          <c:spPr>
+            <a:solidFill>
+              <a:schemeClr val="accent4"/>
+            </a:solidFill>
+            <a:ln/>
+            <a:effectLst/>
+            <a:sp3d/>
+          </c:spPr>
+          <c:cat>
+            <c:strRef>
+              <c:f>Sheet1!$A$2:$A$9</c:f>
+              <c:strCache>
+                <c:ptCount val="8"/>
+                <c:pt idx="0">
+                  <c:v>0m</c:v>
+                </c:pt>
+                <c:pt idx="1">
+                  <c:v>1m</c:v>
+                </c:pt>
+                <c:pt idx="2">
+                  <c:v>2m</c:v>
+                </c:pt>
+                <c:pt idx="3">
+                  <c:v>3m</c:v>
+                </c:pt>
+                <c:pt idx="4">
+                  <c:v>4m</c:v>
+                </c:pt>
+                <c:pt idx="5">
+                  <c:v>5m</c:v>
+                </c:pt>
+                <c:pt idx="6">
+                  <c:v>6m</c:v>
+                </c:pt>
+                <c:pt idx="7">
+                  <c:v>7m</c:v>
+                </c:pt>
+              </c:strCache>
+            </c:strRef>
+          </c:cat>
+          <c:val>
+            <c:numRef>
+              <c:f>Sheet1!$E$2:$E$9</c:f>
+              <c:numCache>
+                <c:formatCode>General</c:formatCode>
+                <c:ptCount val="8"/>
+                <c:pt idx="0">
+                  <c:v>2.1</c:v>
+                </c:pt>
+                <c:pt idx="1">
+                  <c:v>2.2000000000000002</c:v>
+                </c:pt>
+                <c:pt idx="2">
+                  <c:v>0.1</c:v>
+                </c:pt>
+                <c:pt idx="3">
+                  <c:v>0.2</c:v>
+                </c:pt>
+                <c:pt idx="4">
+                  <c:v>0.1</c:v>
+                </c:pt>
+                <c:pt idx="5">
+                  <c:v>2.2999999999999998</c:v>
+                </c:pt>
+                <c:pt idx="6">
+                  <c:v>2.2000000000000002</c:v>
+                </c:pt>
+                <c:pt idx="7">
+                  <c:v>2.1</c:v>
+                </c:pt>
+              </c:numCache>
+            </c:numRef>
+          </c:val>
+          <c:extLst>
+            <c:ext xmlns:c16="http://schemas.microsoft.com/office/drawing/2014/chart" uri="{C3380CC4-5D6E-409C-BE32-E72D297353CC}">
+              <c16:uniqueId val="{00000003-D1A3-4868-9DED-77B3A1EF4C50}"/>
+            </c:ext>
+          </c:extLst>
+        </c:ser>
+        <c:ser>
+          <c:idx val="4"/>
+          <c:order val="4"/>
+          <c:tx>
+            <c:strRef>
+              <c:f>Sheet1!$F$1</c:f>
+              <c:strCache>
+                <c:ptCount val="1"/>
+                <c:pt idx="0">
+                  <c:v>SensorRF</c:v>
+                </c:pt>
+              </c:strCache>
+            </c:strRef>
+          </c:tx>
+          <c:spPr>
+            <a:solidFill>
+              <a:schemeClr val="accent5"/>
+            </a:solidFill>
+            <a:ln/>
+            <a:effectLst/>
+            <a:sp3d/>
+          </c:spPr>
+          <c:cat>
+            <c:strRef>
+              <c:f>Sheet1!$A$2:$A$9</c:f>
+              <c:strCache>
+                <c:ptCount val="8"/>
+                <c:pt idx="0">
+                  <c:v>0m</c:v>
+                </c:pt>
+                <c:pt idx="1">
+                  <c:v>1m</c:v>
+                </c:pt>
+                <c:pt idx="2">
+                  <c:v>2m</c:v>
+                </c:pt>
+                <c:pt idx="3">
+                  <c:v>3m</c:v>
+                </c:pt>
+                <c:pt idx="4">
+                  <c:v>4m</c:v>
+                </c:pt>
+                <c:pt idx="5">
+                  <c:v>5m</c:v>
+                </c:pt>
+                <c:pt idx="6">
+                  <c:v>6m</c:v>
+                </c:pt>
+                <c:pt idx="7">
+                  <c:v>7m</c:v>
+                </c:pt>
+              </c:strCache>
+            </c:strRef>
+          </c:cat>
+          <c:val>
+            <c:numRef>
+              <c:f>Sheet1!$F$2:$F$9</c:f>
+              <c:numCache>
+                <c:formatCode>General</c:formatCode>
+                <c:ptCount val="8"/>
+                <c:pt idx="0">
+                  <c:v>1.4</c:v>
+                </c:pt>
+                <c:pt idx="1">
+                  <c:v>1.5</c:v>
+                </c:pt>
+                <c:pt idx="2">
+                  <c:v>0.2</c:v>
+                </c:pt>
+                <c:pt idx="3">
+                  <c:v>0.2</c:v>
+                </c:pt>
+                <c:pt idx="4">
+                  <c:v>0.2</c:v>
+                </c:pt>
+                <c:pt idx="5">
+                  <c:v>1.3</c:v>
+                </c:pt>
+                <c:pt idx="6">
+                  <c:v>1.5</c:v>
+                </c:pt>
+                <c:pt idx="7">
+                  <c:v>1.6</c:v>
+                </c:pt>
+              </c:numCache>
+            </c:numRef>
+          </c:val>
+          <c:extLst>
+            <c:ext xmlns:c16="http://schemas.microsoft.com/office/drawing/2014/chart" uri="{C3380CC4-5D6E-409C-BE32-E72D297353CC}">
+              <c16:uniqueId val="{00000005-D1A3-4868-9DED-77B3A1EF4C50}"/>
+            </c:ext>
+          </c:extLst>
+        </c:ser>
+        <c:bandFmts>
+          <c:bandFmt>
+            <c:idx val="0"/>
+            <c:spPr>
+              <a:solidFill>
+                <a:schemeClr val="accent1"/>
+              </a:solidFill>
+              <a:ln/>
+              <a:effectLst/>
+              <a:sp3d/>
+            </c:spPr>
+          </c:bandFmt>
+          <c:bandFmt>
+            <c:idx val="1"/>
+            <c:spPr>
+              <a:solidFill>
+                <a:schemeClr val="accent2"/>
+              </a:solidFill>
+              <a:ln/>
+              <a:effectLst/>
+              <a:sp3d/>
+            </c:spPr>
+          </c:bandFmt>
+          <c:bandFmt>
+            <c:idx val="2"/>
+            <c:spPr>
+              <a:solidFill>
+                <a:schemeClr val="accent3"/>
+              </a:solidFill>
+              <a:ln/>
+              <a:effectLst/>
+              <a:sp3d/>
+            </c:spPr>
+          </c:bandFmt>
+          <c:bandFmt>
+            <c:idx val="3"/>
+            <c:spPr>
+              <a:solidFill>
+                <a:schemeClr val="accent4"/>
+              </a:solidFill>
+              <a:ln/>
+              <a:effectLst/>
+              <a:sp3d/>
+            </c:spPr>
+          </c:bandFmt>
+          <c:bandFmt>
+            <c:idx val="4"/>
+            <c:spPr>
+              <a:solidFill>
+                <a:schemeClr val="accent5"/>
+              </a:solidFill>
+              <a:ln/>
+              <a:effectLst/>
+              <a:sp3d/>
+            </c:spPr>
+          </c:bandFmt>
+          <c:bandFmt>
+            <c:idx val="5"/>
+            <c:spPr>
+              <a:solidFill>
+                <a:schemeClr val="accent6"/>
+              </a:solidFill>
+              <a:ln/>
+              <a:effectLst/>
+              <a:sp3d/>
+            </c:spPr>
+          </c:bandFmt>
+          <c:bandFmt>
+            <c:idx val="6"/>
+            <c:spPr>
+              <a:solidFill>
+                <a:schemeClr val="accent1">
+                  <a:lumMod val="60000"/>
+                </a:schemeClr>
+              </a:solidFill>
+              <a:ln/>
+              <a:effectLst/>
+              <a:sp3d/>
+            </c:spPr>
+          </c:bandFmt>
+          <c:bandFmt>
+            <c:idx val="7"/>
+            <c:spPr>
+              <a:solidFill>
+                <a:schemeClr val="accent2">
+                  <a:lumMod val="60000"/>
+                </a:schemeClr>
+              </a:solidFill>
+              <a:ln/>
+              <a:effectLst/>
+              <a:sp3d/>
+            </c:spPr>
+          </c:bandFmt>
+          <c:bandFmt>
+            <c:idx val="8"/>
+            <c:spPr>
+              <a:solidFill>
+                <a:schemeClr val="accent3">
+                  <a:lumMod val="60000"/>
+                </a:schemeClr>
+              </a:solidFill>
+              <a:ln/>
+              <a:effectLst/>
+              <a:sp3d/>
+            </c:spPr>
+          </c:bandFmt>
+          <c:bandFmt>
+            <c:idx val="9"/>
+            <c:spPr>
+              <a:solidFill>
+                <a:schemeClr val="accent4">
+                  <a:lumMod val="60000"/>
+                </a:schemeClr>
+              </a:solidFill>
+              <a:ln/>
+              <a:effectLst/>
+              <a:sp3d/>
+            </c:spPr>
+          </c:bandFmt>
+          <c:bandFmt>
+            <c:idx val="10"/>
+            <c:spPr>
+              <a:solidFill>
+                <a:schemeClr val="accent5">
+                  <a:lumMod val="60000"/>
+                </a:schemeClr>
+              </a:solidFill>
+              <a:ln/>
+              <a:effectLst/>
+              <a:sp3d/>
+            </c:spPr>
+          </c:bandFmt>
+          <c:bandFmt>
+            <c:idx val="11"/>
+            <c:spPr>
+              <a:solidFill>
+                <a:schemeClr val="accent6">
+                  <a:lumMod val="60000"/>
+                </a:schemeClr>
+              </a:solidFill>
+              <a:ln/>
+              <a:effectLst/>
+              <a:sp3d/>
+            </c:spPr>
+          </c:bandFmt>
+          <c:bandFmt>
+            <c:idx val="12"/>
+            <c:spPr>
+              <a:solidFill>
+                <a:schemeClr val="accent1">
+                  <a:lumMod val="80000"/>
+                  <a:lumOff val="20000"/>
+                </a:schemeClr>
+              </a:solidFill>
+              <a:ln/>
+              <a:effectLst/>
+              <a:sp3d/>
+            </c:spPr>
+          </c:bandFmt>
+          <c:bandFmt>
+            <c:idx val="13"/>
+            <c:spPr>
+              <a:solidFill>
+                <a:schemeClr val="accent2">
+                  <a:lumMod val="80000"/>
+                  <a:lumOff val="20000"/>
+                </a:schemeClr>
+              </a:solidFill>
+              <a:ln/>
+              <a:effectLst/>
+              <a:sp3d/>
+            </c:spPr>
+          </c:bandFmt>
+          <c:bandFmt>
+            <c:idx val="14"/>
+            <c:spPr>
+              <a:solidFill>
+                <a:schemeClr val="accent3">
+                  <a:lumMod val="80000"/>
+                  <a:lumOff val="20000"/>
+                </a:schemeClr>
+              </a:solidFill>
+              <a:ln/>
+              <a:effectLst/>
+              <a:sp3d/>
+            </c:spPr>
+          </c:bandFmt>
+        </c:bandFmts>
+        <c:axId val="1165506431"/>
+        <c:axId val="1163481215"/>
+        <c:axId val="1162802783"/>
+      </c:surface3DChart>
+      <c:catAx>
+        <c:axId val="1165506431"/>
+        <c:scaling>
+          <c:orientation val="minMax"/>
+        </c:scaling>
+        <c:delete val="0"/>
+        <c:axPos val="b"/>
+        <c:numFmt formatCode="General" sourceLinked="1"/>
+        <c:majorTickMark val="out"/>
+        <c:minorTickMark val="none"/>
+        <c:tickLblPos val="nextTo"/>
+        <c:spPr>
+          <a:noFill/>
+          <a:ln w="9525" cap="flat" cmpd="sng" algn="ctr">
+            <a:solidFill>
+              <a:schemeClr val="tx1">
+                <a:lumMod val="15000"/>
+                <a:lumOff val="85000"/>
+              </a:schemeClr>
+            </a:solidFill>
+            <a:round/>
+          </a:ln>
+          <a:effectLst/>
+        </c:spPr>
+        <c:txPr>
+          <a:bodyPr rot="-60000000" spcFirstLastPara="1" vertOverflow="ellipsis" vert="horz" wrap="square" anchor="ctr" anchorCtr="1"/>
+          <a:lstStyle/>
+          <a:p>
+            <a:pPr>
+              <a:defRPr sz="1197" b="0" i="0" u="none" strike="noStrike" kern="1200" baseline="0">
+                <a:solidFill>
+                  <a:schemeClr val="tx1">
+                    <a:lumMod val="65000"/>
+                    <a:lumOff val="35000"/>
+                  </a:schemeClr>
+                </a:solidFill>
+                <a:latin typeface="+mn-lt"/>
+                <a:ea typeface="+mn-ea"/>
+                <a:cs typeface="+mn-cs"/>
+              </a:defRPr>
+            </a:pPr>
+            <a:endParaRPr lang="en-US"/>
+          </a:p>
+        </c:txPr>
+        <c:crossAx val="1163481215"/>
+        <c:crosses val="autoZero"/>
+        <c:auto val="1"/>
+        <c:lblAlgn val="ctr"/>
+        <c:lblOffset val="100"/>
+        <c:noMultiLvlLbl val="0"/>
+      </c:catAx>
+      <c:valAx>
+        <c:axId val="1163481215"/>
+        <c:scaling>
+          <c:orientation val="minMax"/>
+        </c:scaling>
+        <c:delete val="0"/>
+        <c:axPos val="l"/>
+        <c:majorGridlines>
+          <c:spPr>
+            <a:ln w="9525" cap="flat" cmpd="sng" algn="ctr">
+              <a:solidFill>
+                <a:schemeClr val="tx1">
+                  <a:lumMod val="15000"/>
+                  <a:lumOff val="85000"/>
+                </a:schemeClr>
+              </a:solidFill>
+              <a:round/>
+            </a:ln>
+            <a:effectLst/>
+          </c:spPr>
+        </c:majorGridlines>
+        <c:numFmt formatCode="General" sourceLinked="1"/>
+        <c:majorTickMark val="none"/>
+        <c:minorTickMark val="none"/>
+        <c:tickLblPos val="nextTo"/>
+        <c:spPr>
+          <a:noFill/>
+          <a:ln>
+            <a:noFill/>
+          </a:ln>
+          <a:effectLst/>
+        </c:spPr>
+        <c:txPr>
+          <a:bodyPr rot="-60000000" spcFirstLastPara="1" vertOverflow="ellipsis" vert="horz" wrap="square" anchor="ctr" anchorCtr="1"/>
+          <a:lstStyle/>
+          <a:p>
+            <a:pPr>
+              <a:defRPr sz="1197" b="0" i="0" u="none" strike="noStrike" kern="1200" baseline="0">
+                <a:solidFill>
+                  <a:schemeClr val="tx1">
+                    <a:lumMod val="65000"/>
+                    <a:lumOff val="35000"/>
+                  </a:schemeClr>
+                </a:solidFill>
+                <a:latin typeface="+mn-lt"/>
+                <a:ea typeface="+mn-ea"/>
+                <a:cs typeface="+mn-cs"/>
+              </a:defRPr>
+            </a:pPr>
+            <a:endParaRPr lang="en-US"/>
+          </a:p>
+        </c:txPr>
+        <c:crossAx val="1165506431"/>
+        <c:crosses val="autoZero"/>
+        <c:crossBetween val="midCat"/>
+      </c:valAx>
+      <c:serAx>
+        <c:axId val="1162802783"/>
+        <c:scaling>
+          <c:orientation val="minMax"/>
+        </c:scaling>
+        <c:delete val="0"/>
+        <c:axPos val="b"/>
+        <c:majorTickMark val="out"/>
+        <c:minorTickMark val="none"/>
+        <c:tickLblPos val="nextTo"/>
+        <c:spPr>
+          <a:noFill/>
+          <a:ln w="9525" cap="flat" cmpd="sng" algn="ctr">
+            <a:solidFill>
+              <a:schemeClr val="tx1">
+                <a:lumMod val="15000"/>
+                <a:lumOff val="85000"/>
+              </a:schemeClr>
+            </a:solidFill>
+            <a:round/>
+          </a:ln>
+          <a:effectLst/>
+        </c:spPr>
+        <c:txPr>
+          <a:bodyPr rot="-60000000" spcFirstLastPara="1" vertOverflow="ellipsis" vert="horz" wrap="square" anchor="ctr" anchorCtr="1"/>
+          <a:lstStyle/>
+          <a:p>
+            <a:pPr>
+              <a:defRPr sz="1197" b="0" i="0" u="none" strike="noStrike" kern="1200" baseline="0">
+                <a:solidFill>
+                  <a:schemeClr val="tx1">
+                    <a:lumMod val="65000"/>
+                    <a:lumOff val="35000"/>
+                  </a:schemeClr>
+                </a:solidFill>
+                <a:latin typeface="+mn-lt"/>
+                <a:ea typeface="+mn-ea"/>
+                <a:cs typeface="+mn-cs"/>
+              </a:defRPr>
+            </a:pPr>
+            <a:endParaRPr lang="en-US"/>
+          </a:p>
+        </c:txPr>
+        <c:crossAx val="1163481215"/>
+        <c:crosses val="autoZero"/>
+      </c:serAx>
+      <c:spPr>
+        <a:noFill/>
+        <a:ln>
+          <a:noFill/>
+        </a:ln>
+        <a:effectLst/>
+      </c:spPr>
+    </c:plotArea>
+    <c:legend>
+      <c:legendPos val="b"/>
+      <c:overlay val="0"/>
+      <c:spPr>
+        <a:noFill/>
+        <a:ln>
+          <a:noFill/>
+        </a:ln>
+        <a:effectLst/>
+      </c:spPr>
+      <c:txPr>
+        <a:bodyPr rot="0" spcFirstLastPara="1" vertOverflow="ellipsis" vert="horz" wrap="square" anchor="ctr" anchorCtr="1"/>
+        <a:lstStyle/>
+        <a:p>
+          <a:pPr rtl="0">
+            <a:defRPr sz="1197" b="0" i="0" u="none" strike="noStrike" kern="1200" baseline="0">
+              <a:solidFill>
+                <a:schemeClr val="tx1">
+                  <a:lumMod val="65000"/>
+                  <a:lumOff val="35000"/>
+                </a:schemeClr>
+              </a:solidFill>
+              <a:latin typeface="+mn-lt"/>
+              <a:ea typeface="+mn-ea"/>
+              <a:cs typeface="+mn-cs"/>
+            </a:defRPr>
+          </a:pPr>
+          <a:endParaRPr lang="en-US"/>
+        </a:p>
+      </c:txPr>
+    </c:legend>
+    <c:plotVisOnly val="1"/>
+    <c:dispBlanksAs val="zero"/>
+    <c:extLst>
+      <c:ext xmlns:c16r3="http://schemas.microsoft.com/office/drawing/2017/03/chart" uri="{56B9EC1D-385E-4148-901F-78D8002777C0}">
+        <c16r3:dataDisplayOptions16>
+          <c16r3:dispNaAsBlank val="1"/>
+        </c16r3:dataDisplayOptions16>
+      </c:ext>
+    </c:extLst>
+    <c:showDLblsOverMax val="0"/>
+  </c:chart>
+  <c:spPr>
+    <a:noFill/>
+    <a:ln>
+      <a:noFill/>
+    </a:ln>
+    <a:effectLst/>
+  </c:spPr>
+  <c:txPr>
+    <a:bodyPr/>
+    <a:lstStyle/>
+    <a:p>
+      <a:pPr>
+        <a:defRPr/>
+      </a:pPr>
+      <a:endParaRPr lang="en-US"/>
+    </a:p>
+  </c:txPr>
+  <c:externalData r:id="rId1">
+    <c:autoUpdate val="0"/>
+  </c:externalData>
+</c:chartSpace>
+</file>
+
+<file path=ppt/charts/chart2.xml><?xml version="1.0" encoding="utf-8"?>
+<c:chartSpace xmlns:c="http://schemas.openxmlformats.org/drawingml/2006/chart" xmlns:a="http://schemas.openxmlformats.org/drawingml/2006/main" xmlns:r="http://schemas.openxmlformats.org/officeDocument/2006/relationships" xmlns:c16r2="http://schemas.microsoft.com/office/drawing/2015/06/chart">
+  <c:date1904 val="0"/>
+  <c:lang val="en-US"/>
+  <c:roundedCorners val="0"/>
+  <mc:AlternateContent xmlns:mc="http://schemas.openxmlformats.org/markup-compatibility/2006">
+    <mc:Choice xmlns:c14="http://schemas.microsoft.com/office/drawing/2007/8/2/chart" Requires="c14">
+      <c14:style val="102"/>
+    </mc:Choice>
+    <mc:Fallback>
+      <c:style val="2"/>
+    </mc:Fallback>
+  </mc:AlternateContent>
+  <c:chart>
+    <c:title>
+      <c:tx>
+        <c:rich>
+          <a:bodyPr rot="0" spcFirstLastPara="1" vertOverflow="ellipsis" vert="horz" wrap="square" anchor="ctr" anchorCtr="1"/>
+          <a:lstStyle/>
+          <a:p>
+            <a:pPr>
+              <a:defRPr sz="1862" b="0" i="0" u="none" strike="noStrike" kern="1200" spc="0" baseline="0">
+                <a:solidFill>
+                  <a:schemeClr val="tx1">
+                    <a:lumMod val="65000"/>
+                    <a:lumOff val="35000"/>
+                  </a:schemeClr>
+                </a:solidFill>
+                <a:latin typeface="+mn-lt"/>
+                <a:ea typeface="+mn-ea"/>
+                <a:cs typeface="+mn-cs"/>
+              </a:defRPr>
+            </a:pPr>
+            <a:r>
+              <a:rPr lang="en-SG" sz="1400" b="1" dirty="0"/>
+              <a:t>Fake contour matric generation progress after firmware</a:t>
+            </a:r>
+            <a:r>
+              <a:rPr lang="en-SG" sz="1400" b="1" baseline="0" dirty="0"/>
+              <a:t>  attack  </a:t>
+            </a:r>
+            <a:endParaRPr lang="en-SG" sz="1400" b="1" dirty="0"/>
+          </a:p>
+        </c:rich>
+      </c:tx>
+      <c:overlay val="0"/>
+      <c:spPr>
+        <a:noFill/>
+        <a:ln>
+          <a:noFill/>
+        </a:ln>
+        <a:effectLst/>
+      </c:spPr>
+    </c:title>
+    <c:autoTitleDeleted val="0"/>
+    <c:view3D>
+      <c:rotX val="15"/>
+      <c:rotY val="20"/>
+      <c:rAngAx val="0"/>
+    </c:view3D>
+    <c:floor>
+      <c:thickness val="0"/>
+      <c:spPr>
+        <a:noFill/>
+        <a:ln>
+          <a:noFill/>
+        </a:ln>
+        <a:effectLst/>
+        <a:sp3d/>
+      </c:spPr>
+    </c:floor>
+    <c:sideWall>
+      <c:thickness val="0"/>
+      <c:spPr>
+        <a:noFill/>
+        <a:ln>
+          <a:noFill/>
+        </a:ln>
+        <a:effectLst/>
+        <a:sp3d/>
+      </c:spPr>
+    </c:sideWall>
+    <c:backWall>
+      <c:thickness val="0"/>
+      <c:spPr>
+        <a:noFill/>
+        <a:ln>
+          <a:noFill/>
+        </a:ln>
+        <a:effectLst/>
+        <a:sp3d/>
+      </c:spPr>
+    </c:backWall>
+    <c:plotArea>
+      <c:layout/>
+      <c:surface3DChart>
+        <c:wireframe val="0"/>
+        <c:ser>
+          <c:idx val="0"/>
+          <c:order val="0"/>
+          <c:tx>
+            <c:strRef>
+              <c:f>Sheet1!$B$1</c:f>
+              <c:strCache>
+                <c:ptCount val="1"/>
+                <c:pt idx="0">
+                  <c:v>SensorLF</c:v>
+                </c:pt>
+              </c:strCache>
+            </c:strRef>
+          </c:tx>
+          <c:spPr>
+            <a:solidFill>
+              <a:schemeClr val="accent1"/>
+            </a:solidFill>
+            <a:ln/>
+            <a:effectLst/>
+            <a:sp3d/>
+          </c:spPr>
+          <c:cat>
+            <c:strRef>
+              <c:f>Sheet1!$A$2:$A$9</c:f>
+              <c:strCache>
+                <c:ptCount val="8"/>
+                <c:pt idx="0">
+                  <c:v>0m</c:v>
+                </c:pt>
+                <c:pt idx="1">
+                  <c:v>1m</c:v>
+                </c:pt>
+                <c:pt idx="2">
+                  <c:v>2m</c:v>
+                </c:pt>
+                <c:pt idx="3">
+                  <c:v>3m</c:v>
+                </c:pt>
+                <c:pt idx="4">
+                  <c:v>4m</c:v>
+                </c:pt>
+                <c:pt idx="5">
+                  <c:v>5m</c:v>
+                </c:pt>
+                <c:pt idx="6">
+                  <c:v>6m</c:v>
+                </c:pt>
+                <c:pt idx="7">
+                  <c:v>7m</c:v>
+                </c:pt>
+              </c:strCache>
+            </c:strRef>
+          </c:cat>
+          <c:val>
+            <c:numRef>
+              <c:f>Sheet1!$B$2:$B$9</c:f>
+              <c:numCache>
+                <c:formatCode>General</c:formatCode>
+                <c:ptCount val="8"/>
+                <c:pt idx="0">
+                  <c:v>1.5</c:v>
+                </c:pt>
+                <c:pt idx="1">
+                  <c:v>0.2</c:v>
+                </c:pt>
+                <c:pt idx="2">
+                  <c:v>0.2</c:v>
+                </c:pt>
+                <c:pt idx="3">
+                  <c:v>0.1</c:v>
+                </c:pt>
+                <c:pt idx="4">
+                  <c:v>1.3</c:v>
+                </c:pt>
+                <c:pt idx="5">
+                  <c:v>1.4</c:v>
+                </c:pt>
+                <c:pt idx="6">
+                  <c:v>0.6</c:v>
+                </c:pt>
+                <c:pt idx="7">
+                  <c:v>1.6</c:v>
+                </c:pt>
+              </c:numCache>
+            </c:numRef>
+          </c:val>
+          <c:extLst>
+            <c:ext xmlns:c16="http://schemas.microsoft.com/office/drawing/2014/chart" uri="{C3380CC4-5D6E-409C-BE32-E72D297353CC}">
+              <c16:uniqueId val="{00000000-02D8-45E6-80E9-37E043EA3487}"/>
+            </c:ext>
+          </c:extLst>
+        </c:ser>
+        <c:ser>
+          <c:idx val="1"/>
+          <c:order val="1"/>
+          <c:tx>
+            <c:strRef>
+              <c:f>Sheet1!$C$1</c:f>
+              <c:strCache>
+                <c:ptCount val="1"/>
+                <c:pt idx="0">
+                  <c:v>SensorLB</c:v>
+                </c:pt>
+              </c:strCache>
+            </c:strRef>
+          </c:tx>
+          <c:spPr>
+            <a:solidFill>
+              <a:schemeClr val="accent2"/>
+            </a:solidFill>
+            <a:ln/>
+            <a:effectLst/>
+            <a:sp3d/>
+          </c:spPr>
+          <c:cat>
+            <c:strRef>
+              <c:f>Sheet1!$A$2:$A$9</c:f>
+              <c:strCache>
+                <c:ptCount val="8"/>
+                <c:pt idx="0">
+                  <c:v>0m</c:v>
+                </c:pt>
+                <c:pt idx="1">
+                  <c:v>1m</c:v>
+                </c:pt>
+                <c:pt idx="2">
+                  <c:v>2m</c:v>
+                </c:pt>
+                <c:pt idx="3">
+                  <c:v>3m</c:v>
+                </c:pt>
+                <c:pt idx="4">
+                  <c:v>4m</c:v>
+                </c:pt>
+                <c:pt idx="5">
+                  <c:v>5m</c:v>
+                </c:pt>
+                <c:pt idx="6">
+                  <c:v>6m</c:v>
+                </c:pt>
+                <c:pt idx="7">
+                  <c:v>7m</c:v>
+                </c:pt>
+              </c:strCache>
+            </c:strRef>
+          </c:cat>
+          <c:val>
+            <c:numRef>
+              <c:f>Sheet1!$C$2:$C$9</c:f>
+              <c:numCache>
+                <c:formatCode>General</c:formatCode>
+                <c:ptCount val="8"/>
+                <c:pt idx="0">
+                  <c:v>1.3</c:v>
+                </c:pt>
+                <c:pt idx="1">
+                  <c:v>0.3</c:v>
+                </c:pt>
+                <c:pt idx="2">
+                  <c:v>1.3</c:v>
+                </c:pt>
+                <c:pt idx="3">
+                  <c:v>2.6</c:v>
+                </c:pt>
+                <c:pt idx="4">
+                  <c:v>1.1000000000000001</c:v>
+                </c:pt>
+                <c:pt idx="5">
+                  <c:v>2.2000000000000002</c:v>
+                </c:pt>
+                <c:pt idx="6">
+                  <c:v>2.5</c:v>
+                </c:pt>
+                <c:pt idx="7">
+                  <c:v>0.3</c:v>
+                </c:pt>
+              </c:numCache>
+            </c:numRef>
+          </c:val>
+          <c:extLst>
+            <c:ext xmlns:c16="http://schemas.microsoft.com/office/drawing/2014/chart" uri="{C3380CC4-5D6E-409C-BE32-E72D297353CC}">
+              <c16:uniqueId val="{00000001-02D8-45E6-80E9-37E043EA3487}"/>
+            </c:ext>
+          </c:extLst>
+        </c:ser>
+        <c:ser>
+          <c:idx val="2"/>
+          <c:order val="2"/>
+          <c:tx>
+            <c:strRef>
+              <c:f>Sheet1!$D$1</c:f>
+              <c:strCache>
+                <c:ptCount val="1"/>
+                <c:pt idx="0">
+                  <c:v>Mid</c:v>
+                </c:pt>
+              </c:strCache>
+            </c:strRef>
+          </c:tx>
+          <c:spPr>
+            <a:solidFill>
+              <a:schemeClr val="accent3"/>
+            </a:solidFill>
+            <a:ln/>
+            <a:effectLst/>
+            <a:sp3d/>
+          </c:spPr>
+          <c:cat>
+            <c:strRef>
+              <c:f>Sheet1!$A$2:$A$9</c:f>
+              <c:strCache>
+                <c:ptCount val="8"/>
+                <c:pt idx="0">
+                  <c:v>0m</c:v>
+                </c:pt>
+                <c:pt idx="1">
+                  <c:v>1m</c:v>
+                </c:pt>
+                <c:pt idx="2">
+                  <c:v>2m</c:v>
+                </c:pt>
+                <c:pt idx="3">
+                  <c:v>3m</c:v>
+                </c:pt>
+                <c:pt idx="4">
+                  <c:v>4m</c:v>
+                </c:pt>
+                <c:pt idx="5">
+                  <c:v>5m</c:v>
+                </c:pt>
+                <c:pt idx="6">
+                  <c:v>6m</c:v>
+                </c:pt>
+                <c:pt idx="7">
+                  <c:v>7m</c:v>
+                </c:pt>
+              </c:strCache>
+            </c:strRef>
+          </c:cat>
+          <c:val>
+            <c:numRef>
+              <c:f>Sheet1!$D$2:$D$9</c:f>
+              <c:numCache>
+                <c:formatCode>General</c:formatCode>
+                <c:ptCount val="8"/>
+                <c:pt idx="0">
+                  <c:v>2.2000000000000002</c:v>
+                </c:pt>
+                <c:pt idx="1">
+                  <c:v>0.2</c:v>
+                </c:pt>
+                <c:pt idx="2">
+                  <c:v>0.2</c:v>
+                </c:pt>
+                <c:pt idx="3">
+                  <c:v>2.1</c:v>
+                </c:pt>
+                <c:pt idx="4">
+                  <c:v>1.1000000000000001</c:v>
+                </c:pt>
+                <c:pt idx="5">
+                  <c:v>2.1</c:v>
+                </c:pt>
+                <c:pt idx="6">
+                  <c:v>2.2000000000000002</c:v>
+                </c:pt>
+                <c:pt idx="7">
+                  <c:v>1.2</c:v>
+                </c:pt>
+              </c:numCache>
+            </c:numRef>
+          </c:val>
+          <c:extLst>
+            <c:ext xmlns:c16="http://schemas.microsoft.com/office/drawing/2014/chart" uri="{C3380CC4-5D6E-409C-BE32-E72D297353CC}">
+              <c16:uniqueId val="{00000002-02D8-45E6-80E9-37E043EA3487}"/>
+            </c:ext>
+          </c:extLst>
+        </c:ser>
+        <c:ser>
+          <c:idx val="3"/>
+          <c:order val="3"/>
+          <c:tx>
+            <c:strRef>
+              <c:f>Sheet1!$E$1</c:f>
+              <c:strCache>
+                <c:ptCount val="1"/>
+                <c:pt idx="0">
+                  <c:v>SensorRB</c:v>
+                </c:pt>
+              </c:strCache>
+            </c:strRef>
+          </c:tx>
+          <c:spPr>
+            <a:solidFill>
+              <a:schemeClr val="accent4"/>
+            </a:solidFill>
+            <a:ln/>
+            <a:effectLst/>
+            <a:sp3d/>
+          </c:spPr>
+          <c:cat>
+            <c:strRef>
+              <c:f>Sheet1!$A$2:$A$9</c:f>
+              <c:strCache>
+                <c:ptCount val="8"/>
+                <c:pt idx="0">
+                  <c:v>0m</c:v>
+                </c:pt>
+                <c:pt idx="1">
+                  <c:v>1m</c:v>
+                </c:pt>
+                <c:pt idx="2">
+                  <c:v>2m</c:v>
+                </c:pt>
+                <c:pt idx="3">
+                  <c:v>3m</c:v>
+                </c:pt>
+                <c:pt idx="4">
+                  <c:v>4m</c:v>
+                </c:pt>
+                <c:pt idx="5">
+                  <c:v>5m</c:v>
+                </c:pt>
+                <c:pt idx="6">
+                  <c:v>6m</c:v>
+                </c:pt>
+                <c:pt idx="7">
+                  <c:v>7m</c:v>
+                </c:pt>
+              </c:strCache>
+            </c:strRef>
+          </c:cat>
+          <c:val>
+            <c:numRef>
+              <c:f>Sheet1!$E$2:$E$9</c:f>
+              <c:numCache>
+                <c:formatCode>General</c:formatCode>
+                <c:ptCount val="8"/>
+                <c:pt idx="0">
+                  <c:v>2.1</c:v>
+                </c:pt>
+                <c:pt idx="1">
+                  <c:v>0.1</c:v>
+                </c:pt>
+                <c:pt idx="2">
+                  <c:v>0.1</c:v>
+                </c:pt>
+                <c:pt idx="3">
+                  <c:v>0.2</c:v>
+                </c:pt>
+                <c:pt idx="4">
+                  <c:v>1.1000000000000001</c:v>
+                </c:pt>
+                <c:pt idx="5">
+                  <c:v>2.2999999999999998</c:v>
+                </c:pt>
+                <c:pt idx="6">
+                  <c:v>2.2000000000000002</c:v>
+                </c:pt>
+                <c:pt idx="7">
+                  <c:v>2.1</c:v>
+                </c:pt>
+              </c:numCache>
+            </c:numRef>
+          </c:val>
+          <c:extLst>
+            <c:ext xmlns:c16="http://schemas.microsoft.com/office/drawing/2014/chart" uri="{C3380CC4-5D6E-409C-BE32-E72D297353CC}">
+              <c16:uniqueId val="{00000003-02D8-45E6-80E9-37E043EA3487}"/>
+            </c:ext>
+          </c:extLst>
+        </c:ser>
+        <c:ser>
+          <c:idx val="4"/>
+          <c:order val="4"/>
+          <c:tx>
+            <c:strRef>
+              <c:f>Sheet1!$F$1</c:f>
+              <c:strCache>
+                <c:ptCount val="1"/>
+                <c:pt idx="0">
+                  <c:v>SensorRF</c:v>
+                </c:pt>
+              </c:strCache>
+            </c:strRef>
+          </c:tx>
+          <c:spPr>
+            <a:solidFill>
+              <a:schemeClr val="accent5"/>
+            </a:solidFill>
+            <a:ln/>
+            <a:effectLst/>
+            <a:sp3d/>
+          </c:spPr>
+          <c:cat>
+            <c:strRef>
+              <c:f>Sheet1!$A$2:$A$9</c:f>
+              <c:strCache>
+                <c:ptCount val="8"/>
+                <c:pt idx="0">
+                  <c:v>0m</c:v>
+                </c:pt>
+                <c:pt idx="1">
+                  <c:v>1m</c:v>
+                </c:pt>
+                <c:pt idx="2">
+                  <c:v>2m</c:v>
+                </c:pt>
+                <c:pt idx="3">
+                  <c:v>3m</c:v>
+                </c:pt>
+                <c:pt idx="4">
+                  <c:v>4m</c:v>
+                </c:pt>
+                <c:pt idx="5">
+                  <c:v>5m</c:v>
+                </c:pt>
+                <c:pt idx="6">
+                  <c:v>6m</c:v>
+                </c:pt>
+                <c:pt idx="7">
+                  <c:v>7m</c:v>
+                </c:pt>
+              </c:strCache>
+            </c:strRef>
+          </c:cat>
+          <c:val>
+            <c:numRef>
+              <c:f>Sheet1!$F$2:$F$9</c:f>
+              <c:numCache>
+                <c:formatCode>General</c:formatCode>
+                <c:ptCount val="8"/>
+                <c:pt idx="0">
+                  <c:v>1.4</c:v>
+                </c:pt>
+                <c:pt idx="1">
+                  <c:v>2.2000000000000002</c:v>
+                </c:pt>
+                <c:pt idx="2">
+                  <c:v>0.2</c:v>
+                </c:pt>
+                <c:pt idx="3">
+                  <c:v>1.2</c:v>
+                </c:pt>
+                <c:pt idx="4">
+                  <c:v>1.2</c:v>
+                </c:pt>
+                <c:pt idx="5">
+                  <c:v>1.3</c:v>
+                </c:pt>
+                <c:pt idx="6">
+                  <c:v>1.5</c:v>
+                </c:pt>
+                <c:pt idx="7">
+                  <c:v>1.6</c:v>
+                </c:pt>
+              </c:numCache>
+            </c:numRef>
+          </c:val>
+          <c:extLst>
+            <c:ext xmlns:c16="http://schemas.microsoft.com/office/drawing/2014/chart" uri="{C3380CC4-5D6E-409C-BE32-E72D297353CC}">
+              <c16:uniqueId val="{00000004-02D8-45E6-80E9-37E043EA3487}"/>
+            </c:ext>
+          </c:extLst>
+        </c:ser>
+        <c:bandFmts>
+          <c:bandFmt>
+            <c:idx val="0"/>
+            <c:spPr>
+              <a:solidFill>
+                <a:schemeClr val="accent1"/>
+              </a:solidFill>
+              <a:ln/>
+              <a:effectLst/>
+              <a:sp3d/>
+            </c:spPr>
+          </c:bandFmt>
+          <c:bandFmt>
+            <c:idx val="1"/>
+            <c:spPr>
+              <a:solidFill>
+                <a:schemeClr val="accent2"/>
+              </a:solidFill>
+              <a:ln/>
+              <a:effectLst/>
+              <a:sp3d/>
+            </c:spPr>
+          </c:bandFmt>
+          <c:bandFmt>
+            <c:idx val="2"/>
+            <c:spPr>
+              <a:solidFill>
+                <a:schemeClr val="accent3"/>
+              </a:solidFill>
+              <a:ln/>
+              <a:effectLst/>
+              <a:sp3d/>
+            </c:spPr>
+          </c:bandFmt>
+          <c:bandFmt>
+            <c:idx val="3"/>
+            <c:spPr>
+              <a:solidFill>
+                <a:schemeClr val="accent4"/>
+              </a:solidFill>
+              <a:ln/>
+              <a:effectLst/>
+              <a:sp3d/>
+            </c:spPr>
+          </c:bandFmt>
+          <c:bandFmt>
+            <c:idx val="4"/>
+            <c:spPr>
+              <a:solidFill>
+                <a:schemeClr val="accent5"/>
+              </a:solidFill>
+              <a:ln/>
+              <a:effectLst/>
+              <a:sp3d/>
+            </c:spPr>
+          </c:bandFmt>
+          <c:bandFmt>
+            <c:idx val="5"/>
+            <c:spPr>
+              <a:solidFill>
+                <a:schemeClr val="accent6"/>
+              </a:solidFill>
+              <a:ln/>
+              <a:effectLst/>
+              <a:sp3d/>
+            </c:spPr>
+          </c:bandFmt>
+          <c:bandFmt>
+            <c:idx val="6"/>
+            <c:spPr>
+              <a:solidFill>
+                <a:schemeClr val="accent1">
+                  <a:lumMod val="60000"/>
+                </a:schemeClr>
+              </a:solidFill>
+              <a:ln/>
+              <a:effectLst/>
+              <a:sp3d/>
+            </c:spPr>
+          </c:bandFmt>
+          <c:bandFmt>
+            <c:idx val="7"/>
+            <c:spPr>
+              <a:solidFill>
+                <a:schemeClr val="accent2">
+                  <a:lumMod val="60000"/>
+                </a:schemeClr>
+              </a:solidFill>
+              <a:ln/>
+              <a:effectLst/>
+              <a:sp3d/>
+            </c:spPr>
+          </c:bandFmt>
+          <c:bandFmt>
+            <c:idx val="8"/>
+            <c:spPr>
+              <a:solidFill>
+                <a:schemeClr val="accent3">
+                  <a:lumMod val="60000"/>
+                </a:schemeClr>
+              </a:solidFill>
+              <a:ln/>
+              <a:effectLst/>
+              <a:sp3d/>
+            </c:spPr>
+          </c:bandFmt>
+          <c:bandFmt>
+            <c:idx val="9"/>
+            <c:spPr>
+              <a:solidFill>
+                <a:schemeClr val="accent4">
+                  <a:lumMod val="60000"/>
+                </a:schemeClr>
+              </a:solidFill>
+              <a:ln/>
+              <a:effectLst/>
+              <a:sp3d/>
+            </c:spPr>
+          </c:bandFmt>
+          <c:bandFmt>
+            <c:idx val="10"/>
+            <c:spPr>
+              <a:solidFill>
+                <a:schemeClr val="accent5">
+                  <a:lumMod val="60000"/>
+                </a:schemeClr>
+              </a:solidFill>
+              <a:ln/>
+              <a:effectLst/>
+              <a:sp3d/>
+            </c:spPr>
+          </c:bandFmt>
+          <c:bandFmt>
+            <c:idx val="11"/>
+            <c:spPr>
+              <a:solidFill>
+                <a:schemeClr val="accent6">
+                  <a:lumMod val="60000"/>
+                </a:schemeClr>
+              </a:solidFill>
+              <a:ln/>
+              <a:effectLst/>
+              <a:sp3d/>
+            </c:spPr>
+          </c:bandFmt>
+          <c:bandFmt>
+            <c:idx val="12"/>
+            <c:spPr>
+              <a:solidFill>
+                <a:schemeClr val="accent1">
+                  <a:lumMod val="80000"/>
+                  <a:lumOff val="20000"/>
+                </a:schemeClr>
+              </a:solidFill>
+              <a:ln/>
+              <a:effectLst/>
+              <a:sp3d/>
+            </c:spPr>
+          </c:bandFmt>
+          <c:bandFmt>
+            <c:idx val="13"/>
+            <c:spPr>
+              <a:solidFill>
+                <a:schemeClr val="accent2">
+                  <a:lumMod val="80000"/>
+                  <a:lumOff val="20000"/>
+                </a:schemeClr>
+              </a:solidFill>
+              <a:ln/>
+              <a:effectLst/>
+              <a:sp3d/>
+            </c:spPr>
+          </c:bandFmt>
+          <c:bandFmt>
+            <c:idx val="14"/>
+            <c:spPr>
+              <a:solidFill>
+                <a:schemeClr val="accent3">
+                  <a:lumMod val="80000"/>
+                  <a:lumOff val="20000"/>
+                </a:schemeClr>
+              </a:solidFill>
+              <a:ln/>
+              <a:effectLst/>
+              <a:sp3d/>
+            </c:spPr>
+          </c:bandFmt>
+        </c:bandFmts>
+        <c:axId val="1165506431"/>
+        <c:axId val="1163481215"/>
+        <c:axId val="1162802783"/>
+      </c:surface3DChart>
+      <c:catAx>
+        <c:axId val="1165506431"/>
+        <c:scaling>
+          <c:orientation val="minMax"/>
+        </c:scaling>
+        <c:delete val="0"/>
+        <c:axPos val="b"/>
+        <c:numFmt formatCode="General" sourceLinked="1"/>
+        <c:majorTickMark val="out"/>
+        <c:minorTickMark val="none"/>
+        <c:tickLblPos val="nextTo"/>
+        <c:spPr>
+          <a:noFill/>
+          <a:ln w="9525" cap="flat" cmpd="sng" algn="ctr">
+            <a:solidFill>
+              <a:schemeClr val="tx1">
+                <a:lumMod val="15000"/>
+                <a:lumOff val="85000"/>
+              </a:schemeClr>
+            </a:solidFill>
+            <a:round/>
+          </a:ln>
+          <a:effectLst/>
+        </c:spPr>
+        <c:txPr>
+          <a:bodyPr rot="-60000000" spcFirstLastPara="1" vertOverflow="ellipsis" vert="horz" wrap="square" anchor="ctr" anchorCtr="1"/>
+          <a:lstStyle/>
+          <a:p>
+            <a:pPr>
+              <a:defRPr sz="1197" b="0" i="0" u="none" strike="noStrike" kern="1200" baseline="0">
+                <a:solidFill>
+                  <a:schemeClr val="tx1">
+                    <a:lumMod val="65000"/>
+                    <a:lumOff val="35000"/>
+                  </a:schemeClr>
+                </a:solidFill>
+                <a:latin typeface="+mn-lt"/>
+                <a:ea typeface="+mn-ea"/>
+                <a:cs typeface="+mn-cs"/>
+              </a:defRPr>
+            </a:pPr>
+            <a:endParaRPr lang="en-US"/>
+          </a:p>
+        </c:txPr>
+        <c:crossAx val="1163481215"/>
+        <c:crosses val="autoZero"/>
+        <c:auto val="1"/>
+        <c:lblAlgn val="ctr"/>
+        <c:lblOffset val="100"/>
+        <c:noMultiLvlLbl val="0"/>
+      </c:catAx>
+      <c:valAx>
+        <c:axId val="1163481215"/>
+        <c:scaling>
+          <c:orientation val="minMax"/>
+        </c:scaling>
+        <c:delete val="0"/>
+        <c:axPos val="l"/>
+        <c:majorGridlines>
+          <c:spPr>
+            <a:ln w="9525" cap="flat" cmpd="sng" algn="ctr">
+              <a:solidFill>
+                <a:schemeClr val="tx1">
+                  <a:lumMod val="15000"/>
+                  <a:lumOff val="85000"/>
+                </a:schemeClr>
+              </a:solidFill>
+              <a:round/>
+            </a:ln>
+            <a:effectLst/>
+          </c:spPr>
+        </c:majorGridlines>
+        <c:numFmt formatCode="General" sourceLinked="1"/>
+        <c:majorTickMark val="none"/>
+        <c:minorTickMark val="none"/>
+        <c:tickLblPos val="nextTo"/>
+        <c:spPr>
+          <a:noFill/>
+          <a:ln>
+            <a:noFill/>
+          </a:ln>
+          <a:effectLst/>
+        </c:spPr>
+        <c:txPr>
+          <a:bodyPr rot="-60000000" spcFirstLastPara="1" vertOverflow="ellipsis" vert="horz" wrap="square" anchor="ctr" anchorCtr="1"/>
+          <a:lstStyle/>
+          <a:p>
+            <a:pPr>
+              <a:defRPr sz="1197" b="0" i="0" u="none" strike="noStrike" kern="1200" baseline="0">
+                <a:solidFill>
+                  <a:schemeClr val="tx1">
+                    <a:lumMod val="65000"/>
+                    <a:lumOff val="35000"/>
+                  </a:schemeClr>
+                </a:solidFill>
+                <a:latin typeface="+mn-lt"/>
+                <a:ea typeface="+mn-ea"/>
+                <a:cs typeface="+mn-cs"/>
+              </a:defRPr>
+            </a:pPr>
+            <a:endParaRPr lang="en-US"/>
+          </a:p>
+        </c:txPr>
+        <c:crossAx val="1165506431"/>
+        <c:crosses val="autoZero"/>
+        <c:crossBetween val="midCat"/>
+      </c:valAx>
+      <c:serAx>
+        <c:axId val="1162802783"/>
+        <c:scaling>
+          <c:orientation val="minMax"/>
+        </c:scaling>
+        <c:delete val="0"/>
+        <c:axPos val="b"/>
+        <c:majorTickMark val="out"/>
+        <c:minorTickMark val="none"/>
+        <c:tickLblPos val="nextTo"/>
+        <c:spPr>
+          <a:noFill/>
+          <a:ln w="9525" cap="flat" cmpd="sng" algn="ctr">
+            <a:solidFill>
+              <a:schemeClr val="tx1">
+                <a:lumMod val="15000"/>
+                <a:lumOff val="85000"/>
+              </a:schemeClr>
+            </a:solidFill>
+            <a:round/>
+          </a:ln>
+          <a:effectLst/>
+        </c:spPr>
+        <c:txPr>
+          <a:bodyPr rot="-60000000" spcFirstLastPara="1" vertOverflow="ellipsis" vert="horz" wrap="square" anchor="ctr" anchorCtr="1"/>
+          <a:lstStyle/>
+          <a:p>
+            <a:pPr>
+              <a:defRPr sz="1197" b="0" i="0" u="none" strike="noStrike" kern="1200" baseline="0">
+                <a:solidFill>
+                  <a:schemeClr val="tx1">
+                    <a:lumMod val="65000"/>
+                    <a:lumOff val="35000"/>
+                  </a:schemeClr>
+                </a:solidFill>
+                <a:latin typeface="+mn-lt"/>
+                <a:ea typeface="+mn-ea"/>
+                <a:cs typeface="+mn-cs"/>
+              </a:defRPr>
+            </a:pPr>
+            <a:endParaRPr lang="en-US"/>
+          </a:p>
+        </c:txPr>
+        <c:crossAx val="1163481215"/>
+        <c:crosses val="autoZero"/>
+      </c:serAx>
+    </c:plotArea>
+    <c:legend>
+      <c:legendPos val="b"/>
+      <c:overlay val="0"/>
+      <c:spPr>
+        <a:noFill/>
+        <a:ln>
+          <a:noFill/>
+        </a:ln>
+        <a:effectLst/>
+      </c:spPr>
+      <c:txPr>
+        <a:bodyPr rot="0" spcFirstLastPara="1" vertOverflow="ellipsis" vert="horz" wrap="square" anchor="ctr" anchorCtr="1"/>
+        <a:lstStyle/>
+        <a:p>
+          <a:pPr rtl="0">
+            <a:defRPr sz="1197" b="0" i="0" u="none" strike="noStrike" kern="1200" baseline="0">
+              <a:solidFill>
+                <a:schemeClr val="tx1">
+                  <a:lumMod val="65000"/>
+                  <a:lumOff val="35000"/>
+                </a:schemeClr>
+              </a:solidFill>
+              <a:latin typeface="+mn-lt"/>
+              <a:ea typeface="+mn-ea"/>
+              <a:cs typeface="+mn-cs"/>
+            </a:defRPr>
+          </a:pPr>
+          <a:endParaRPr lang="en-US"/>
+        </a:p>
+      </c:txPr>
+    </c:legend>
+    <c:plotVisOnly val="1"/>
+    <c:dispBlanksAs val="zero"/>
+    <c:extLst>
+      <c:ext xmlns:c16r3="http://schemas.microsoft.com/office/drawing/2017/03/chart" uri="{56B9EC1D-385E-4148-901F-78D8002777C0}">
+        <c16r3:dataDisplayOptions16>
+          <c16r3:dispNaAsBlank val="1"/>
+        </c16r3:dataDisplayOptions16>
+      </c:ext>
+    </c:extLst>
+    <c:showDLblsOverMax val="0"/>
+  </c:chart>
+  <c:txPr>
+    <a:bodyPr/>
+    <a:lstStyle/>
+    <a:p>
+      <a:pPr>
+        <a:defRPr/>
+      </a:pPr>
+      <a:endParaRPr lang="en-US"/>
+    </a:p>
+  </c:txPr>
+  <c:externalData r:id="rId1">
+    <c:autoUpdate val="0"/>
+  </c:externalData>
+</c:chartSpace>
 </file>
 
 <file path=ppt/notesMasters/notesMaster1.xml><?xml version="1.0" encoding="utf-8"?>
@@ -5706,6 +7670,673 @@
 </p:sld>
 </file>
 
+<file path=ppt/slides/slide10.xml><?xml version="1.0" encoding="utf-8"?>
+<p:sld xmlns:a="http://schemas.openxmlformats.org/drawingml/2006/main" xmlns:r="http://schemas.openxmlformats.org/officeDocument/2006/relationships" xmlns:p="http://schemas.openxmlformats.org/presentationml/2006/main">
+  <p:cSld>
+    <p:spTree>
+      <p:nvGrpSpPr>
+        <p:cNvPr id="1" name=""/>
+        <p:cNvGrpSpPr/>
+        <p:nvPr/>
+      </p:nvGrpSpPr>
+      <p:grpSpPr>
+        <a:xfrm>
+          <a:off x="0" y="0"/>
+          <a:ext cx="0" cy="0"/>
+          <a:chOff x="0" y="0"/>
+          <a:chExt cx="0" cy="0"/>
+        </a:xfrm>
+      </p:grpSpPr>
+      <p:pic>
+        <p:nvPicPr>
+          <p:cNvPr id="11" name="Picture 10">
+            <a:extLst>
+              <a:ext uri="{FF2B5EF4-FFF2-40B4-BE49-F238E27FC236}">
+                <a16:creationId xmlns:a16="http://schemas.microsoft.com/office/drawing/2014/main" id="{8D4720DF-5D76-BA74-2032-EE55F9614F57}"/>
+              </a:ext>
+            </a:extLst>
+          </p:cNvPr>
+          <p:cNvPicPr>
+            <a:picLocks noChangeAspect="1"/>
+          </p:cNvPicPr>
+          <p:nvPr/>
+        </p:nvPicPr>
+        <p:blipFill>
+          <a:blip r:embed="rId2"/>
+          <a:stretch>
+            <a:fillRect/>
+          </a:stretch>
+        </p:blipFill>
+        <p:spPr>
+          <a:xfrm>
+            <a:off x="5653995" y="694943"/>
+            <a:ext cx="4523928" cy="5468112"/>
+          </a:xfrm>
+          <a:prstGeom prst="rect">
+            <a:avLst/>
+          </a:prstGeom>
+        </p:spPr>
+      </p:pic>
+      <p:pic>
+        <p:nvPicPr>
+          <p:cNvPr id="5" name="Picture 4">
+            <a:extLst>
+              <a:ext uri="{FF2B5EF4-FFF2-40B4-BE49-F238E27FC236}">
+                <a16:creationId xmlns:a16="http://schemas.microsoft.com/office/drawing/2014/main" id="{D9BBC459-B729-7493-9114-D85354F874EE}"/>
+              </a:ext>
+            </a:extLst>
+          </p:cNvPr>
+          <p:cNvPicPr>
+            <a:picLocks noChangeAspect="1"/>
+          </p:cNvPicPr>
+          <p:nvPr/>
+        </p:nvPicPr>
+        <p:blipFill>
+          <a:blip r:embed="rId3"/>
+          <a:stretch>
+            <a:fillRect/>
+          </a:stretch>
+        </p:blipFill>
+        <p:spPr>
+          <a:xfrm>
+            <a:off x="1173772" y="694944"/>
+            <a:ext cx="3445660" cy="5468112"/>
+          </a:xfrm>
+          <a:prstGeom prst="rect">
+            <a:avLst/>
+          </a:prstGeom>
+        </p:spPr>
+      </p:pic>
+      <p:sp>
+        <p:nvSpPr>
+          <p:cNvPr id="6" name="Rectangle 5">
+            <a:extLst>
+              <a:ext uri="{FF2B5EF4-FFF2-40B4-BE49-F238E27FC236}">
+                <a16:creationId xmlns:a16="http://schemas.microsoft.com/office/drawing/2014/main" id="{FCCF7355-F1B2-1548-241B-852F6BAFA6CD}"/>
+              </a:ext>
+            </a:extLst>
+          </p:cNvPr>
+          <p:cNvSpPr/>
+          <p:nvPr/>
+        </p:nvSpPr>
+        <p:spPr>
+          <a:xfrm>
+            <a:off x="4078224" y="4489704"/>
+            <a:ext cx="541208" cy="301752"/>
+          </a:xfrm>
+          <a:prstGeom prst="rect">
+            <a:avLst/>
+          </a:prstGeom>
+          <a:noFill/>
+          <a:ln w="28575" cap="flat" cmpd="sng" algn="ctr">
+            <a:solidFill>
+              <a:srgbClr val="FF0000"/>
+            </a:solidFill>
+            <a:prstDash val="sysDash"/>
+            <a:round/>
+            <a:headEnd type="none" w="med" len="med"/>
+            <a:tailEnd type="none" w="med" len="med"/>
+          </a:ln>
+        </p:spPr>
+        <p:style>
+          <a:lnRef idx="0">
+            <a:scrgbClr r="0" g="0" b="0"/>
+          </a:lnRef>
+          <a:fillRef idx="0">
+            <a:scrgbClr r="0" g="0" b="0"/>
+          </a:fillRef>
+          <a:effectRef idx="0">
+            <a:scrgbClr r="0" g="0" b="0"/>
+          </a:effectRef>
+          <a:fontRef idx="minor">
+            <a:schemeClr val="dk1"/>
+          </a:fontRef>
+        </p:style>
+        <p:txBody>
+          <a:bodyPr rtlCol="0" anchor="ctr"/>
+          <a:lstStyle/>
+          <a:p>
+            <a:pPr algn="ctr"/>
+            <a:endParaRPr lang="en-SG" dirty="0"/>
+          </a:p>
+        </p:txBody>
+      </p:sp>
+      <p:cxnSp>
+        <p:nvCxnSpPr>
+          <p:cNvPr id="8" name="Straight Arrow Connector 7">
+            <a:extLst>
+              <a:ext uri="{FF2B5EF4-FFF2-40B4-BE49-F238E27FC236}">
+                <a16:creationId xmlns:a16="http://schemas.microsoft.com/office/drawing/2014/main" id="{F5F4FB4D-8633-BBDE-2757-07FABF2773E5}"/>
+              </a:ext>
+            </a:extLst>
+          </p:cNvPr>
+          <p:cNvCxnSpPr/>
+          <p:nvPr/>
+        </p:nvCxnSpPr>
+        <p:spPr>
+          <a:xfrm flipV="1">
+            <a:off x="4315968" y="4882896"/>
+            <a:ext cx="0" cy="566928"/>
+          </a:xfrm>
+          <a:prstGeom prst="straightConnector1">
+            <a:avLst/>
+          </a:prstGeom>
+          <a:ln w="19050">
+            <a:solidFill>
+              <a:srgbClr val="FF0000"/>
+            </a:solidFill>
+            <a:tailEnd type="triangle"/>
+          </a:ln>
+        </p:spPr>
+        <p:style>
+          <a:lnRef idx="1">
+            <a:schemeClr val="accent1"/>
+          </a:lnRef>
+          <a:fillRef idx="0">
+            <a:schemeClr val="accent1"/>
+          </a:fillRef>
+          <a:effectRef idx="0">
+            <a:schemeClr val="accent1"/>
+          </a:effectRef>
+          <a:fontRef idx="minor">
+            <a:schemeClr val="tx1"/>
+          </a:fontRef>
+        </p:style>
+      </p:cxnSp>
+      <p:sp>
+        <p:nvSpPr>
+          <p:cNvPr id="9" name="TextBox 8">
+            <a:extLst>
+              <a:ext uri="{FF2B5EF4-FFF2-40B4-BE49-F238E27FC236}">
+                <a16:creationId xmlns:a16="http://schemas.microsoft.com/office/drawing/2014/main" id="{68DE76F9-5DAE-ACDC-FF1F-5139B494AFB6}"/>
+              </a:ext>
+            </a:extLst>
+          </p:cNvPr>
+          <p:cNvSpPr txBox="1"/>
+          <p:nvPr/>
+        </p:nvSpPr>
+        <p:spPr>
+          <a:xfrm>
+            <a:off x="3425955" y="5449824"/>
+            <a:ext cx="2298189" cy="584775"/>
+          </a:xfrm>
+          <a:prstGeom prst="rect">
+            <a:avLst/>
+          </a:prstGeom>
+          <a:noFill/>
+        </p:spPr>
+        <p:txBody>
+          <a:bodyPr wrap="square">
+            <a:spAutoFit/>
+          </a:bodyPr>
+          <a:lstStyle/>
+          <a:p>
+            <a:r>
+              <a:rPr lang="en-SG" sz="1600" b="1" dirty="0">
+                <a:solidFill>
+                  <a:srgbClr val="FF0000"/>
+                </a:solidFill>
+              </a:rPr>
+              <a:t>Press the loading contour JSON file button</a:t>
+            </a:r>
+          </a:p>
+        </p:txBody>
+      </p:sp>
+      <p:sp>
+        <p:nvSpPr>
+          <p:cNvPr id="12" name="Arrow: Right 11">
+            <a:extLst>
+              <a:ext uri="{FF2B5EF4-FFF2-40B4-BE49-F238E27FC236}">
+                <a16:creationId xmlns:a16="http://schemas.microsoft.com/office/drawing/2014/main" id="{D2AE5E44-E201-CF24-42E6-8F767F622655}"/>
+              </a:ext>
+            </a:extLst>
+          </p:cNvPr>
+          <p:cNvSpPr/>
+          <p:nvPr/>
+        </p:nvSpPr>
+        <p:spPr>
+          <a:xfrm>
+            <a:off x="4928616" y="2148840"/>
+            <a:ext cx="502920" cy="274320"/>
+          </a:xfrm>
+          <a:prstGeom prst="rightArrow">
+            <a:avLst/>
+          </a:prstGeom>
+        </p:spPr>
+        <p:style>
+          <a:lnRef idx="2">
+            <a:schemeClr val="accent1">
+              <a:shade val="15000"/>
+            </a:schemeClr>
+          </a:lnRef>
+          <a:fillRef idx="1">
+            <a:schemeClr val="accent1"/>
+          </a:fillRef>
+          <a:effectRef idx="0">
+            <a:schemeClr val="accent1"/>
+          </a:effectRef>
+          <a:fontRef idx="minor">
+            <a:schemeClr val="lt1"/>
+          </a:fontRef>
+        </p:style>
+        <p:txBody>
+          <a:bodyPr rtlCol="0" anchor="ctr"/>
+          <a:lstStyle/>
+          <a:p>
+            <a:pPr algn="ctr"/>
+            <a:endParaRPr lang="en-SG"/>
+          </a:p>
+        </p:txBody>
+      </p:sp>
+    </p:spTree>
+    <p:extLst>
+      <p:ext uri="{BB962C8B-B14F-4D97-AF65-F5344CB8AC3E}">
+        <p14:creationId xmlns:p14="http://schemas.microsoft.com/office/powerpoint/2010/main" val="3286128573"/>
+      </p:ext>
+    </p:extLst>
+  </p:cSld>
+  <p:clrMapOvr>
+    <a:masterClrMapping/>
+  </p:clrMapOvr>
+</p:sld>
+</file>
+
+<file path=ppt/slides/slide11.xml><?xml version="1.0" encoding="utf-8"?>
+<p:sld xmlns:a="http://schemas.openxmlformats.org/drawingml/2006/main" xmlns:r="http://schemas.openxmlformats.org/officeDocument/2006/relationships" xmlns:p="http://schemas.openxmlformats.org/presentationml/2006/main">
+  <p:cSld>
+    <p:spTree>
+      <p:nvGrpSpPr>
+        <p:cNvPr id="1" name=""/>
+        <p:cNvGrpSpPr/>
+        <p:nvPr/>
+      </p:nvGrpSpPr>
+      <p:grpSpPr>
+        <a:xfrm>
+          <a:off x="0" y="0"/>
+          <a:ext cx="0" cy="0"/>
+          <a:chOff x="0" y="0"/>
+          <a:chExt cx="0" cy="0"/>
+        </a:xfrm>
+      </p:grpSpPr>
+      <p:pic>
+        <p:nvPicPr>
+          <p:cNvPr id="5" name="Picture 4" descr="A screenshot of a computer&#10;&#10;Description automatically generated">
+            <a:extLst>
+              <a:ext uri="{FF2B5EF4-FFF2-40B4-BE49-F238E27FC236}">
+                <a16:creationId xmlns:a16="http://schemas.microsoft.com/office/drawing/2014/main" id="{AC3E7721-BA1A-DA19-4F49-EB71D1FA6ADA}"/>
+              </a:ext>
+            </a:extLst>
+          </p:cNvPr>
+          <p:cNvPicPr>
+            <a:picLocks noChangeAspect="1"/>
+          </p:cNvPicPr>
+          <p:nvPr/>
+        </p:nvPicPr>
+        <p:blipFill>
+          <a:blip r:embed="rId2">
+            <a:extLst>
+              <a:ext uri="{28A0092B-C50C-407E-A947-70E740481C1C}">
+                <a14:useLocalDpi xmlns:a14="http://schemas.microsoft.com/office/drawing/2010/main" val="0"/>
+              </a:ext>
+            </a:extLst>
+          </a:blip>
+          <a:stretch>
+            <a:fillRect/>
+          </a:stretch>
+        </p:blipFill>
+        <p:spPr>
+          <a:xfrm>
+            <a:off x="2486167" y="356616"/>
+            <a:ext cx="4664896" cy="5934456"/>
+          </a:xfrm>
+          <a:prstGeom prst="rect">
+            <a:avLst/>
+          </a:prstGeom>
+        </p:spPr>
+      </p:pic>
+      <p:sp>
+        <p:nvSpPr>
+          <p:cNvPr id="6" name="Rectangle 5">
+            <a:extLst>
+              <a:ext uri="{FF2B5EF4-FFF2-40B4-BE49-F238E27FC236}">
+                <a16:creationId xmlns:a16="http://schemas.microsoft.com/office/drawing/2014/main" id="{9A15A7F1-93A1-3E41-E6DB-5293D8C22DDF}"/>
+              </a:ext>
+            </a:extLst>
+          </p:cNvPr>
+          <p:cNvSpPr/>
+          <p:nvPr/>
+        </p:nvSpPr>
+        <p:spPr>
+          <a:xfrm>
+            <a:off x="2403632" y="5474372"/>
+            <a:ext cx="3905728" cy="350355"/>
+          </a:xfrm>
+          <a:prstGeom prst="rect">
+            <a:avLst/>
+          </a:prstGeom>
+          <a:noFill/>
+          <a:ln w="19050" cap="flat" cmpd="sng" algn="ctr">
+            <a:solidFill>
+              <a:srgbClr val="FF0000"/>
+            </a:solidFill>
+            <a:prstDash val="sysDash"/>
+            <a:round/>
+            <a:headEnd type="none" w="med" len="med"/>
+            <a:tailEnd type="none" w="med" len="med"/>
+          </a:ln>
+        </p:spPr>
+        <p:style>
+          <a:lnRef idx="0">
+            <a:scrgbClr r="0" g="0" b="0"/>
+          </a:lnRef>
+          <a:fillRef idx="0">
+            <a:scrgbClr r="0" g="0" b="0"/>
+          </a:fillRef>
+          <a:effectRef idx="0">
+            <a:scrgbClr r="0" g="0" b="0"/>
+          </a:effectRef>
+          <a:fontRef idx="minor">
+            <a:schemeClr val="accent2"/>
+          </a:fontRef>
+        </p:style>
+        <p:txBody>
+          <a:bodyPr rtlCol="0" anchor="ctr"/>
+          <a:lstStyle/>
+          <a:p>
+            <a:pPr algn="ctr"/>
+            <a:endParaRPr lang="en-SG"/>
+          </a:p>
+        </p:txBody>
+      </p:sp>
+      <p:sp>
+        <p:nvSpPr>
+          <p:cNvPr id="7" name="Rectangle 6">
+            <a:extLst>
+              <a:ext uri="{FF2B5EF4-FFF2-40B4-BE49-F238E27FC236}">
+                <a16:creationId xmlns:a16="http://schemas.microsoft.com/office/drawing/2014/main" id="{F062A3DA-4736-D5F7-3104-44F31C3A901F}"/>
+              </a:ext>
+            </a:extLst>
+          </p:cNvPr>
+          <p:cNvSpPr/>
+          <p:nvPr/>
+        </p:nvSpPr>
+        <p:spPr>
+          <a:xfrm>
+            <a:off x="2403632" y="5943929"/>
+            <a:ext cx="3905728" cy="350355"/>
+          </a:xfrm>
+          <a:prstGeom prst="rect">
+            <a:avLst/>
+          </a:prstGeom>
+          <a:noFill/>
+          <a:ln w="19050" cap="flat" cmpd="sng" algn="ctr">
+            <a:solidFill>
+              <a:srgbClr val="FF0000"/>
+            </a:solidFill>
+            <a:prstDash val="sysDash"/>
+            <a:round/>
+            <a:headEnd type="none" w="med" len="med"/>
+            <a:tailEnd type="none" w="med" len="med"/>
+          </a:ln>
+        </p:spPr>
+        <p:style>
+          <a:lnRef idx="0">
+            <a:scrgbClr r="0" g="0" b="0"/>
+          </a:lnRef>
+          <a:fillRef idx="0">
+            <a:scrgbClr r="0" g="0" b="0"/>
+          </a:fillRef>
+          <a:effectRef idx="0">
+            <a:scrgbClr r="0" g="0" b="0"/>
+          </a:effectRef>
+          <a:fontRef idx="minor">
+            <a:schemeClr val="accent2"/>
+          </a:fontRef>
+        </p:style>
+        <p:txBody>
+          <a:bodyPr rtlCol="0" anchor="ctr"/>
+          <a:lstStyle/>
+          <a:p>
+            <a:pPr algn="ctr"/>
+            <a:endParaRPr lang="en-SG"/>
+          </a:p>
+        </p:txBody>
+      </p:sp>
+      <p:cxnSp>
+        <p:nvCxnSpPr>
+          <p:cNvPr id="8" name="Straight Arrow Connector 7">
+            <a:extLst>
+              <a:ext uri="{FF2B5EF4-FFF2-40B4-BE49-F238E27FC236}">
+                <a16:creationId xmlns:a16="http://schemas.microsoft.com/office/drawing/2014/main" id="{4F759F88-E9A6-538B-7A94-0EE2DD56A221}"/>
+              </a:ext>
+            </a:extLst>
+          </p:cNvPr>
+          <p:cNvCxnSpPr>
+            <a:cxnSpLocks/>
+            <a:stCxn id="9" idx="2"/>
+          </p:cNvCxnSpPr>
+          <p:nvPr/>
+        </p:nvCxnSpPr>
+        <p:spPr>
+          <a:xfrm flipH="1">
+            <a:off x="6382512" y="4782127"/>
+            <a:ext cx="987553" cy="814001"/>
+          </a:xfrm>
+          <a:prstGeom prst="straightConnector1">
+            <a:avLst/>
+          </a:prstGeom>
+          <a:ln w="19050">
+            <a:solidFill>
+              <a:srgbClr val="FF0000"/>
+            </a:solidFill>
+            <a:tailEnd type="triangle"/>
+          </a:ln>
+        </p:spPr>
+        <p:style>
+          <a:lnRef idx="1">
+            <a:schemeClr val="accent1"/>
+          </a:lnRef>
+          <a:fillRef idx="0">
+            <a:schemeClr val="accent1"/>
+          </a:fillRef>
+          <a:effectRef idx="0">
+            <a:schemeClr val="accent1"/>
+          </a:effectRef>
+          <a:fontRef idx="minor">
+            <a:schemeClr val="tx1"/>
+          </a:fontRef>
+        </p:style>
+      </p:cxnSp>
+      <p:sp>
+        <p:nvSpPr>
+          <p:cNvPr id="9" name="TextBox 8">
+            <a:extLst>
+              <a:ext uri="{FF2B5EF4-FFF2-40B4-BE49-F238E27FC236}">
+                <a16:creationId xmlns:a16="http://schemas.microsoft.com/office/drawing/2014/main" id="{ACBF0EBC-E593-F786-AC48-0DE455666075}"/>
+              </a:ext>
+            </a:extLst>
+          </p:cNvPr>
+          <p:cNvSpPr txBox="1"/>
+          <p:nvPr/>
+        </p:nvSpPr>
+        <p:spPr>
+          <a:xfrm>
+            <a:off x="6309361" y="3612576"/>
+            <a:ext cx="2121408" cy="1169551"/>
+          </a:xfrm>
+          <a:prstGeom prst="rect">
+            <a:avLst/>
+          </a:prstGeom>
+          <a:noFill/>
+          <a:ln w="19050">
+            <a:solidFill>
+              <a:srgbClr val="FF0000"/>
+            </a:solidFill>
+          </a:ln>
+        </p:spPr>
+        <p:txBody>
+          <a:bodyPr wrap="square">
+            <a:spAutoFit/>
+          </a:bodyPr>
+          <a:lstStyle/>
+          <a:p>
+            <a:r>
+              <a:rPr lang="en-SG" sz="1400" b="1" dirty="0">
+                <a:solidFill>
+                  <a:srgbClr val="FF0000"/>
+                </a:solidFill>
+              </a:rPr>
+              <a:t>Firmware feedback PATT checksum and the controller local computed PATT checksum  are different  </a:t>
+            </a:r>
+          </a:p>
+        </p:txBody>
+      </p:sp>
+      <p:cxnSp>
+        <p:nvCxnSpPr>
+          <p:cNvPr id="12" name="Straight Arrow Connector 11">
+            <a:extLst>
+              <a:ext uri="{FF2B5EF4-FFF2-40B4-BE49-F238E27FC236}">
+                <a16:creationId xmlns:a16="http://schemas.microsoft.com/office/drawing/2014/main" id="{ED15B5FB-D71A-491F-3336-C74838BD3669}"/>
+              </a:ext>
+            </a:extLst>
+          </p:cNvPr>
+          <p:cNvCxnSpPr>
+            <a:cxnSpLocks/>
+            <a:stCxn id="9" idx="2"/>
+          </p:cNvCxnSpPr>
+          <p:nvPr/>
+        </p:nvCxnSpPr>
+        <p:spPr>
+          <a:xfrm flipH="1">
+            <a:off x="6392350" y="4782127"/>
+            <a:ext cx="977715" cy="1291095"/>
+          </a:xfrm>
+          <a:prstGeom prst="straightConnector1">
+            <a:avLst/>
+          </a:prstGeom>
+          <a:ln w="19050">
+            <a:solidFill>
+              <a:srgbClr val="FF0000"/>
+            </a:solidFill>
+            <a:tailEnd type="triangle"/>
+          </a:ln>
+        </p:spPr>
+        <p:style>
+          <a:lnRef idx="1">
+            <a:schemeClr val="accent1"/>
+          </a:lnRef>
+          <a:fillRef idx="0">
+            <a:schemeClr val="accent1"/>
+          </a:fillRef>
+          <a:effectRef idx="0">
+            <a:schemeClr val="accent1"/>
+          </a:effectRef>
+          <a:fontRef idx="minor">
+            <a:schemeClr val="tx1"/>
+          </a:fontRef>
+        </p:style>
+      </p:cxnSp>
+      <p:cxnSp>
+        <p:nvCxnSpPr>
+          <p:cNvPr id="17" name="Straight Arrow Connector 16">
+            <a:extLst>
+              <a:ext uri="{FF2B5EF4-FFF2-40B4-BE49-F238E27FC236}">
+                <a16:creationId xmlns:a16="http://schemas.microsoft.com/office/drawing/2014/main" id="{B5658A7D-7B19-C29F-9474-98F2FB4227DC}"/>
+              </a:ext>
+            </a:extLst>
+          </p:cNvPr>
+          <p:cNvCxnSpPr>
+            <a:cxnSpLocks/>
+          </p:cNvCxnSpPr>
+          <p:nvPr/>
+        </p:nvCxnSpPr>
+        <p:spPr>
+          <a:xfrm flipH="1" flipV="1">
+            <a:off x="5605272" y="784778"/>
+            <a:ext cx="1188720" cy="1162894"/>
+          </a:xfrm>
+          <a:prstGeom prst="straightConnector1">
+            <a:avLst/>
+          </a:prstGeom>
+          <a:ln w="19050">
+            <a:solidFill>
+              <a:srgbClr val="FF0000"/>
+            </a:solidFill>
+            <a:tailEnd type="triangle"/>
+          </a:ln>
+        </p:spPr>
+        <p:style>
+          <a:lnRef idx="1">
+            <a:schemeClr val="accent1"/>
+          </a:lnRef>
+          <a:fillRef idx="0">
+            <a:schemeClr val="accent1"/>
+          </a:fillRef>
+          <a:effectRef idx="0">
+            <a:schemeClr val="accent1"/>
+          </a:effectRef>
+          <a:fontRef idx="minor">
+            <a:schemeClr val="tx1"/>
+          </a:fontRef>
+        </p:style>
+      </p:cxnSp>
+      <p:sp>
+        <p:nvSpPr>
+          <p:cNvPr id="20" name="TextBox 19">
+            <a:extLst>
+              <a:ext uri="{FF2B5EF4-FFF2-40B4-BE49-F238E27FC236}">
+                <a16:creationId xmlns:a16="http://schemas.microsoft.com/office/drawing/2014/main" id="{0588D464-9421-09C2-1DB8-792794177687}"/>
+              </a:ext>
+            </a:extLst>
+          </p:cNvPr>
+          <p:cNvSpPr txBox="1"/>
+          <p:nvPr/>
+        </p:nvSpPr>
+        <p:spPr>
+          <a:xfrm>
+            <a:off x="6382512" y="1947672"/>
+            <a:ext cx="2048257" cy="954107"/>
+          </a:xfrm>
+          <a:prstGeom prst="rect">
+            <a:avLst/>
+          </a:prstGeom>
+          <a:noFill/>
+          <a:ln w="28575">
+            <a:solidFill>
+              <a:srgbClr val="FF0000"/>
+            </a:solidFill>
+          </a:ln>
+        </p:spPr>
+        <p:txBody>
+          <a:bodyPr wrap="square">
+            <a:spAutoFit/>
+          </a:bodyPr>
+          <a:lstStyle/>
+          <a:p>
+            <a:r>
+              <a:rPr lang="en-SG" sz="1400" b="1" dirty="0">
+                <a:solidFill>
+                  <a:srgbClr val="FF0000"/>
+                </a:solidFill>
+              </a:rPr>
+              <a:t>Firmware attestation state shown firmware unsafe, the firmware attack is detected</a:t>
+            </a:r>
+          </a:p>
+        </p:txBody>
+      </p:sp>
+    </p:spTree>
+    <p:extLst>
+      <p:ext uri="{BB962C8B-B14F-4D97-AF65-F5344CB8AC3E}">
+        <p14:creationId xmlns:p14="http://schemas.microsoft.com/office/powerpoint/2010/main" val="2179630484"/>
+      </p:ext>
+    </p:extLst>
+  </p:cSld>
+  <p:clrMapOvr>
+    <a:masterClrMapping/>
+  </p:clrMapOvr>
+</p:sld>
+</file>
+
 <file path=ppt/slides/slide2.xml><?xml version="1.0" encoding="utf-8"?>
 <p:sld xmlns:a="http://schemas.openxmlformats.org/drawingml/2006/main" xmlns:r="http://schemas.openxmlformats.org/officeDocument/2006/relationships" xmlns:p="http://schemas.openxmlformats.org/presentationml/2006/main">
   <p:cSld>
@@ -13217,6 +15848,868 @@
     <p:extLst>
       <p:ext uri="{BB962C8B-B14F-4D97-AF65-F5344CB8AC3E}">
         <p14:creationId xmlns:p14="http://schemas.microsoft.com/office/powerpoint/2010/main" val="1457027501"/>
+      </p:ext>
+    </p:extLst>
+  </p:cSld>
+  <p:clrMapOvr>
+    <a:masterClrMapping/>
+  </p:clrMapOvr>
+</p:sld>
+</file>
+
+<file path=ppt/slides/slide9.xml><?xml version="1.0" encoding="utf-8"?>
+<p:sld xmlns:a="http://schemas.openxmlformats.org/drawingml/2006/main" xmlns:r="http://schemas.openxmlformats.org/officeDocument/2006/relationships" xmlns:p="http://schemas.openxmlformats.org/presentationml/2006/main">
+  <p:cSld>
+    <p:spTree>
+      <p:nvGrpSpPr>
+        <p:cNvPr id="1" name=""/>
+        <p:cNvGrpSpPr/>
+        <p:nvPr/>
+      </p:nvGrpSpPr>
+      <p:grpSpPr>
+        <a:xfrm>
+          <a:off x="0" y="0"/>
+          <a:ext cx="0" cy="0"/>
+          <a:chOff x="0" y="0"/>
+          <a:chExt cx="0" cy="0"/>
+        </a:xfrm>
+      </p:grpSpPr>
+      <p:sp>
+        <p:nvSpPr>
+          <p:cNvPr id="21" name="Rectangle 20">
+            <a:extLst>
+              <a:ext uri="{FF2B5EF4-FFF2-40B4-BE49-F238E27FC236}">
+                <a16:creationId xmlns:a16="http://schemas.microsoft.com/office/drawing/2014/main" id="{9D26F93C-7173-BD86-5957-1C1AC3390A9B}"/>
+              </a:ext>
+            </a:extLst>
+          </p:cNvPr>
+          <p:cNvSpPr/>
+          <p:nvPr/>
+        </p:nvSpPr>
+        <p:spPr>
+          <a:xfrm>
+            <a:off x="761261" y="230909"/>
+            <a:ext cx="10895030" cy="6396041"/>
+          </a:xfrm>
+          <a:prstGeom prst="rect">
+            <a:avLst/>
+          </a:prstGeom>
+          <a:noFill/>
+          <a:ln>
+            <a:prstDash val="sysDash"/>
+          </a:ln>
+        </p:spPr>
+        <p:style>
+          <a:lnRef idx="2">
+            <a:schemeClr val="accent1">
+              <a:shade val="15000"/>
+            </a:schemeClr>
+          </a:lnRef>
+          <a:fillRef idx="1">
+            <a:schemeClr val="accent1"/>
+          </a:fillRef>
+          <a:effectRef idx="0">
+            <a:schemeClr val="accent1"/>
+          </a:effectRef>
+          <a:fontRef idx="minor">
+            <a:schemeClr val="lt1"/>
+          </a:fontRef>
+        </p:style>
+        <p:txBody>
+          <a:bodyPr rtlCol="0" anchor="ctr"/>
+          <a:lstStyle/>
+          <a:p>
+            <a:pPr algn="ctr"/>
+            <a:endParaRPr lang="en-SG" dirty="0"/>
+          </a:p>
+        </p:txBody>
+      </p:sp>
+      <p:graphicFrame>
+        <p:nvGraphicFramePr>
+          <p:cNvPr id="6" name="Chart 5">
+            <a:extLst>
+              <a:ext uri="{FF2B5EF4-FFF2-40B4-BE49-F238E27FC236}">
+                <a16:creationId xmlns:a16="http://schemas.microsoft.com/office/drawing/2014/main" id="{11579348-ABE2-3449-C493-CC751E134DF2}"/>
+              </a:ext>
+            </a:extLst>
+          </p:cNvPr>
+          <p:cNvGraphicFramePr/>
+          <p:nvPr>
+            <p:extLst>
+              <p:ext uri="{D42A27DB-BD31-4B8C-83A1-F6EECF244321}">
+                <p14:modId xmlns:p14="http://schemas.microsoft.com/office/powerpoint/2010/main" val="157230008"/>
+              </p:ext>
+            </p:extLst>
+          </p:nvPr>
+        </p:nvGraphicFramePr>
+        <p:xfrm>
+          <a:off x="761261" y="3283479"/>
+          <a:ext cx="5537940" cy="3343471"/>
+        </p:xfrm>
+        <a:graphic>
+          <a:graphicData uri="http://schemas.openxmlformats.org/drawingml/2006/chart">
+            <c:chart xmlns:c="http://schemas.openxmlformats.org/drawingml/2006/chart" xmlns:r="http://schemas.openxmlformats.org/officeDocument/2006/relationships" r:id="rId2"/>
+          </a:graphicData>
+        </a:graphic>
+      </p:graphicFrame>
+      <p:pic>
+        <p:nvPicPr>
+          <p:cNvPr id="8" name="Picture 7">
+            <a:extLst>
+              <a:ext uri="{FF2B5EF4-FFF2-40B4-BE49-F238E27FC236}">
+                <a16:creationId xmlns:a16="http://schemas.microsoft.com/office/drawing/2014/main" id="{85F704D8-783F-6040-673B-F165D1786D60}"/>
+              </a:ext>
+            </a:extLst>
+          </p:cNvPr>
+          <p:cNvPicPr>
+            <a:picLocks noChangeAspect="1"/>
+          </p:cNvPicPr>
+          <p:nvPr/>
+        </p:nvPicPr>
+        <p:blipFill>
+          <a:blip r:embed="rId3"/>
+          <a:stretch>
+            <a:fillRect/>
+          </a:stretch>
+        </p:blipFill>
+        <p:spPr>
+          <a:xfrm>
+            <a:off x="1129505" y="339553"/>
+            <a:ext cx="5169696" cy="2493677"/>
+          </a:xfrm>
+          <a:prstGeom prst="rect">
+            <a:avLst/>
+          </a:prstGeom>
+          <a:ln w="12700">
+            <a:solidFill>
+              <a:schemeClr val="tx1"/>
+            </a:solidFill>
+          </a:ln>
+        </p:spPr>
+      </p:pic>
+      <p:graphicFrame>
+        <p:nvGraphicFramePr>
+          <p:cNvPr id="9" name="Chart 8">
+            <a:extLst>
+              <a:ext uri="{FF2B5EF4-FFF2-40B4-BE49-F238E27FC236}">
+                <a16:creationId xmlns:a16="http://schemas.microsoft.com/office/drawing/2014/main" id="{B8AA1378-4788-2118-68C4-9E3039DE4EC2}"/>
+              </a:ext>
+            </a:extLst>
+          </p:cNvPr>
+          <p:cNvGraphicFramePr/>
+          <p:nvPr>
+            <p:extLst>
+              <p:ext uri="{D42A27DB-BD31-4B8C-83A1-F6EECF244321}">
+                <p14:modId xmlns:p14="http://schemas.microsoft.com/office/powerpoint/2010/main" val="151346899"/>
+              </p:ext>
+            </p:extLst>
+          </p:nvPr>
+        </p:nvGraphicFramePr>
+        <p:xfrm>
+          <a:off x="6299201" y="3297285"/>
+          <a:ext cx="5537940" cy="3343471"/>
+        </p:xfrm>
+        <a:graphic>
+          <a:graphicData uri="http://schemas.openxmlformats.org/drawingml/2006/chart">
+            <c:chart xmlns:c="http://schemas.openxmlformats.org/drawingml/2006/chart" xmlns:r="http://schemas.openxmlformats.org/officeDocument/2006/relationships" r:id="rId4"/>
+          </a:graphicData>
+        </a:graphic>
+      </p:graphicFrame>
+      <p:sp>
+        <p:nvSpPr>
+          <p:cNvPr id="15" name="Freeform: Shape 14">
+            <a:extLst>
+              <a:ext uri="{FF2B5EF4-FFF2-40B4-BE49-F238E27FC236}">
+                <a16:creationId xmlns:a16="http://schemas.microsoft.com/office/drawing/2014/main" id="{E6072015-CDA2-6B79-45FA-B9582FC36E78}"/>
+              </a:ext>
+            </a:extLst>
+          </p:cNvPr>
+          <p:cNvSpPr/>
+          <p:nvPr/>
+        </p:nvSpPr>
+        <p:spPr>
+          <a:xfrm>
+            <a:off x="1747007" y="1586391"/>
+            <a:ext cx="3934691" cy="1080655"/>
+          </a:xfrm>
+          <a:custGeom>
+            <a:avLst/>
+            <a:gdLst>
+              <a:gd name="connsiteX0" fmla="*/ 0 w 3934691"/>
+              <a:gd name="connsiteY0" fmla="*/ 83128 h 1080655"/>
+              <a:gd name="connsiteX1" fmla="*/ 129309 w 3934691"/>
+              <a:gd name="connsiteY1" fmla="*/ 73891 h 1080655"/>
+              <a:gd name="connsiteX2" fmla="*/ 193963 w 3934691"/>
+              <a:gd name="connsiteY2" fmla="*/ 46182 h 1080655"/>
+              <a:gd name="connsiteX3" fmla="*/ 249381 w 3934691"/>
+              <a:gd name="connsiteY3" fmla="*/ 36946 h 1080655"/>
+              <a:gd name="connsiteX4" fmla="*/ 304800 w 3934691"/>
+              <a:gd name="connsiteY4" fmla="*/ 18473 h 1080655"/>
+              <a:gd name="connsiteX5" fmla="*/ 369454 w 3934691"/>
+              <a:gd name="connsiteY5" fmla="*/ 0 h 1080655"/>
+              <a:gd name="connsiteX6" fmla="*/ 674254 w 3934691"/>
+              <a:gd name="connsiteY6" fmla="*/ 9237 h 1080655"/>
+              <a:gd name="connsiteX7" fmla="*/ 701963 w 3934691"/>
+              <a:gd name="connsiteY7" fmla="*/ 27710 h 1080655"/>
+              <a:gd name="connsiteX8" fmla="*/ 858981 w 3934691"/>
+              <a:gd name="connsiteY8" fmla="*/ 36946 h 1080655"/>
+              <a:gd name="connsiteX9" fmla="*/ 1173018 w 3934691"/>
+              <a:gd name="connsiteY9" fmla="*/ 55419 h 1080655"/>
+              <a:gd name="connsiteX10" fmla="*/ 1237672 w 3934691"/>
+              <a:gd name="connsiteY10" fmla="*/ 83128 h 1080655"/>
+              <a:gd name="connsiteX11" fmla="*/ 1293091 w 3934691"/>
+              <a:gd name="connsiteY11" fmla="*/ 147782 h 1080655"/>
+              <a:gd name="connsiteX12" fmla="*/ 1320800 w 3934691"/>
+              <a:gd name="connsiteY12" fmla="*/ 175491 h 1080655"/>
+              <a:gd name="connsiteX13" fmla="*/ 1357745 w 3934691"/>
+              <a:gd name="connsiteY13" fmla="*/ 387928 h 1080655"/>
+              <a:gd name="connsiteX14" fmla="*/ 1413163 w 3934691"/>
+              <a:gd name="connsiteY14" fmla="*/ 480291 h 1080655"/>
+              <a:gd name="connsiteX15" fmla="*/ 1459345 w 3934691"/>
+              <a:gd name="connsiteY15" fmla="*/ 554182 h 1080655"/>
+              <a:gd name="connsiteX16" fmla="*/ 1477818 w 3934691"/>
+              <a:gd name="connsiteY16" fmla="*/ 600364 h 1080655"/>
+              <a:gd name="connsiteX17" fmla="*/ 1524000 w 3934691"/>
+              <a:gd name="connsiteY17" fmla="*/ 665019 h 1080655"/>
+              <a:gd name="connsiteX18" fmla="*/ 1551709 w 3934691"/>
+              <a:gd name="connsiteY18" fmla="*/ 748146 h 1080655"/>
+              <a:gd name="connsiteX19" fmla="*/ 1570181 w 3934691"/>
+              <a:gd name="connsiteY19" fmla="*/ 803564 h 1080655"/>
+              <a:gd name="connsiteX20" fmla="*/ 1579418 w 3934691"/>
+              <a:gd name="connsiteY20" fmla="*/ 858982 h 1080655"/>
+              <a:gd name="connsiteX21" fmla="*/ 1597891 w 3934691"/>
+              <a:gd name="connsiteY21" fmla="*/ 895928 h 1080655"/>
+              <a:gd name="connsiteX22" fmla="*/ 1607127 w 3934691"/>
+              <a:gd name="connsiteY22" fmla="*/ 923637 h 1080655"/>
+              <a:gd name="connsiteX23" fmla="*/ 1634836 w 3934691"/>
+              <a:gd name="connsiteY23" fmla="*/ 942110 h 1080655"/>
+              <a:gd name="connsiteX24" fmla="*/ 1662545 w 3934691"/>
+              <a:gd name="connsiteY24" fmla="*/ 979055 h 1080655"/>
+              <a:gd name="connsiteX25" fmla="*/ 1764145 w 3934691"/>
+              <a:gd name="connsiteY25" fmla="*/ 1071419 h 1080655"/>
+              <a:gd name="connsiteX26" fmla="*/ 1856509 w 3934691"/>
+              <a:gd name="connsiteY26" fmla="*/ 1080655 h 1080655"/>
+              <a:gd name="connsiteX27" fmla="*/ 2355272 w 3934691"/>
+              <a:gd name="connsiteY27" fmla="*/ 1025237 h 1080655"/>
+              <a:gd name="connsiteX28" fmla="*/ 2419927 w 3934691"/>
+              <a:gd name="connsiteY28" fmla="*/ 969819 h 1080655"/>
+              <a:gd name="connsiteX29" fmla="*/ 2438400 w 3934691"/>
+              <a:gd name="connsiteY29" fmla="*/ 923637 h 1080655"/>
+              <a:gd name="connsiteX30" fmla="*/ 2475345 w 3934691"/>
+              <a:gd name="connsiteY30" fmla="*/ 868219 h 1080655"/>
+              <a:gd name="connsiteX31" fmla="*/ 2503054 w 3934691"/>
+              <a:gd name="connsiteY31" fmla="*/ 803564 h 1080655"/>
+              <a:gd name="connsiteX32" fmla="*/ 2521527 w 3934691"/>
+              <a:gd name="connsiteY32" fmla="*/ 655782 h 1080655"/>
+              <a:gd name="connsiteX33" fmla="*/ 2549236 w 3934691"/>
+              <a:gd name="connsiteY33" fmla="*/ 618837 h 1080655"/>
+              <a:gd name="connsiteX34" fmla="*/ 2567709 w 3934691"/>
+              <a:gd name="connsiteY34" fmla="*/ 563419 h 1080655"/>
+              <a:gd name="connsiteX35" fmla="*/ 2586181 w 3934691"/>
+              <a:gd name="connsiteY35" fmla="*/ 535710 h 1080655"/>
+              <a:gd name="connsiteX36" fmla="*/ 2595418 w 3934691"/>
+              <a:gd name="connsiteY36" fmla="*/ 489528 h 1080655"/>
+              <a:gd name="connsiteX37" fmla="*/ 2604654 w 3934691"/>
+              <a:gd name="connsiteY37" fmla="*/ 452582 h 1080655"/>
+              <a:gd name="connsiteX38" fmla="*/ 2623127 w 3934691"/>
+              <a:gd name="connsiteY38" fmla="*/ 415637 h 1080655"/>
+              <a:gd name="connsiteX39" fmla="*/ 2641600 w 3934691"/>
+              <a:gd name="connsiteY39" fmla="*/ 295564 h 1080655"/>
+              <a:gd name="connsiteX40" fmla="*/ 2660072 w 3934691"/>
+              <a:gd name="connsiteY40" fmla="*/ 203200 h 1080655"/>
+              <a:gd name="connsiteX41" fmla="*/ 2687781 w 3934691"/>
+              <a:gd name="connsiteY41" fmla="*/ 166255 h 1080655"/>
+              <a:gd name="connsiteX42" fmla="*/ 2974109 w 3934691"/>
+              <a:gd name="connsiteY42" fmla="*/ 129310 h 1080655"/>
+              <a:gd name="connsiteX43" fmla="*/ 3389745 w 3934691"/>
+              <a:gd name="connsiteY43" fmla="*/ 147782 h 1080655"/>
+              <a:gd name="connsiteX44" fmla="*/ 3694545 w 3934691"/>
+              <a:gd name="connsiteY44" fmla="*/ 157019 h 1080655"/>
+              <a:gd name="connsiteX45" fmla="*/ 3934691 w 3934691"/>
+              <a:gd name="connsiteY45" fmla="*/ 193964 h 1080655"/>
+            </a:gdLst>
+            <a:ahLst/>
+            <a:cxnLst>
+              <a:cxn ang="0">
+                <a:pos x="connsiteX0" y="connsiteY0"/>
+              </a:cxn>
+              <a:cxn ang="0">
+                <a:pos x="connsiteX1" y="connsiteY1"/>
+              </a:cxn>
+              <a:cxn ang="0">
+                <a:pos x="connsiteX2" y="connsiteY2"/>
+              </a:cxn>
+              <a:cxn ang="0">
+                <a:pos x="connsiteX3" y="connsiteY3"/>
+              </a:cxn>
+              <a:cxn ang="0">
+                <a:pos x="connsiteX4" y="connsiteY4"/>
+              </a:cxn>
+              <a:cxn ang="0">
+                <a:pos x="connsiteX5" y="connsiteY5"/>
+              </a:cxn>
+              <a:cxn ang="0">
+                <a:pos x="connsiteX6" y="connsiteY6"/>
+              </a:cxn>
+              <a:cxn ang="0">
+                <a:pos x="connsiteX7" y="connsiteY7"/>
+              </a:cxn>
+              <a:cxn ang="0">
+                <a:pos x="connsiteX8" y="connsiteY8"/>
+              </a:cxn>
+              <a:cxn ang="0">
+                <a:pos x="connsiteX9" y="connsiteY9"/>
+              </a:cxn>
+              <a:cxn ang="0">
+                <a:pos x="connsiteX10" y="connsiteY10"/>
+              </a:cxn>
+              <a:cxn ang="0">
+                <a:pos x="connsiteX11" y="connsiteY11"/>
+              </a:cxn>
+              <a:cxn ang="0">
+                <a:pos x="connsiteX12" y="connsiteY12"/>
+              </a:cxn>
+              <a:cxn ang="0">
+                <a:pos x="connsiteX13" y="connsiteY13"/>
+              </a:cxn>
+              <a:cxn ang="0">
+                <a:pos x="connsiteX14" y="connsiteY14"/>
+              </a:cxn>
+              <a:cxn ang="0">
+                <a:pos x="connsiteX15" y="connsiteY15"/>
+              </a:cxn>
+              <a:cxn ang="0">
+                <a:pos x="connsiteX16" y="connsiteY16"/>
+              </a:cxn>
+              <a:cxn ang="0">
+                <a:pos x="connsiteX17" y="connsiteY17"/>
+              </a:cxn>
+              <a:cxn ang="0">
+                <a:pos x="connsiteX18" y="connsiteY18"/>
+              </a:cxn>
+              <a:cxn ang="0">
+                <a:pos x="connsiteX19" y="connsiteY19"/>
+              </a:cxn>
+              <a:cxn ang="0">
+                <a:pos x="connsiteX20" y="connsiteY20"/>
+              </a:cxn>
+              <a:cxn ang="0">
+                <a:pos x="connsiteX21" y="connsiteY21"/>
+              </a:cxn>
+              <a:cxn ang="0">
+                <a:pos x="connsiteX22" y="connsiteY22"/>
+              </a:cxn>
+              <a:cxn ang="0">
+                <a:pos x="connsiteX23" y="connsiteY23"/>
+              </a:cxn>
+              <a:cxn ang="0">
+                <a:pos x="connsiteX24" y="connsiteY24"/>
+              </a:cxn>
+              <a:cxn ang="0">
+                <a:pos x="connsiteX25" y="connsiteY25"/>
+              </a:cxn>
+              <a:cxn ang="0">
+                <a:pos x="connsiteX26" y="connsiteY26"/>
+              </a:cxn>
+              <a:cxn ang="0">
+                <a:pos x="connsiteX27" y="connsiteY27"/>
+              </a:cxn>
+              <a:cxn ang="0">
+                <a:pos x="connsiteX28" y="connsiteY28"/>
+              </a:cxn>
+              <a:cxn ang="0">
+                <a:pos x="connsiteX29" y="connsiteY29"/>
+              </a:cxn>
+              <a:cxn ang="0">
+                <a:pos x="connsiteX30" y="connsiteY30"/>
+              </a:cxn>
+              <a:cxn ang="0">
+                <a:pos x="connsiteX31" y="connsiteY31"/>
+              </a:cxn>
+              <a:cxn ang="0">
+                <a:pos x="connsiteX32" y="connsiteY32"/>
+              </a:cxn>
+              <a:cxn ang="0">
+                <a:pos x="connsiteX33" y="connsiteY33"/>
+              </a:cxn>
+              <a:cxn ang="0">
+                <a:pos x="connsiteX34" y="connsiteY34"/>
+              </a:cxn>
+              <a:cxn ang="0">
+                <a:pos x="connsiteX35" y="connsiteY35"/>
+              </a:cxn>
+              <a:cxn ang="0">
+                <a:pos x="connsiteX36" y="connsiteY36"/>
+              </a:cxn>
+              <a:cxn ang="0">
+                <a:pos x="connsiteX37" y="connsiteY37"/>
+              </a:cxn>
+              <a:cxn ang="0">
+                <a:pos x="connsiteX38" y="connsiteY38"/>
+              </a:cxn>
+              <a:cxn ang="0">
+                <a:pos x="connsiteX39" y="connsiteY39"/>
+              </a:cxn>
+              <a:cxn ang="0">
+                <a:pos x="connsiteX40" y="connsiteY40"/>
+              </a:cxn>
+              <a:cxn ang="0">
+                <a:pos x="connsiteX41" y="connsiteY41"/>
+              </a:cxn>
+              <a:cxn ang="0">
+                <a:pos x="connsiteX42" y="connsiteY42"/>
+              </a:cxn>
+              <a:cxn ang="0">
+                <a:pos x="connsiteX43" y="connsiteY43"/>
+              </a:cxn>
+              <a:cxn ang="0">
+                <a:pos x="connsiteX44" y="connsiteY44"/>
+              </a:cxn>
+              <a:cxn ang="0">
+                <a:pos x="connsiteX45" y="connsiteY45"/>
+              </a:cxn>
+            </a:cxnLst>
+            <a:rect l="l" t="t" r="r" b="b"/>
+            <a:pathLst>
+              <a:path w="3934691" h="1080655">
+                <a:moveTo>
+                  <a:pt x="0" y="83128"/>
+                </a:moveTo>
+                <a:cubicBezTo>
+                  <a:pt x="43103" y="80049"/>
+                  <a:pt x="86859" y="81977"/>
+                  <a:pt x="129309" y="73891"/>
+                </a:cubicBezTo>
+                <a:cubicBezTo>
+                  <a:pt x="152342" y="69504"/>
+                  <a:pt x="171553" y="53077"/>
+                  <a:pt x="193963" y="46182"/>
+                </a:cubicBezTo>
+                <a:cubicBezTo>
+                  <a:pt x="211862" y="40675"/>
+                  <a:pt x="230908" y="40025"/>
+                  <a:pt x="249381" y="36946"/>
+                </a:cubicBezTo>
+                <a:cubicBezTo>
+                  <a:pt x="267854" y="30788"/>
+                  <a:pt x="286149" y="24068"/>
+                  <a:pt x="304800" y="18473"/>
+                </a:cubicBezTo>
+                <a:cubicBezTo>
+                  <a:pt x="420728" y="-16305"/>
+                  <a:pt x="276369" y="31031"/>
+                  <a:pt x="369454" y="0"/>
+                </a:cubicBezTo>
+                <a:cubicBezTo>
+                  <a:pt x="471054" y="3079"/>
+                  <a:pt x="572958" y="795"/>
+                  <a:pt x="674254" y="9237"/>
+                </a:cubicBezTo>
+                <a:cubicBezTo>
+                  <a:pt x="685316" y="10159"/>
+                  <a:pt x="690985" y="26063"/>
+                  <a:pt x="701963" y="27710"/>
+                </a:cubicBezTo>
+                <a:cubicBezTo>
+                  <a:pt x="753813" y="35487"/>
+                  <a:pt x="806694" y="33073"/>
+                  <a:pt x="858981" y="36946"/>
+                </a:cubicBezTo>
+                <a:cubicBezTo>
+                  <a:pt x="1157712" y="59073"/>
+                  <a:pt x="603069" y="31670"/>
+                  <a:pt x="1173018" y="55419"/>
+                </a:cubicBezTo>
+                <a:cubicBezTo>
+                  <a:pt x="1191004" y="61414"/>
+                  <a:pt x="1224243" y="71042"/>
+                  <a:pt x="1237672" y="83128"/>
+                </a:cubicBezTo>
+                <a:cubicBezTo>
+                  <a:pt x="1258771" y="102117"/>
+                  <a:pt x="1274102" y="126684"/>
+                  <a:pt x="1293091" y="147782"/>
+                </a:cubicBezTo>
+                <a:cubicBezTo>
+                  <a:pt x="1301829" y="157491"/>
+                  <a:pt x="1311564" y="166255"/>
+                  <a:pt x="1320800" y="175491"/>
+                </a:cubicBezTo>
+                <a:cubicBezTo>
+                  <a:pt x="1321335" y="178971"/>
+                  <a:pt x="1348939" y="370316"/>
+                  <a:pt x="1357745" y="387928"/>
+                </a:cubicBezTo>
+                <a:cubicBezTo>
+                  <a:pt x="1386147" y="444730"/>
+                  <a:pt x="1368581" y="413417"/>
+                  <a:pt x="1413163" y="480291"/>
+                </a:cubicBezTo>
+                <a:cubicBezTo>
+                  <a:pt x="1433319" y="560911"/>
+                  <a:pt x="1404239" y="471522"/>
+                  <a:pt x="1459345" y="554182"/>
+                </a:cubicBezTo>
+                <a:cubicBezTo>
+                  <a:pt x="1468542" y="567977"/>
+                  <a:pt x="1469464" y="586043"/>
+                  <a:pt x="1477818" y="600364"/>
+                </a:cubicBezTo>
+                <a:cubicBezTo>
+                  <a:pt x="1491163" y="623241"/>
+                  <a:pt x="1510655" y="642142"/>
+                  <a:pt x="1524000" y="665019"/>
+                </a:cubicBezTo>
+                <a:cubicBezTo>
+                  <a:pt x="1543061" y="697695"/>
+                  <a:pt x="1541609" y="714480"/>
+                  <a:pt x="1551709" y="748146"/>
+                </a:cubicBezTo>
+                <a:cubicBezTo>
+                  <a:pt x="1557304" y="766797"/>
+                  <a:pt x="1566980" y="784357"/>
+                  <a:pt x="1570181" y="803564"/>
+                </a:cubicBezTo>
+                <a:cubicBezTo>
+                  <a:pt x="1573260" y="822037"/>
+                  <a:pt x="1574037" y="841044"/>
+                  <a:pt x="1579418" y="858982"/>
+                </a:cubicBezTo>
+                <a:cubicBezTo>
+                  <a:pt x="1583375" y="872170"/>
+                  <a:pt x="1592467" y="883272"/>
+                  <a:pt x="1597891" y="895928"/>
+                </a:cubicBezTo>
+                <a:cubicBezTo>
+                  <a:pt x="1601726" y="904877"/>
+                  <a:pt x="1601045" y="916034"/>
+                  <a:pt x="1607127" y="923637"/>
+                </a:cubicBezTo>
+                <a:cubicBezTo>
+                  <a:pt x="1614062" y="932305"/>
+                  <a:pt x="1626987" y="934261"/>
+                  <a:pt x="1634836" y="942110"/>
+                </a:cubicBezTo>
+                <a:cubicBezTo>
+                  <a:pt x="1645721" y="952995"/>
+                  <a:pt x="1652247" y="967613"/>
+                  <a:pt x="1662545" y="979055"/>
+                </a:cubicBezTo>
+                <a:cubicBezTo>
+                  <a:pt x="1669055" y="986288"/>
+                  <a:pt x="1744990" y="1065034"/>
+                  <a:pt x="1764145" y="1071419"/>
+                </a:cubicBezTo>
+                <a:cubicBezTo>
+                  <a:pt x="1793499" y="1081204"/>
+                  <a:pt x="1825721" y="1077576"/>
+                  <a:pt x="1856509" y="1080655"/>
+                </a:cubicBezTo>
+                <a:cubicBezTo>
+                  <a:pt x="2113143" y="1029328"/>
+                  <a:pt x="1948096" y="1056558"/>
+                  <a:pt x="2355272" y="1025237"/>
+                </a:cubicBezTo>
+                <a:cubicBezTo>
+                  <a:pt x="2370562" y="1013770"/>
+                  <a:pt x="2408575" y="987982"/>
+                  <a:pt x="2419927" y="969819"/>
+                </a:cubicBezTo>
+                <a:cubicBezTo>
+                  <a:pt x="2428714" y="955759"/>
+                  <a:pt x="2430461" y="938192"/>
+                  <a:pt x="2438400" y="923637"/>
+                </a:cubicBezTo>
+                <a:cubicBezTo>
+                  <a:pt x="2449031" y="904147"/>
+                  <a:pt x="2463923" y="887257"/>
+                  <a:pt x="2475345" y="868219"/>
+                </a:cubicBezTo>
+                <a:cubicBezTo>
+                  <a:pt x="2492466" y="839684"/>
+                  <a:pt x="2493499" y="832231"/>
+                  <a:pt x="2503054" y="803564"/>
+                </a:cubicBezTo>
+                <a:cubicBezTo>
+                  <a:pt x="2503110" y="803006"/>
+                  <a:pt x="2513889" y="674876"/>
+                  <a:pt x="2521527" y="655782"/>
+                </a:cubicBezTo>
+                <a:cubicBezTo>
+                  <a:pt x="2527244" y="641489"/>
+                  <a:pt x="2540000" y="631152"/>
+                  <a:pt x="2549236" y="618837"/>
+                </a:cubicBezTo>
+                <a:cubicBezTo>
+                  <a:pt x="2555394" y="600364"/>
+                  <a:pt x="2559801" y="581213"/>
+                  <a:pt x="2567709" y="563419"/>
+                </a:cubicBezTo>
+                <a:cubicBezTo>
+                  <a:pt x="2572217" y="553275"/>
+                  <a:pt x="2582283" y="546104"/>
+                  <a:pt x="2586181" y="535710"/>
+                </a:cubicBezTo>
+                <a:cubicBezTo>
+                  <a:pt x="2591693" y="521011"/>
+                  <a:pt x="2592012" y="504853"/>
+                  <a:pt x="2595418" y="489528"/>
+                </a:cubicBezTo>
+                <a:cubicBezTo>
+                  <a:pt x="2598172" y="477136"/>
+                  <a:pt x="2600197" y="464468"/>
+                  <a:pt x="2604654" y="452582"/>
+                </a:cubicBezTo>
+                <a:cubicBezTo>
+                  <a:pt x="2609488" y="439690"/>
+                  <a:pt x="2616969" y="427952"/>
+                  <a:pt x="2623127" y="415637"/>
+                </a:cubicBezTo>
+                <a:cubicBezTo>
+                  <a:pt x="2640335" y="346801"/>
+                  <a:pt x="2628302" y="401943"/>
+                  <a:pt x="2641600" y="295564"/>
+                </a:cubicBezTo>
+                <a:cubicBezTo>
+                  <a:pt x="2643305" y="281922"/>
+                  <a:pt x="2647936" y="224439"/>
+                  <a:pt x="2660072" y="203200"/>
+                </a:cubicBezTo>
+                <a:cubicBezTo>
+                  <a:pt x="2667709" y="189834"/>
+                  <a:pt x="2678545" y="178570"/>
+                  <a:pt x="2687781" y="166255"/>
+                </a:cubicBezTo>
+                <a:cubicBezTo>
+                  <a:pt x="2725908" y="51881"/>
+                  <a:pt x="2690474" y="129310"/>
+                  <a:pt x="2974109" y="129310"/>
+                </a:cubicBezTo>
+                <a:cubicBezTo>
+                  <a:pt x="3195657" y="129310"/>
+                  <a:pt x="3200993" y="140232"/>
+                  <a:pt x="3389745" y="147782"/>
+                </a:cubicBezTo>
+                <a:lnTo>
+                  <a:pt x="3694545" y="157019"/>
+                </a:lnTo>
+                <a:cubicBezTo>
+                  <a:pt x="3934735" y="165302"/>
+                  <a:pt x="3901150" y="93347"/>
+                  <a:pt x="3934691" y="193964"/>
+                </a:cubicBezTo>
+              </a:path>
+            </a:pathLst>
+          </a:custGeom>
+          <a:noFill/>
+          <a:ln w="57150">
+            <a:solidFill>
+              <a:srgbClr val="FFFF00"/>
+            </a:solidFill>
+          </a:ln>
+        </p:spPr>
+        <p:style>
+          <a:lnRef idx="2">
+            <a:schemeClr val="accent1">
+              <a:shade val="15000"/>
+            </a:schemeClr>
+          </a:lnRef>
+          <a:fillRef idx="1">
+            <a:schemeClr val="accent1"/>
+          </a:fillRef>
+          <a:effectRef idx="0">
+            <a:schemeClr val="accent1"/>
+          </a:effectRef>
+          <a:fontRef idx="minor">
+            <a:schemeClr val="lt1"/>
+          </a:fontRef>
+        </p:style>
+        <p:txBody>
+          <a:bodyPr rtlCol="0" anchor="ctr"/>
+          <a:lstStyle/>
+          <a:p>
+            <a:pPr algn="ctr"/>
+            <a:endParaRPr lang="en-SG" dirty="0"/>
+          </a:p>
+        </p:txBody>
+      </p:sp>
+      <p:sp>
+        <p:nvSpPr>
+          <p:cNvPr id="17" name="Arrow: Right 16">
+            <a:extLst>
+              <a:ext uri="{FF2B5EF4-FFF2-40B4-BE49-F238E27FC236}">
+                <a16:creationId xmlns:a16="http://schemas.microsoft.com/office/drawing/2014/main" id="{B12CD3B2-7C08-3A0E-C9A6-F21D7BCEE36E}"/>
+              </a:ext>
+            </a:extLst>
+          </p:cNvPr>
+          <p:cNvSpPr/>
+          <p:nvPr/>
+        </p:nvSpPr>
+        <p:spPr>
+          <a:xfrm rot="5400000">
+            <a:off x="2234902" y="3020263"/>
+            <a:ext cx="422933" cy="221672"/>
+          </a:xfrm>
+          <a:prstGeom prst="rightArrow">
+            <a:avLst/>
+          </a:prstGeom>
+        </p:spPr>
+        <p:style>
+          <a:lnRef idx="2">
+            <a:schemeClr val="accent1">
+              <a:shade val="15000"/>
+            </a:schemeClr>
+          </a:lnRef>
+          <a:fillRef idx="1">
+            <a:schemeClr val="accent1"/>
+          </a:fillRef>
+          <a:effectRef idx="0">
+            <a:schemeClr val="accent1"/>
+          </a:effectRef>
+          <a:fontRef idx="minor">
+            <a:schemeClr val="lt1"/>
+          </a:fontRef>
+        </p:style>
+        <p:txBody>
+          <a:bodyPr rtlCol="0" anchor="ctr"/>
+          <a:lstStyle/>
+          <a:p>
+            <a:pPr algn="ctr"/>
+            <a:endParaRPr lang="en-SG"/>
+          </a:p>
+        </p:txBody>
+      </p:sp>
+      <p:sp>
+        <p:nvSpPr>
+          <p:cNvPr id="18" name="Arrow: Right 17">
+            <a:extLst>
+              <a:ext uri="{FF2B5EF4-FFF2-40B4-BE49-F238E27FC236}">
+                <a16:creationId xmlns:a16="http://schemas.microsoft.com/office/drawing/2014/main" id="{B584F765-C019-634A-D409-471321B6EDB4}"/>
+              </a:ext>
+            </a:extLst>
+          </p:cNvPr>
+          <p:cNvSpPr/>
+          <p:nvPr/>
+        </p:nvSpPr>
+        <p:spPr>
+          <a:xfrm rot="2608374">
+            <a:off x="6355144" y="2763096"/>
+            <a:ext cx="1011160" cy="147182"/>
+          </a:xfrm>
+          <a:prstGeom prst="rightArrow">
+            <a:avLst/>
+          </a:prstGeom>
+          <a:solidFill>
+            <a:srgbClr val="FF0000"/>
+          </a:solidFill>
+        </p:spPr>
+        <p:style>
+          <a:lnRef idx="2">
+            <a:schemeClr val="accent1">
+              <a:shade val="15000"/>
+            </a:schemeClr>
+          </a:lnRef>
+          <a:fillRef idx="1">
+            <a:schemeClr val="accent1"/>
+          </a:fillRef>
+          <a:effectRef idx="0">
+            <a:schemeClr val="accent1"/>
+          </a:effectRef>
+          <a:fontRef idx="minor">
+            <a:schemeClr val="lt1"/>
+          </a:fontRef>
+        </p:style>
+        <p:txBody>
+          <a:bodyPr rtlCol="0" anchor="ctr"/>
+          <a:lstStyle/>
+          <a:p>
+            <a:pPr algn="ctr"/>
+            <a:endParaRPr lang="en-SG"/>
+          </a:p>
+        </p:txBody>
+      </p:sp>
+      <p:sp>
+        <p:nvSpPr>
+          <p:cNvPr id="19" name="TextBox 18">
+            <a:extLst>
+              <a:ext uri="{FF2B5EF4-FFF2-40B4-BE49-F238E27FC236}">
+                <a16:creationId xmlns:a16="http://schemas.microsoft.com/office/drawing/2014/main" id="{0FFF77D4-5998-E8B2-9E99-4404D76B4EF9}"/>
+              </a:ext>
+            </a:extLst>
+          </p:cNvPr>
+          <p:cNvSpPr txBox="1"/>
+          <p:nvPr/>
+        </p:nvSpPr>
+        <p:spPr>
+          <a:xfrm>
+            <a:off x="2654821" y="2838711"/>
+            <a:ext cx="3546763" cy="584775"/>
+          </a:xfrm>
+          <a:prstGeom prst="rect">
+            <a:avLst/>
+          </a:prstGeom>
+          <a:noFill/>
+        </p:spPr>
+        <p:txBody>
+          <a:bodyPr wrap="square">
+            <a:spAutoFit/>
+          </a:bodyPr>
+          <a:lstStyle/>
+          <a:p>
+            <a:r>
+              <a:rPr lang="en-SG" sz="1600" b="1" dirty="0">
+                <a:solidFill>
+                  <a:schemeClr val="accent1"/>
+                </a:solidFill>
+              </a:rPr>
+              <a:t>Normal contour map generate by the correct CMGU firmware</a:t>
+            </a:r>
+          </a:p>
+        </p:txBody>
+      </p:sp>
+      <p:sp>
+        <p:nvSpPr>
+          <p:cNvPr id="20" name="TextBox 19">
+            <a:extLst>
+              <a:ext uri="{FF2B5EF4-FFF2-40B4-BE49-F238E27FC236}">
+                <a16:creationId xmlns:a16="http://schemas.microsoft.com/office/drawing/2014/main" id="{24EBE036-523D-E05A-D8E4-ACA319ADCA93}"/>
+              </a:ext>
+            </a:extLst>
+          </p:cNvPr>
+          <p:cNvSpPr txBox="1"/>
+          <p:nvPr/>
+        </p:nvSpPr>
+        <p:spPr>
+          <a:xfrm>
+            <a:off x="7278255" y="2772870"/>
+            <a:ext cx="4077026" cy="584775"/>
+          </a:xfrm>
+          <a:prstGeom prst="rect">
+            <a:avLst/>
+          </a:prstGeom>
+          <a:noFill/>
+        </p:spPr>
+        <p:txBody>
+          <a:bodyPr wrap="square">
+            <a:spAutoFit/>
+          </a:bodyPr>
+          <a:lstStyle/>
+          <a:p>
+            <a:r>
+              <a:rPr lang="en-SG" sz="1600" b="1" dirty="0">
+                <a:solidFill>
+                  <a:srgbClr val="FF0000"/>
+                </a:solidFill>
+              </a:rPr>
+              <a:t>Error contour map generate by the malicious CMGU firmware</a:t>
+            </a:r>
+          </a:p>
+        </p:txBody>
+      </p:sp>
+    </p:spTree>
+    <p:extLst>
+      <p:ext uri="{BB962C8B-B14F-4D97-AF65-F5344CB8AC3E}">
+        <p14:creationId xmlns:p14="http://schemas.microsoft.com/office/powerpoint/2010/main" val="166406356"/>
       </p:ext>
     </p:extLst>
   </p:cSld>

</xml_diff>